<commit_message>
Insert reactor flow sheet
</commit_message>
<xml_diff>
--- a/Case_Study_presentation.pptx
+++ b/Case_Study_presentation.pptx
@@ -20,8 +20,8 @@
   </p:handoutMasterIdLst>
   <p:sldIdLst>
     <p:sldId id="268" r:id="rId10"/>
-    <p:sldId id="272" r:id="rId11"/>
-    <p:sldId id="269" r:id="rId12"/>
+    <p:sldId id="269" r:id="rId11"/>
+    <p:sldId id="272" r:id="rId12"/>
     <p:sldId id="270" r:id="rId13"/>
     <p:sldId id="271" r:id="rId14"/>
     <p:sldId id="273" r:id="rId15"/>
@@ -129,7 +129,7 @@
   </p:defaultTextStyle>
   <p:extLst>
     <p:ext uri="{EFAFB233-063F-42B5-8137-9DF3F51BA10A}">
-      <p15:sldGuideLst xmlns:p15="http://schemas.microsoft.com/office/powerpoint/2012/main" xmlns="">
+      <p15:sldGuideLst xmlns="" xmlns:p15="http://schemas.microsoft.com/office/powerpoint/2012/main">
         <p15:guide id="1" orient="horz" pos="391">
           <p15:clr>
             <a:srgbClr val="A4A3A4"/>
@@ -282,7 +282,7 @@
               <a:rPr lang="de-DE" smtClean="0">
                 <a:latin typeface="Arial" panose="020B0604020202020204" pitchFamily="34" charset="0"/>
               </a:rPr>
-              <a:t>17/05/18</a:t>
+              <a:t>18/05/18</a:t>
             </a:fld>
             <a:endParaRPr lang="de-DE" dirty="0">
               <a:latin typeface="Arial" panose="020B0604020202020204" pitchFamily="34" charset="0"/>
@@ -461,7 +461,7 @@
             <a:fld id="{BCDB334D-D17F-49C4-91DD-37BB7E818209}" type="datetimeFigureOut">
               <a:rPr lang="de-CH" smtClean="0"/>
               <a:pPr/>
-              <a:t>17/05/18</a:t>
+              <a:t>18/05/18</a:t>
             </a:fld>
             <a:endParaRPr lang="de-CH" dirty="0"/>
           </a:p>
@@ -1067,7 +1067,7 @@
           <a:p>
             <a:r>
               <a:rPr lang="en-GB" smtClean="0"/>
-              <a:t>Group 1</a:t>
+              <a:t>Group A</a:t>
             </a:r>
             <a:endParaRPr lang="en-GB" dirty="0"/>
           </a:p>
@@ -1372,7 +1372,7 @@
           <a:p>
             <a:r>
               <a:rPr lang="en-GB" smtClean="0"/>
-              <a:t>Group 1</a:t>
+              <a:t>Group A</a:t>
             </a:r>
             <a:endParaRPr lang="en-GB" dirty="0"/>
           </a:p>
@@ -1652,7 +1652,7 @@
           <a:p>
             <a:r>
               <a:rPr lang="en-GB" smtClean="0"/>
-              <a:t>Group 1</a:t>
+              <a:t>Group A</a:t>
             </a:r>
             <a:endParaRPr lang="en-GB" dirty="0"/>
           </a:p>
@@ -1960,7 +1960,7 @@
           <a:p>
             <a:r>
               <a:rPr lang="en-GB" smtClean="0"/>
-              <a:t>Group 1</a:t>
+              <a:t>Group A</a:t>
             </a:r>
             <a:endParaRPr lang="en-GB" dirty="0"/>
           </a:p>
@@ -2044,7 +2044,7 @@
   </p:timing>
   <p:extLst mod="1">
     <p:ext uri="{DCECCB84-F9BA-43D5-87BE-67443E8EF086}">
-      <p15:sldGuideLst xmlns:p15="http://schemas.microsoft.com/office/powerpoint/2012/main" xmlns=""/>
+      <p15:sldGuideLst xmlns="" xmlns:p15="http://schemas.microsoft.com/office/powerpoint/2012/main"/>
     </p:ext>
   </p:extLst>
 </p:sldLayout>
@@ -3253,7 +3253,7 @@
           <a:p>
             <a:r>
               <a:rPr lang="en-GB" smtClean="0"/>
-              <a:t>Group 1</a:t>
+              <a:t>Group A</a:t>
             </a:r>
             <a:endParaRPr lang="en-GB" dirty="0"/>
           </a:p>
@@ -3671,7 +3671,7 @@
           <a:p>
             <a:r>
               <a:rPr lang="en-GB" smtClean="0"/>
-              <a:t>Group 1</a:t>
+              <a:t>Group A</a:t>
             </a:r>
             <a:endParaRPr lang="en-GB" dirty="0"/>
           </a:p>
@@ -3815,7 +3815,7 @@
           <a:p>
             <a:r>
               <a:rPr lang="en-GB" smtClean="0"/>
-              <a:t>Group 1</a:t>
+              <a:t>Group A</a:t>
             </a:r>
             <a:endParaRPr lang="en-GB" dirty="0"/>
           </a:p>
@@ -3956,7 +3956,7 @@
           <a:p>
             <a:r>
               <a:rPr lang="en-GB" smtClean="0"/>
-              <a:t>Group 1</a:t>
+              <a:t>Group A</a:t>
             </a:r>
             <a:endParaRPr lang="en-GB" dirty="0"/>
           </a:p>
@@ -4144,7 +4144,7 @@
           <a:p>
             <a:r>
               <a:rPr lang="en-GB" smtClean="0"/>
-              <a:t>Group 1</a:t>
+              <a:t>Group A</a:t>
             </a:r>
             <a:endParaRPr lang="en-GB" dirty="0"/>
           </a:p>
@@ -4474,7 +4474,7 @@
           <a:p>
             <a:r>
               <a:rPr lang="en-GB" smtClean="0"/>
-              <a:t>Group 1</a:t>
+              <a:t>Group A</a:t>
             </a:r>
             <a:endParaRPr lang="en-GB" dirty="0"/>
           </a:p>
@@ -4754,7 +4754,7 @@
           <a:p>
             <a:r>
               <a:rPr lang="en-GB" smtClean="0"/>
-              <a:t>Group 1</a:t>
+              <a:t>Group A</a:t>
             </a:r>
             <a:endParaRPr lang="en-GB" dirty="0"/>
           </a:p>
@@ -5066,7 +5066,7 @@
           <a:p>
             <a:r>
               <a:rPr lang="en-GB" smtClean="0"/>
-              <a:t>Group 1</a:t>
+              <a:t>Group A</a:t>
             </a:r>
             <a:endParaRPr lang="en-GB" dirty="0"/>
           </a:p>
@@ -5374,7 +5374,7 @@
           <a:p>
             <a:r>
               <a:rPr lang="en-GB" smtClean="0"/>
-              <a:t>Group 1</a:t>
+              <a:t>Group A</a:t>
             </a:r>
             <a:endParaRPr lang="en-GB" dirty="0"/>
           </a:p>
@@ -5458,7 +5458,7 @@
   </p:timing>
   <p:extLst mod="1">
     <p:ext uri="{DCECCB84-F9BA-43D5-87BE-67443E8EF086}">
-      <p15:sldGuideLst xmlns:p15="http://schemas.microsoft.com/office/powerpoint/2012/main" xmlns=""/>
+      <p15:sldGuideLst xmlns="" xmlns:p15="http://schemas.microsoft.com/office/powerpoint/2012/main"/>
     </p:ext>
   </p:extLst>
 </p:sldLayout>
@@ -6667,7 +6667,7 @@
           <a:p>
             <a:r>
               <a:rPr lang="en-GB" smtClean="0"/>
-              <a:t>Group 1</a:t>
+              <a:t>Group A</a:t>
             </a:r>
             <a:endParaRPr lang="en-GB" dirty="0"/>
           </a:p>
@@ -7085,7 +7085,7 @@
           <a:p>
             <a:r>
               <a:rPr lang="en-GB" smtClean="0"/>
-              <a:t>Group 1</a:t>
+              <a:t>Group A</a:t>
             </a:r>
             <a:endParaRPr lang="en-GB" dirty="0"/>
           </a:p>
@@ -7229,7 +7229,7 @@
           <a:p>
             <a:r>
               <a:rPr lang="en-GB" smtClean="0"/>
-              <a:t>Group 1</a:t>
+              <a:t>Group A</a:t>
             </a:r>
             <a:endParaRPr lang="en-GB" dirty="0"/>
           </a:p>
@@ -7370,7 +7370,7 @@
           <a:p>
             <a:r>
               <a:rPr lang="en-GB" smtClean="0"/>
-              <a:t>Group 1</a:t>
+              <a:t>Group A</a:t>
             </a:r>
             <a:endParaRPr lang="en-GB" dirty="0"/>
           </a:p>
@@ -7558,7 +7558,7 @@
           <a:p>
             <a:r>
               <a:rPr lang="en-GB" smtClean="0"/>
-              <a:t>Group 1</a:t>
+              <a:t>Group A</a:t>
             </a:r>
             <a:endParaRPr lang="en-GB" dirty="0"/>
           </a:p>
@@ -7888,7 +7888,7 @@
           <a:p>
             <a:r>
               <a:rPr lang="en-GB" smtClean="0"/>
-              <a:t>Group 1</a:t>
+              <a:t>Group A</a:t>
             </a:r>
             <a:endParaRPr lang="en-GB" dirty="0"/>
           </a:p>
@@ -8168,7 +8168,7 @@
           <a:p>
             <a:r>
               <a:rPr lang="en-GB" smtClean="0"/>
-              <a:t>Group 1</a:t>
+              <a:t>Group A</a:t>
             </a:r>
             <a:endParaRPr lang="en-GB" dirty="0"/>
           </a:p>
@@ -8476,7 +8476,7 @@
           <a:p>
             <a:r>
               <a:rPr lang="en-GB" smtClean="0"/>
-              <a:t>Group 1</a:t>
+              <a:t>Group A</a:t>
             </a:r>
             <a:endParaRPr lang="en-GB" dirty="0"/>
           </a:p>
@@ -8560,7 +8560,7 @@
   </p:timing>
   <p:extLst mod="1">
     <p:ext uri="{DCECCB84-F9BA-43D5-87BE-67443E8EF086}">
-      <p15:sldGuideLst xmlns:p15="http://schemas.microsoft.com/office/powerpoint/2012/main" xmlns=""/>
+      <p15:sldGuideLst xmlns="" xmlns:p15="http://schemas.microsoft.com/office/powerpoint/2012/main"/>
     </p:ext>
   </p:extLst>
 </p:sldLayout>
@@ -8789,7 +8789,7 @@
           <a:p>
             <a:r>
               <a:rPr lang="en-GB" smtClean="0"/>
-              <a:t>Group 1</a:t>
+              <a:t>Group A</a:t>
             </a:r>
             <a:endParaRPr lang="en-GB" dirty="0"/>
           </a:p>
@@ -8873,7 +8873,7 @@
   </p:timing>
   <p:extLst mod="1">
     <p:ext uri="{DCECCB84-F9BA-43D5-87BE-67443E8EF086}">
-      <p15:sldGuideLst xmlns:p15="http://schemas.microsoft.com/office/powerpoint/2012/main" xmlns=""/>
+      <p15:sldGuideLst xmlns="" xmlns:p15="http://schemas.microsoft.com/office/powerpoint/2012/main"/>
     </p:ext>
   </p:extLst>
 </p:sldLayout>
@@ -10082,7 +10082,7 @@
           <a:p>
             <a:r>
               <a:rPr lang="en-GB" smtClean="0"/>
-              <a:t>Group 1</a:t>
+              <a:t>Group A</a:t>
             </a:r>
             <a:endParaRPr lang="en-GB" dirty="0"/>
           </a:p>
@@ -10500,7 +10500,7 @@
           <a:p>
             <a:r>
               <a:rPr lang="en-GB" smtClean="0"/>
-              <a:t>Group 1</a:t>
+              <a:t>Group A</a:t>
             </a:r>
             <a:endParaRPr lang="en-GB" dirty="0"/>
           </a:p>
@@ -10644,7 +10644,7 @@
           <a:p>
             <a:r>
               <a:rPr lang="en-GB" smtClean="0"/>
-              <a:t>Group 1</a:t>
+              <a:t>Group A</a:t>
             </a:r>
             <a:endParaRPr lang="en-GB" dirty="0"/>
           </a:p>
@@ -10785,7 +10785,7 @@
           <a:p>
             <a:r>
               <a:rPr lang="en-GB" smtClean="0"/>
-              <a:t>Group 1</a:t>
+              <a:t>Group A</a:t>
             </a:r>
             <a:endParaRPr lang="en-GB" dirty="0"/>
           </a:p>
@@ -10973,7 +10973,7 @@
           <a:p>
             <a:r>
               <a:rPr lang="en-GB" smtClean="0"/>
-              <a:t>Group 1</a:t>
+              <a:t>Group A</a:t>
             </a:r>
             <a:endParaRPr lang="en-GB" dirty="0"/>
           </a:p>
@@ -11303,7 +11303,7 @@
           <a:p>
             <a:r>
               <a:rPr lang="en-GB" smtClean="0"/>
-              <a:t>Group 1</a:t>
+              <a:t>Group A</a:t>
             </a:r>
             <a:endParaRPr lang="en-GB" dirty="0"/>
           </a:p>
@@ -11583,7 +11583,7 @@
           <a:p>
             <a:r>
               <a:rPr lang="en-GB" smtClean="0"/>
-              <a:t>Group 1</a:t>
+              <a:t>Group A</a:t>
             </a:r>
             <a:endParaRPr lang="en-GB" dirty="0"/>
           </a:p>
@@ -11891,7 +11891,7 @@
           <a:p>
             <a:r>
               <a:rPr lang="en-GB" smtClean="0"/>
-              <a:t>Group 1</a:t>
+              <a:t>Group A</a:t>
             </a:r>
             <a:endParaRPr lang="en-GB" dirty="0"/>
           </a:p>
@@ -11975,7 +11975,7 @@
   </p:timing>
   <p:extLst mod="1">
     <p:ext uri="{DCECCB84-F9BA-43D5-87BE-67443E8EF086}">
-      <p15:sldGuideLst xmlns:p15="http://schemas.microsoft.com/office/powerpoint/2012/main" xmlns=""/>
+      <p15:sldGuideLst xmlns="" xmlns:p15="http://schemas.microsoft.com/office/powerpoint/2012/main"/>
     </p:ext>
   </p:extLst>
 </p:sldLayout>
@@ -14225,7 +14225,7 @@
           <a:p>
             <a:r>
               <a:rPr lang="en-GB" smtClean="0"/>
-              <a:t>Group 1</a:t>
+              <a:t>Group A</a:t>
             </a:r>
             <a:endParaRPr lang="en-GB" dirty="0"/>
           </a:p>
@@ -14643,7 +14643,7 @@
           <a:p>
             <a:r>
               <a:rPr lang="en-GB" smtClean="0"/>
-              <a:t>Group 1</a:t>
+              <a:t>Group A</a:t>
             </a:r>
             <a:endParaRPr lang="en-GB" dirty="0"/>
           </a:p>
@@ -14787,7 +14787,7 @@
           <a:p>
             <a:r>
               <a:rPr lang="en-GB" smtClean="0"/>
-              <a:t>Group 1</a:t>
+              <a:t>Group A</a:t>
             </a:r>
             <a:endParaRPr lang="en-GB" dirty="0"/>
           </a:p>
@@ -14928,7 +14928,7 @@
           <a:p>
             <a:r>
               <a:rPr lang="en-GB" smtClean="0"/>
-              <a:t>Group 1</a:t>
+              <a:t>Group A</a:t>
             </a:r>
             <a:endParaRPr lang="en-GB" dirty="0"/>
           </a:p>
@@ -15116,7 +15116,7 @@
           <a:p>
             <a:r>
               <a:rPr lang="en-GB" smtClean="0"/>
-              <a:t>Group 1</a:t>
+              <a:t>Group A</a:t>
             </a:r>
             <a:endParaRPr lang="en-GB" dirty="0"/>
           </a:p>
@@ -15446,7 +15446,7 @@
           <a:p>
             <a:r>
               <a:rPr lang="en-GB" smtClean="0"/>
-              <a:t>Group 1</a:t>
+              <a:t>Group A</a:t>
             </a:r>
             <a:endParaRPr lang="en-GB" dirty="0"/>
           </a:p>
@@ -15726,7 +15726,7 @@
           <a:p>
             <a:r>
               <a:rPr lang="en-GB" smtClean="0"/>
-              <a:t>Group 1</a:t>
+              <a:t>Group A</a:t>
             </a:r>
             <a:endParaRPr lang="en-GB" dirty="0"/>
           </a:p>
@@ -16034,7 +16034,7 @@
           <a:p>
             <a:r>
               <a:rPr lang="en-GB" smtClean="0"/>
-              <a:t>Group 1</a:t>
+              <a:t>Group A</a:t>
             </a:r>
             <a:endParaRPr lang="en-GB" dirty="0"/>
           </a:p>
@@ -16118,7 +16118,7 @@
   </p:timing>
   <p:extLst mod="1">
     <p:ext uri="{DCECCB84-F9BA-43D5-87BE-67443E8EF086}">
-      <p15:sldGuideLst xmlns:p15="http://schemas.microsoft.com/office/powerpoint/2012/main" xmlns=""/>
+      <p15:sldGuideLst xmlns="" xmlns:p15="http://schemas.microsoft.com/office/powerpoint/2012/main"/>
     </p:ext>
   </p:extLst>
 </p:sldLayout>
@@ -17327,7 +17327,7 @@
           <a:p>
             <a:r>
               <a:rPr lang="en-GB" smtClean="0"/>
-              <a:t>Group 1</a:t>
+              <a:t>Group A</a:t>
             </a:r>
             <a:endParaRPr lang="en-GB" dirty="0"/>
           </a:p>
@@ -17571,7 +17571,7 @@
           <a:p>
             <a:r>
               <a:rPr lang="en-GB" smtClean="0"/>
-              <a:t>Group 1</a:t>
+              <a:t>Group A</a:t>
             </a:r>
             <a:endParaRPr lang="en-GB" dirty="0"/>
           </a:p>
@@ -17989,7 +17989,7 @@
           <a:p>
             <a:r>
               <a:rPr lang="en-GB" smtClean="0"/>
-              <a:t>Group 1</a:t>
+              <a:t>Group A</a:t>
             </a:r>
             <a:endParaRPr lang="en-GB" dirty="0"/>
           </a:p>
@@ -18133,7 +18133,7 @@
           <a:p>
             <a:r>
               <a:rPr lang="en-GB" smtClean="0"/>
-              <a:t>Group 1</a:t>
+              <a:t>Group A</a:t>
             </a:r>
             <a:endParaRPr lang="en-GB" dirty="0"/>
           </a:p>
@@ -18274,7 +18274,7 @@
           <a:p>
             <a:r>
               <a:rPr lang="en-GB" smtClean="0"/>
-              <a:t>Group 1</a:t>
+              <a:t>Group A</a:t>
             </a:r>
             <a:endParaRPr lang="en-GB" dirty="0"/>
           </a:p>
@@ -18462,7 +18462,7 @@
           <a:p>
             <a:r>
               <a:rPr lang="en-GB" smtClean="0"/>
-              <a:t>Group 1</a:t>
+              <a:t>Group A</a:t>
             </a:r>
             <a:endParaRPr lang="en-GB" dirty="0"/>
           </a:p>
@@ -18792,7 +18792,7 @@
           <a:p>
             <a:r>
               <a:rPr lang="en-GB" smtClean="0"/>
-              <a:t>Group 1</a:t>
+              <a:t>Group A</a:t>
             </a:r>
             <a:endParaRPr lang="en-GB" dirty="0"/>
           </a:p>
@@ -19072,7 +19072,7 @@
           <a:p>
             <a:r>
               <a:rPr lang="en-GB" smtClean="0"/>
-              <a:t>Group 1</a:t>
+              <a:t>Group A</a:t>
             </a:r>
             <a:endParaRPr lang="en-GB" dirty="0"/>
           </a:p>
@@ -19380,7 +19380,7 @@
           <a:p>
             <a:r>
               <a:rPr lang="en-GB" smtClean="0"/>
-              <a:t>Group 1</a:t>
+              <a:t>Group A</a:t>
             </a:r>
             <a:endParaRPr lang="en-GB" dirty="0"/>
           </a:p>
@@ -19464,7 +19464,7 @@
   </p:timing>
   <p:extLst mod="1">
     <p:ext uri="{DCECCB84-F9BA-43D5-87BE-67443E8EF086}">
-      <p15:sldGuideLst xmlns:p15="http://schemas.microsoft.com/office/powerpoint/2012/main" xmlns=""/>
+      <p15:sldGuideLst xmlns="" xmlns:p15="http://schemas.microsoft.com/office/powerpoint/2012/main"/>
     </p:ext>
   </p:extLst>
 </p:sldLayout>
@@ -20673,7 +20673,7 @@
           <a:p>
             <a:r>
               <a:rPr lang="en-GB" smtClean="0"/>
-              <a:t>Group 1</a:t>
+              <a:t>Group A</a:t>
             </a:r>
             <a:endParaRPr lang="en-GB" dirty="0"/>
           </a:p>
@@ -21091,7 +21091,7 @@
           <a:p>
             <a:r>
               <a:rPr lang="en-GB" smtClean="0"/>
-              <a:t>Group 1</a:t>
+              <a:t>Group A</a:t>
             </a:r>
             <a:endParaRPr lang="en-GB" dirty="0"/>
           </a:p>
@@ -21504,7 +21504,7 @@
           <a:p>
             <a:r>
               <a:rPr lang="en-GB" smtClean="0"/>
-              <a:t>Group 1</a:t>
+              <a:t>Group A</a:t>
             </a:r>
             <a:endParaRPr lang="en-GB" dirty="0"/>
           </a:p>
@@ -21648,7 +21648,7 @@
           <a:p>
             <a:r>
               <a:rPr lang="en-GB" smtClean="0"/>
-              <a:t>Group 1</a:t>
+              <a:t>Group A</a:t>
             </a:r>
             <a:endParaRPr lang="en-GB" dirty="0"/>
           </a:p>
@@ -21789,7 +21789,7 @@
           <a:p>
             <a:r>
               <a:rPr lang="en-GB" smtClean="0"/>
-              <a:t>Group 1</a:t>
+              <a:t>Group A</a:t>
             </a:r>
             <a:endParaRPr lang="en-GB" dirty="0"/>
           </a:p>
@@ -21977,7 +21977,7 @@
           <a:p>
             <a:r>
               <a:rPr lang="en-GB" smtClean="0"/>
-              <a:t>Group 1</a:t>
+              <a:t>Group A</a:t>
             </a:r>
             <a:endParaRPr lang="en-GB" dirty="0"/>
           </a:p>
@@ -22307,7 +22307,7 @@
           <a:p>
             <a:r>
               <a:rPr lang="en-GB" smtClean="0"/>
-              <a:t>Group 1</a:t>
+              <a:t>Group A</a:t>
             </a:r>
             <a:endParaRPr lang="en-GB" dirty="0"/>
           </a:p>
@@ -22587,7 +22587,7 @@
           <a:p>
             <a:r>
               <a:rPr lang="en-GB" smtClean="0"/>
-              <a:t>Group 1</a:t>
+              <a:t>Group A</a:t>
             </a:r>
             <a:endParaRPr lang="en-GB" dirty="0"/>
           </a:p>
@@ -22895,7 +22895,7 @@
           <a:p>
             <a:r>
               <a:rPr lang="en-GB" smtClean="0"/>
-              <a:t>Group 1</a:t>
+              <a:t>Group A</a:t>
             </a:r>
             <a:endParaRPr lang="en-GB" dirty="0"/>
           </a:p>
@@ -22979,7 +22979,7 @@
   </p:timing>
   <p:extLst mod="1">
     <p:ext uri="{DCECCB84-F9BA-43D5-87BE-67443E8EF086}">
-      <p15:sldGuideLst xmlns:p15="http://schemas.microsoft.com/office/powerpoint/2012/main" xmlns=""/>
+      <p15:sldGuideLst xmlns="" xmlns:p15="http://schemas.microsoft.com/office/powerpoint/2012/main"/>
     </p:ext>
   </p:extLst>
 </p:sldLayout>
@@ -24188,7 +24188,7 @@
           <a:p>
             <a:r>
               <a:rPr lang="en-GB" smtClean="0"/>
-              <a:t>Group 1</a:t>
+              <a:t>Group A</a:t>
             </a:r>
             <a:endParaRPr lang="en-GB" dirty="0"/>
           </a:p>
@@ -24606,7 +24606,7 @@
           <a:p>
             <a:r>
               <a:rPr lang="en-GB" smtClean="0"/>
-              <a:t>Group 1</a:t>
+              <a:t>Group A</a:t>
             </a:r>
             <a:endParaRPr lang="en-GB" dirty="0"/>
           </a:p>
@@ -24750,7 +24750,7 @@
           <a:p>
             <a:r>
               <a:rPr lang="en-GB" smtClean="0"/>
-              <a:t>Group 1</a:t>
+              <a:t>Group A</a:t>
             </a:r>
             <a:endParaRPr lang="en-GB" dirty="0"/>
           </a:p>
@@ -24886,7 +24886,7 @@
           <a:p>
             <a:r>
               <a:rPr lang="en-GB" smtClean="0"/>
-              <a:t>Group 1</a:t>
+              <a:t>Group A</a:t>
             </a:r>
             <a:endParaRPr lang="en-GB" dirty="0"/>
           </a:p>
@@ -25027,7 +25027,7 @@
           <a:p>
             <a:r>
               <a:rPr lang="en-GB" smtClean="0"/>
-              <a:t>Group 1</a:t>
+              <a:t>Group A</a:t>
             </a:r>
             <a:endParaRPr lang="en-GB" dirty="0"/>
           </a:p>
@@ -25215,7 +25215,7 @@
           <a:p>
             <a:r>
               <a:rPr lang="en-GB" smtClean="0"/>
-              <a:t>Group 1</a:t>
+              <a:t>Group A</a:t>
             </a:r>
             <a:endParaRPr lang="en-GB" dirty="0"/>
           </a:p>
@@ -25545,7 +25545,7 @@
           <a:p>
             <a:r>
               <a:rPr lang="en-GB" smtClean="0"/>
-              <a:t>Group 1</a:t>
+              <a:t>Group A</a:t>
             </a:r>
             <a:endParaRPr lang="en-GB" dirty="0"/>
           </a:p>
@@ -25825,7 +25825,7 @@
           <a:p>
             <a:r>
               <a:rPr lang="en-GB" smtClean="0"/>
-              <a:t>Group 1</a:t>
+              <a:t>Group A</a:t>
             </a:r>
             <a:endParaRPr lang="en-GB" dirty="0"/>
           </a:p>
@@ -26133,7 +26133,7 @@
           <a:p>
             <a:r>
               <a:rPr lang="en-GB" smtClean="0"/>
-              <a:t>Group 1</a:t>
+              <a:t>Group A</a:t>
             </a:r>
             <a:endParaRPr lang="en-GB" dirty="0"/>
           </a:p>
@@ -26217,7 +26217,7 @@
   </p:timing>
   <p:extLst mod="1">
     <p:ext uri="{DCECCB84-F9BA-43D5-87BE-67443E8EF086}">
-      <p15:sldGuideLst xmlns:p15="http://schemas.microsoft.com/office/powerpoint/2012/main" xmlns=""/>
+      <p15:sldGuideLst xmlns="" xmlns:p15="http://schemas.microsoft.com/office/powerpoint/2012/main"/>
     </p:ext>
   </p:extLst>
 </p:sldLayout>
@@ -27426,7 +27426,7 @@
           <a:p>
             <a:r>
               <a:rPr lang="en-GB" smtClean="0"/>
-              <a:t>Group 1</a:t>
+              <a:t>Group A</a:t>
             </a:r>
             <a:endParaRPr lang="en-GB" dirty="0"/>
           </a:p>
@@ -27844,7 +27844,7 @@
           <a:p>
             <a:r>
               <a:rPr lang="en-GB" smtClean="0"/>
-              <a:t>Group 1</a:t>
+              <a:t>Group A</a:t>
             </a:r>
             <a:endParaRPr lang="en-GB" dirty="0"/>
           </a:p>
@@ -27988,7 +27988,7 @@
           <a:p>
             <a:r>
               <a:rPr lang="en-GB" smtClean="0"/>
-              <a:t>Group 1</a:t>
+              <a:t>Group A</a:t>
             </a:r>
             <a:endParaRPr lang="en-GB" dirty="0"/>
           </a:p>
@@ -28129,7 +28129,7 @@
           <a:p>
             <a:r>
               <a:rPr lang="en-GB" smtClean="0"/>
-              <a:t>Group 1</a:t>
+              <a:t>Group A</a:t>
             </a:r>
             <a:endParaRPr lang="en-GB" dirty="0"/>
           </a:p>
@@ -28271,7 +28271,7 @@
           <a:p>
             <a:r>
               <a:rPr lang="en-GB" smtClean="0"/>
-              <a:t>Group 1</a:t>
+              <a:t>Group A</a:t>
             </a:r>
             <a:endParaRPr lang="en-GB" dirty="0"/>
           </a:p>
@@ -28459,7 +28459,7 @@
           <a:p>
             <a:r>
               <a:rPr lang="en-GB" smtClean="0"/>
-              <a:t>Group 1</a:t>
+              <a:t>Group A</a:t>
             </a:r>
             <a:endParaRPr lang="en-GB" dirty="0"/>
           </a:p>
@@ -28644,7 +28644,7 @@
           <a:p>
             <a:r>
               <a:rPr lang="en-GB" smtClean="0"/>
-              <a:t>Group 1</a:t>
+              <a:t>Group A</a:t>
             </a:r>
             <a:endParaRPr lang="en-GB" dirty="0"/>
           </a:p>
@@ -29505,7 +29505,7 @@
           <a:p>
             <a:r>
               <a:rPr lang="en-GB" smtClean="0"/>
-              <a:t>Group 1</a:t>
+              <a:t>Group A</a:t>
             </a:r>
             <a:endParaRPr lang="en-GB" dirty="0"/>
           </a:p>
@@ -30159,7 +30159,7 @@
   </p:txStyles>
   <p:extLst mod="1">
     <p:ext uri="{27BBF7A9-308A-43DC-89C8-2F10F3537804}">
-      <p15:sldGuideLst xmlns:p15="http://schemas.microsoft.com/office/powerpoint/2012/main" xmlns="">
+      <p15:sldGuideLst xmlns="" xmlns:p15="http://schemas.microsoft.com/office/powerpoint/2012/main">
         <p15:guide id="1" pos="92" userDrawn="1">
           <p15:clr>
             <a:srgbClr val="F26B43"/>
@@ -31000,7 +31000,7 @@
           <a:p>
             <a:r>
               <a:rPr lang="en-GB" smtClean="0"/>
-              <a:t>Group 1</a:t>
+              <a:t>Group A</a:t>
             </a:r>
             <a:endParaRPr lang="en-GB" dirty="0"/>
           </a:p>
@@ -31659,7 +31659,7 @@
   </p:txStyles>
   <p:extLst mod="1">
     <p:ext uri="{27BBF7A9-308A-43DC-89C8-2F10F3537804}">
-      <p15:sldGuideLst xmlns:p15="http://schemas.microsoft.com/office/powerpoint/2012/main" xmlns="">
+      <p15:sldGuideLst xmlns="" xmlns:p15="http://schemas.microsoft.com/office/powerpoint/2012/main">
         <p15:guide id="1" pos="92" userDrawn="1">
           <p15:clr>
             <a:srgbClr val="F26B43"/>
@@ -32500,7 +32500,7 @@
           <a:p>
             <a:r>
               <a:rPr lang="en-GB" smtClean="0"/>
-              <a:t>Group 1</a:t>
+              <a:t>Group A</a:t>
             </a:r>
             <a:endParaRPr lang="en-GB" dirty="0"/>
           </a:p>
@@ -33159,7 +33159,7 @@
   </p:txStyles>
   <p:extLst mod="1">
     <p:ext uri="{27BBF7A9-308A-43DC-89C8-2F10F3537804}">
-      <p15:sldGuideLst xmlns:p15="http://schemas.microsoft.com/office/powerpoint/2012/main" xmlns="">
+      <p15:sldGuideLst xmlns="" xmlns:p15="http://schemas.microsoft.com/office/powerpoint/2012/main">
         <p15:guide id="1" pos="92" userDrawn="1">
           <p15:clr>
             <a:srgbClr val="F26B43"/>
@@ -34000,7 +34000,7 @@
           <a:p>
             <a:r>
               <a:rPr lang="en-GB" smtClean="0"/>
-              <a:t>Group 1</a:t>
+              <a:t>Group A</a:t>
             </a:r>
             <a:endParaRPr lang="en-GB" dirty="0"/>
           </a:p>
@@ -34659,7 +34659,7 @@
   </p:txStyles>
   <p:extLst mod="1">
     <p:ext uri="{27BBF7A9-308A-43DC-89C8-2F10F3537804}">
-      <p15:sldGuideLst xmlns:p15="http://schemas.microsoft.com/office/powerpoint/2012/main" xmlns="">
+      <p15:sldGuideLst xmlns="" xmlns:p15="http://schemas.microsoft.com/office/powerpoint/2012/main">
         <p15:guide id="1" pos="92" userDrawn="1">
           <p15:clr>
             <a:srgbClr val="F26B43"/>
@@ -35500,7 +35500,7 @@
           <a:p>
             <a:r>
               <a:rPr lang="en-GB" smtClean="0"/>
-              <a:t>Group 1</a:t>
+              <a:t>Group A</a:t>
             </a:r>
             <a:endParaRPr lang="en-GB" dirty="0"/>
           </a:p>
@@ -36159,7 +36159,7 @@
   </p:txStyles>
   <p:extLst mod="1">
     <p:ext uri="{27BBF7A9-308A-43DC-89C8-2F10F3537804}">
-      <p15:sldGuideLst xmlns:p15="http://schemas.microsoft.com/office/powerpoint/2012/main" xmlns="">
+      <p15:sldGuideLst xmlns="" xmlns:p15="http://schemas.microsoft.com/office/powerpoint/2012/main">
         <p15:guide id="1" pos="92" userDrawn="1">
           <p15:clr>
             <a:srgbClr val="F26B43"/>
@@ -37000,7 +37000,7 @@
           <a:p>
             <a:r>
               <a:rPr lang="en-GB" smtClean="0"/>
-              <a:t>Group 1</a:t>
+              <a:t>Group A</a:t>
             </a:r>
             <a:endParaRPr lang="en-GB" dirty="0"/>
           </a:p>
@@ -37659,7 +37659,7 @@
   </p:txStyles>
   <p:extLst mod="1">
     <p:ext uri="{27BBF7A9-308A-43DC-89C8-2F10F3537804}">
-      <p15:sldGuideLst xmlns:p15="http://schemas.microsoft.com/office/powerpoint/2012/main" xmlns="">
+      <p15:sldGuideLst xmlns="" xmlns:p15="http://schemas.microsoft.com/office/powerpoint/2012/main">
         <p15:guide id="1" pos="92" userDrawn="1">
           <p15:clr>
             <a:srgbClr val="F26B43"/>
@@ -38500,7 +38500,7 @@
           <a:p>
             <a:r>
               <a:rPr lang="en-GB" smtClean="0"/>
-              <a:t>Group 1</a:t>
+              <a:t>Group A</a:t>
             </a:r>
             <a:endParaRPr lang="en-GB" dirty="0"/>
           </a:p>
@@ -39159,7 +39159,7 @@
   </p:txStyles>
   <p:extLst mod="1">
     <p:ext uri="{27BBF7A9-308A-43DC-89C8-2F10F3537804}">
-      <p15:sldGuideLst xmlns:p15="http://schemas.microsoft.com/office/powerpoint/2012/main" xmlns="">
+      <p15:sldGuideLst xmlns="" xmlns:p15="http://schemas.microsoft.com/office/powerpoint/2012/main">
         <p15:guide id="1" pos="92" userDrawn="1">
           <p15:clr>
             <a:srgbClr val="F26B43"/>
@@ -40000,7 +40000,7 @@
           <a:p>
             <a:r>
               <a:rPr lang="en-GB" smtClean="0"/>
-              <a:t>Group 1</a:t>
+              <a:t>Group A</a:t>
             </a:r>
             <a:endParaRPr lang="en-GB" dirty="0"/>
           </a:p>
@@ -40659,7 +40659,7 @@
   </p:txStyles>
   <p:extLst mod="1">
     <p:ext uri="{27BBF7A9-308A-43DC-89C8-2F10F3537804}">
-      <p15:sldGuideLst xmlns:p15="http://schemas.microsoft.com/office/powerpoint/2012/main" xmlns="">
+      <p15:sldGuideLst xmlns="" xmlns:p15="http://schemas.microsoft.com/office/powerpoint/2012/main">
         <p15:guide id="1" pos="92" userDrawn="1">
           <p15:clr>
             <a:srgbClr val="F26B43"/>
@@ -41500,7 +41500,7 @@
           <a:p>
             <a:r>
               <a:rPr lang="en-GB" smtClean="0"/>
-              <a:t>Group 1</a:t>
+              <a:t>Group A</a:t>
             </a:r>
             <a:endParaRPr lang="en-GB" dirty="0"/>
           </a:p>
@@ -42159,7 +42159,7 @@
   </p:txStyles>
   <p:extLst mod="1">
     <p:ext uri="{27BBF7A9-308A-43DC-89C8-2F10F3537804}">
-      <p15:sldGuideLst xmlns:p15="http://schemas.microsoft.com/office/powerpoint/2012/main" xmlns="">
+      <p15:sldGuideLst xmlns="" xmlns:p15="http://schemas.microsoft.com/office/powerpoint/2012/main">
         <p15:guide id="1" pos="92" userDrawn="1">
           <p15:clr>
             <a:srgbClr val="F26B43"/>
@@ -42404,7 +42404,7 @@
           <a:p>
             <a:r>
               <a:rPr lang="en-GB" smtClean="0"/>
-              <a:t>Group 1</a:t>
+              <a:t>Group A</a:t>
             </a:r>
             <a:endParaRPr lang="en-GB" dirty="0"/>
           </a:p>
@@ -42519,7 +42519,7 @@
           <a:p>
             <a:r>
               <a:rPr lang="en-GB" smtClean="0"/>
-              <a:t>Group 1</a:t>
+              <a:t>Group A</a:t>
             </a:r>
             <a:endParaRPr lang="en-GB" dirty="0"/>
           </a:p>
@@ -42584,12 +42584,12 @@
       </p:grpSpPr>
       <p:sp>
         <p:nvSpPr>
-          <p:cNvPr id="11" name="Inhaltsplatzhalter 10"/>
-          <p:cNvSpPr>
-            <a:spLocks noGrp="1"/>
-          </p:cNvSpPr>
-          <p:nvPr>
-            <p:ph idx="1"/>
+          <p:cNvPr id="11" name="Titel 10"/>
+          <p:cNvSpPr>
+            <a:spLocks noGrp="1"/>
+          </p:cNvSpPr>
+          <p:nvPr>
+            <p:ph type="ctrTitle"/>
           </p:nvPr>
         </p:nvSpPr>
         <p:spPr/>
@@ -42597,18 +42597,22 @@
           <a:bodyPr/>
           <a:lstStyle/>
           <a:p>
+            <a:r>
+              <a:rPr lang="en-GB" dirty="0" smtClean="0"/>
+              <a:t>Reactor flow sheet</a:t>
+            </a:r>
             <a:endParaRPr lang="en-GB" dirty="0"/>
           </a:p>
         </p:txBody>
       </p:sp>
       <p:sp>
         <p:nvSpPr>
-          <p:cNvPr id="3" name="Datumsplatzhalter 2"/>
-          <p:cNvSpPr>
-            <a:spLocks noGrp="1"/>
-          </p:cNvSpPr>
-          <p:nvPr>
-            <p:ph type="dt" sz="half" idx="10"/>
+          <p:cNvPr id="12" name="Untertitel 11"/>
+          <p:cNvSpPr>
+            <a:spLocks noGrp="1"/>
+          </p:cNvSpPr>
+          <p:nvPr>
+            <p:ph type="subTitle" idx="1"/>
           </p:nvPr>
         </p:nvSpPr>
         <p:spPr/>
@@ -42616,6 +42620,25 @@
           <a:bodyPr/>
           <a:lstStyle/>
           <a:p>
+            <a:endParaRPr lang="en-GB" dirty="0"/>
+          </a:p>
+        </p:txBody>
+      </p:sp>
+      <p:sp>
+        <p:nvSpPr>
+          <p:cNvPr id="4" name="Datumsplatzhalter 3"/>
+          <p:cNvSpPr>
+            <a:spLocks noGrp="1"/>
+          </p:cNvSpPr>
+          <p:nvPr>
+            <p:ph type="dt" sz="half" idx="10"/>
+          </p:nvPr>
+        </p:nvSpPr>
+        <p:spPr/>
+        <p:txBody>
+          <a:bodyPr/>
+          <a:lstStyle/>
+          <a:p>
             <a:r>
               <a:rPr lang="fr-CH" smtClean="0"/>
               <a:t>23.05.2018</a:t>
@@ -42626,7 +42649,7 @@
       </p:sp>
       <p:sp>
         <p:nvSpPr>
-          <p:cNvPr id="4" name="Fußzeilenplatzhalter 3"/>
+          <p:cNvPr id="5" name="Fußzeilenplatzhalter 4"/>
           <p:cNvSpPr>
             <a:spLocks noGrp="1"/>
           </p:cNvSpPr>
@@ -42641,7 +42664,7 @@
           <a:p>
             <a:r>
               <a:rPr lang="en-GB" smtClean="0"/>
-              <a:t>Group 1</a:t>
+              <a:t>Group A</a:t>
             </a:r>
             <a:endParaRPr lang="en-GB" dirty="0"/>
           </a:p>
@@ -42649,7 +42672,7 @@
       </p:sp>
       <p:sp>
         <p:nvSpPr>
-          <p:cNvPr id="5" name="Foliennummernplatzhalter 4"/>
+          <p:cNvPr id="6" name="Foliennummernplatzhalter 5"/>
           <p:cNvSpPr>
             <a:spLocks noGrp="1"/>
           </p:cNvSpPr>
@@ -42671,29 +42694,40 @@
           </a:p>
         </p:txBody>
       </p:sp>
-      <p:sp>
-        <p:nvSpPr>
-          <p:cNvPr id="10" name="Titel 9"/>
-          <p:cNvSpPr>
-            <a:spLocks noGrp="1"/>
-          </p:cNvSpPr>
-          <p:nvPr>
-            <p:ph type="title"/>
-          </p:nvPr>
-        </p:nvSpPr>
-        <p:spPr/>
-        <p:txBody>
-          <a:bodyPr/>
-          <a:lstStyle/>
-          <a:p>
-            <a:endParaRPr lang="en-GB" dirty="0"/>
-          </a:p>
-        </p:txBody>
-      </p:sp>
+      <p:pic>
+        <p:nvPicPr>
+          <p:cNvPr id="2" name="Espace réservé pour une image  1" descr="CaseStudyDiagram.jpg"/>
+          <p:cNvPicPr>
+            <a:picLocks noGrp="1" noChangeAspect="1"/>
+          </p:cNvPicPr>
+          <p:nvPr>
+            <p:ph type="pic" sz="quarter" idx="13"/>
+          </p:nvPr>
+        </p:nvPicPr>
+        <p:blipFill>
+          <a:blip r:embed="rId2">
+            <a:extLst>
+              <a:ext uri="{28A0092B-C50C-407E-A947-70E740481C1C}">
+                <a14:useLocalDpi xmlns:a14="http://schemas.microsoft.com/office/drawing/2010/main" val="0"/>
+              </a:ext>
+            </a:extLst>
+          </a:blip>
+          <a:srcRect l="-61033" r="-61033"/>
+          <a:stretch>
+            <a:fillRect/>
+          </a:stretch>
+        </p:blipFill>
+        <p:spPr>
+          <a:xfrm>
+            <a:off x="323850" y="620713"/>
+            <a:ext cx="11537950" cy="4205287"/>
+          </a:xfrm>
+        </p:spPr>
+      </p:pic>
     </p:spTree>
     <p:extLst>
       <p:ext uri="{BB962C8B-B14F-4D97-AF65-F5344CB8AC3E}">
-        <p14:creationId xmlns:p14="http://schemas.microsoft.com/office/powerpoint/2010/main" val="2857788226"/>
+        <p14:creationId xmlns:p14="http://schemas.microsoft.com/office/powerpoint/2010/main" val="3737279567"/>
       </p:ext>
     </p:extLst>
   </p:cSld>
@@ -42732,12 +42766,12 @@
       </p:grpSpPr>
       <p:sp>
         <p:nvSpPr>
-          <p:cNvPr id="11" name="Titel 10"/>
-          <p:cNvSpPr>
-            <a:spLocks noGrp="1"/>
-          </p:cNvSpPr>
-          <p:nvPr>
-            <p:ph type="ctrTitle"/>
+          <p:cNvPr id="11" name="Inhaltsplatzhalter 10"/>
+          <p:cNvSpPr>
+            <a:spLocks noGrp="1"/>
+          </p:cNvSpPr>
+          <p:nvPr>
+            <p:ph idx="1"/>
           </p:nvPr>
         </p:nvSpPr>
         <p:spPr/>
@@ -42751,12 +42785,12 @@
       </p:sp>
       <p:sp>
         <p:nvSpPr>
-          <p:cNvPr id="12" name="Untertitel 11"/>
-          <p:cNvSpPr>
-            <a:spLocks noGrp="1"/>
-          </p:cNvSpPr>
-          <p:nvPr>
-            <p:ph type="subTitle" idx="1"/>
+          <p:cNvPr id="3" name="Datumsplatzhalter 2"/>
+          <p:cNvSpPr>
+            <a:spLocks noGrp="1"/>
+          </p:cNvSpPr>
+          <p:nvPr>
+            <p:ph type="dt" sz="half" idx="10"/>
           </p:nvPr>
         </p:nvSpPr>
         <p:spPr/>
@@ -42764,18 +42798,22 @@
           <a:bodyPr/>
           <a:lstStyle/>
           <a:p>
+            <a:r>
+              <a:rPr lang="fr-CH" smtClean="0"/>
+              <a:t>23.05.2018</a:t>
+            </a:r>
             <a:endParaRPr lang="en-GB" dirty="0"/>
           </a:p>
         </p:txBody>
       </p:sp>
       <p:sp>
         <p:nvSpPr>
-          <p:cNvPr id="4" name="Datumsplatzhalter 3"/>
-          <p:cNvSpPr>
-            <a:spLocks noGrp="1"/>
-          </p:cNvSpPr>
-          <p:nvPr>
-            <p:ph type="dt" sz="half" idx="10"/>
+          <p:cNvPr id="4" name="Fußzeilenplatzhalter 3"/>
+          <p:cNvSpPr>
+            <a:spLocks noGrp="1"/>
+          </p:cNvSpPr>
+          <p:nvPr>
+            <p:ph type="ftr" sz="quarter" idx="11"/>
           </p:nvPr>
         </p:nvSpPr>
         <p:spPr/>
@@ -42784,8 +42822,8 @@
           <a:lstStyle/>
           <a:p>
             <a:r>
-              <a:rPr lang="fr-CH" smtClean="0"/>
-              <a:t>23.05.2018</a:t>
+              <a:rPr lang="en-GB" smtClean="0"/>
+              <a:t>Group A</a:t>
             </a:r>
             <a:endParaRPr lang="en-GB" dirty="0"/>
           </a:p>
@@ -42793,30 +42831,7 @@
       </p:sp>
       <p:sp>
         <p:nvSpPr>
-          <p:cNvPr id="5" name="Fußzeilenplatzhalter 4"/>
-          <p:cNvSpPr>
-            <a:spLocks noGrp="1"/>
-          </p:cNvSpPr>
-          <p:nvPr>
-            <p:ph type="ftr" sz="quarter" idx="11"/>
-          </p:nvPr>
-        </p:nvSpPr>
-        <p:spPr/>
-        <p:txBody>
-          <a:bodyPr/>
-          <a:lstStyle/>
-          <a:p>
-            <a:r>
-              <a:rPr lang="en-GB" smtClean="0"/>
-              <a:t>Group 1</a:t>
-            </a:r>
-            <a:endParaRPr lang="en-GB" dirty="0"/>
-          </a:p>
-        </p:txBody>
-      </p:sp>
-      <p:sp>
-        <p:nvSpPr>
-          <p:cNvPr id="6" name="Foliennummernplatzhalter 5"/>
+          <p:cNvPr id="5" name="Foliennummernplatzhalter 4"/>
           <p:cNvSpPr>
             <a:spLocks noGrp="1"/>
           </p:cNvSpPr>
@@ -42840,20 +42855,27 @@
       </p:sp>
       <p:sp>
         <p:nvSpPr>
-          <p:cNvPr id="13" name="Bildplatzhalter 12"/>
-          <p:cNvSpPr>
-            <a:spLocks noGrp="1"/>
-          </p:cNvSpPr>
-          <p:nvPr>
-            <p:ph type="pic" sz="quarter" idx="13"/>
+          <p:cNvPr id="10" name="Titel 9"/>
+          <p:cNvSpPr>
+            <a:spLocks noGrp="1"/>
+          </p:cNvSpPr>
+          <p:nvPr>
+            <p:ph type="title"/>
           </p:nvPr>
         </p:nvSpPr>
         <p:spPr/>
+        <p:txBody>
+          <a:bodyPr/>
+          <a:lstStyle/>
+          <a:p>
+            <a:endParaRPr lang="en-GB" dirty="0"/>
+          </a:p>
+        </p:txBody>
       </p:sp>
     </p:spTree>
     <p:extLst>
       <p:ext uri="{BB962C8B-B14F-4D97-AF65-F5344CB8AC3E}">
-        <p14:creationId xmlns:p14="http://schemas.microsoft.com/office/powerpoint/2010/main" val="3737279567"/>
+        <p14:creationId xmlns:p14="http://schemas.microsoft.com/office/powerpoint/2010/main" val="2857788226"/>
       </p:ext>
     </p:extLst>
   </p:cSld>
@@ -42968,7 +42990,7 @@
           <a:p>
             <a:r>
               <a:rPr lang="en-GB" smtClean="0"/>
-              <a:t>Group 1</a:t>
+              <a:t>Group A</a:t>
             </a:r>
             <a:endParaRPr lang="en-GB" dirty="0"/>
           </a:p>
@@ -43411,7 +43433,7 @@
           <a:p>
             <a:r>
               <a:rPr lang="en-GB" smtClean="0"/>
-              <a:t>Group 1</a:t>
+              <a:t>Group A</a:t>
             </a:r>
             <a:endParaRPr lang="en-GB" dirty="0"/>
           </a:p>
@@ -43540,7 +43562,7 @@
           <a:p>
             <a:r>
               <a:rPr lang="en-GB" smtClean="0"/>
-              <a:t>Group 1</a:t>
+              <a:t>Group A</a:t>
             </a:r>
             <a:endParaRPr lang="en-GB" dirty="0"/>
           </a:p>
@@ -43669,7 +43691,7 @@
           <a:p>
             <a:r>
               <a:rPr lang="en-GB" smtClean="0"/>
-              <a:t>Group 1</a:t>
+              <a:t>Group A</a:t>
             </a:r>
             <a:endParaRPr lang="en-GB" dirty="0"/>
           </a:p>
@@ -43926,7 +43948,7 @@
           <a:p>
             <a:r>
               <a:rPr lang="en-GB" smtClean="0"/>
-              <a:t>Group 1</a:t>
+              <a:t>Group A</a:t>
             </a:r>
             <a:endParaRPr lang="en-GB" dirty="0"/>
           </a:p>
@@ -44410,7 +44432,7 @@
   </a:custClrLst>
   <a:extLst>
     <a:ext uri="{05A4C25C-085E-4340-85A3-A5531E510DB2}">
-      <thm15:themeFamily xmlns:thm15="http://schemas.microsoft.com/office/thememl/2012/main" xmlns="" name="eth_praesentation_16zu9_ETH1_d" id="{F9B539DF-8A69-4439-8089-24A40A980317}" vid="{5D9C827C-5BA7-402A-8ABB-C7F0BA4B4DEC}"/>
+      <thm15:themeFamily xmlns="" xmlns:thm15="http://schemas.microsoft.com/office/thememl/2012/main" name="eth_praesentation_16zu9_ETH1_d" id="{F9B539DF-8A69-4439-8089-24A40A980317}" vid="{5D9C827C-5BA7-402A-8ABB-C7F0BA4B4DEC}"/>
     </a:ext>
   </a:extLst>
 </a:theme>
@@ -45431,7 +45453,7 @@
   </a:custClrLst>
   <a:extLst>
     <a:ext uri="{05A4C25C-085E-4340-85A3-A5531E510DB2}">
-      <thm15:themeFamily xmlns:thm15="http://schemas.microsoft.com/office/thememl/2012/main" xmlns="" name="eth_praesentation_16zu9_ETH1_d" id="{F9B539DF-8A69-4439-8089-24A40A980317}" vid="{5D9C827C-5BA7-402A-8ABB-C7F0BA4B4DEC}"/>
+      <thm15:themeFamily xmlns="" xmlns:thm15="http://schemas.microsoft.com/office/thememl/2012/main" name="eth_praesentation_16zu9_ETH1_d" id="{F9B539DF-8A69-4439-8089-24A40A980317}" vid="{5D9C827C-5BA7-402A-8ABB-C7F0BA4B4DEC}"/>
     </a:ext>
   </a:extLst>
 </a:theme>
@@ -45847,7 +45869,7 @@
   </a:custClrLst>
   <a:extLst>
     <a:ext uri="{05A4C25C-085E-4340-85A3-A5531E510DB2}">
-      <thm15:themeFamily xmlns:thm15="http://schemas.microsoft.com/office/thememl/2012/main" xmlns="" name="eth_praesentation_16zu9_ETH1_d" id="{F9B539DF-8A69-4439-8089-24A40A980317}" vid="{5D9C827C-5BA7-402A-8ABB-C7F0BA4B4DEC}"/>
+      <thm15:themeFamily xmlns="" xmlns:thm15="http://schemas.microsoft.com/office/thememl/2012/main" name="eth_praesentation_16zu9_ETH1_d" id="{F9B539DF-8A69-4439-8089-24A40A980317}" vid="{5D9C827C-5BA7-402A-8ABB-C7F0BA4B4DEC}"/>
     </a:ext>
   </a:extLst>
 </a:theme>
@@ -46263,7 +46285,7 @@
   </a:custClrLst>
   <a:extLst>
     <a:ext uri="{05A4C25C-085E-4340-85A3-A5531E510DB2}">
-      <thm15:themeFamily xmlns:thm15="http://schemas.microsoft.com/office/thememl/2012/main" xmlns="" name="eth_praesentation_16zu9_ETH1_d" id="{F9B539DF-8A69-4439-8089-24A40A980317}" vid="{5D9C827C-5BA7-402A-8ABB-C7F0BA4B4DEC}"/>
+      <thm15:themeFamily xmlns="" xmlns:thm15="http://schemas.microsoft.com/office/thememl/2012/main" name="eth_praesentation_16zu9_ETH1_d" id="{F9B539DF-8A69-4439-8089-24A40A980317}" vid="{5D9C827C-5BA7-402A-8ABB-C7F0BA4B4DEC}"/>
     </a:ext>
   </a:extLst>
 </a:theme>
@@ -46679,7 +46701,7 @@
   </a:custClrLst>
   <a:extLst>
     <a:ext uri="{05A4C25C-085E-4340-85A3-A5531E510DB2}">
-      <thm15:themeFamily xmlns:thm15="http://schemas.microsoft.com/office/thememl/2012/main" xmlns="" name="eth_praesentation_16zu9_ETH1_d" id="{F9B539DF-8A69-4439-8089-24A40A980317}" vid="{5D9C827C-5BA7-402A-8ABB-C7F0BA4B4DEC}"/>
+      <thm15:themeFamily xmlns="" xmlns:thm15="http://schemas.microsoft.com/office/thememl/2012/main" name="eth_praesentation_16zu9_ETH1_d" id="{F9B539DF-8A69-4439-8089-24A40A980317}" vid="{5D9C827C-5BA7-402A-8ABB-C7F0BA4B4DEC}"/>
     </a:ext>
   </a:extLst>
 </a:theme>
@@ -47095,7 +47117,7 @@
   </a:custClrLst>
   <a:extLst>
     <a:ext uri="{05A4C25C-085E-4340-85A3-A5531E510DB2}">
-      <thm15:themeFamily xmlns:thm15="http://schemas.microsoft.com/office/thememl/2012/main" xmlns="" name="eth_praesentation_16zu9_ETH1_d" id="{F9B539DF-8A69-4439-8089-24A40A980317}" vid="{5D9C827C-5BA7-402A-8ABB-C7F0BA4B4DEC}"/>
+      <thm15:themeFamily xmlns="" xmlns:thm15="http://schemas.microsoft.com/office/thememl/2012/main" name="eth_praesentation_16zu9_ETH1_d" id="{F9B539DF-8A69-4439-8089-24A40A980317}" vid="{5D9C827C-5BA7-402A-8ABB-C7F0BA4B4DEC}"/>
     </a:ext>
   </a:extLst>
 </a:theme>
@@ -47511,7 +47533,7 @@
   </a:custClrLst>
   <a:extLst>
     <a:ext uri="{05A4C25C-085E-4340-85A3-A5531E510DB2}">
-      <thm15:themeFamily xmlns:thm15="http://schemas.microsoft.com/office/thememl/2012/main" xmlns="" name="eth_praesentation_16zu9_ETH1_d" id="{F9B539DF-8A69-4439-8089-24A40A980317}" vid="{5D9C827C-5BA7-402A-8ABB-C7F0BA4B4DEC}"/>
+      <thm15:themeFamily xmlns="" xmlns:thm15="http://schemas.microsoft.com/office/thememl/2012/main" name="eth_praesentation_16zu9_ETH1_d" id="{F9B539DF-8A69-4439-8089-24A40A980317}" vid="{5D9C827C-5BA7-402A-8ABB-C7F0BA4B4DEC}"/>
     </a:ext>
   </a:extLst>
 </a:theme>
@@ -47927,7 +47949,7 @@
   </a:custClrLst>
   <a:extLst>
     <a:ext uri="{05A4C25C-085E-4340-85A3-A5531E510DB2}">
-      <thm15:themeFamily xmlns:thm15="http://schemas.microsoft.com/office/thememl/2012/main" xmlns="" name="eth_praesentation_16zu9_ETH1_d" id="{F9B539DF-8A69-4439-8089-24A40A980317}" vid="{5D9C827C-5BA7-402A-8ABB-C7F0BA4B4DEC}"/>
+      <thm15:themeFamily xmlns="" xmlns:thm15="http://schemas.microsoft.com/office/thememl/2012/main" name="eth_praesentation_16zu9_ETH1_d" id="{F9B539DF-8A69-4439-8089-24A40A980317}" vid="{5D9C827C-5BA7-402A-8ABB-C7F0BA4B4DEC}"/>
     </a:ext>
   </a:extLst>
 </a:theme>
@@ -48343,7 +48365,7 @@
   </a:custClrLst>
   <a:extLst>
     <a:ext uri="{05A4C25C-085E-4340-85A3-A5531E510DB2}">
-      <thm15:themeFamily xmlns:thm15="http://schemas.microsoft.com/office/thememl/2012/main" xmlns="" name="eth_praesentation_16zu9_ETH1_d" id="{F9B539DF-8A69-4439-8089-24A40A980317}" vid="{5D9C827C-5BA7-402A-8ABB-C7F0BA4B4DEC}"/>
+      <thm15:themeFamily xmlns="" xmlns:thm15="http://schemas.microsoft.com/office/thememl/2012/main" name="eth_praesentation_16zu9_ETH1_d" id="{F9B539DF-8A69-4439-8089-24A40A980317}" vid="{5D9C827C-5BA7-402A-8ABB-C7F0BA4B4DEC}"/>
     </a:ext>
   </a:extLst>
 </a:theme>

</xml_diff>

<commit_message>
Pauline's part added to presentation
</commit_message>
<xml_diff>
--- a/Case_Study_presentation.pptx
+++ b/Case_Study_presentation.pptx
@@ -13,22 +13,27 @@
     <p:sldMasterId id="2147483849" r:id="rId9"/>
   </p:sldMasterIdLst>
   <p:notesMasterIdLst>
-    <p:notesMasterId r:id="rId20"/>
+    <p:notesMasterId r:id="rId25"/>
   </p:notesMasterIdLst>
   <p:handoutMasterIdLst>
-    <p:handoutMasterId r:id="rId21"/>
+    <p:handoutMasterId r:id="rId26"/>
   </p:handoutMasterIdLst>
   <p:sldIdLst>
     <p:sldId id="268" r:id="rId10"/>
     <p:sldId id="269" r:id="rId11"/>
-    <p:sldId id="272" r:id="rId12"/>
-    <p:sldId id="270" r:id="rId13"/>
-    <p:sldId id="271" r:id="rId14"/>
-    <p:sldId id="273" r:id="rId15"/>
-    <p:sldId id="274" r:id="rId16"/>
-    <p:sldId id="275" r:id="rId17"/>
-    <p:sldId id="266" r:id="rId18"/>
-    <p:sldId id="267" r:id="rId19"/>
+    <p:sldId id="276" r:id="rId12"/>
+    <p:sldId id="277" r:id="rId13"/>
+    <p:sldId id="278" r:id="rId14"/>
+    <p:sldId id="279" r:id="rId15"/>
+    <p:sldId id="280" r:id="rId16"/>
+    <p:sldId id="272" r:id="rId17"/>
+    <p:sldId id="270" r:id="rId18"/>
+    <p:sldId id="271" r:id="rId19"/>
+    <p:sldId id="273" r:id="rId20"/>
+    <p:sldId id="274" r:id="rId21"/>
+    <p:sldId id="275" r:id="rId22"/>
+    <p:sldId id="266" r:id="rId23"/>
+    <p:sldId id="267" r:id="rId24"/>
   </p:sldIdLst>
   <p:sldSz cx="12187238" cy="6858000"/>
   <p:notesSz cx="7099300" cy="10234613"/>
@@ -129,7 +134,7 @@
   </p:defaultTextStyle>
   <p:extLst>
     <p:ext uri="{EFAFB233-063F-42B5-8137-9DF3F51BA10A}">
-      <p15:sldGuideLst xmlns="" xmlns:p15="http://schemas.microsoft.com/office/powerpoint/2012/main">
+      <p15:sldGuideLst xmlns:p15="http://schemas.microsoft.com/office/powerpoint/2012/main" xmlns="">
         <p15:guide id="1" orient="horz" pos="391">
           <p15:clr>
             <a:srgbClr val="A4A3A4"/>
@@ -282,7 +287,7 @@
               <a:rPr lang="de-DE" smtClean="0">
                 <a:latin typeface="Arial" panose="020B0604020202020204" pitchFamily="34" charset="0"/>
               </a:rPr>
-              <a:t>18/05/18</a:t>
+              <a:t>21/05/18</a:t>
             </a:fld>
             <a:endParaRPr lang="de-DE" dirty="0">
               <a:latin typeface="Arial" panose="020B0604020202020204" pitchFamily="34" charset="0"/>
@@ -461,7 +466,7 @@
             <a:fld id="{BCDB334D-D17F-49C4-91DD-37BB7E818209}" type="datetimeFigureOut">
               <a:rPr lang="de-CH" smtClean="0"/>
               <a:pPr/>
-              <a:t>18/05/18</a:t>
+              <a:t>21/05/18</a:t>
             </a:fld>
             <a:endParaRPr lang="de-CH" dirty="0"/>
           </a:p>
@@ -800,7 +805,7 @@
           <a:p>
             <a:fld id="{A51C0C35-A9A2-4EFD-9BAF-1E52E29E03D1}" type="slidenum">
               <a:rPr lang="de-CH" smtClean="0"/>
-              <a:t>4</a:t>
+              <a:t>9</a:t>
             </a:fld>
             <a:endParaRPr lang="de-CH"/>
           </a:p>
@@ -2044,7 +2049,7 @@
   </p:timing>
   <p:extLst mod="1">
     <p:ext uri="{DCECCB84-F9BA-43D5-87BE-67443E8EF086}">
-      <p15:sldGuideLst xmlns="" xmlns:p15="http://schemas.microsoft.com/office/powerpoint/2012/main"/>
+      <p15:sldGuideLst xmlns:p15="http://schemas.microsoft.com/office/powerpoint/2012/main" xmlns=""/>
     </p:ext>
   </p:extLst>
 </p:sldLayout>
@@ -5458,7 +5463,7 @@
   </p:timing>
   <p:extLst mod="1">
     <p:ext uri="{DCECCB84-F9BA-43D5-87BE-67443E8EF086}">
-      <p15:sldGuideLst xmlns="" xmlns:p15="http://schemas.microsoft.com/office/powerpoint/2012/main"/>
+      <p15:sldGuideLst xmlns:p15="http://schemas.microsoft.com/office/powerpoint/2012/main" xmlns=""/>
     </p:ext>
   </p:extLst>
 </p:sldLayout>
@@ -8560,7 +8565,7 @@
   </p:timing>
   <p:extLst mod="1">
     <p:ext uri="{DCECCB84-F9BA-43D5-87BE-67443E8EF086}">
-      <p15:sldGuideLst xmlns="" xmlns:p15="http://schemas.microsoft.com/office/powerpoint/2012/main"/>
+      <p15:sldGuideLst xmlns:p15="http://schemas.microsoft.com/office/powerpoint/2012/main" xmlns=""/>
     </p:ext>
   </p:extLst>
 </p:sldLayout>
@@ -8873,7 +8878,7 @@
   </p:timing>
   <p:extLst mod="1">
     <p:ext uri="{DCECCB84-F9BA-43D5-87BE-67443E8EF086}">
-      <p15:sldGuideLst xmlns="" xmlns:p15="http://schemas.microsoft.com/office/powerpoint/2012/main"/>
+      <p15:sldGuideLst xmlns:p15="http://schemas.microsoft.com/office/powerpoint/2012/main" xmlns=""/>
     </p:ext>
   </p:extLst>
 </p:sldLayout>
@@ -11975,7 +11980,7 @@
   </p:timing>
   <p:extLst mod="1">
     <p:ext uri="{DCECCB84-F9BA-43D5-87BE-67443E8EF086}">
-      <p15:sldGuideLst xmlns="" xmlns:p15="http://schemas.microsoft.com/office/powerpoint/2012/main"/>
+      <p15:sldGuideLst xmlns:p15="http://schemas.microsoft.com/office/powerpoint/2012/main" xmlns=""/>
     </p:ext>
   </p:extLst>
 </p:sldLayout>
@@ -16118,7 +16123,7 @@
   </p:timing>
   <p:extLst mod="1">
     <p:ext uri="{DCECCB84-F9BA-43D5-87BE-67443E8EF086}">
-      <p15:sldGuideLst xmlns="" xmlns:p15="http://schemas.microsoft.com/office/powerpoint/2012/main"/>
+      <p15:sldGuideLst xmlns:p15="http://schemas.microsoft.com/office/powerpoint/2012/main" xmlns=""/>
     </p:ext>
   </p:extLst>
 </p:sldLayout>
@@ -19464,7 +19469,7 @@
   </p:timing>
   <p:extLst mod="1">
     <p:ext uri="{DCECCB84-F9BA-43D5-87BE-67443E8EF086}">
-      <p15:sldGuideLst xmlns="" xmlns:p15="http://schemas.microsoft.com/office/powerpoint/2012/main"/>
+      <p15:sldGuideLst xmlns:p15="http://schemas.microsoft.com/office/powerpoint/2012/main" xmlns=""/>
     </p:ext>
   </p:extLst>
 </p:sldLayout>
@@ -22979,7 +22984,7 @@
   </p:timing>
   <p:extLst mod="1">
     <p:ext uri="{DCECCB84-F9BA-43D5-87BE-67443E8EF086}">
-      <p15:sldGuideLst xmlns="" xmlns:p15="http://schemas.microsoft.com/office/powerpoint/2012/main"/>
+      <p15:sldGuideLst xmlns:p15="http://schemas.microsoft.com/office/powerpoint/2012/main" xmlns=""/>
     </p:ext>
   </p:extLst>
 </p:sldLayout>
@@ -26217,7 +26222,7 @@
   </p:timing>
   <p:extLst mod="1">
     <p:ext uri="{DCECCB84-F9BA-43D5-87BE-67443E8EF086}">
-      <p15:sldGuideLst xmlns="" xmlns:p15="http://schemas.microsoft.com/office/powerpoint/2012/main"/>
+      <p15:sldGuideLst xmlns:p15="http://schemas.microsoft.com/office/powerpoint/2012/main" xmlns=""/>
     </p:ext>
   </p:extLst>
 </p:sldLayout>
@@ -30159,7 +30164,7 @@
   </p:txStyles>
   <p:extLst mod="1">
     <p:ext uri="{27BBF7A9-308A-43DC-89C8-2F10F3537804}">
-      <p15:sldGuideLst xmlns="" xmlns:p15="http://schemas.microsoft.com/office/powerpoint/2012/main">
+      <p15:sldGuideLst xmlns:p15="http://schemas.microsoft.com/office/powerpoint/2012/main" xmlns="">
         <p15:guide id="1" pos="92" userDrawn="1">
           <p15:clr>
             <a:srgbClr val="F26B43"/>
@@ -31659,7 +31664,7 @@
   </p:txStyles>
   <p:extLst mod="1">
     <p:ext uri="{27BBF7A9-308A-43DC-89C8-2F10F3537804}">
-      <p15:sldGuideLst xmlns="" xmlns:p15="http://schemas.microsoft.com/office/powerpoint/2012/main">
+      <p15:sldGuideLst xmlns:p15="http://schemas.microsoft.com/office/powerpoint/2012/main" xmlns="">
         <p15:guide id="1" pos="92" userDrawn="1">
           <p15:clr>
             <a:srgbClr val="F26B43"/>
@@ -33159,7 +33164,7 @@
   </p:txStyles>
   <p:extLst mod="1">
     <p:ext uri="{27BBF7A9-308A-43DC-89C8-2F10F3537804}">
-      <p15:sldGuideLst xmlns="" xmlns:p15="http://schemas.microsoft.com/office/powerpoint/2012/main">
+      <p15:sldGuideLst xmlns:p15="http://schemas.microsoft.com/office/powerpoint/2012/main" xmlns="">
         <p15:guide id="1" pos="92" userDrawn="1">
           <p15:clr>
             <a:srgbClr val="F26B43"/>
@@ -34659,7 +34664,7 @@
   </p:txStyles>
   <p:extLst mod="1">
     <p:ext uri="{27BBF7A9-308A-43DC-89C8-2F10F3537804}">
-      <p15:sldGuideLst xmlns="" xmlns:p15="http://schemas.microsoft.com/office/powerpoint/2012/main">
+      <p15:sldGuideLst xmlns:p15="http://schemas.microsoft.com/office/powerpoint/2012/main" xmlns="">
         <p15:guide id="1" pos="92" userDrawn="1">
           <p15:clr>
             <a:srgbClr val="F26B43"/>
@@ -36159,7 +36164,7 @@
   </p:txStyles>
   <p:extLst mod="1">
     <p:ext uri="{27BBF7A9-308A-43DC-89C8-2F10F3537804}">
-      <p15:sldGuideLst xmlns="" xmlns:p15="http://schemas.microsoft.com/office/powerpoint/2012/main">
+      <p15:sldGuideLst xmlns:p15="http://schemas.microsoft.com/office/powerpoint/2012/main" xmlns="">
         <p15:guide id="1" pos="92" userDrawn="1">
           <p15:clr>
             <a:srgbClr val="F26B43"/>
@@ -37659,7 +37664,7 @@
   </p:txStyles>
   <p:extLst mod="1">
     <p:ext uri="{27BBF7A9-308A-43DC-89C8-2F10F3537804}">
-      <p15:sldGuideLst xmlns="" xmlns:p15="http://schemas.microsoft.com/office/powerpoint/2012/main">
+      <p15:sldGuideLst xmlns:p15="http://schemas.microsoft.com/office/powerpoint/2012/main" xmlns="">
         <p15:guide id="1" pos="92" userDrawn="1">
           <p15:clr>
             <a:srgbClr val="F26B43"/>
@@ -39159,7 +39164,7 @@
   </p:txStyles>
   <p:extLst mod="1">
     <p:ext uri="{27BBF7A9-308A-43DC-89C8-2F10F3537804}">
-      <p15:sldGuideLst xmlns="" xmlns:p15="http://schemas.microsoft.com/office/powerpoint/2012/main">
+      <p15:sldGuideLst xmlns:p15="http://schemas.microsoft.com/office/powerpoint/2012/main" xmlns="">
         <p15:guide id="1" pos="92" userDrawn="1">
           <p15:clr>
             <a:srgbClr val="F26B43"/>
@@ -40659,7 +40664,7 @@
   </p:txStyles>
   <p:extLst mod="1">
     <p:ext uri="{27BBF7A9-308A-43DC-89C8-2F10F3537804}">
-      <p15:sldGuideLst xmlns="" xmlns:p15="http://schemas.microsoft.com/office/powerpoint/2012/main">
+      <p15:sldGuideLst xmlns:p15="http://schemas.microsoft.com/office/powerpoint/2012/main" xmlns="">
         <p15:guide id="1" pos="92" userDrawn="1">
           <p15:clr>
             <a:srgbClr val="F26B43"/>
@@ -42159,7 +42164,7 @@
   </p:txStyles>
   <p:extLst mod="1">
     <p:ext uri="{27BBF7A9-308A-43DC-89C8-2F10F3537804}">
-      <p15:sldGuideLst xmlns="" xmlns:p15="http://schemas.microsoft.com/office/powerpoint/2012/main">
+      <p15:sldGuideLst xmlns:p15="http://schemas.microsoft.com/office/powerpoint/2012/main" xmlns="">
         <p15:guide id="1" pos="92" userDrawn="1">
           <p15:clr>
             <a:srgbClr val="F26B43"/>
@@ -42463,599 +42468,6 @@
 </file>
 
 <file path=ppt/slides/slide10.xml><?xml version="1.0" encoding="utf-8"?>
-<p:sld xmlns:a="http://schemas.openxmlformats.org/drawingml/2006/main" xmlns:r="http://schemas.openxmlformats.org/officeDocument/2006/relationships" xmlns:p="http://schemas.openxmlformats.org/presentationml/2006/main">
-  <p:cSld>
-    <p:spTree>
-      <p:nvGrpSpPr>
-        <p:cNvPr id="1" name=""/>
-        <p:cNvGrpSpPr/>
-        <p:nvPr/>
-      </p:nvGrpSpPr>
-      <p:grpSpPr>
-        <a:xfrm>
-          <a:off x="0" y="0"/>
-          <a:ext cx="0" cy="0"/>
-          <a:chOff x="0" y="0"/>
-          <a:chExt cx="0" cy="0"/>
-        </a:xfrm>
-      </p:grpSpPr>
-      <p:sp>
-        <p:nvSpPr>
-          <p:cNvPr id="2" name="Datumsplatzhalter 1"/>
-          <p:cNvSpPr>
-            <a:spLocks noGrp="1"/>
-          </p:cNvSpPr>
-          <p:nvPr>
-            <p:ph type="dt" sz="half" idx="10"/>
-          </p:nvPr>
-        </p:nvSpPr>
-        <p:spPr/>
-        <p:txBody>
-          <a:bodyPr/>
-          <a:lstStyle/>
-          <a:p>
-            <a:r>
-              <a:rPr lang="fr-CH" smtClean="0"/>
-              <a:t>23.05.2018</a:t>
-            </a:r>
-            <a:endParaRPr lang="en-GB" dirty="0"/>
-          </a:p>
-        </p:txBody>
-      </p:sp>
-      <p:sp>
-        <p:nvSpPr>
-          <p:cNvPr id="3" name="Fußzeilenplatzhalter 2"/>
-          <p:cNvSpPr>
-            <a:spLocks noGrp="1"/>
-          </p:cNvSpPr>
-          <p:nvPr>
-            <p:ph type="ftr" sz="quarter" idx="11"/>
-          </p:nvPr>
-        </p:nvSpPr>
-        <p:spPr/>
-        <p:txBody>
-          <a:bodyPr/>
-          <a:lstStyle/>
-          <a:p>
-            <a:r>
-              <a:rPr lang="en-GB" smtClean="0"/>
-              <a:t>Group A</a:t>
-            </a:r>
-            <a:endParaRPr lang="en-GB" dirty="0"/>
-          </a:p>
-        </p:txBody>
-      </p:sp>
-      <p:sp>
-        <p:nvSpPr>
-          <p:cNvPr id="4" name="Foliennummernplatzhalter 3"/>
-          <p:cNvSpPr>
-            <a:spLocks noGrp="1"/>
-          </p:cNvSpPr>
-          <p:nvPr>
-            <p:ph type="sldNum" sz="quarter" idx="12"/>
-          </p:nvPr>
-        </p:nvSpPr>
-        <p:spPr/>
-        <p:txBody>
-          <a:bodyPr/>
-          <a:lstStyle/>
-          <a:p>
-            <a:fld id="{6C6AE60A-B69C-4790-82F7-3882EDF23186}" type="slidenum">
-              <a:rPr lang="en-GB" smtClean="0"/>
-              <a:pPr/>
-              <a:t>10</a:t>
-            </a:fld>
-            <a:endParaRPr lang="en-GB" dirty="0"/>
-          </a:p>
-        </p:txBody>
-      </p:sp>
-    </p:spTree>
-    <p:extLst>
-      <p:ext uri="{BB962C8B-B14F-4D97-AF65-F5344CB8AC3E}">
-        <p14:creationId xmlns:p14="http://schemas.microsoft.com/office/powerpoint/2010/main" val="1019193639"/>
-      </p:ext>
-    </p:extLst>
-  </p:cSld>
-  <p:clrMapOvr>
-    <a:masterClrMapping/>
-  </p:clrMapOvr>
-  <p:transition xmlns:p14="http://schemas.microsoft.com/office/powerpoint/2010/main">
-    <p:fade/>
-  </p:transition>
-</p:sld>
-</file>
-
-<file path=ppt/slides/slide2.xml><?xml version="1.0" encoding="utf-8"?>
-<p:sld xmlns:a="http://schemas.openxmlformats.org/drawingml/2006/main" xmlns:r="http://schemas.openxmlformats.org/officeDocument/2006/relationships" xmlns:p="http://schemas.openxmlformats.org/presentationml/2006/main">
-  <p:cSld>
-    <p:spTree>
-      <p:nvGrpSpPr>
-        <p:cNvPr id="1" name=""/>
-        <p:cNvGrpSpPr/>
-        <p:nvPr/>
-      </p:nvGrpSpPr>
-      <p:grpSpPr>
-        <a:xfrm>
-          <a:off x="0" y="0"/>
-          <a:ext cx="0" cy="0"/>
-          <a:chOff x="0" y="0"/>
-          <a:chExt cx="0" cy="0"/>
-        </a:xfrm>
-      </p:grpSpPr>
-      <p:sp>
-        <p:nvSpPr>
-          <p:cNvPr id="11" name="Titel 10"/>
-          <p:cNvSpPr>
-            <a:spLocks noGrp="1"/>
-          </p:cNvSpPr>
-          <p:nvPr>
-            <p:ph type="ctrTitle"/>
-          </p:nvPr>
-        </p:nvSpPr>
-        <p:spPr/>
-        <p:txBody>
-          <a:bodyPr/>
-          <a:lstStyle/>
-          <a:p>
-            <a:r>
-              <a:rPr lang="en-GB" dirty="0" smtClean="0"/>
-              <a:t>Reactor flow sheet</a:t>
-            </a:r>
-            <a:endParaRPr lang="en-GB" dirty="0"/>
-          </a:p>
-        </p:txBody>
-      </p:sp>
-      <p:sp>
-        <p:nvSpPr>
-          <p:cNvPr id="12" name="Untertitel 11"/>
-          <p:cNvSpPr>
-            <a:spLocks noGrp="1"/>
-          </p:cNvSpPr>
-          <p:nvPr>
-            <p:ph type="subTitle" idx="1"/>
-          </p:nvPr>
-        </p:nvSpPr>
-        <p:spPr/>
-        <p:txBody>
-          <a:bodyPr/>
-          <a:lstStyle/>
-          <a:p>
-            <a:endParaRPr lang="en-GB" dirty="0"/>
-          </a:p>
-        </p:txBody>
-      </p:sp>
-      <p:sp>
-        <p:nvSpPr>
-          <p:cNvPr id="4" name="Datumsplatzhalter 3"/>
-          <p:cNvSpPr>
-            <a:spLocks noGrp="1"/>
-          </p:cNvSpPr>
-          <p:nvPr>
-            <p:ph type="dt" sz="half" idx="10"/>
-          </p:nvPr>
-        </p:nvSpPr>
-        <p:spPr/>
-        <p:txBody>
-          <a:bodyPr/>
-          <a:lstStyle/>
-          <a:p>
-            <a:r>
-              <a:rPr lang="fr-CH" smtClean="0"/>
-              <a:t>23.05.2018</a:t>
-            </a:r>
-            <a:endParaRPr lang="en-GB" dirty="0"/>
-          </a:p>
-        </p:txBody>
-      </p:sp>
-      <p:sp>
-        <p:nvSpPr>
-          <p:cNvPr id="5" name="Fußzeilenplatzhalter 4"/>
-          <p:cNvSpPr>
-            <a:spLocks noGrp="1"/>
-          </p:cNvSpPr>
-          <p:nvPr>
-            <p:ph type="ftr" sz="quarter" idx="11"/>
-          </p:nvPr>
-        </p:nvSpPr>
-        <p:spPr/>
-        <p:txBody>
-          <a:bodyPr/>
-          <a:lstStyle/>
-          <a:p>
-            <a:r>
-              <a:rPr lang="en-GB" smtClean="0"/>
-              <a:t>Group A</a:t>
-            </a:r>
-            <a:endParaRPr lang="en-GB" dirty="0"/>
-          </a:p>
-        </p:txBody>
-      </p:sp>
-      <p:sp>
-        <p:nvSpPr>
-          <p:cNvPr id="6" name="Foliennummernplatzhalter 5"/>
-          <p:cNvSpPr>
-            <a:spLocks noGrp="1"/>
-          </p:cNvSpPr>
-          <p:nvPr>
-            <p:ph type="sldNum" sz="quarter" idx="12"/>
-          </p:nvPr>
-        </p:nvSpPr>
-        <p:spPr/>
-        <p:txBody>
-          <a:bodyPr/>
-          <a:lstStyle/>
-          <a:p>
-            <a:fld id="{6C6AE60A-B69C-4790-82F7-3882EDF23186}" type="slidenum">
-              <a:rPr lang="en-GB" smtClean="0"/>
-              <a:pPr/>
-              <a:t>2</a:t>
-            </a:fld>
-            <a:endParaRPr lang="en-GB" dirty="0"/>
-          </a:p>
-        </p:txBody>
-      </p:sp>
-      <p:pic>
-        <p:nvPicPr>
-          <p:cNvPr id="2" name="Espace réservé pour une image  1" descr="CaseStudyDiagram.jpg"/>
-          <p:cNvPicPr>
-            <a:picLocks noGrp="1" noChangeAspect="1"/>
-          </p:cNvPicPr>
-          <p:nvPr>
-            <p:ph type="pic" sz="quarter" idx="13"/>
-          </p:nvPr>
-        </p:nvPicPr>
-        <p:blipFill>
-          <a:blip r:embed="rId2">
-            <a:extLst>
-              <a:ext uri="{28A0092B-C50C-407E-A947-70E740481C1C}">
-                <a14:useLocalDpi xmlns:a14="http://schemas.microsoft.com/office/drawing/2010/main" val="0"/>
-              </a:ext>
-            </a:extLst>
-          </a:blip>
-          <a:srcRect l="-61033" r="-61033"/>
-          <a:stretch>
-            <a:fillRect/>
-          </a:stretch>
-        </p:blipFill>
-        <p:spPr>
-          <a:xfrm>
-            <a:off x="323850" y="620713"/>
-            <a:ext cx="11537950" cy="4205287"/>
-          </a:xfrm>
-        </p:spPr>
-      </p:pic>
-    </p:spTree>
-    <p:extLst>
-      <p:ext uri="{BB962C8B-B14F-4D97-AF65-F5344CB8AC3E}">
-        <p14:creationId xmlns:p14="http://schemas.microsoft.com/office/powerpoint/2010/main" val="3737279567"/>
-      </p:ext>
-    </p:extLst>
-  </p:cSld>
-  <p:clrMapOvr>
-    <a:masterClrMapping/>
-  </p:clrMapOvr>
-  <p:transition xmlns:p14="http://schemas.microsoft.com/office/powerpoint/2010/main">
-    <p:fade/>
-  </p:transition>
-  <p:timing>
-    <p:tnLst>
-      <p:par>
-        <p:cTn xmlns:p14="http://schemas.microsoft.com/office/powerpoint/2010/main" id="1" dur="indefinite" restart="never" nodeType="tmRoot"/>
-      </p:par>
-    </p:tnLst>
-  </p:timing>
-</p:sld>
-</file>
-
-<file path=ppt/slides/slide3.xml><?xml version="1.0" encoding="utf-8"?>
-<p:sld xmlns:a="http://schemas.openxmlformats.org/drawingml/2006/main" xmlns:r="http://schemas.openxmlformats.org/officeDocument/2006/relationships" xmlns:p="http://schemas.openxmlformats.org/presentationml/2006/main">
-  <p:cSld>
-    <p:spTree>
-      <p:nvGrpSpPr>
-        <p:cNvPr id="1" name=""/>
-        <p:cNvGrpSpPr/>
-        <p:nvPr/>
-      </p:nvGrpSpPr>
-      <p:grpSpPr>
-        <a:xfrm>
-          <a:off x="0" y="0"/>
-          <a:ext cx="0" cy="0"/>
-          <a:chOff x="0" y="0"/>
-          <a:chExt cx="0" cy="0"/>
-        </a:xfrm>
-      </p:grpSpPr>
-      <p:sp>
-        <p:nvSpPr>
-          <p:cNvPr id="11" name="Inhaltsplatzhalter 10"/>
-          <p:cNvSpPr>
-            <a:spLocks noGrp="1"/>
-          </p:cNvSpPr>
-          <p:nvPr>
-            <p:ph idx="1"/>
-          </p:nvPr>
-        </p:nvSpPr>
-        <p:spPr/>
-        <p:txBody>
-          <a:bodyPr/>
-          <a:lstStyle/>
-          <a:p>
-            <a:endParaRPr lang="en-GB" dirty="0"/>
-          </a:p>
-        </p:txBody>
-      </p:sp>
-      <p:sp>
-        <p:nvSpPr>
-          <p:cNvPr id="3" name="Datumsplatzhalter 2"/>
-          <p:cNvSpPr>
-            <a:spLocks noGrp="1"/>
-          </p:cNvSpPr>
-          <p:nvPr>
-            <p:ph type="dt" sz="half" idx="10"/>
-          </p:nvPr>
-        </p:nvSpPr>
-        <p:spPr/>
-        <p:txBody>
-          <a:bodyPr/>
-          <a:lstStyle/>
-          <a:p>
-            <a:r>
-              <a:rPr lang="fr-CH" smtClean="0"/>
-              <a:t>23.05.2018</a:t>
-            </a:r>
-            <a:endParaRPr lang="en-GB" dirty="0"/>
-          </a:p>
-        </p:txBody>
-      </p:sp>
-      <p:sp>
-        <p:nvSpPr>
-          <p:cNvPr id="4" name="Fußzeilenplatzhalter 3"/>
-          <p:cNvSpPr>
-            <a:spLocks noGrp="1"/>
-          </p:cNvSpPr>
-          <p:nvPr>
-            <p:ph type="ftr" sz="quarter" idx="11"/>
-          </p:nvPr>
-        </p:nvSpPr>
-        <p:spPr/>
-        <p:txBody>
-          <a:bodyPr/>
-          <a:lstStyle/>
-          <a:p>
-            <a:r>
-              <a:rPr lang="en-GB" smtClean="0"/>
-              <a:t>Group A</a:t>
-            </a:r>
-            <a:endParaRPr lang="en-GB" dirty="0"/>
-          </a:p>
-        </p:txBody>
-      </p:sp>
-      <p:sp>
-        <p:nvSpPr>
-          <p:cNvPr id="5" name="Foliennummernplatzhalter 4"/>
-          <p:cNvSpPr>
-            <a:spLocks noGrp="1"/>
-          </p:cNvSpPr>
-          <p:nvPr>
-            <p:ph type="sldNum" sz="quarter" idx="12"/>
-          </p:nvPr>
-        </p:nvSpPr>
-        <p:spPr/>
-        <p:txBody>
-          <a:bodyPr/>
-          <a:lstStyle/>
-          <a:p>
-            <a:fld id="{6C6AE60A-B69C-4790-82F7-3882EDF23186}" type="slidenum">
-              <a:rPr lang="en-GB" smtClean="0"/>
-              <a:pPr/>
-              <a:t>3</a:t>
-            </a:fld>
-            <a:endParaRPr lang="en-GB" dirty="0"/>
-          </a:p>
-        </p:txBody>
-      </p:sp>
-      <p:sp>
-        <p:nvSpPr>
-          <p:cNvPr id="10" name="Titel 9"/>
-          <p:cNvSpPr>
-            <a:spLocks noGrp="1"/>
-          </p:cNvSpPr>
-          <p:nvPr>
-            <p:ph type="title"/>
-          </p:nvPr>
-        </p:nvSpPr>
-        <p:spPr/>
-        <p:txBody>
-          <a:bodyPr/>
-          <a:lstStyle/>
-          <a:p>
-            <a:endParaRPr lang="en-GB" dirty="0"/>
-          </a:p>
-        </p:txBody>
-      </p:sp>
-    </p:spTree>
-    <p:extLst>
-      <p:ext uri="{BB962C8B-B14F-4D97-AF65-F5344CB8AC3E}">
-        <p14:creationId xmlns:p14="http://schemas.microsoft.com/office/powerpoint/2010/main" val="2857788226"/>
-      </p:ext>
-    </p:extLst>
-  </p:cSld>
-  <p:clrMapOvr>
-    <a:masterClrMapping/>
-  </p:clrMapOvr>
-  <p:transition xmlns:p14="http://schemas.microsoft.com/office/powerpoint/2010/main">
-    <p:fade/>
-  </p:transition>
-  <p:timing>
-    <p:tnLst>
-      <p:par>
-        <p:cTn xmlns:p14="http://schemas.microsoft.com/office/powerpoint/2010/main" id="1" dur="indefinite" restart="never" nodeType="tmRoot"/>
-      </p:par>
-    </p:tnLst>
-  </p:timing>
-</p:sld>
-</file>
-
-<file path=ppt/slides/slide4.xml><?xml version="1.0" encoding="utf-8"?>
-<p:sld xmlns:a="http://schemas.openxmlformats.org/drawingml/2006/main" xmlns:r="http://schemas.openxmlformats.org/officeDocument/2006/relationships" xmlns:p="http://schemas.openxmlformats.org/presentationml/2006/main">
-  <p:cSld>
-    <p:spTree>
-      <p:nvGrpSpPr>
-        <p:cNvPr id="1" name=""/>
-        <p:cNvGrpSpPr/>
-        <p:nvPr/>
-      </p:nvGrpSpPr>
-      <p:grpSpPr>
-        <a:xfrm>
-          <a:off x="0" y="0"/>
-          <a:ext cx="0" cy="0"/>
-          <a:chOff x="0" y="0"/>
-          <a:chExt cx="0" cy="0"/>
-        </a:xfrm>
-      </p:grpSpPr>
-      <p:sp>
-        <p:nvSpPr>
-          <p:cNvPr id="11" name="Titel 10"/>
-          <p:cNvSpPr>
-            <a:spLocks noGrp="1"/>
-          </p:cNvSpPr>
-          <p:nvPr>
-            <p:ph type="ctrTitle"/>
-          </p:nvPr>
-        </p:nvSpPr>
-        <p:spPr/>
-        <p:txBody>
-          <a:bodyPr/>
-          <a:lstStyle/>
-          <a:p>
-            <a:endParaRPr lang="en-GB" dirty="0"/>
-          </a:p>
-        </p:txBody>
-      </p:sp>
-      <p:sp>
-        <p:nvSpPr>
-          <p:cNvPr id="12" name="Untertitel 11"/>
-          <p:cNvSpPr>
-            <a:spLocks noGrp="1"/>
-          </p:cNvSpPr>
-          <p:nvPr>
-            <p:ph type="subTitle" idx="1"/>
-          </p:nvPr>
-        </p:nvSpPr>
-        <p:spPr/>
-        <p:txBody>
-          <a:bodyPr/>
-          <a:lstStyle/>
-          <a:p>
-            <a:endParaRPr lang="en-GB" dirty="0"/>
-          </a:p>
-        </p:txBody>
-      </p:sp>
-      <p:sp>
-        <p:nvSpPr>
-          <p:cNvPr id="4" name="Datumsplatzhalter 3"/>
-          <p:cNvSpPr>
-            <a:spLocks noGrp="1"/>
-          </p:cNvSpPr>
-          <p:nvPr>
-            <p:ph type="dt" sz="half" idx="10"/>
-          </p:nvPr>
-        </p:nvSpPr>
-        <p:spPr/>
-        <p:txBody>
-          <a:bodyPr/>
-          <a:lstStyle/>
-          <a:p>
-            <a:r>
-              <a:rPr lang="fr-CH" smtClean="0"/>
-              <a:t>23.05.2018</a:t>
-            </a:r>
-            <a:endParaRPr lang="en-GB" dirty="0"/>
-          </a:p>
-        </p:txBody>
-      </p:sp>
-      <p:sp>
-        <p:nvSpPr>
-          <p:cNvPr id="5" name="Fußzeilenplatzhalter 4"/>
-          <p:cNvSpPr>
-            <a:spLocks noGrp="1"/>
-          </p:cNvSpPr>
-          <p:nvPr>
-            <p:ph type="ftr" sz="quarter" idx="11"/>
-          </p:nvPr>
-        </p:nvSpPr>
-        <p:spPr/>
-        <p:txBody>
-          <a:bodyPr/>
-          <a:lstStyle/>
-          <a:p>
-            <a:r>
-              <a:rPr lang="en-GB" smtClean="0"/>
-              <a:t>Group A</a:t>
-            </a:r>
-            <a:endParaRPr lang="en-GB" dirty="0"/>
-          </a:p>
-        </p:txBody>
-      </p:sp>
-      <p:sp>
-        <p:nvSpPr>
-          <p:cNvPr id="6" name="Foliennummernplatzhalter 5"/>
-          <p:cNvSpPr>
-            <a:spLocks noGrp="1"/>
-          </p:cNvSpPr>
-          <p:nvPr>
-            <p:ph type="sldNum" sz="quarter" idx="12"/>
-          </p:nvPr>
-        </p:nvSpPr>
-        <p:spPr/>
-        <p:txBody>
-          <a:bodyPr/>
-          <a:lstStyle/>
-          <a:p>
-            <a:fld id="{6C6AE60A-B69C-4790-82F7-3882EDF23186}" type="slidenum">
-              <a:rPr lang="en-GB" smtClean="0"/>
-              <a:pPr/>
-              <a:t>4</a:t>
-            </a:fld>
-            <a:endParaRPr lang="en-GB" dirty="0"/>
-          </a:p>
-        </p:txBody>
-      </p:sp>
-      <p:sp>
-        <p:nvSpPr>
-          <p:cNvPr id="13" name="Bildplatzhalter 12"/>
-          <p:cNvSpPr>
-            <a:spLocks noGrp="1"/>
-          </p:cNvSpPr>
-          <p:nvPr>
-            <p:ph type="pic" sz="quarter" idx="13"/>
-          </p:nvPr>
-        </p:nvSpPr>
-        <p:spPr/>
-      </p:sp>
-    </p:spTree>
-    <p:extLst>
-      <p:ext uri="{BB962C8B-B14F-4D97-AF65-F5344CB8AC3E}">
-        <p14:creationId xmlns:p14="http://schemas.microsoft.com/office/powerpoint/2010/main" val="3801771638"/>
-      </p:ext>
-    </p:extLst>
-  </p:cSld>
-  <p:clrMapOvr>
-    <a:masterClrMapping/>
-  </p:clrMapOvr>
-  <p:transition xmlns:p14="http://schemas.microsoft.com/office/powerpoint/2010/main">
-    <p:fade/>
-  </p:transition>
-  <p:timing>
-    <p:tnLst>
-      <p:par>
-        <p:cTn xmlns:p14="http://schemas.microsoft.com/office/powerpoint/2010/main" id="1" dur="indefinite" restart="never" nodeType="tmRoot"/>
-      </p:par>
-    </p:tnLst>
-  </p:timing>
-</p:sld>
-</file>
-
-<file path=ppt/slides/slide5.xml><?xml version="1.0" encoding="utf-8"?>
 <p:sld xmlns:a="http://schemas.openxmlformats.org/drawingml/2006/main" xmlns:r="http://schemas.openxmlformats.org/officeDocument/2006/relationships" xmlns:p="http://schemas.openxmlformats.org/presentationml/2006/main">
   <p:cSld>
     <p:spTree>
@@ -43338,6 +42750,1705 @@
 </p:sld>
 </file>
 
+<file path=ppt/slides/slide11.xml><?xml version="1.0" encoding="utf-8"?>
+<p:sld xmlns:a="http://schemas.openxmlformats.org/drawingml/2006/main" xmlns:r="http://schemas.openxmlformats.org/officeDocument/2006/relationships" xmlns:p="http://schemas.openxmlformats.org/presentationml/2006/main">
+  <p:cSld>
+    <p:spTree>
+      <p:nvGrpSpPr>
+        <p:cNvPr id="1" name=""/>
+        <p:cNvGrpSpPr/>
+        <p:nvPr/>
+      </p:nvGrpSpPr>
+      <p:grpSpPr>
+        <a:xfrm>
+          <a:off x="0" y="0"/>
+          <a:ext cx="0" cy="0"/>
+          <a:chOff x="0" y="0"/>
+          <a:chExt cx="0" cy="0"/>
+        </a:xfrm>
+      </p:grpSpPr>
+      <p:sp>
+        <p:nvSpPr>
+          <p:cNvPr id="12" name="Inhaltsplatzhalter 11"/>
+          <p:cNvSpPr>
+            <a:spLocks noGrp="1"/>
+          </p:cNvSpPr>
+          <p:nvPr>
+            <p:ph sz="half" idx="1"/>
+          </p:nvPr>
+        </p:nvSpPr>
+        <p:spPr/>
+        <p:txBody>
+          <a:bodyPr/>
+          <a:lstStyle/>
+          <a:p>
+            <a:endParaRPr lang="en-GB" dirty="0"/>
+          </a:p>
+        </p:txBody>
+      </p:sp>
+      <p:sp>
+        <p:nvSpPr>
+          <p:cNvPr id="13" name="Inhaltsplatzhalter 12"/>
+          <p:cNvSpPr>
+            <a:spLocks noGrp="1"/>
+          </p:cNvSpPr>
+          <p:nvPr>
+            <p:ph sz="half" idx="2"/>
+          </p:nvPr>
+        </p:nvSpPr>
+        <p:spPr/>
+        <p:txBody>
+          <a:bodyPr/>
+          <a:lstStyle/>
+          <a:p>
+            <a:endParaRPr lang="en-GB" dirty="0"/>
+          </a:p>
+        </p:txBody>
+      </p:sp>
+      <p:sp>
+        <p:nvSpPr>
+          <p:cNvPr id="4" name="Datumsplatzhalter 3"/>
+          <p:cNvSpPr>
+            <a:spLocks noGrp="1"/>
+          </p:cNvSpPr>
+          <p:nvPr>
+            <p:ph type="dt" sz="half" idx="10"/>
+          </p:nvPr>
+        </p:nvSpPr>
+        <p:spPr/>
+        <p:txBody>
+          <a:bodyPr/>
+          <a:lstStyle/>
+          <a:p>
+            <a:r>
+              <a:rPr lang="fr-CH" smtClean="0"/>
+              <a:t>23.05.2018</a:t>
+            </a:r>
+            <a:endParaRPr lang="en-GB" dirty="0"/>
+          </a:p>
+        </p:txBody>
+      </p:sp>
+      <p:sp>
+        <p:nvSpPr>
+          <p:cNvPr id="5" name="Fußzeilenplatzhalter 4"/>
+          <p:cNvSpPr>
+            <a:spLocks noGrp="1"/>
+          </p:cNvSpPr>
+          <p:nvPr>
+            <p:ph type="ftr" sz="quarter" idx="11"/>
+          </p:nvPr>
+        </p:nvSpPr>
+        <p:spPr/>
+        <p:txBody>
+          <a:bodyPr/>
+          <a:lstStyle/>
+          <a:p>
+            <a:r>
+              <a:rPr lang="en-GB" smtClean="0"/>
+              <a:t>Group A</a:t>
+            </a:r>
+            <a:endParaRPr lang="en-GB" dirty="0"/>
+          </a:p>
+        </p:txBody>
+      </p:sp>
+      <p:sp>
+        <p:nvSpPr>
+          <p:cNvPr id="6" name="Foliennummernplatzhalter 5"/>
+          <p:cNvSpPr>
+            <a:spLocks noGrp="1"/>
+          </p:cNvSpPr>
+          <p:nvPr>
+            <p:ph type="sldNum" sz="quarter" idx="12"/>
+          </p:nvPr>
+        </p:nvSpPr>
+        <p:spPr/>
+        <p:txBody>
+          <a:bodyPr/>
+          <a:lstStyle/>
+          <a:p>
+            <a:fld id="{6C6AE60A-B69C-4790-82F7-3882EDF23186}" type="slidenum">
+              <a:rPr lang="en-GB" smtClean="0"/>
+              <a:pPr/>
+              <a:t>11</a:t>
+            </a:fld>
+            <a:endParaRPr lang="en-GB" dirty="0"/>
+          </a:p>
+        </p:txBody>
+      </p:sp>
+      <p:sp>
+        <p:nvSpPr>
+          <p:cNvPr id="11" name="Titel 10"/>
+          <p:cNvSpPr>
+            <a:spLocks noGrp="1"/>
+          </p:cNvSpPr>
+          <p:nvPr>
+            <p:ph type="title"/>
+          </p:nvPr>
+        </p:nvSpPr>
+        <p:spPr/>
+        <p:txBody>
+          <a:bodyPr/>
+          <a:lstStyle/>
+          <a:p>
+            <a:endParaRPr lang="en-GB" dirty="0"/>
+          </a:p>
+        </p:txBody>
+      </p:sp>
+    </p:spTree>
+    <p:extLst>
+      <p:ext uri="{BB962C8B-B14F-4D97-AF65-F5344CB8AC3E}">
+        <p14:creationId xmlns:p14="http://schemas.microsoft.com/office/powerpoint/2010/main" val="572143329"/>
+      </p:ext>
+    </p:extLst>
+  </p:cSld>
+  <p:clrMapOvr>
+    <a:masterClrMapping/>
+  </p:clrMapOvr>
+  <p:transition xmlns:p14="http://schemas.microsoft.com/office/powerpoint/2010/main">
+    <p:fade/>
+  </p:transition>
+  <p:timing>
+    <p:tnLst>
+      <p:par>
+        <p:cTn xmlns:p14="http://schemas.microsoft.com/office/powerpoint/2010/main" id="1" dur="indefinite" restart="never" nodeType="tmRoot"/>
+      </p:par>
+    </p:tnLst>
+  </p:timing>
+</p:sld>
+</file>
+
+<file path=ppt/slides/slide12.xml><?xml version="1.0" encoding="utf-8"?>
+<p:sld xmlns:a="http://schemas.openxmlformats.org/drawingml/2006/main" xmlns:r="http://schemas.openxmlformats.org/officeDocument/2006/relationships" xmlns:p="http://schemas.openxmlformats.org/presentationml/2006/main">
+  <p:cSld>
+    <p:spTree>
+      <p:nvGrpSpPr>
+        <p:cNvPr id="1" name=""/>
+        <p:cNvGrpSpPr/>
+        <p:nvPr/>
+      </p:nvGrpSpPr>
+      <p:grpSpPr>
+        <a:xfrm>
+          <a:off x="0" y="0"/>
+          <a:ext cx="0" cy="0"/>
+          <a:chOff x="0" y="0"/>
+          <a:chExt cx="0" cy="0"/>
+        </a:xfrm>
+      </p:grpSpPr>
+      <p:sp>
+        <p:nvSpPr>
+          <p:cNvPr id="2" name="Datumsplatzhalter 1"/>
+          <p:cNvSpPr>
+            <a:spLocks noGrp="1"/>
+          </p:cNvSpPr>
+          <p:nvPr>
+            <p:ph type="dt" sz="half" idx="10"/>
+          </p:nvPr>
+        </p:nvSpPr>
+        <p:spPr/>
+        <p:txBody>
+          <a:bodyPr/>
+          <a:lstStyle/>
+          <a:p>
+            <a:r>
+              <a:rPr lang="fr-CH" smtClean="0"/>
+              <a:t>23.05.2018</a:t>
+            </a:r>
+            <a:endParaRPr lang="en-GB" dirty="0"/>
+          </a:p>
+        </p:txBody>
+      </p:sp>
+      <p:sp>
+        <p:nvSpPr>
+          <p:cNvPr id="3" name="Fußzeilenplatzhalter 2"/>
+          <p:cNvSpPr>
+            <a:spLocks noGrp="1"/>
+          </p:cNvSpPr>
+          <p:nvPr>
+            <p:ph type="ftr" sz="quarter" idx="11"/>
+          </p:nvPr>
+        </p:nvSpPr>
+        <p:spPr/>
+        <p:txBody>
+          <a:bodyPr/>
+          <a:lstStyle/>
+          <a:p>
+            <a:r>
+              <a:rPr lang="en-GB" smtClean="0"/>
+              <a:t>Group A</a:t>
+            </a:r>
+            <a:endParaRPr lang="en-GB" dirty="0"/>
+          </a:p>
+        </p:txBody>
+      </p:sp>
+      <p:sp>
+        <p:nvSpPr>
+          <p:cNvPr id="4" name="Foliennummernplatzhalter 3"/>
+          <p:cNvSpPr>
+            <a:spLocks noGrp="1"/>
+          </p:cNvSpPr>
+          <p:nvPr>
+            <p:ph type="sldNum" sz="quarter" idx="12"/>
+          </p:nvPr>
+        </p:nvSpPr>
+        <p:spPr/>
+        <p:txBody>
+          <a:bodyPr/>
+          <a:lstStyle/>
+          <a:p>
+            <a:fld id="{6C6AE60A-B69C-4790-82F7-3882EDF23186}" type="slidenum">
+              <a:rPr lang="en-GB" smtClean="0"/>
+              <a:pPr/>
+              <a:t>12</a:t>
+            </a:fld>
+            <a:endParaRPr lang="en-GB" dirty="0"/>
+          </a:p>
+        </p:txBody>
+      </p:sp>
+      <p:sp>
+        <p:nvSpPr>
+          <p:cNvPr id="9" name="Titel 8"/>
+          <p:cNvSpPr>
+            <a:spLocks noGrp="1"/>
+          </p:cNvSpPr>
+          <p:nvPr>
+            <p:ph type="title"/>
+          </p:nvPr>
+        </p:nvSpPr>
+        <p:spPr/>
+        <p:txBody>
+          <a:bodyPr/>
+          <a:lstStyle/>
+          <a:p>
+            <a:endParaRPr lang="en-GB" dirty="0"/>
+          </a:p>
+        </p:txBody>
+      </p:sp>
+    </p:spTree>
+    <p:extLst>
+      <p:ext uri="{BB962C8B-B14F-4D97-AF65-F5344CB8AC3E}">
+        <p14:creationId xmlns:p14="http://schemas.microsoft.com/office/powerpoint/2010/main" val="3974297676"/>
+      </p:ext>
+    </p:extLst>
+  </p:cSld>
+  <p:clrMapOvr>
+    <a:masterClrMapping/>
+  </p:clrMapOvr>
+  <p:transition xmlns:p14="http://schemas.microsoft.com/office/powerpoint/2010/main">
+    <p:fade/>
+  </p:transition>
+  <p:timing>
+    <p:tnLst>
+      <p:par>
+        <p:cTn xmlns:p14="http://schemas.microsoft.com/office/powerpoint/2010/main" id="1" dur="indefinite" restart="never" nodeType="tmRoot"/>
+      </p:par>
+    </p:tnLst>
+  </p:timing>
+</p:sld>
+</file>
+
+<file path=ppt/slides/slide13.xml><?xml version="1.0" encoding="utf-8"?>
+<p:sld xmlns:a="http://schemas.openxmlformats.org/drawingml/2006/main" xmlns:r="http://schemas.openxmlformats.org/officeDocument/2006/relationships" xmlns:p="http://schemas.openxmlformats.org/presentationml/2006/main">
+  <p:cSld>
+    <p:spTree>
+      <p:nvGrpSpPr>
+        <p:cNvPr id="1" name=""/>
+        <p:cNvGrpSpPr/>
+        <p:nvPr/>
+      </p:nvGrpSpPr>
+      <p:grpSpPr>
+        <a:xfrm>
+          <a:off x="0" y="0"/>
+          <a:ext cx="0" cy="0"/>
+          <a:chOff x="0" y="0"/>
+          <a:chExt cx="0" cy="0"/>
+        </a:xfrm>
+      </p:grpSpPr>
+      <p:sp>
+        <p:nvSpPr>
+          <p:cNvPr id="2" name="Datumsplatzhalter 1"/>
+          <p:cNvSpPr>
+            <a:spLocks noGrp="1"/>
+          </p:cNvSpPr>
+          <p:nvPr>
+            <p:ph type="dt" sz="half" idx="10"/>
+          </p:nvPr>
+        </p:nvSpPr>
+        <p:spPr/>
+        <p:txBody>
+          <a:bodyPr/>
+          <a:lstStyle/>
+          <a:p>
+            <a:r>
+              <a:rPr lang="fr-CH" smtClean="0"/>
+              <a:t>23.05.2018</a:t>
+            </a:r>
+            <a:endParaRPr lang="en-GB" dirty="0"/>
+          </a:p>
+        </p:txBody>
+      </p:sp>
+      <p:sp>
+        <p:nvSpPr>
+          <p:cNvPr id="3" name="Fußzeilenplatzhalter 2"/>
+          <p:cNvSpPr>
+            <a:spLocks noGrp="1"/>
+          </p:cNvSpPr>
+          <p:nvPr>
+            <p:ph type="ftr" sz="quarter" idx="11"/>
+          </p:nvPr>
+        </p:nvSpPr>
+        <p:spPr/>
+        <p:txBody>
+          <a:bodyPr/>
+          <a:lstStyle/>
+          <a:p>
+            <a:r>
+              <a:rPr lang="en-GB" smtClean="0"/>
+              <a:t>Group A</a:t>
+            </a:r>
+            <a:endParaRPr lang="en-GB" dirty="0"/>
+          </a:p>
+        </p:txBody>
+      </p:sp>
+      <p:sp>
+        <p:nvSpPr>
+          <p:cNvPr id="4" name="Foliennummernplatzhalter 3"/>
+          <p:cNvSpPr>
+            <a:spLocks noGrp="1"/>
+          </p:cNvSpPr>
+          <p:nvPr>
+            <p:ph type="sldNum" sz="quarter" idx="12"/>
+          </p:nvPr>
+        </p:nvSpPr>
+        <p:spPr/>
+        <p:txBody>
+          <a:bodyPr/>
+          <a:lstStyle/>
+          <a:p>
+            <a:fld id="{6C6AE60A-B69C-4790-82F7-3882EDF23186}" type="slidenum">
+              <a:rPr lang="en-GB" smtClean="0"/>
+              <a:pPr/>
+              <a:t>13</a:t>
+            </a:fld>
+            <a:endParaRPr lang="en-GB" dirty="0"/>
+          </a:p>
+        </p:txBody>
+      </p:sp>
+      <p:sp>
+        <p:nvSpPr>
+          <p:cNvPr id="9" name="Bildplatzhalter 8"/>
+          <p:cNvSpPr>
+            <a:spLocks noGrp="1"/>
+          </p:cNvSpPr>
+          <p:nvPr>
+            <p:ph type="pic" sz="quarter" idx="13"/>
+          </p:nvPr>
+        </p:nvSpPr>
+        <p:spPr/>
+      </p:sp>
+    </p:spTree>
+    <p:extLst>
+      <p:ext uri="{BB962C8B-B14F-4D97-AF65-F5344CB8AC3E}">
+        <p14:creationId xmlns:p14="http://schemas.microsoft.com/office/powerpoint/2010/main" val="1116238283"/>
+      </p:ext>
+    </p:extLst>
+  </p:cSld>
+  <p:clrMapOvr>
+    <a:masterClrMapping/>
+  </p:clrMapOvr>
+  <p:transition xmlns:p14="http://schemas.microsoft.com/office/powerpoint/2010/main">
+    <p:fade/>
+  </p:transition>
+  <p:timing>
+    <p:tnLst>
+      <p:par>
+        <p:cTn xmlns:p14="http://schemas.microsoft.com/office/powerpoint/2010/main" id="1" dur="indefinite" restart="never" nodeType="tmRoot"/>
+      </p:par>
+    </p:tnLst>
+  </p:timing>
+</p:sld>
+</file>
+
+<file path=ppt/slides/slide14.xml><?xml version="1.0" encoding="utf-8"?>
+<p:sld xmlns:a="http://schemas.openxmlformats.org/drawingml/2006/main" xmlns:r="http://schemas.openxmlformats.org/officeDocument/2006/relationships" xmlns:p="http://schemas.openxmlformats.org/presentationml/2006/main">
+  <p:cSld>
+    <p:spTree>
+      <p:nvGrpSpPr>
+        <p:cNvPr id="1" name=""/>
+        <p:cNvGrpSpPr/>
+        <p:nvPr/>
+      </p:nvGrpSpPr>
+      <p:grpSpPr>
+        <a:xfrm>
+          <a:off x="0" y="0"/>
+          <a:ext cx="0" cy="0"/>
+          <a:chOff x="0" y="0"/>
+          <a:chExt cx="0" cy="0"/>
+        </a:xfrm>
+      </p:grpSpPr>
+      <p:sp>
+        <p:nvSpPr>
+          <p:cNvPr id="7" name="Inhaltsplatzhalter 6"/>
+          <p:cNvSpPr>
+            <a:spLocks noGrp="1"/>
+          </p:cNvSpPr>
+          <p:nvPr>
+            <p:ph idx="1"/>
+          </p:nvPr>
+        </p:nvSpPr>
+        <p:spPr/>
+        <p:txBody>
+          <a:bodyPr/>
+          <a:lstStyle/>
+          <a:p>
+            <a:pPr marL="0" indent="0">
+              <a:buNone/>
+            </a:pPr>
+            <a:r>
+              <a:rPr lang="en-GB" sz="1800" b="1" dirty="0" smtClean="0"/>
+              <a:t>ETH Zurich</a:t>
+            </a:r>
+          </a:p>
+          <a:p>
+            <a:pPr marL="0" indent="0">
+              <a:buNone/>
+            </a:pPr>
+            <a:r>
+              <a:rPr lang="en-GB" sz="1800" dirty="0"/>
+              <a:t>Organisational </a:t>
+            </a:r>
+            <a:r>
+              <a:rPr lang="en-GB" sz="1800" dirty="0" smtClean="0"/>
+              <a:t>unit</a:t>
+            </a:r>
+          </a:p>
+          <a:p>
+            <a:pPr marL="0" indent="0">
+              <a:buNone/>
+            </a:pPr>
+            <a:r>
+              <a:rPr lang="en-GB" sz="1800" dirty="0"/>
+              <a:t>Street address</a:t>
+            </a:r>
+          </a:p>
+          <a:p>
+            <a:pPr marL="0" indent="0">
+              <a:buNone/>
+            </a:pPr>
+            <a:r>
+              <a:rPr lang="en-GB" sz="1800" dirty="0"/>
+              <a:t>Postcode City</a:t>
+            </a:r>
+          </a:p>
+          <a:p>
+            <a:pPr marL="0" indent="0">
+              <a:buNone/>
+            </a:pPr>
+            <a:endParaRPr lang="en-GB" sz="1800" dirty="0" smtClean="0"/>
+          </a:p>
+          <a:p>
+            <a:pPr marL="0" indent="0">
+              <a:buNone/>
+            </a:pPr>
+            <a:r>
+              <a:rPr lang="en-GB" sz="1800" dirty="0"/>
+              <a:t>www.ethz.ch/en.html</a:t>
+            </a:r>
+          </a:p>
+          <a:p>
+            <a:pPr marL="0" indent="0">
+              <a:buNone/>
+            </a:pPr>
+            <a:endParaRPr lang="en-GB" sz="1800" dirty="0" smtClean="0"/>
+          </a:p>
+          <a:p>
+            <a:pPr marL="0" indent="0">
+              <a:buNone/>
+            </a:pPr>
+            <a:r>
+              <a:rPr lang="en-US" sz="1800" dirty="0"/>
+              <a:t>Publisher: </a:t>
+            </a:r>
+            <a:r>
+              <a:rPr lang="en-GB" sz="1800" dirty="0" smtClean="0"/>
+              <a:t>Organisational</a:t>
+            </a:r>
+            <a:r>
+              <a:rPr lang="en-US" sz="1800" dirty="0" smtClean="0"/>
+              <a:t> </a:t>
+            </a:r>
+            <a:r>
+              <a:rPr lang="en-US" sz="1800" dirty="0"/>
+              <a:t>unit of ETH Zurich</a:t>
+            </a:r>
+          </a:p>
+          <a:p>
+            <a:pPr marL="0" indent="0">
+              <a:buNone/>
+            </a:pPr>
+            <a:r>
+              <a:rPr lang="en-GB" sz="1800" dirty="0"/>
+              <a:t>Design: Designer Name</a:t>
+            </a:r>
+          </a:p>
+          <a:p>
+            <a:pPr marL="0" indent="0">
+              <a:buNone/>
+            </a:pPr>
+            <a:r>
+              <a:rPr lang="en-US" sz="1800" dirty="0"/>
+              <a:t>Images: Credit (slide xx), Credit (slide xx</a:t>
+            </a:r>
+            <a:r>
+              <a:rPr lang="en-US" sz="1800" dirty="0" smtClean="0"/>
+              <a:t>)</a:t>
+            </a:r>
+          </a:p>
+          <a:p>
+            <a:pPr marL="0" indent="0">
+              <a:buNone/>
+            </a:pPr>
+            <a:endParaRPr lang="en-GB" sz="1800" dirty="0" smtClean="0"/>
+          </a:p>
+          <a:p>
+            <a:pPr marL="0" indent="0">
+              <a:buNone/>
+            </a:pPr>
+            <a:r>
+              <a:rPr lang="en-GB" sz="1800" dirty="0"/>
+              <a:t>© ETH Zurich, December 2013</a:t>
+            </a:r>
+          </a:p>
+        </p:txBody>
+      </p:sp>
+      <p:sp>
+        <p:nvSpPr>
+          <p:cNvPr id="2" name="Datumsplatzhalter 1"/>
+          <p:cNvSpPr>
+            <a:spLocks noGrp="1"/>
+          </p:cNvSpPr>
+          <p:nvPr>
+            <p:ph type="dt" sz="half" idx="10"/>
+          </p:nvPr>
+        </p:nvSpPr>
+        <p:spPr/>
+        <p:txBody>
+          <a:bodyPr/>
+          <a:lstStyle/>
+          <a:p>
+            <a:r>
+              <a:rPr lang="fr-CH" smtClean="0"/>
+              <a:t>23.05.2018</a:t>
+            </a:r>
+            <a:endParaRPr lang="en-GB" dirty="0"/>
+          </a:p>
+        </p:txBody>
+      </p:sp>
+      <p:sp>
+        <p:nvSpPr>
+          <p:cNvPr id="3" name="Fußzeilenplatzhalter 2"/>
+          <p:cNvSpPr>
+            <a:spLocks noGrp="1"/>
+          </p:cNvSpPr>
+          <p:nvPr>
+            <p:ph type="ftr" sz="quarter" idx="11"/>
+          </p:nvPr>
+        </p:nvSpPr>
+        <p:spPr/>
+        <p:txBody>
+          <a:bodyPr/>
+          <a:lstStyle/>
+          <a:p>
+            <a:r>
+              <a:rPr lang="en-GB" smtClean="0"/>
+              <a:t>Group A</a:t>
+            </a:r>
+            <a:endParaRPr lang="en-GB" dirty="0"/>
+          </a:p>
+        </p:txBody>
+      </p:sp>
+      <p:sp>
+        <p:nvSpPr>
+          <p:cNvPr id="4" name="Foliennummernplatzhalter 3"/>
+          <p:cNvSpPr>
+            <a:spLocks noGrp="1"/>
+          </p:cNvSpPr>
+          <p:nvPr>
+            <p:ph type="sldNum" sz="quarter" idx="12"/>
+          </p:nvPr>
+        </p:nvSpPr>
+        <p:spPr/>
+        <p:txBody>
+          <a:bodyPr/>
+          <a:lstStyle/>
+          <a:p>
+            <a:fld id="{6C6AE60A-B69C-4790-82F7-3882EDF23186}" type="slidenum">
+              <a:rPr lang="en-GB" smtClean="0"/>
+              <a:t>14</a:t>
+            </a:fld>
+            <a:endParaRPr lang="en-GB" dirty="0"/>
+          </a:p>
+        </p:txBody>
+      </p:sp>
+      <p:sp>
+        <p:nvSpPr>
+          <p:cNvPr id="6" name="Titel 5"/>
+          <p:cNvSpPr>
+            <a:spLocks noGrp="1"/>
+          </p:cNvSpPr>
+          <p:nvPr>
+            <p:ph type="title"/>
+          </p:nvPr>
+        </p:nvSpPr>
+        <p:spPr/>
+        <p:txBody>
+          <a:bodyPr/>
+          <a:lstStyle/>
+          <a:p>
+            <a:r>
+              <a:rPr lang="en-GB" dirty="0"/>
+              <a:t>Contact information and credits</a:t>
+            </a:r>
+          </a:p>
+        </p:txBody>
+      </p:sp>
+    </p:spTree>
+    <p:extLst>
+      <p:ext uri="{BB962C8B-B14F-4D97-AF65-F5344CB8AC3E}">
+        <p14:creationId xmlns:p14="http://schemas.microsoft.com/office/powerpoint/2010/main" val="949753625"/>
+      </p:ext>
+    </p:extLst>
+  </p:cSld>
+  <p:clrMapOvr>
+    <a:masterClrMapping/>
+  </p:clrMapOvr>
+  <p:transition xmlns:p14="http://schemas.microsoft.com/office/powerpoint/2010/main">
+    <p:fade/>
+  </p:transition>
+  <p:timing>
+    <p:tnLst>
+      <p:par>
+        <p:cTn xmlns:p14="http://schemas.microsoft.com/office/powerpoint/2010/main" id="1" dur="indefinite" restart="never" nodeType="tmRoot"/>
+      </p:par>
+    </p:tnLst>
+  </p:timing>
+</p:sld>
+</file>
+
+<file path=ppt/slides/slide15.xml><?xml version="1.0" encoding="utf-8"?>
+<p:sld xmlns:a="http://schemas.openxmlformats.org/drawingml/2006/main" xmlns:r="http://schemas.openxmlformats.org/officeDocument/2006/relationships" xmlns:p="http://schemas.openxmlformats.org/presentationml/2006/main">
+  <p:cSld>
+    <p:spTree>
+      <p:nvGrpSpPr>
+        <p:cNvPr id="1" name=""/>
+        <p:cNvGrpSpPr/>
+        <p:nvPr/>
+      </p:nvGrpSpPr>
+      <p:grpSpPr>
+        <a:xfrm>
+          <a:off x="0" y="0"/>
+          <a:ext cx="0" cy="0"/>
+          <a:chOff x="0" y="0"/>
+          <a:chExt cx="0" cy="0"/>
+        </a:xfrm>
+      </p:grpSpPr>
+      <p:sp>
+        <p:nvSpPr>
+          <p:cNvPr id="2" name="Datumsplatzhalter 1"/>
+          <p:cNvSpPr>
+            <a:spLocks noGrp="1"/>
+          </p:cNvSpPr>
+          <p:nvPr>
+            <p:ph type="dt" sz="half" idx="10"/>
+          </p:nvPr>
+        </p:nvSpPr>
+        <p:spPr/>
+        <p:txBody>
+          <a:bodyPr/>
+          <a:lstStyle/>
+          <a:p>
+            <a:r>
+              <a:rPr lang="fr-CH" smtClean="0"/>
+              <a:t>23.05.2018</a:t>
+            </a:r>
+            <a:endParaRPr lang="en-GB" dirty="0"/>
+          </a:p>
+        </p:txBody>
+      </p:sp>
+      <p:sp>
+        <p:nvSpPr>
+          <p:cNvPr id="3" name="Fußzeilenplatzhalter 2"/>
+          <p:cNvSpPr>
+            <a:spLocks noGrp="1"/>
+          </p:cNvSpPr>
+          <p:nvPr>
+            <p:ph type="ftr" sz="quarter" idx="11"/>
+          </p:nvPr>
+        </p:nvSpPr>
+        <p:spPr/>
+        <p:txBody>
+          <a:bodyPr/>
+          <a:lstStyle/>
+          <a:p>
+            <a:r>
+              <a:rPr lang="en-GB" smtClean="0"/>
+              <a:t>Group A</a:t>
+            </a:r>
+            <a:endParaRPr lang="en-GB" dirty="0"/>
+          </a:p>
+        </p:txBody>
+      </p:sp>
+      <p:sp>
+        <p:nvSpPr>
+          <p:cNvPr id="4" name="Foliennummernplatzhalter 3"/>
+          <p:cNvSpPr>
+            <a:spLocks noGrp="1"/>
+          </p:cNvSpPr>
+          <p:nvPr>
+            <p:ph type="sldNum" sz="quarter" idx="12"/>
+          </p:nvPr>
+        </p:nvSpPr>
+        <p:spPr/>
+        <p:txBody>
+          <a:bodyPr/>
+          <a:lstStyle/>
+          <a:p>
+            <a:fld id="{6C6AE60A-B69C-4790-82F7-3882EDF23186}" type="slidenum">
+              <a:rPr lang="en-GB" smtClean="0"/>
+              <a:pPr/>
+              <a:t>15</a:t>
+            </a:fld>
+            <a:endParaRPr lang="en-GB" dirty="0"/>
+          </a:p>
+        </p:txBody>
+      </p:sp>
+    </p:spTree>
+    <p:extLst>
+      <p:ext uri="{BB962C8B-B14F-4D97-AF65-F5344CB8AC3E}">
+        <p14:creationId xmlns:p14="http://schemas.microsoft.com/office/powerpoint/2010/main" val="1019193639"/>
+      </p:ext>
+    </p:extLst>
+  </p:cSld>
+  <p:clrMapOvr>
+    <a:masterClrMapping/>
+  </p:clrMapOvr>
+  <p:transition xmlns:p14="http://schemas.microsoft.com/office/powerpoint/2010/main">
+    <p:fade/>
+  </p:transition>
+</p:sld>
+</file>
+
+<file path=ppt/slides/slide2.xml><?xml version="1.0" encoding="utf-8"?>
+<p:sld xmlns:a="http://schemas.openxmlformats.org/drawingml/2006/main" xmlns:r="http://schemas.openxmlformats.org/officeDocument/2006/relationships" xmlns:p="http://schemas.openxmlformats.org/presentationml/2006/main">
+  <p:cSld>
+    <p:spTree>
+      <p:nvGrpSpPr>
+        <p:cNvPr id="1" name=""/>
+        <p:cNvGrpSpPr/>
+        <p:nvPr/>
+      </p:nvGrpSpPr>
+      <p:grpSpPr>
+        <a:xfrm>
+          <a:off x="0" y="0"/>
+          <a:ext cx="0" cy="0"/>
+          <a:chOff x="0" y="0"/>
+          <a:chExt cx="0" cy="0"/>
+        </a:xfrm>
+      </p:grpSpPr>
+      <p:sp>
+        <p:nvSpPr>
+          <p:cNvPr id="11" name="Titel 10"/>
+          <p:cNvSpPr>
+            <a:spLocks noGrp="1"/>
+          </p:cNvSpPr>
+          <p:nvPr>
+            <p:ph type="ctrTitle"/>
+          </p:nvPr>
+        </p:nvSpPr>
+        <p:spPr/>
+        <p:txBody>
+          <a:bodyPr/>
+          <a:lstStyle/>
+          <a:p>
+            <a:r>
+              <a:rPr lang="en-GB" dirty="0" smtClean="0"/>
+              <a:t>Reactor flow sheet</a:t>
+            </a:r>
+            <a:endParaRPr lang="en-GB" dirty="0"/>
+          </a:p>
+        </p:txBody>
+      </p:sp>
+      <p:sp>
+        <p:nvSpPr>
+          <p:cNvPr id="12" name="Untertitel 11"/>
+          <p:cNvSpPr>
+            <a:spLocks noGrp="1"/>
+          </p:cNvSpPr>
+          <p:nvPr>
+            <p:ph type="subTitle" idx="1"/>
+          </p:nvPr>
+        </p:nvSpPr>
+        <p:spPr/>
+        <p:txBody>
+          <a:bodyPr/>
+          <a:lstStyle/>
+          <a:p>
+            <a:endParaRPr lang="en-GB" dirty="0"/>
+          </a:p>
+        </p:txBody>
+      </p:sp>
+      <p:sp>
+        <p:nvSpPr>
+          <p:cNvPr id="4" name="Datumsplatzhalter 3"/>
+          <p:cNvSpPr>
+            <a:spLocks noGrp="1"/>
+          </p:cNvSpPr>
+          <p:nvPr>
+            <p:ph type="dt" sz="half" idx="10"/>
+          </p:nvPr>
+        </p:nvSpPr>
+        <p:spPr/>
+        <p:txBody>
+          <a:bodyPr/>
+          <a:lstStyle/>
+          <a:p>
+            <a:r>
+              <a:rPr lang="fr-CH" smtClean="0"/>
+              <a:t>23.05.2018</a:t>
+            </a:r>
+            <a:endParaRPr lang="en-GB" dirty="0"/>
+          </a:p>
+        </p:txBody>
+      </p:sp>
+      <p:sp>
+        <p:nvSpPr>
+          <p:cNvPr id="5" name="Fußzeilenplatzhalter 4"/>
+          <p:cNvSpPr>
+            <a:spLocks noGrp="1"/>
+          </p:cNvSpPr>
+          <p:nvPr>
+            <p:ph type="ftr" sz="quarter" idx="11"/>
+          </p:nvPr>
+        </p:nvSpPr>
+        <p:spPr/>
+        <p:txBody>
+          <a:bodyPr/>
+          <a:lstStyle/>
+          <a:p>
+            <a:r>
+              <a:rPr lang="en-GB" smtClean="0"/>
+              <a:t>Group A</a:t>
+            </a:r>
+            <a:endParaRPr lang="en-GB" dirty="0"/>
+          </a:p>
+        </p:txBody>
+      </p:sp>
+      <p:sp>
+        <p:nvSpPr>
+          <p:cNvPr id="6" name="Foliennummernplatzhalter 5"/>
+          <p:cNvSpPr>
+            <a:spLocks noGrp="1"/>
+          </p:cNvSpPr>
+          <p:nvPr>
+            <p:ph type="sldNum" sz="quarter" idx="12"/>
+          </p:nvPr>
+        </p:nvSpPr>
+        <p:spPr/>
+        <p:txBody>
+          <a:bodyPr/>
+          <a:lstStyle/>
+          <a:p>
+            <a:fld id="{6C6AE60A-B69C-4790-82F7-3882EDF23186}" type="slidenum">
+              <a:rPr lang="en-GB" smtClean="0"/>
+              <a:pPr/>
+              <a:t>2</a:t>
+            </a:fld>
+            <a:endParaRPr lang="en-GB" dirty="0"/>
+          </a:p>
+        </p:txBody>
+      </p:sp>
+      <p:pic>
+        <p:nvPicPr>
+          <p:cNvPr id="2" name="Espace réservé pour une image  1" descr="CaseStudyDiagram.jpg"/>
+          <p:cNvPicPr>
+            <a:picLocks noGrp="1" noChangeAspect="1"/>
+          </p:cNvPicPr>
+          <p:nvPr>
+            <p:ph type="pic" sz="quarter" idx="13"/>
+          </p:nvPr>
+        </p:nvPicPr>
+        <p:blipFill>
+          <a:blip r:embed="rId2">
+            <a:extLst>
+              <a:ext uri="{28A0092B-C50C-407E-A947-70E740481C1C}">
+                <a14:useLocalDpi xmlns:a14="http://schemas.microsoft.com/office/drawing/2010/main" val="0"/>
+              </a:ext>
+            </a:extLst>
+          </a:blip>
+          <a:srcRect l="-61033" r="-61033"/>
+          <a:stretch>
+            <a:fillRect/>
+          </a:stretch>
+        </p:blipFill>
+        <p:spPr>
+          <a:xfrm>
+            <a:off x="323850" y="620713"/>
+            <a:ext cx="11537950" cy="4205287"/>
+          </a:xfrm>
+        </p:spPr>
+      </p:pic>
+    </p:spTree>
+    <p:extLst>
+      <p:ext uri="{BB962C8B-B14F-4D97-AF65-F5344CB8AC3E}">
+        <p14:creationId xmlns:p14="http://schemas.microsoft.com/office/powerpoint/2010/main" val="3737279567"/>
+      </p:ext>
+    </p:extLst>
+  </p:cSld>
+  <p:clrMapOvr>
+    <a:masterClrMapping/>
+  </p:clrMapOvr>
+  <p:transition xmlns:p14="http://schemas.microsoft.com/office/powerpoint/2010/main">
+    <p:fade/>
+  </p:transition>
+  <p:timing>
+    <p:tnLst>
+      <p:par>
+        <p:cTn xmlns:p14="http://schemas.microsoft.com/office/powerpoint/2010/main" id="1" dur="indefinite" restart="never" nodeType="tmRoot"/>
+      </p:par>
+    </p:tnLst>
+  </p:timing>
+</p:sld>
+</file>
+
+<file path=ppt/slides/slide3.xml><?xml version="1.0" encoding="utf-8"?>
+<p:sld xmlns:a="http://schemas.openxmlformats.org/drawingml/2006/main" xmlns:r="http://schemas.openxmlformats.org/officeDocument/2006/relationships" xmlns:p="http://schemas.openxmlformats.org/presentationml/2006/main">
+  <p:cSld>
+    <p:spTree>
+      <p:nvGrpSpPr>
+        <p:cNvPr id="1" name=""/>
+        <p:cNvGrpSpPr/>
+        <p:nvPr/>
+      </p:nvGrpSpPr>
+      <p:grpSpPr>
+        <a:xfrm>
+          <a:off x="0" y="0"/>
+          <a:ext cx="0" cy="0"/>
+          <a:chOff x="0" y="0"/>
+          <a:chExt cx="0" cy="0"/>
+        </a:xfrm>
+      </p:grpSpPr>
+      <p:sp>
+        <p:nvSpPr>
+          <p:cNvPr id="11" name="Inhaltsplatzhalter 10"/>
+          <p:cNvSpPr>
+            <a:spLocks noGrp="1"/>
+          </p:cNvSpPr>
+          <p:nvPr>
+            <p:ph idx="1"/>
+          </p:nvPr>
+        </p:nvSpPr>
+        <p:spPr>
+          <a:xfrm>
+            <a:off x="323850" y="1268700"/>
+            <a:ext cx="11537950" cy="4965410"/>
+          </a:xfrm>
+        </p:spPr>
+        <p:txBody>
+          <a:bodyPr/>
+          <a:lstStyle/>
+          <a:p>
+            <a:pPr marL="0" indent="0">
+              <a:buNone/>
+            </a:pPr>
+            <a:endParaRPr lang="en-GB" dirty="0" smtClean="0"/>
+          </a:p>
+          <a:p>
+            <a:pPr marL="0" indent="0">
+              <a:buNone/>
+            </a:pPr>
+            <a:r>
+              <a:rPr lang="en-GB" dirty="0" smtClean="0"/>
+              <a:t>Reactor:</a:t>
+            </a:r>
+          </a:p>
+          <a:p>
+            <a:r>
+              <a:rPr lang="en-GB" dirty="0" smtClean="0"/>
+              <a:t>Ideal vs. real (case 1/case 3)</a:t>
+            </a:r>
+          </a:p>
+          <a:p>
+            <a:pPr lvl="1"/>
+            <a:r>
+              <a:rPr lang="en-GB" dirty="0" smtClean="0"/>
+              <a:t>Length: 12 m / 28 m</a:t>
+            </a:r>
+          </a:p>
+          <a:p>
+            <a:pPr lvl="1"/>
+            <a:r>
+              <a:rPr lang="en-GB" dirty="0"/>
+              <a:t>Number of </a:t>
+            </a:r>
+            <a:r>
+              <a:rPr lang="en-GB" dirty="0" smtClean="0"/>
+              <a:t>tubes: 1’342 / 17’149</a:t>
+            </a:r>
+          </a:p>
+          <a:p>
+            <a:pPr marL="361950" lvl="1" indent="0">
+              <a:buNone/>
+            </a:pPr>
+            <a:endParaRPr lang="en-GB" dirty="0" smtClean="0"/>
+          </a:p>
+          <a:p>
+            <a:r>
+              <a:rPr lang="en-GB" dirty="0"/>
+              <a:t>Co- vs. counter-</a:t>
+            </a:r>
+            <a:r>
+              <a:rPr lang="en-GB" dirty="0" smtClean="0"/>
+              <a:t>current (case 3/case 4)</a:t>
+            </a:r>
+            <a:endParaRPr lang="en-GB" dirty="0"/>
+          </a:p>
+          <a:p>
+            <a:pPr lvl="1">
+              <a:buFont typeface="Wingdings" charset="2"/>
+              <a:buChar char="§"/>
+            </a:pPr>
+            <a:r>
+              <a:rPr lang="en-GB" dirty="0" smtClean="0"/>
+              <a:t>Number of tubes: 17’149 / 40’642</a:t>
+            </a:r>
+            <a:endParaRPr lang="en-GB" dirty="0"/>
+          </a:p>
+          <a:p>
+            <a:pPr lvl="1">
+              <a:buFont typeface="Wingdings" charset="2"/>
+              <a:buChar char="§"/>
+            </a:pPr>
+            <a:r>
+              <a:rPr lang="en-GB" dirty="0"/>
+              <a:t>Heating medium </a:t>
+            </a:r>
+            <a:r>
+              <a:rPr lang="en-GB" dirty="0" smtClean="0"/>
+              <a:t>flow: 0.10 / 0.05</a:t>
+            </a:r>
+          </a:p>
+          <a:p>
+            <a:pPr lvl="1">
+              <a:buFont typeface="Wingdings" charset="2"/>
+              <a:buChar char="§"/>
+            </a:pPr>
+            <a:r>
+              <a:rPr lang="en-GB" dirty="0" smtClean="0"/>
+              <a:t>Conversion CH</a:t>
+            </a:r>
+            <a:r>
+              <a:rPr lang="en-GB" baseline="-25000" dirty="0" smtClean="0"/>
+              <a:t>4</a:t>
+            </a:r>
+            <a:r>
+              <a:rPr lang="en-GB" dirty="0" smtClean="0"/>
+              <a:t>: 0.82 / 0.59</a:t>
+            </a:r>
+            <a:endParaRPr lang="en-GB" dirty="0"/>
+          </a:p>
+        </p:txBody>
+      </p:sp>
+      <p:sp>
+        <p:nvSpPr>
+          <p:cNvPr id="3" name="Datumsplatzhalter 2"/>
+          <p:cNvSpPr>
+            <a:spLocks noGrp="1"/>
+          </p:cNvSpPr>
+          <p:nvPr>
+            <p:ph type="dt" sz="half" idx="10"/>
+          </p:nvPr>
+        </p:nvSpPr>
+        <p:spPr/>
+        <p:txBody>
+          <a:bodyPr/>
+          <a:lstStyle/>
+          <a:p>
+            <a:r>
+              <a:rPr lang="fr-CH" smtClean="0"/>
+              <a:t>23.05.2018</a:t>
+            </a:r>
+            <a:endParaRPr lang="en-GB" dirty="0"/>
+          </a:p>
+        </p:txBody>
+      </p:sp>
+      <p:sp>
+        <p:nvSpPr>
+          <p:cNvPr id="4" name="Fußzeilenplatzhalter 3"/>
+          <p:cNvSpPr>
+            <a:spLocks noGrp="1"/>
+          </p:cNvSpPr>
+          <p:nvPr>
+            <p:ph type="ftr" sz="quarter" idx="11"/>
+          </p:nvPr>
+        </p:nvSpPr>
+        <p:spPr/>
+        <p:txBody>
+          <a:bodyPr/>
+          <a:lstStyle/>
+          <a:p>
+            <a:r>
+              <a:rPr lang="en-GB" smtClean="0"/>
+              <a:t>Group A</a:t>
+            </a:r>
+            <a:endParaRPr lang="en-GB" dirty="0"/>
+          </a:p>
+        </p:txBody>
+      </p:sp>
+      <p:sp>
+        <p:nvSpPr>
+          <p:cNvPr id="5" name="Foliennummernplatzhalter 4"/>
+          <p:cNvSpPr>
+            <a:spLocks noGrp="1"/>
+          </p:cNvSpPr>
+          <p:nvPr>
+            <p:ph type="sldNum" sz="quarter" idx="12"/>
+          </p:nvPr>
+        </p:nvSpPr>
+        <p:spPr/>
+        <p:txBody>
+          <a:bodyPr/>
+          <a:lstStyle/>
+          <a:p>
+            <a:fld id="{6C6AE60A-B69C-4790-82F7-3882EDF23186}" type="slidenum">
+              <a:rPr lang="en-GB" smtClean="0"/>
+              <a:pPr/>
+              <a:t>3</a:t>
+            </a:fld>
+            <a:endParaRPr lang="en-GB" dirty="0"/>
+          </a:p>
+        </p:txBody>
+      </p:sp>
+      <p:sp>
+        <p:nvSpPr>
+          <p:cNvPr id="10" name="Titel 9"/>
+          <p:cNvSpPr>
+            <a:spLocks noGrp="1"/>
+          </p:cNvSpPr>
+          <p:nvPr>
+            <p:ph type="title"/>
+          </p:nvPr>
+        </p:nvSpPr>
+        <p:spPr>
+          <a:xfrm>
+            <a:off x="323850" y="620714"/>
+            <a:ext cx="11537950" cy="503966"/>
+          </a:xfrm>
+        </p:spPr>
+        <p:txBody>
+          <a:bodyPr/>
+          <a:lstStyle/>
+          <a:p>
+            <a:r>
+              <a:rPr lang="en-GB" dirty="0" smtClean="0"/>
+              <a:t>Results</a:t>
+            </a:r>
+            <a:endParaRPr lang="en-GB" dirty="0"/>
+          </a:p>
+        </p:txBody>
+      </p:sp>
+    </p:spTree>
+    <p:extLst>
+      <p:ext uri="{BB962C8B-B14F-4D97-AF65-F5344CB8AC3E}">
+        <p14:creationId xmlns:p14="http://schemas.microsoft.com/office/powerpoint/2010/main" val="524812646"/>
+      </p:ext>
+    </p:extLst>
+  </p:cSld>
+  <p:clrMapOvr>
+    <a:masterClrMapping/>
+  </p:clrMapOvr>
+  <p:transition xmlns:p14="http://schemas.microsoft.com/office/powerpoint/2010/main">
+    <p:fade/>
+  </p:transition>
+  <p:timing>
+    <p:tnLst>
+      <p:par>
+        <p:cTn xmlns:p14="http://schemas.microsoft.com/office/powerpoint/2010/main" id="1" dur="indefinite" restart="never" nodeType="tmRoot"/>
+      </p:par>
+    </p:tnLst>
+  </p:timing>
+</p:sld>
+</file>
+
+<file path=ppt/slides/slide4.xml><?xml version="1.0" encoding="utf-8"?>
+<p:sld xmlns:a="http://schemas.openxmlformats.org/drawingml/2006/main" xmlns:r="http://schemas.openxmlformats.org/officeDocument/2006/relationships" xmlns:p="http://schemas.openxmlformats.org/presentationml/2006/main">
+  <p:cSld>
+    <p:spTree>
+      <p:nvGrpSpPr>
+        <p:cNvPr id="1" name=""/>
+        <p:cNvGrpSpPr/>
+        <p:nvPr/>
+      </p:nvGrpSpPr>
+      <p:grpSpPr>
+        <a:xfrm>
+          <a:off x="0" y="0"/>
+          <a:ext cx="0" cy="0"/>
+          <a:chOff x="0" y="0"/>
+          <a:chExt cx="0" cy="0"/>
+        </a:xfrm>
+      </p:grpSpPr>
+      <p:sp>
+        <p:nvSpPr>
+          <p:cNvPr id="11" name="Inhaltsplatzhalter 10"/>
+          <p:cNvSpPr>
+            <a:spLocks noGrp="1"/>
+          </p:cNvSpPr>
+          <p:nvPr>
+            <p:ph idx="1"/>
+          </p:nvPr>
+        </p:nvSpPr>
+        <p:spPr>
+          <a:xfrm>
+            <a:off x="323850" y="1268700"/>
+            <a:ext cx="11537950" cy="4965410"/>
+          </a:xfrm>
+        </p:spPr>
+        <p:txBody>
+          <a:bodyPr/>
+          <a:lstStyle/>
+          <a:p>
+            <a:pPr marL="0" indent="0">
+              <a:buNone/>
+            </a:pPr>
+            <a:endParaRPr lang="en-GB" dirty="0" smtClean="0"/>
+          </a:p>
+          <a:p>
+            <a:pPr marL="0" indent="0">
+              <a:buNone/>
+            </a:pPr>
+            <a:r>
+              <a:rPr lang="en-GB" dirty="0" smtClean="0"/>
+              <a:t>NH</a:t>
+            </a:r>
+            <a:r>
+              <a:rPr lang="en-GB" baseline="-25000" dirty="0" smtClean="0"/>
+              <a:t>3</a:t>
+            </a:r>
+            <a:r>
+              <a:rPr lang="en-GB" dirty="0" smtClean="0"/>
+              <a:t> absorber:</a:t>
+            </a:r>
+          </a:p>
+          <a:p>
+            <a:r>
+              <a:rPr lang="en-GB" dirty="0"/>
+              <a:t>Ideal vs. real (case 1/case 3</a:t>
+            </a:r>
+            <a:r>
+              <a:rPr lang="en-GB" dirty="0" smtClean="0"/>
+              <a:t>)</a:t>
+            </a:r>
+          </a:p>
+          <a:p>
+            <a:pPr lvl="1"/>
+            <a:r>
+              <a:rPr lang="en-GB" dirty="0" smtClean="0"/>
+              <a:t>Column height: 2.44 m / 4.39 m</a:t>
+            </a:r>
+          </a:p>
+          <a:p>
+            <a:pPr lvl="1"/>
+            <a:r>
+              <a:rPr lang="en-GB" dirty="0" smtClean="0"/>
+              <a:t>Diameter: 0.79 m / 0.79 m</a:t>
+            </a:r>
+          </a:p>
+          <a:p>
+            <a:pPr lvl="1"/>
+            <a:r>
+              <a:rPr lang="en-GB" dirty="0" smtClean="0"/>
+              <a:t>Flow rate ratio 0.80 / 1.64</a:t>
+            </a:r>
+          </a:p>
+          <a:p>
+            <a:pPr lvl="1"/>
+            <a:r>
+              <a:rPr lang="en-GB" dirty="0"/>
+              <a:t>Temperature in the </a:t>
+            </a:r>
+            <a:r>
+              <a:rPr lang="en-GB" dirty="0" smtClean="0"/>
+              <a:t>column</a:t>
+            </a:r>
+          </a:p>
+          <a:p>
+            <a:pPr lvl="1"/>
+            <a:r>
+              <a:rPr lang="en-GB" dirty="0" smtClean="0"/>
+              <a:t>Volumetric fraction H</a:t>
+            </a:r>
+            <a:r>
+              <a:rPr lang="en-GB" baseline="-25000" dirty="0" smtClean="0"/>
+              <a:t>2</a:t>
+            </a:r>
+            <a:r>
+              <a:rPr lang="en-GB" dirty="0" smtClean="0"/>
+              <a:t>SO</a:t>
+            </a:r>
+            <a:r>
+              <a:rPr lang="en-GB" baseline="-25000" dirty="0" smtClean="0"/>
+              <a:t>4 </a:t>
+            </a:r>
+            <a:r>
+              <a:rPr lang="en-GB" dirty="0" smtClean="0"/>
+              <a:t>: 0.37 / 2.01</a:t>
+            </a:r>
+            <a:endParaRPr lang="en-GB" dirty="0"/>
+          </a:p>
+          <a:p>
+            <a:endParaRPr lang="en-GB" dirty="0" smtClean="0"/>
+          </a:p>
+        </p:txBody>
+      </p:sp>
+      <p:sp>
+        <p:nvSpPr>
+          <p:cNvPr id="3" name="Datumsplatzhalter 2"/>
+          <p:cNvSpPr>
+            <a:spLocks noGrp="1"/>
+          </p:cNvSpPr>
+          <p:nvPr>
+            <p:ph type="dt" sz="half" idx="10"/>
+          </p:nvPr>
+        </p:nvSpPr>
+        <p:spPr/>
+        <p:txBody>
+          <a:bodyPr/>
+          <a:lstStyle/>
+          <a:p>
+            <a:r>
+              <a:rPr lang="fr-CH" smtClean="0"/>
+              <a:t>23.05.2018</a:t>
+            </a:r>
+            <a:endParaRPr lang="en-GB" dirty="0"/>
+          </a:p>
+        </p:txBody>
+      </p:sp>
+      <p:sp>
+        <p:nvSpPr>
+          <p:cNvPr id="4" name="Fußzeilenplatzhalter 3"/>
+          <p:cNvSpPr>
+            <a:spLocks noGrp="1"/>
+          </p:cNvSpPr>
+          <p:nvPr>
+            <p:ph type="ftr" sz="quarter" idx="11"/>
+          </p:nvPr>
+        </p:nvSpPr>
+        <p:spPr/>
+        <p:txBody>
+          <a:bodyPr/>
+          <a:lstStyle/>
+          <a:p>
+            <a:r>
+              <a:rPr lang="en-GB" smtClean="0"/>
+              <a:t>Group A</a:t>
+            </a:r>
+            <a:endParaRPr lang="en-GB" dirty="0"/>
+          </a:p>
+        </p:txBody>
+      </p:sp>
+      <p:sp>
+        <p:nvSpPr>
+          <p:cNvPr id="5" name="Foliennummernplatzhalter 4"/>
+          <p:cNvSpPr>
+            <a:spLocks noGrp="1"/>
+          </p:cNvSpPr>
+          <p:nvPr>
+            <p:ph type="sldNum" sz="quarter" idx="12"/>
+          </p:nvPr>
+        </p:nvSpPr>
+        <p:spPr/>
+        <p:txBody>
+          <a:bodyPr/>
+          <a:lstStyle/>
+          <a:p>
+            <a:fld id="{6C6AE60A-B69C-4790-82F7-3882EDF23186}" type="slidenum">
+              <a:rPr lang="en-GB" smtClean="0"/>
+              <a:pPr/>
+              <a:t>4</a:t>
+            </a:fld>
+            <a:endParaRPr lang="en-GB" dirty="0"/>
+          </a:p>
+        </p:txBody>
+      </p:sp>
+      <p:sp>
+        <p:nvSpPr>
+          <p:cNvPr id="10" name="Titel 9"/>
+          <p:cNvSpPr>
+            <a:spLocks noGrp="1"/>
+          </p:cNvSpPr>
+          <p:nvPr>
+            <p:ph type="title"/>
+          </p:nvPr>
+        </p:nvSpPr>
+        <p:spPr>
+          <a:xfrm>
+            <a:off x="323850" y="620714"/>
+            <a:ext cx="11537950" cy="503966"/>
+          </a:xfrm>
+        </p:spPr>
+        <p:txBody>
+          <a:bodyPr/>
+          <a:lstStyle/>
+          <a:p>
+            <a:r>
+              <a:rPr lang="en-GB" dirty="0" smtClean="0"/>
+              <a:t>Results</a:t>
+            </a:r>
+            <a:endParaRPr lang="en-GB" dirty="0"/>
+          </a:p>
+        </p:txBody>
+      </p:sp>
+    </p:spTree>
+    <p:extLst>
+      <p:ext uri="{BB962C8B-B14F-4D97-AF65-F5344CB8AC3E}">
+        <p14:creationId xmlns:p14="http://schemas.microsoft.com/office/powerpoint/2010/main" val="2336202494"/>
+      </p:ext>
+    </p:extLst>
+  </p:cSld>
+  <p:clrMapOvr>
+    <a:masterClrMapping/>
+  </p:clrMapOvr>
+  <p:transition xmlns:p14="http://schemas.microsoft.com/office/powerpoint/2010/main">
+    <p:fade/>
+  </p:transition>
+  <p:timing>
+    <p:tnLst>
+      <p:par>
+        <p:cTn xmlns:p14="http://schemas.microsoft.com/office/powerpoint/2010/main" id="1" dur="indefinite" restart="never" nodeType="tmRoot"/>
+      </p:par>
+    </p:tnLst>
+  </p:timing>
+</p:sld>
+</file>
+
+<file path=ppt/slides/slide5.xml><?xml version="1.0" encoding="utf-8"?>
+<p:sld xmlns:a="http://schemas.openxmlformats.org/drawingml/2006/main" xmlns:r="http://schemas.openxmlformats.org/officeDocument/2006/relationships" xmlns:p="http://schemas.openxmlformats.org/presentationml/2006/main">
+  <p:cSld>
+    <p:spTree>
+      <p:nvGrpSpPr>
+        <p:cNvPr id="1" name=""/>
+        <p:cNvGrpSpPr/>
+        <p:nvPr/>
+      </p:nvGrpSpPr>
+      <p:grpSpPr>
+        <a:xfrm>
+          <a:off x="0" y="0"/>
+          <a:ext cx="0" cy="0"/>
+          <a:chOff x="0" y="0"/>
+          <a:chExt cx="0" cy="0"/>
+        </a:xfrm>
+      </p:grpSpPr>
+      <p:sp>
+        <p:nvSpPr>
+          <p:cNvPr id="11" name="Inhaltsplatzhalter 10"/>
+          <p:cNvSpPr>
+            <a:spLocks noGrp="1"/>
+          </p:cNvSpPr>
+          <p:nvPr>
+            <p:ph idx="1"/>
+          </p:nvPr>
+        </p:nvSpPr>
+        <p:spPr>
+          <a:xfrm>
+            <a:off x="323850" y="1268700"/>
+            <a:ext cx="11537950" cy="4965410"/>
+          </a:xfrm>
+        </p:spPr>
+        <p:txBody>
+          <a:bodyPr/>
+          <a:lstStyle/>
+          <a:p>
+            <a:pPr marL="0" indent="0">
+              <a:buNone/>
+            </a:pPr>
+            <a:endParaRPr lang="en-GB" dirty="0" smtClean="0"/>
+          </a:p>
+          <a:p>
+            <a:pPr marL="0" indent="0">
+              <a:buNone/>
+            </a:pPr>
+            <a:r>
+              <a:rPr lang="en-GB" dirty="0" smtClean="0"/>
+              <a:t>HCN absorber:</a:t>
+            </a:r>
+          </a:p>
+          <a:p>
+            <a:r>
+              <a:rPr lang="en-GB" dirty="0"/>
+              <a:t>Ideal vs. real (case 1/case 3</a:t>
+            </a:r>
+            <a:r>
+              <a:rPr lang="en-GB" dirty="0" smtClean="0"/>
+              <a:t>)</a:t>
+            </a:r>
+          </a:p>
+          <a:p>
+            <a:pPr lvl="1"/>
+            <a:r>
+              <a:rPr lang="en-GB" dirty="0" smtClean="0"/>
+              <a:t>Column height: 9.73 m / 10.31 m</a:t>
+            </a:r>
+          </a:p>
+          <a:p>
+            <a:pPr lvl="1"/>
+            <a:r>
+              <a:rPr lang="en-GB" dirty="0" smtClean="0"/>
+              <a:t>Diameter: 1.11 m / 1.10 m</a:t>
+            </a:r>
+          </a:p>
+          <a:p>
+            <a:pPr lvl="1"/>
+            <a:r>
+              <a:rPr lang="en-GB" dirty="0"/>
+              <a:t>Outlet </a:t>
+            </a:r>
+            <a:r>
+              <a:rPr lang="en-GB" dirty="0" smtClean="0"/>
+              <a:t>temperature: 294.72 K / 293.57 K</a:t>
+            </a:r>
+          </a:p>
+          <a:p>
+            <a:pPr lvl="1"/>
+            <a:r>
+              <a:rPr lang="en-GB" dirty="0" smtClean="0"/>
+              <a:t>Water</a:t>
+            </a:r>
+            <a:endParaRPr lang="en-GB" dirty="0"/>
+          </a:p>
+          <a:p>
+            <a:endParaRPr lang="en-GB" dirty="0" smtClean="0"/>
+          </a:p>
+        </p:txBody>
+      </p:sp>
+      <p:sp>
+        <p:nvSpPr>
+          <p:cNvPr id="3" name="Datumsplatzhalter 2"/>
+          <p:cNvSpPr>
+            <a:spLocks noGrp="1"/>
+          </p:cNvSpPr>
+          <p:nvPr>
+            <p:ph type="dt" sz="half" idx="10"/>
+          </p:nvPr>
+        </p:nvSpPr>
+        <p:spPr/>
+        <p:txBody>
+          <a:bodyPr/>
+          <a:lstStyle/>
+          <a:p>
+            <a:r>
+              <a:rPr lang="fr-CH" smtClean="0"/>
+              <a:t>23.05.2018</a:t>
+            </a:r>
+            <a:endParaRPr lang="en-GB" dirty="0"/>
+          </a:p>
+        </p:txBody>
+      </p:sp>
+      <p:sp>
+        <p:nvSpPr>
+          <p:cNvPr id="4" name="Fußzeilenplatzhalter 3"/>
+          <p:cNvSpPr>
+            <a:spLocks noGrp="1"/>
+          </p:cNvSpPr>
+          <p:nvPr>
+            <p:ph type="ftr" sz="quarter" idx="11"/>
+          </p:nvPr>
+        </p:nvSpPr>
+        <p:spPr/>
+        <p:txBody>
+          <a:bodyPr/>
+          <a:lstStyle/>
+          <a:p>
+            <a:r>
+              <a:rPr lang="en-GB" smtClean="0"/>
+              <a:t>Group A</a:t>
+            </a:r>
+            <a:endParaRPr lang="en-GB" dirty="0"/>
+          </a:p>
+        </p:txBody>
+      </p:sp>
+      <p:sp>
+        <p:nvSpPr>
+          <p:cNvPr id="5" name="Foliennummernplatzhalter 4"/>
+          <p:cNvSpPr>
+            <a:spLocks noGrp="1"/>
+          </p:cNvSpPr>
+          <p:nvPr>
+            <p:ph type="sldNum" sz="quarter" idx="12"/>
+          </p:nvPr>
+        </p:nvSpPr>
+        <p:spPr/>
+        <p:txBody>
+          <a:bodyPr/>
+          <a:lstStyle/>
+          <a:p>
+            <a:fld id="{6C6AE60A-B69C-4790-82F7-3882EDF23186}" type="slidenum">
+              <a:rPr lang="en-GB" smtClean="0"/>
+              <a:pPr/>
+              <a:t>5</a:t>
+            </a:fld>
+            <a:endParaRPr lang="en-GB" dirty="0"/>
+          </a:p>
+        </p:txBody>
+      </p:sp>
+      <p:sp>
+        <p:nvSpPr>
+          <p:cNvPr id="10" name="Titel 9"/>
+          <p:cNvSpPr>
+            <a:spLocks noGrp="1"/>
+          </p:cNvSpPr>
+          <p:nvPr>
+            <p:ph type="title"/>
+          </p:nvPr>
+        </p:nvSpPr>
+        <p:spPr>
+          <a:xfrm>
+            <a:off x="323850" y="620714"/>
+            <a:ext cx="11537950" cy="503966"/>
+          </a:xfrm>
+        </p:spPr>
+        <p:txBody>
+          <a:bodyPr/>
+          <a:lstStyle/>
+          <a:p>
+            <a:r>
+              <a:rPr lang="en-GB" dirty="0" smtClean="0"/>
+              <a:t>Results</a:t>
+            </a:r>
+            <a:endParaRPr lang="en-GB" dirty="0"/>
+          </a:p>
+        </p:txBody>
+      </p:sp>
+    </p:spTree>
+    <p:extLst>
+      <p:ext uri="{BB962C8B-B14F-4D97-AF65-F5344CB8AC3E}">
+        <p14:creationId xmlns:p14="http://schemas.microsoft.com/office/powerpoint/2010/main" val="3246964687"/>
+      </p:ext>
+    </p:extLst>
+  </p:cSld>
+  <p:clrMapOvr>
+    <a:masterClrMapping/>
+  </p:clrMapOvr>
+  <p:transition xmlns:p14="http://schemas.microsoft.com/office/powerpoint/2010/main">
+    <p:fade/>
+  </p:transition>
+  <p:timing>
+    <p:tnLst>
+      <p:par>
+        <p:cTn xmlns:p14="http://schemas.microsoft.com/office/powerpoint/2010/main" id="1" dur="indefinite" restart="never" nodeType="tmRoot"/>
+      </p:par>
+    </p:tnLst>
+  </p:timing>
+</p:sld>
+</file>
+
 <file path=ppt/slides/slide6.xml><?xml version="1.0" encoding="utf-8"?>
 <p:sld xmlns:a="http://schemas.openxmlformats.org/drawingml/2006/main" xmlns:r="http://schemas.openxmlformats.org/officeDocument/2006/relationships" xmlns:p="http://schemas.openxmlformats.org/presentationml/2006/main">
   <p:cSld>
@@ -43357,31 +44468,91 @@
       </p:grpSpPr>
       <p:sp>
         <p:nvSpPr>
-          <p:cNvPr id="12" name="Inhaltsplatzhalter 11"/>
-          <p:cNvSpPr>
-            <a:spLocks noGrp="1"/>
-          </p:cNvSpPr>
-          <p:nvPr>
-            <p:ph sz="half" idx="1"/>
-          </p:nvPr>
-        </p:nvSpPr>
-        <p:spPr/>
+          <p:cNvPr id="11" name="Inhaltsplatzhalter 10"/>
+          <p:cNvSpPr>
+            <a:spLocks noGrp="1"/>
+          </p:cNvSpPr>
+          <p:nvPr>
+            <p:ph idx="1"/>
+          </p:nvPr>
+        </p:nvSpPr>
+        <p:spPr>
+          <a:xfrm>
+            <a:off x="323850" y="1268700"/>
+            <a:ext cx="11537950" cy="4965410"/>
+          </a:xfrm>
+        </p:spPr>
         <p:txBody>
           <a:bodyPr/>
           <a:lstStyle/>
           <a:p>
-            <a:endParaRPr lang="en-GB" dirty="0"/>
-          </a:p>
-        </p:txBody>
-      </p:sp>
-      <p:sp>
-        <p:nvSpPr>
-          <p:cNvPr id="13" name="Inhaltsplatzhalter 12"/>
-          <p:cNvSpPr>
-            <a:spLocks noGrp="1"/>
-          </p:cNvSpPr>
-          <p:nvPr>
-            <p:ph sz="half" idx="2"/>
+            <a:pPr marL="0" indent="0">
+              <a:buNone/>
+            </a:pPr>
+            <a:endParaRPr lang="en-GB" dirty="0" smtClean="0"/>
+          </a:p>
+          <a:p>
+            <a:pPr marL="0" indent="0">
+              <a:buNone/>
+            </a:pPr>
+            <a:r>
+              <a:rPr lang="en-GB" dirty="0" smtClean="0"/>
+              <a:t>HCN distillation:</a:t>
+            </a:r>
+          </a:p>
+          <a:p>
+            <a:r>
+              <a:rPr lang="en-GB" dirty="0"/>
+              <a:t>Ideal vs. real (case 1/case 3</a:t>
+            </a:r>
+            <a:r>
+              <a:rPr lang="en-GB" dirty="0" smtClean="0"/>
+              <a:t>)</a:t>
+            </a:r>
+          </a:p>
+          <a:p>
+            <a:pPr lvl="1"/>
+            <a:r>
+              <a:rPr lang="en-GB" dirty="0" smtClean="0"/>
+              <a:t>Column height: 9.36 m / 10.08 m</a:t>
+            </a:r>
+          </a:p>
+          <a:p>
+            <a:pPr lvl="1"/>
+            <a:r>
+              <a:rPr lang="en-GB" dirty="0" smtClean="0"/>
+              <a:t>Diameter: 1.73 m / 1.92 m</a:t>
+            </a:r>
+          </a:p>
+          <a:p>
+            <a:pPr lvl="1"/>
+            <a:r>
+              <a:rPr lang="en-GB" dirty="0" smtClean="0"/>
+              <a:t>Heat exchanger area: 0.057 m</a:t>
+            </a:r>
+            <a:r>
+              <a:rPr lang="en-GB" baseline="30000" dirty="0" smtClean="0"/>
+              <a:t>2</a:t>
+            </a:r>
+            <a:r>
+              <a:rPr lang="en-GB" dirty="0" smtClean="0"/>
+              <a:t> / 0.056 m</a:t>
+            </a:r>
+            <a:r>
+              <a:rPr lang="en-GB" baseline="30000" dirty="0" smtClean="0"/>
+              <a:t>2</a:t>
+            </a:r>
+          </a:p>
+        </p:txBody>
+      </p:sp>
+      <p:sp>
+        <p:nvSpPr>
+          <p:cNvPr id="3" name="Datumsplatzhalter 2"/>
+          <p:cNvSpPr>
+            <a:spLocks noGrp="1"/>
+          </p:cNvSpPr>
+          <p:nvPr>
+            <p:ph type="dt" sz="half" idx="10"/>
           </p:nvPr>
         </p:nvSpPr>
         <p:spPr/>
@@ -43389,18 +44560,22 @@
           <a:bodyPr/>
           <a:lstStyle/>
           <a:p>
+            <a:r>
+              <a:rPr lang="fr-CH" smtClean="0"/>
+              <a:t>23.05.2018</a:t>
+            </a:r>
             <a:endParaRPr lang="en-GB" dirty="0"/>
           </a:p>
         </p:txBody>
       </p:sp>
       <p:sp>
         <p:nvSpPr>
-          <p:cNvPr id="4" name="Datumsplatzhalter 3"/>
-          <p:cNvSpPr>
-            <a:spLocks noGrp="1"/>
-          </p:cNvSpPr>
-          <p:nvPr>
-            <p:ph type="dt" sz="half" idx="10"/>
+          <p:cNvPr id="4" name="Fußzeilenplatzhalter 3"/>
+          <p:cNvSpPr>
+            <a:spLocks noGrp="1"/>
+          </p:cNvSpPr>
+          <p:nvPr>
+            <p:ph type="ftr" sz="quarter" idx="11"/>
           </p:nvPr>
         </p:nvSpPr>
         <p:spPr/>
@@ -43409,29 +44584,6 @@
           <a:lstStyle/>
           <a:p>
             <a:r>
-              <a:rPr lang="fr-CH" smtClean="0"/>
-              <a:t>23.05.2018</a:t>
-            </a:r>
-            <a:endParaRPr lang="en-GB" dirty="0"/>
-          </a:p>
-        </p:txBody>
-      </p:sp>
-      <p:sp>
-        <p:nvSpPr>
-          <p:cNvPr id="5" name="Fußzeilenplatzhalter 4"/>
-          <p:cNvSpPr>
-            <a:spLocks noGrp="1"/>
-          </p:cNvSpPr>
-          <p:nvPr>
-            <p:ph type="ftr" sz="quarter" idx="11"/>
-          </p:nvPr>
-        </p:nvSpPr>
-        <p:spPr/>
-        <p:txBody>
-          <a:bodyPr/>
-          <a:lstStyle/>
-          <a:p>
-            <a:r>
               <a:rPr lang="en-GB" smtClean="0"/>
               <a:t>Group A</a:t>
             </a:r>
@@ -43441,7 +44593,7 @@
       </p:sp>
       <p:sp>
         <p:nvSpPr>
-          <p:cNvPr id="6" name="Foliennummernplatzhalter 5"/>
+          <p:cNvPr id="5" name="Foliennummernplatzhalter 4"/>
           <p:cNvSpPr>
             <a:spLocks noGrp="1"/>
           </p:cNvSpPr>
@@ -43465,7 +44617,7 @@
       </p:sp>
       <p:sp>
         <p:nvSpPr>
-          <p:cNvPr id="11" name="Titel 10"/>
+          <p:cNvPr id="10" name="Titel 9"/>
           <p:cNvSpPr>
             <a:spLocks noGrp="1"/>
           </p:cNvSpPr>
@@ -43473,11 +44625,20 @@
             <p:ph type="title"/>
           </p:nvPr>
         </p:nvSpPr>
-        <p:spPr/>
+        <p:spPr>
+          <a:xfrm>
+            <a:off x="323850" y="620714"/>
+            <a:ext cx="11537950" cy="503966"/>
+          </a:xfrm>
+        </p:spPr>
         <p:txBody>
           <a:bodyPr/>
           <a:lstStyle/>
           <a:p>
+            <a:r>
+              <a:rPr lang="en-GB" dirty="0" smtClean="0"/>
+              <a:t>Results</a:t>
+            </a:r>
             <a:endParaRPr lang="en-GB" dirty="0"/>
           </a:p>
         </p:txBody>
@@ -43485,7 +44646,7 @@
     </p:spTree>
     <p:extLst>
       <p:ext uri="{BB962C8B-B14F-4D97-AF65-F5344CB8AC3E}">
-        <p14:creationId xmlns:p14="http://schemas.microsoft.com/office/powerpoint/2010/main" val="572143329"/>
+        <p14:creationId xmlns:p14="http://schemas.microsoft.com/office/powerpoint/2010/main" val="1461997070"/>
       </p:ext>
     </p:extLst>
   </p:cSld>
@@ -43524,19 +44685,72 @@
       </p:grpSpPr>
       <p:sp>
         <p:nvSpPr>
-          <p:cNvPr id="2" name="Datumsplatzhalter 1"/>
-          <p:cNvSpPr>
-            <a:spLocks noGrp="1"/>
-          </p:cNvSpPr>
-          <p:nvPr>
-            <p:ph type="dt" sz="half" idx="10"/>
-          </p:nvPr>
-        </p:nvSpPr>
-        <p:spPr/>
+          <p:cNvPr id="11" name="Inhaltsplatzhalter 10"/>
+          <p:cNvSpPr>
+            <a:spLocks noGrp="1"/>
+          </p:cNvSpPr>
+          <p:nvPr>
+            <p:ph idx="1"/>
+          </p:nvPr>
+        </p:nvSpPr>
+        <p:spPr>
+          <a:xfrm>
+            <a:off x="323850" y="1268700"/>
+            <a:ext cx="11537950" cy="4965410"/>
+          </a:xfrm>
+        </p:spPr>
         <p:txBody>
           <a:bodyPr/>
           <a:lstStyle/>
           <a:p>
+            <a:pPr marL="0" indent="0">
+              <a:buNone/>
+            </a:pPr>
+            <a:endParaRPr lang="en-GB" dirty="0" smtClean="0"/>
+          </a:p>
+          <a:p>
+            <a:pPr marL="0" indent="0">
+              <a:buNone/>
+            </a:pPr>
+            <a:r>
+              <a:rPr lang="en-GB" dirty="0" smtClean="0"/>
+              <a:t>Costs</a:t>
+            </a:r>
+          </a:p>
+          <a:p>
+            <a:r>
+              <a:rPr lang="en-GB" dirty="0"/>
+              <a:t>Ideal vs. real (case 1/case 3</a:t>
+            </a:r>
+            <a:r>
+              <a:rPr lang="en-GB" dirty="0" smtClean="0"/>
+              <a:t>)</a:t>
+            </a:r>
+          </a:p>
+          <a:p>
+            <a:pPr lvl="1"/>
+            <a:r>
+              <a:rPr lang="en-GB" dirty="0" smtClean="0"/>
+              <a:t>Break-even price: 0.62 $/kg / 0.76 $/kg</a:t>
+            </a:r>
+          </a:p>
+        </p:txBody>
+      </p:sp>
+      <p:sp>
+        <p:nvSpPr>
+          <p:cNvPr id="3" name="Datumsplatzhalter 2"/>
+          <p:cNvSpPr>
+            <a:spLocks noGrp="1"/>
+          </p:cNvSpPr>
+          <p:nvPr>
+            <p:ph type="dt" sz="half" idx="10"/>
+          </p:nvPr>
+        </p:nvSpPr>
+        <p:spPr/>
+        <p:txBody>
+          <a:bodyPr/>
+          <a:lstStyle/>
+          <a:p>
             <a:r>
               <a:rPr lang="fr-CH" smtClean="0"/>
               <a:t>23.05.2018</a:t>
@@ -43547,7 +44761,7 @@
       </p:sp>
       <p:sp>
         <p:nvSpPr>
-          <p:cNvPr id="3" name="Fußzeilenplatzhalter 2"/>
+          <p:cNvPr id="4" name="Fußzeilenplatzhalter 3"/>
           <p:cNvSpPr>
             <a:spLocks noGrp="1"/>
           </p:cNvSpPr>
@@ -43570,7 +44784,7 @@
       </p:sp>
       <p:sp>
         <p:nvSpPr>
-          <p:cNvPr id="4" name="Foliennummernplatzhalter 3"/>
+          <p:cNvPr id="5" name="Foliennummernplatzhalter 4"/>
           <p:cNvSpPr>
             <a:spLocks noGrp="1"/>
           </p:cNvSpPr>
@@ -43594,7 +44808,7 @@
       </p:sp>
       <p:sp>
         <p:nvSpPr>
-          <p:cNvPr id="9" name="Titel 8"/>
+          <p:cNvPr id="10" name="Titel 9"/>
           <p:cNvSpPr>
             <a:spLocks noGrp="1"/>
           </p:cNvSpPr>
@@ -43602,19 +44816,118 @@
             <p:ph type="title"/>
           </p:nvPr>
         </p:nvSpPr>
-        <p:spPr/>
+        <p:spPr>
+          <a:xfrm>
+            <a:off x="323850" y="620714"/>
+            <a:ext cx="11537950" cy="503966"/>
+          </a:xfrm>
+        </p:spPr>
         <p:txBody>
           <a:bodyPr/>
           <a:lstStyle/>
           <a:p>
+            <a:r>
+              <a:rPr lang="en-GB" dirty="0" smtClean="0"/>
+              <a:t>Results</a:t>
+            </a:r>
             <a:endParaRPr lang="en-GB" dirty="0"/>
           </a:p>
         </p:txBody>
       </p:sp>
+      <p:pic>
+        <p:nvPicPr>
+          <p:cNvPr id="6" name="Image 5" descr="costplot1.png"/>
+          <p:cNvPicPr>
+            <a:picLocks noChangeAspect="1"/>
+          </p:cNvPicPr>
+          <p:nvPr/>
+        </p:nvPicPr>
+        <p:blipFill>
+          <a:blip r:embed="rId2" cstate="print">
+            <a:extLst>
+              <a:ext uri="{28A0092B-C50C-407E-A947-70E740481C1C}">
+                <a14:useLocalDpi xmlns:a14="http://schemas.microsoft.com/office/drawing/2010/main" val="0"/>
+              </a:ext>
+            </a:extLst>
+          </a:blip>
+          <a:stretch>
+            <a:fillRect/>
+          </a:stretch>
+        </p:blipFill>
+        <p:spPr>
+          <a:xfrm>
+            <a:off x="692869" y="2996940"/>
+            <a:ext cx="2938082" cy="2802065"/>
+          </a:xfrm>
+          <a:prstGeom prst="rect">
+            <a:avLst/>
+          </a:prstGeom>
+        </p:spPr>
+      </p:pic>
+      <p:pic>
+        <p:nvPicPr>
+          <p:cNvPr id="7" name="Image 6" descr="costplot2.png"/>
+          <p:cNvPicPr>
+            <a:picLocks noChangeAspect="1"/>
+          </p:cNvPicPr>
+          <p:nvPr/>
+        </p:nvPicPr>
+        <p:blipFill>
+          <a:blip r:embed="rId3" cstate="print">
+            <a:extLst>
+              <a:ext uri="{28A0092B-C50C-407E-A947-70E740481C1C}">
+                <a14:useLocalDpi xmlns:a14="http://schemas.microsoft.com/office/drawing/2010/main" val="0"/>
+              </a:ext>
+            </a:extLst>
+          </a:blip>
+          <a:stretch>
+            <a:fillRect/>
+          </a:stretch>
+        </p:blipFill>
+        <p:spPr>
+          <a:xfrm>
+            <a:off x="4221359" y="3001000"/>
+            <a:ext cx="2937510" cy="2803208"/>
+          </a:xfrm>
+          <a:prstGeom prst="rect">
+            <a:avLst/>
+          </a:prstGeom>
+        </p:spPr>
+      </p:pic>
+      <p:pic>
+        <p:nvPicPr>
+          <p:cNvPr id="8" name="Image 7" descr="costplot3.png"/>
+          <p:cNvPicPr>
+            <a:picLocks noChangeAspect="1"/>
+          </p:cNvPicPr>
+          <p:nvPr/>
+        </p:nvPicPr>
+        <p:blipFill>
+          <a:blip r:embed="rId4" cstate="print">
+            <a:extLst>
+              <a:ext uri="{28A0092B-C50C-407E-A947-70E740481C1C}">
+                <a14:useLocalDpi xmlns:a14="http://schemas.microsoft.com/office/drawing/2010/main" val="0"/>
+              </a:ext>
+            </a:extLst>
+          </a:blip>
+          <a:stretch>
+            <a:fillRect/>
+          </a:stretch>
+        </p:blipFill>
+        <p:spPr>
+          <a:xfrm>
+            <a:off x="7712110" y="3010144"/>
+            <a:ext cx="3204401" cy="2794064"/>
+          </a:xfrm>
+          <a:prstGeom prst="rect">
+            <a:avLst/>
+          </a:prstGeom>
+        </p:spPr>
+      </p:pic>
     </p:spTree>
     <p:extLst>
       <p:ext uri="{BB962C8B-B14F-4D97-AF65-F5344CB8AC3E}">
-        <p14:creationId xmlns:p14="http://schemas.microsoft.com/office/powerpoint/2010/main" val="3974297676"/>
+        <p14:creationId xmlns:p14="http://schemas.microsoft.com/office/powerpoint/2010/main" val="3886166668"/>
       </p:ext>
     </p:extLst>
   </p:cSld>
@@ -43653,12 +44966,12 @@
       </p:grpSpPr>
       <p:sp>
         <p:nvSpPr>
-          <p:cNvPr id="2" name="Datumsplatzhalter 1"/>
-          <p:cNvSpPr>
-            <a:spLocks noGrp="1"/>
-          </p:cNvSpPr>
-          <p:nvPr>
-            <p:ph type="dt" sz="half" idx="10"/>
+          <p:cNvPr id="11" name="Inhaltsplatzhalter 10"/>
+          <p:cNvSpPr>
+            <a:spLocks noGrp="1"/>
+          </p:cNvSpPr>
+          <p:nvPr>
+            <p:ph idx="1"/>
           </p:nvPr>
         </p:nvSpPr>
         <p:spPr/>
@@ -43666,6 +44979,25 @@
           <a:bodyPr/>
           <a:lstStyle/>
           <a:p>
+            <a:endParaRPr lang="en-GB" dirty="0"/>
+          </a:p>
+        </p:txBody>
+      </p:sp>
+      <p:sp>
+        <p:nvSpPr>
+          <p:cNvPr id="3" name="Datumsplatzhalter 2"/>
+          <p:cNvSpPr>
+            <a:spLocks noGrp="1"/>
+          </p:cNvSpPr>
+          <p:nvPr>
+            <p:ph type="dt" sz="half" idx="10"/>
+          </p:nvPr>
+        </p:nvSpPr>
+        <p:spPr/>
+        <p:txBody>
+          <a:bodyPr/>
+          <a:lstStyle/>
+          <a:p>
             <a:r>
               <a:rPr lang="fr-CH" smtClean="0"/>
               <a:t>23.05.2018</a:t>
@@ -43676,7 +45008,7 @@
       </p:sp>
       <p:sp>
         <p:nvSpPr>
-          <p:cNvPr id="3" name="Fußzeilenplatzhalter 2"/>
+          <p:cNvPr id="4" name="Fußzeilenplatzhalter 3"/>
           <p:cNvSpPr>
             <a:spLocks noGrp="1"/>
           </p:cNvSpPr>
@@ -43699,7 +45031,7 @@
       </p:sp>
       <p:sp>
         <p:nvSpPr>
-          <p:cNvPr id="4" name="Foliennummernplatzhalter 3"/>
+          <p:cNvPr id="5" name="Foliennummernplatzhalter 4"/>
           <p:cNvSpPr>
             <a:spLocks noGrp="1"/>
           </p:cNvSpPr>
@@ -43723,20 +45055,27 @@
       </p:sp>
       <p:sp>
         <p:nvSpPr>
-          <p:cNvPr id="9" name="Bildplatzhalter 8"/>
-          <p:cNvSpPr>
-            <a:spLocks noGrp="1"/>
-          </p:cNvSpPr>
-          <p:nvPr>
-            <p:ph type="pic" sz="quarter" idx="13"/>
+          <p:cNvPr id="10" name="Titel 9"/>
+          <p:cNvSpPr>
+            <a:spLocks noGrp="1"/>
+          </p:cNvSpPr>
+          <p:nvPr>
+            <p:ph type="title"/>
           </p:nvPr>
         </p:nvSpPr>
         <p:spPr/>
+        <p:txBody>
+          <a:bodyPr/>
+          <a:lstStyle/>
+          <a:p>
+            <a:endParaRPr lang="en-GB" dirty="0"/>
+          </a:p>
+        </p:txBody>
       </p:sp>
     </p:spTree>
     <p:extLst>
       <p:ext uri="{BB962C8B-B14F-4D97-AF65-F5344CB8AC3E}">
-        <p14:creationId xmlns:p14="http://schemas.microsoft.com/office/powerpoint/2010/main" val="1116238283"/>
+        <p14:creationId xmlns:p14="http://schemas.microsoft.com/office/powerpoint/2010/main" val="2857788226"/>
       </p:ext>
     </p:extLst>
   </p:cSld>
@@ -43775,12 +45114,12 @@
       </p:grpSpPr>
       <p:sp>
         <p:nvSpPr>
-          <p:cNvPr id="7" name="Inhaltsplatzhalter 6"/>
-          <p:cNvSpPr>
-            <a:spLocks noGrp="1"/>
-          </p:cNvSpPr>
-          <p:nvPr>
-            <p:ph idx="1"/>
+          <p:cNvPr id="11" name="Titel 10"/>
+          <p:cNvSpPr>
+            <a:spLocks noGrp="1"/>
+          </p:cNvSpPr>
+          <p:nvPr>
+            <p:ph type="ctrTitle"/>
           </p:nvPr>
         </p:nvSpPr>
         <p:spPr/>
@@ -43788,134 +45127,18 @@
           <a:bodyPr/>
           <a:lstStyle/>
           <a:p>
-            <a:pPr marL="0" indent="0">
-              <a:buNone/>
-            </a:pPr>
-            <a:r>
-              <a:rPr lang="en-GB" sz="1800" b="1" dirty="0" smtClean="0"/>
-              <a:t>ETH Zurich</a:t>
-            </a:r>
-          </a:p>
-          <a:p>
-            <a:pPr marL="0" indent="0">
-              <a:buNone/>
-            </a:pPr>
-            <a:r>
-              <a:rPr lang="en-GB" sz="1800" dirty="0"/>
-              <a:t>Organisational </a:t>
-            </a:r>
-            <a:r>
-              <a:rPr lang="en-GB" sz="1800" dirty="0" smtClean="0"/>
-              <a:t>unit</a:t>
-            </a:r>
-          </a:p>
-          <a:p>
-            <a:pPr marL="0" indent="0">
-              <a:buNone/>
-            </a:pPr>
-            <a:r>
-              <a:rPr lang="en-GB" sz="1800" dirty="0"/>
-              <a:t>Street address</a:t>
-            </a:r>
-          </a:p>
-          <a:p>
-            <a:pPr marL="0" indent="0">
-              <a:buNone/>
-            </a:pPr>
-            <a:r>
-              <a:rPr lang="en-GB" sz="1800" dirty="0"/>
-              <a:t>Postcode City</a:t>
-            </a:r>
-          </a:p>
-          <a:p>
-            <a:pPr marL="0" indent="0">
-              <a:buNone/>
-            </a:pPr>
-            <a:endParaRPr lang="en-GB" sz="1800" dirty="0" smtClean="0"/>
-          </a:p>
-          <a:p>
-            <a:pPr marL="0" indent="0">
-              <a:buNone/>
-            </a:pPr>
-            <a:r>
-              <a:rPr lang="en-GB" sz="1800" dirty="0"/>
-              <a:t>www.ethz.ch/en.html</a:t>
-            </a:r>
-          </a:p>
-          <a:p>
-            <a:pPr marL="0" indent="0">
-              <a:buNone/>
-            </a:pPr>
-            <a:endParaRPr lang="en-GB" sz="1800" dirty="0" smtClean="0"/>
-          </a:p>
-          <a:p>
-            <a:pPr marL="0" indent="0">
-              <a:buNone/>
-            </a:pPr>
-            <a:r>
-              <a:rPr lang="en-US" sz="1800" dirty="0"/>
-              <a:t>Publisher: </a:t>
-            </a:r>
-            <a:r>
-              <a:rPr lang="en-GB" sz="1800" dirty="0" smtClean="0"/>
-              <a:t>Organisational</a:t>
-            </a:r>
-            <a:r>
-              <a:rPr lang="en-US" sz="1800" dirty="0" smtClean="0"/>
-              <a:t> </a:t>
-            </a:r>
-            <a:r>
-              <a:rPr lang="en-US" sz="1800" dirty="0"/>
-              <a:t>unit of ETH Zurich</a:t>
-            </a:r>
-          </a:p>
-          <a:p>
-            <a:pPr marL="0" indent="0">
-              <a:buNone/>
-            </a:pPr>
-            <a:r>
-              <a:rPr lang="en-GB" sz="1800" dirty="0"/>
-              <a:t>Design: Designer Name</a:t>
-            </a:r>
-          </a:p>
-          <a:p>
-            <a:pPr marL="0" indent="0">
-              <a:buNone/>
-            </a:pPr>
-            <a:r>
-              <a:rPr lang="en-US" sz="1800" dirty="0"/>
-              <a:t>Images: Credit (slide xx), Credit (slide xx</a:t>
-            </a:r>
-            <a:r>
-              <a:rPr lang="en-US" sz="1800" dirty="0" smtClean="0"/>
-              <a:t>)</a:t>
-            </a:r>
-          </a:p>
-          <a:p>
-            <a:pPr marL="0" indent="0">
-              <a:buNone/>
-            </a:pPr>
-            <a:endParaRPr lang="en-GB" sz="1800" dirty="0" smtClean="0"/>
-          </a:p>
-          <a:p>
-            <a:pPr marL="0" indent="0">
-              <a:buNone/>
-            </a:pPr>
-            <a:r>
-              <a:rPr lang="en-GB" sz="1800" dirty="0"/>
-              <a:t>© ETH Zurich, December 2013</a:t>
-            </a:r>
-          </a:p>
-        </p:txBody>
-      </p:sp>
-      <p:sp>
-        <p:nvSpPr>
-          <p:cNvPr id="2" name="Datumsplatzhalter 1"/>
-          <p:cNvSpPr>
-            <a:spLocks noGrp="1"/>
-          </p:cNvSpPr>
-          <p:nvPr>
-            <p:ph type="dt" sz="half" idx="10"/>
+            <a:endParaRPr lang="en-GB" dirty="0"/>
+          </a:p>
+        </p:txBody>
+      </p:sp>
+      <p:sp>
+        <p:nvSpPr>
+          <p:cNvPr id="12" name="Untertitel 11"/>
+          <p:cNvSpPr>
+            <a:spLocks noGrp="1"/>
+          </p:cNvSpPr>
+          <p:nvPr>
+            <p:ph type="subTitle" idx="1"/>
           </p:nvPr>
         </p:nvSpPr>
         <p:spPr/>
@@ -43923,6 +45146,25 @@
           <a:bodyPr/>
           <a:lstStyle/>
           <a:p>
+            <a:endParaRPr lang="en-GB" dirty="0"/>
+          </a:p>
+        </p:txBody>
+      </p:sp>
+      <p:sp>
+        <p:nvSpPr>
+          <p:cNvPr id="4" name="Datumsplatzhalter 3"/>
+          <p:cNvSpPr>
+            <a:spLocks noGrp="1"/>
+          </p:cNvSpPr>
+          <p:nvPr>
+            <p:ph type="dt" sz="half" idx="10"/>
+          </p:nvPr>
+        </p:nvSpPr>
+        <p:spPr/>
+        <p:txBody>
+          <a:bodyPr/>
+          <a:lstStyle/>
+          <a:p>
             <a:r>
               <a:rPr lang="fr-CH" smtClean="0"/>
               <a:t>23.05.2018</a:t>
@@ -43933,7 +45175,7 @@
       </p:sp>
       <p:sp>
         <p:nvSpPr>
-          <p:cNvPr id="3" name="Fußzeilenplatzhalter 2"/>
+          <p:cNvPr id="5" name="Fußzeilenplatzhalter 4"/>
           <p:cNvSpPr>
             <a:spLocks noGrp="1"/>
           </p:cNvSpPr>
@@ -43956,7 +45198,7 @@
       </p:sp>
       <p:sp>
         <p:nvSpPr>
-          <p:cNvPr id="4" name="Foliennummernplatzhalter 3"/>
+          <p:cNvPr id="6" name="Foliennummernplatzhalter 5"/>
           <p:cNvSpPr>
             <a:spLocks noGrp="1"/>
           </p:cNvSpPr>
@@ -43971,6 +45213,7 @@
           <a:p>
             <a:fld id="{6C6AE60A-B69C-4790-82F7-3882EDF23186}" type="slidenum">
               <a:rPr lang="en-GB" smtClean="0"/>
+              <a:pPr/>
               <a:t>9</a:t>
             </a:fld>
             <a:endParaRPr lang="en-GB" dirty="0"/>
@@ -43979,30 +45222,20 @@
       </p:sp>
       <p:sp>
         <p:nvSpPr>
-          <p:cNvPr id="6" name="Titel 5"/>
-          <p:cNvSpPr>
-            <a:spLocks noGrp="1"/>
-          </p:cNvSpPr>
-          <p:nvPr>
-            <p:ph type="title"/>
+          <p:cNvPr id="13" name="Bildplatzhalter 12"/>
+          <p:cNvSpPr>
+            <a:spLocks noGrp="1"/>
+          </p:cNvSpPr>
+          <p:nvPr>
+            <p:ph type="pic" sz="quarter" idx="13"/>
           </p:nvPr>
         </p:nvSpPr>
         <p:spPr/>
-        <p:txBody>
-          <a:bodyPr/>
-          <a:lstStyle/>
-          <a:p>
-            <a:r>
-              <a:rPr lang="en-GB" dirty="0"/>
-              <a:t>Contact information and credits</a:t>
-            </a:r>
-          </a:p>
-        </p:txBody>
       </p:sp>
     </p:spTree>
     <p:extLst>
       <p:ext uri="{BB962C8B-B14F-4D97-AF65-F5344CB8AC3E}">
-        <p14:creationId xmlns:p14="http://schemas.microsoft.com/office/powerpoint/2010/main" val="949753625"/>
+        <p14:creationId xmlns:p14="http://schemas.microsoft.com/office/powerpoint/2010/main" val="3801771638"/>
       </p:ext>
     </p:extLst>
   </p:cSld>
@@ -44432,7 +45665,7 @@
   </a:custClrLst>
   <a:extLst>
     <a:ext uri="{05A4C25C-085E-4340-85A3-A5531E510DB2}">
-      <thm15:themeFamily xmlns="" xmlns:thm15="http://schemas.microsoft.com/office/thememl/2012/main" name="eth_praesentation_16zu9_ETH1_d" id="{F9B539DF-8A69-4439-8089-24A40A980317}" vid="{5D9C827C-5BA7-402A-8ABB-C7F0BA4B4DEC}"/>
+      <thm15:themeFamily xmlns:thm15="http://schemas.microsoft.com/office/thememl/2012/main" xmlns="" name="eth_praesentation_16zu9_ETH1_d" id="{F9B539DF-8A69-4439-8089-24A40A980317}" vid="{5D9C827C-5BA7-402A-8ABB-C7F0BA4B4DEC}"/>
     </a:ext>
   </a:extLst>
 </a:theme>
@@ -45453,7 +46686,7 @@
   </a:custClrLst>
   <a:extLst>
     <a:ext uri="{05A4C25C-085E-4340-85A3-A5531E510DB2}">
-      <thm15:themeFamily xmlns="" xmlns:thm15="http://schemas.microsoft.com/office/thememl/2012/main" name="eth_praesentation_16zu9_ETH1_d" id="{F9B539DF-8A69-4439-8089-24A40A980317}" vid="{5D9C827C-5BA7-402A-8ABB-C7F0BA4B4DEC}"/>
+      <thm15:themeFamily xmlns:thm15="http://schemas.microsoft.com/office/thememl/2012/main" xmlns="" name="eth_praesentation_16zu9_ETH1_d" id="{F9B539DF-8A69-4439-8089-24A40A980317}" vid="{5D9C827C-5BA7-402A-8ABB-C7F0BA4B4DEC}"/>
     </a:ext>
   </a:extLst>
 </a:theme>
@@ -45869,7 +47102,7 @@
   </a:custClrLst>
   <a:extLst>
     <a:ext uri="{05A4C25C-085E-4340-85A3-A5531E510DB2}">
-      <thm15:themeFamily xmlns="" xmlns:thm15="http://schemas.microsoft.com/office/thememl/2012/main" name="eth_praesentation_16zu9_ETH1_d" id="{F9B539DF-8A69-4439-8089-24A40A980317}" vid="{5D9C827C-5BA7-402A-8ABB-C7F0BA4B4DEC}"/>
+      <thm15:themeFamily xmlns:thm15="http://schemas.microsoft.com/office/thememl/2012/main" xmlns="" name="eth_praesentation_16zu9_ETH1_d" id="{F9B539DF-8A69-4439-8089-24A40A980317}" vid="{5D9C827C-5BA7-402A-8ABB-C7F0BA4B4DEC}"/>
     </a:ext>
   </a:extLst>
 </a:theme>
@@ -46285,7 +47518,7 @@
   </a:custClrLst>
   <a:extLst>
     <a:ext uri="{05A4C25C-085E-4340-85A3-A5531E510DB2}">
-      <thm15:themeFamily xmlns="" xmlns:thm15="http://schemas.microsoft.com/office/thememl/2012/main" name="eth_praesentation_16zu9_ETH1_d" id="{F9B539DF-8A69-4439-8089-24A40A980317}" vid="{5D9C827C-5BA7-402A-8ABB-C7F0BA4B4DEC}"/>
+      <thm15:themeFamily xmlns:thm15="http://schemas.microsoft.com/office/thememl/2012/main" xmlns="" name="eth_praesentation_16zu9_ETH1_d" id="{F9B539DF-8A69-4439-8089-24A40A980317}" vid="{5D9C827C-5BA7-402A-8ABB-C7F0BA4B4DEC}"/>
     </a:ext>
   </a:extLst>
 </a:theme>
@@ -46701,7 +47934,7 @@
   </a:custClrLst>
   <a:extLst>
     <a:ext uri="{05A4C25C-085E-4340-85A3-A5531E510DB2}">
-      <thm15:themeFamily xmlns="" xmlns:thm15="http://schemas.microsoft.com/office/thememl/2012/main" name="eth_praesentation_16zu9_ETH1_d" id="{F9B539DF-8A69-4439-8089-24A40A980317}" vid="{5D9C827C-5BA7-402A-8ABB-C7F0BA4B4DEC}"/>
+      <thm15:themeFamily xmlns:thm15="http://schemas.microsoft.com/office/thememl/2012/main" xmlns="" name="eth_praesentation_16zu9_ETH1_d" id="{F9B539DF-8A69-4439-8089-24A40A980317}" vid="{5D9C827C-5BA7-402A-8ABB-C7F0BA4B4DEC}"/>
     </a:ext>
   </a:extLst>
 </a:theme>
@@ -47117,7 +48350,7 @@
   </a:custClrLst>
   <a:extLst>
     <a:ext uri="{05A4C25C-085E-4340-85A3-A5531E510DB2}">
-      <thm15:themeFamily xmlns="" xmlns:thm15="http://schemas.microsoft.com/office/thememl/2012/main" name="eth_praesentation_16zu9_ETH1_d" id="{F9B539DF-8A69-4439-8089-24A40A980317}" vid="{5D9C827C-5BA7-402A-8ABB-C7F0BA4B4DEC}"/>
+      <thm15:themeFamily xmlns:thm15="http://schemas.microsoft.com/office/thememl/2012/main" xmlns="" name="eth_praesentation_16zu9_ETH1_d" id="{F9B539DF-8A69-4439-8089-24A40A980317}" vid="{5D9C827C-5BA7-402A-8ABB-C7F0BA4B4DEC}"/>
     </a:ext>
   </a:extLst>
 </a:theme>
@@ -47533,7 +48766,7 @@
   </a:custClrLst>
   <a:extLst>
     <a:ext uri="{05A4C25C-085E-4340-85A3-A5531E510DB2}">
-      <thm15:themeFamily xmlns="" xmlns:thm15="http://schemas.microsoft.com/office/thememl/2012/main" name="eth_praesentation_16zu9_ETH1_d" id="{F9B539DF-8A69-4439-8089-24A40A980317}" vid="{5D9C827C-5BA7-402A-8ABB-C7F0BA4B4DEC}"/>
+      <thm15:themeFamily xmlns:thm15="http://schemas.microsoft.com/office/thememl/2012/main" xmlns="" name="eth_praesentation_16zu9_ETH1_d" id="{F9B539DF-8A69-4439-8089-24A40A980317}" vid="{5D9C827C-5BA7-402A-8ABB-C7F0BA4B4DEC}"/>
     </a:ext>
   </a:extLst>
 </a:theme>
@@ -47949,7 +49182,7 @@
   </a:custClrLst>
   <a:extLst>
     <a:ext uri="{05A4C25C-085E-4340-85A3-A5531E510DB2}">
-      <thm15:themeFamily xmlns="" xmlns:thm15="http://schemas.microsoft.com/office/thememl/2012/main" name="eth_praesentation_16zu9_ETH1_d" id="{F9B539DF-8A69-4439-8089-24A40A980317}" vid="{5D9C827C-5BA7-402A-8ABB-C7F0BA4B4DEC}"/>
+      <thm15:themeFamily xmlns:thm15="http://schemas.microsoft.com/office/thememl/2012/main" xmlns="" name="eth_praesentation_16zu9_ETH1_d" id="{F9B539DF-8A69-4439-8089-24A40A980317}" vid="{5D9C827C-5BA7-402A-8ABB-C7F0BA4B4DEC}"/>
     </a:ext>
   </a:extLst>
 </a:theme>
@@ -48365,7 +49598,7 @@
   </a:custClrLst>
   <a:extLst>
     <a:ext uri="{05A4C25C-085E-4340-85A3-A5531E510DB2}">
-      <thm15:themeFamily xmlns="" xmlns:thm15="http://schemas.microsoft.com/office/thememl/2012/main" name="eth_praesentation_16zu9_ETH1_d" id="{F9B539DF-8A69-4439-8089-24A40A980317}" vid="{5D9C827C-5BA7-402A-8ABB-C7F0BA4B4DEC}"/>
+      <thm15:themeFamily xmlns:thm15="http://schemas.microsoft.com/office/thememl/2012/main" xmlns="" name="eth_praesentation_16zu9_ETH1_d" id="{F9B539DF-8A69-4439-8089-24A40A980317}" vid="{5D9C827C-5BA7-402A-8ABB-C7F0BA4B4DEC}"/>
     </a:ext>
   </a:extLst>
 </a:theme>

</xml_diff>

<commit_message>
Addition of slides for nh3 absorber to power point presentation
</commit_message>
<xml_diff>
--- a/Case_Study_presentation.pptx
+++ b/Case_Study_presentation.pptx
@@ -13,29 +13,31 @@
     <p:sldMasterId id="2147483849" r:id="rId9"/>
   </p:sldMasterIdLst>
   <p:notesMasterIdLst>
-    <p:notesMasterId r:id="rId27"/>
+    <p:notesMasterId r:id="rId29"/>
   </p:notesMasterIdLst>
   <p:handoutMasterIdLst>
-    <p:handoutMasterId r:id="rId28"/>
+    <p:handoutMasterId r:id="rId30"/>
   </p:handoutMasterIdLst>
   <p:sldIdLst>
     <p:sldId id="268" r:id="rId10"/>
     <p:sldId id="269" r:id="rId11"/>
-    <p:sldId id="281" r:id="rId12"/>
-    <p:sldId id="282" r:id="rId13"/>
-    <p:sldId id="276" r:id="rId14"/>
-    <p:sldId id="277" r:id="rId15"/>
-    <p:sldId id="278" r:id="rId16"/>
-    <p:sldId id="279" r:id="rId17"/>
-    <p:sldId id="280" r:id="rId18"/>
-    <p:sldId id="272" r:id="rId19"/>
-    <p:sldId id="270" r:id="rId20"/>
-    <p:sldId id="271" r:id="rId21"/>
-    <p:sldId id="273" r:id="rId22"/>
-    <p:sldId id="274" r:id="rId23"/>
-    <p:sldId id="275" r:id="rId24"/>
-    <p:sldId id="266" r:id="rId25"/>
-    <p:sldId id="267" r:id="rId26"/>
+    <p:sldId id="283" r:id="rId12"/>
+    <p:sldId id="284" r:id="rId13"/>
+    <p:sldId id="281" r:id="rId14"/>
+    <p:sldId id="282" r:id="rId15"/>
+    <p:sldId id="276" r:id="rId16"/>
+    <p:sldId id="277" r:id="rId17"/>
+    <p:sldId id="278" r:id="rId18"/>
+    <p:sldId id="279" r:id="rId19"/>
+    <p:sldId id="280" r:id="rId20"/>
+    <p:sldId id="272" r:id="rId21"/>
+    <p:sldId id="270" r:id="rId22"/>
+    <p:sldId id="271" r:id="rId23"/>
+    <p:sldId id="273" r:id="rId24"/>
+    <p:sldId id="274" r:id="rId25"/>
+    <p:sldId id="275" r:id="rId26"/>
+    <p:sldId id="266" r:id="rId27"/>
+    <p:sldId id="267" r:id="rId28"/>
   </p:sldIdLst>
   <p:sldSz cx="12187238" cy="6858000"/>
   <p:notesSz cx="7099300" cy="10234613"/>
@@ -294,7 +296,7 @@
               <a:rPr lang="de-DE" smtClean="0">
                 <a:latin typeface="Arial" panose="020B0604020202020204" pitchFamily="34" charset="0"/>
               </a:rPr>
-              <a:t>21.05.18</a:t>
+              <a:t>22.05.2018</a:t>
             </a:fld>
             <a:endParaRPr lang="de-DE" dirty="0">
               <a:latin typeface="Arial" panose="020B0604020202020204" pitchFamily="34" charset="0"/>
@@ -473,7 +475,7 @@
             <a:fld id="{BCDB334D-D17F-49C4-91DD-37BB7E818209}" type="datetimeFigureOut">
               <a:rPr lang="de-CH" smtClean="0"/>
               <a:pPr/>
-              <a:t>21.05.18</a:t>
+              <a:t>22.05.2018</a:t>
             </a:fld>
             <a:endParaRPr lang="de-CH" dirty="0"/>
           </a:p>
@@ -812,7 +814,7 @@
           <a:p>
             <a:fld id="{A51C0C35-A9A2-4EFD-9BAF-1E52E29E03D1}" type="slidenum">
               <a:rPr lang="de-CH" smtClean="0"/>
-              <a:t>11</a:t>
+              <a:t>13</a:t>
             </a:fld>
             <a:endParaRPr lang="de-CH"/>
           </a:p>
@@ -41666,12 +41668,68 @@
             <p:ph idx="1"/>
           </p:nvPr>
         </p:nvSpPr>
-        <p:spPr/>
+        <p:spPr>
+          <a:xfrm>
+            <a:off x="323850" y="1268700"/>
+            <a:ext cx="11537950" cy="4965410"/>
+          </a:xfrm>
+        </p:spPr>
         <p:txBody>
           <a:bodyPr/>
           <a:lstStyle/>
           <a:p>
-            <a:endParaRPr lang="en-GB" dirty="0"/>
+            <a:pPr marL="0" indent="0">
+              <a:buNone/>
+            </a:pPr>
+            <a:endParaRPr lang="en-GB" dirty="0"/>
+          </a:p>
+          <a:p>
+            <a:pPr marL="0" indent="0">
+              <a:buNone/>
+            </a:pPr>
+            <a:r>
+              <a:rPr lang="en-GB" dirty="0"/>
+              <a:t>HCN distillation:</a:t>
+            </a:r>
+          </a:p>
+          <a:p>
+            <a:r>
+              <a:rPr lang="en-GB" dirty="0"/>
+              <a:t>Ideal vs. real (case 1/case 3)</a:t>
+            </a:r>
+          </a:p>
+          <a:p>
+            <a:pPr lvl="1"/>
+            <a:r>
+              <a:rPr lang="en-GB" dirty="0"/>
+              <a:t>Column height: 9.36 m / 10.08 m</a:t>
+            </a:r>
+          </a:p>
+          <a:p>
+            <a:pPr lvl="1"/>
+            <a:r>
+              <a:rPr lang="en-GB" dirty="0"/>
+              <a:t>Diameter: 1.73 m / 1.92 m</a:t>
+            </a:r>
+          </a:p>
+          <a:p>
+            <a:pPr lvl="1"/>
+            <a:r>
+              <a:rPr lang="en-GB" dirty="0"/>
+              <a:t>Heat exchanger area: 0.057 m</a:t>
+            </a:r>
+            <a:r>
+              <a:rPr lang="en-GB" baseline="30000" dirty="0"/>
+              <a:t>2</a:t>
+            </a:r>
+            <a:r>
+              <a:rPr lang="en-GB" dirty="0"/>
+              <a:t> / 0.056 m</a:t>
+            </a:r>
+            <a:r>
+              <a:rPr lang="en-GB" baseline="30000" dirty="0"/>
+              <a:t>2</a:t>
+            </a:r>
           </a:p>
         </p:txBody>
       </p:sp>
@@ -41755,19 +41813,27 @@
             <p:ph type="title"/>
           </p:nvPr>
         </p:nvSpPr>
-        <p:spPr/>
+        <p:spPr>
+          <a:xfrm>
+            <a:off x="323850" y="620714"/>
+            <a:ext cx="11537950" cy="503966"/>
+          </a:xfrm>
+        </p:spPr>
         <p:txBody>
           <a:bodyPr/>
           <a:lstStyle/>
           <a:p>
-            <a:endParaRPr lang="en-GB" dirty="0"/>
+            <a:r>
+              <a:rPr lang="en-GB" dirty="0"/>
+              <a:t>Results</a:t>
+            </a:r>
           </a:p>
         </p:txBody>
       </p:sp>
     </p:spTree>
     <p:extLst>
       <p:ext uri="{BB962C8B-B14F-4D97-AF65-F5344CB8AC3E}">
-        <p14:creationId xmlns:p14="http://schemas.microsoft.com/office/powerpoint/2010/main" val="2857788226"/>
+        <p14:creationId xmlns:p14="http://schemas.microsoft.com/office/powerpoint/2010/main" val="1461997070"/>
       </p:ext>
     </p:extLst>
   </p:cSld>
@@ -41799,31 +41865,61 @@
       </p:grpSpPr>
       <p:sp>
         <p:nvSpPr>
-          <p:cNvPr id="11" name="Titel 10"/>
-          <p:cNvSpPr>
-            <a:spLocks noGrp="1"/>
-          </p:cNvSpPr>
-          <p:nvPr>
-            <p:ph type="ctrTitle"/>
-          </p:nvPr>
-        </p:nvSpPr>
-        <p:spPr/>
+          <p:cNvPr id="11" name="Inhaltsplatzhalter 10"/>
+          <p:cNvSpPr>
+            <a:spLocks noGrp="1"/>
+          </p:cNvSpPr>
+          <p:nvPr>
+            <p:ph idx="1"/>
+          </p:nvPr>
+        </p:nvSpPr>
+        <p:spPr>
+          <a:xfrm>
+            <a:off x="323850" y="1268700"/>
+            <a:ext cx="11537950" cy="4965410"/>
+          </a:xfrm>
+        </p:spPr>
         <p:txBody>
           <a:bodyPr/>
           <a:lstStyle/>
           <a:p>
-            <a:endParaRPr lang="en-GB" dirty="0"/>
-          </a:p>
-        </p:txBody>
-      </p:sp>
-      <p:sp>
-        <p:nvSpPr>
-          <p:cNvPr id="12" name="Untertitel 11"/>
-          <p:cNvSpPr>
-            <a:spLocks noGrp="1"/>
-          </p:cNvSpPr>
-          <p:nvPr>
-            <p:ph type="subTitle" idx="1"/>
+            <a:pPr marL="0" indent="0">
+              <a:buNone/>
+            </a:pPr>
+            <a:endParaRPr lang="en-GB" dirty="0"/>
+          </a:p>
+          <a:p>
+            <a:pPr marL="0" indent="0">
+              <a:buNone/>
+            </a:pPr>
+            <a:r>
+              <a:rPr lang="en-GB" dirty="0"/>
+              <a:t>Costs</a:t>
+            </a:r>
+          </a:p>
+          <a:p>
+            <a:r>
+              <a:rPr lang="en-GB" dirty="0"/>
+              <a:t>Ideal vs. real (case 1/case 3)</a:t>
+            </a:r>
+          </a:p>
+          <a:p>
+            <a:pPr lvl="1"/>
+            <a:r>
+              <a:rPr lang="en-GB" dirty="0"/>
+              <a:t>Break-even price: 0.62 $/kg / 0.76 $/kg</a:t>
+            </a:r>
+          </a:p>
+        </p:txBody>
+      </p:sp>
+      <p:sp>
+        <p:nvSpPr>
+          <p:cNvPr id="3" name="Datumsplatzhalter 2"/>
+          <p:cNvSpPr>
+            <a:spLocks noGrp="1"/>
+          </p:cNvSpPr>
+          <p:nvPr>
+            <p:ph type="dt" sz="half" idx="10"/>
           </p:nvPr>
         </p:nvSpPr>
         <p:spPr/>
@@ -41831,18 +41927,22 @@
           <a:bodyPr/>
           <a:lstStyle/>
           <a:p>
-            <a:endParaRPr lang="en-GB" dirty="0"/>
-          </a:p>
-        </p:txBody>
-      </p:sp>
-      <p:sp>
-        <p:nvSpPr>
-          <p:cNvPr id="4" name="Datumsplatzhalter 3"/>
-          <p:cNvSpPr>
-            <a:spLocks noGrp="1"/>
-          </p:cNvSpPr>
-          <p:nvPr>
-            <p:ph type="dt" sz="half" idx="10"/>
+            <a:r>
+              <a:rPr lang="fr-CH"/>
+              <a:t>23.05.2018</a:t>
+            </a:r>
+            <a:endParaRPr lang="en-GB" dirty="0"/>
+          </a:p>
+        </p:txBody>
+      </p:sp>
+      <p:sp>
+        <p:nvSpPr>
+          <p:cNvPr id="4" name="Fußzeilenplatzhalter 3"/>
+          <p:cNvSpPr>
+            <a:spLocks noGrp="1"/>
+          </p:cNvSpPr>
+          <p:nvPr>
+            <p:ph type="ftr" sz="quarter" idx="11"/>
           </p:nvPr>
         </p:nvSpPr>
         <p:spPr/>
@@ -41851,29 +41951,6 @@
           <a:lstStyle/>
           <a:p>
             <a:r>
-              <a:rPr lang="fr-CH"/>
-              <a:t>23.05.2018</a:t>
-            </a:r>
-            <a:endParaRPr lang="en-GB" dirty="0"/>
-          </a:p>
-        </p:txBody>
-      </p:sp>
-      <p:sp>
-        <p:nvSpPr>
-          <p:cNvPr id="5" name="Fußzeilenplatzhalter 4"/>
-          <p:cNvSpPr>
-            <a:spLocks noGrp="1"/>
-          </p:cNvSpPr>
-          <p:nvPr>
-            <p:ph type="ftr" sz="quarter" idx="11"/>
-          </p:nvPr>
-        </p:nvSpPr>
-        <p:spPr/>
-        <p:txBody>
-          <a:bodyPr/>
-          <a:lstStyle/>
-          <a:p>
-            <a:r>
               <a:rPr lang="en-GB"/>
               <a:t>Group A</a:t>
             </a:r>
@@ -41883,7 +41960,7 @@
       </p:sp>
       <p:sp>
         <p:nvSpPr>
-          <p:cNvPr id="6" name="Foliennummernplatzhalter 5"/>
+          <p:cNvPr id="5" name="Foliennummernplatzhalter 4"/>
           <p:cNvSpPr>
             <a:spLocks noGrp="1"/>
           </p:cNvSpPr>
@@ -41900,6 +41977,405 @@
               <a:rPr lang="en-GB" smtClean="0"/>
               <a:pPr/>
               <a:t>11</a:t>
+            </a:fld>
+            <a:endParaRPr lang="en-GB" dirty="0"/>
+          </a:p>
+        </p:txBody>
+      </p:sp>
+      <p:sp>
+        <p:nvSpPr>
+          <p:cNvPr id="10" name="Titel 9"/>
+          <p:cNvSpPr>
+            <a:spLocks noGrp="1"/>
+          </p:cNvSpPr>
+          <p:nvPr>
+            <p:ph type="title"/>
+          </p:nvPr>
+        </p:nvSpPr>
+        <p:spPr>
+          <a:xfrm>
+            <a:off x="323850" y="620714"/>
+            <a:ext cx="11537950" cy="503966"/>
+          </a:xfrm>
+        </p:spPr>
+        <p:txBody>
+          <a:bodyPr/>
+          <a:lstStyle/>
+          <a:p>
+            <a:r>
+              <a:rPr lang="en-GB" dirty="0"/>
+              <a:t>Results</a:t>
+            </a:r>
+          </a:p>
+        </p:txBody>
+      </p:sp>
+      <p:pic>
+        <p:nvPicPr>
+          <p:cNvPr id="6" name="Image 5" descr="costplot1.png"/>
+          <p:cNvPicPr>
+            <a:picLocks noChangeAspect="1"/>
+          </p:cNvPicPr>
+          <p:nvPr/>
+        </p:nvPicPr>
+        <p:blipFill>
+          <a:blip r:embed="rId2" cstate="print">
+            <a:extLst>
+              <a:ext uri="{28A0092B-C50C-407E-A947-70E740481C1C}">
+                <a14:useLocalDpi xmlns:a14="http://schemas.microsoft.com/office/drawing/2010/main" val="0"/>
+              </a:ext>
+            </a:extLst>
+          </a:blip>
+          <a:stretch>
+            <a:fillRect/>
+          </a:stretch>
+        </p:blipFill>
+        <p:spPr>
+          <a:xfrm>
+            <a:off x="692869" y="2996940"/>
+            <a:ext cx="2938082" cy="2802065"/>
+          </a:xfrm>
+          <a:prstGeom prst="rect">
+            <a:avLst/>
+          </a:prstGeom>
+        </p:spPr>
+      </p:pic>
+      <p:pic>
+        <p:nvPicPr>
+          <p:cNvPr id="7" name="Image 6" descr="costplot2.png"/>
+          <p:cNvPicPr>
+            <a:picLocks noChangeAspect="1"/>
+          </p:cNvPicPr>
+          <p:nvPr/>
+        </p:nvPicPr>
+        <p:blipFill>
+          <a:blip r:embed="rId3" cstate="print">
+            <a:extLst>
+              <a:ext uri="{28A0092B-C50C-407E-A947-70E740481C1C}">
+                <a14:useLocalDpi xmlns:a14="http://schemas.microsoft.com/office/drawing/2010/main" val="0"/>
+              </a:ext>
+            </a:extLst>
+          </a:blip>
+          <a:stretch>
+            <a:fillRect/>
+          </a:stretch>
+        </p:blipFill>
+        <p:spPr>
+          <a:xfrm>
+            <a:off x="4221359" y="3001000"/>
+            <a:ext cx="2937510" cy="2803208"/>
+          </a:xfrm>
+          <a:prstGeom prst="rect">
+            <a:avLst/>
+          </a:prstGeom>
+        </p:spPr>
+      </p:pic>
+      <p:pic>
+        <p:nvPicPr>
+          <p:cNvPr id="8" name="Image 7" descr="costplot3.png"/>
+          <p:cNvPicPr>
+            <a:picLocks noChangeAspect="1"/>
+          </p:cNvPicPr>
+          <p:nvPr/>
+        </p:nvPicPr>
+        <p:blipFill>
+          <a:blip r:embed="rId4" cstate="print">
+            <a:extLst>
+              <a:ext uri="{28A0092B-C50C-407E-A947-70E740481C1C}">
+                <a14:useLocalDpi xmlns:a14="http://schemas.microsoft.com/office/drawing/2010/main" val="0"/>
+              </a:ext>
+            </a:extLst>
+          </a:blip>
+          <a:stretch>
+            <a:fillRect/>
+          </a:stretch>
+        </p:blipFill>
+        <p:spPr>
+          <a:xfrm>
+            <a:off x="7712110" y="3010144"/>
+            <a:ext cx="3204401" cy="2794064"/>
+          </a:xfrm>
+          <a:prstGeom prst="rect">
+            <a:avLst/>
+          </a:prstGeom>
+        </p:spPr>
+      </p:pic>
+    </p:spTree>
+    <p:extLst>
+      <p:ext uri="{BB962C8B-B14F-4D97-AF65-F5344CB8AC3E}">
+        <p14:creationId xmlns:p14="http://schemas.microsoft.com/office/powerpoint/2010/main" val="3886166668"/>
+      </p:ext>
+    </p:extLst>
+  </p:cSld>
+  <p:clrMapOvr>
+    <a:masterClrMapping/>
+  </p:clrMapOvr>
+  <p:transition>
+    <p:fade/>
+  </p:transition>
+</p:sld>
+</file>
+
+<file path=ppt/slides/slide12.xml><?xml version="1.0" encoding="utf-8"?>
+<p:sld xmlns:a="http://schemas.openxmlformats.org/drawingml/2006/main" xmlns:r="http://schemas.openxmlformats.org/officeDocument/2006/relationships" xmlns:p="http://schemas.openxmlformats.org/presentationml/2006/main">
+  <p:cSld>
+    <p:spTree>
+      <p:nvGrpSpPr>
+        <p:cNvPr id="1" name=""/>
+        <p:cNvGrpSpPr/>
+        <p:nvPr/>
+      </p:nvGrpSpPr>
+      <p:grpSpPr>
+        <a:xfrm>
+          <a:off x="0" y="0"/>
+          <a:ext cx="0" cy="0"/>
+          <a:chOff x="0" y="0"/>
+          <a:chExt cx="0" cy="0"/>
+        </a:xfrm>
+      </p:grpSpPr>
+      <p:sp>
+        <p:nvSpPr>
+          <p:cNvPr id="11" name="Inhaltsplatzhalter 10"/>
+          <p:cNvSpPr>
+            <a:spLocks noGrp="1"/>
+          </p:cNvSpPr>
+          <p:nvPr>
+            <p:ph idx="1"/>
+          </p:nvPr>
+        </p:nvSpPr>
+        <p:spPr/>
+        <p:txBody>
+          <a:bodyPr/>
+          <a:lstStyle/>
+          <a:p>
+            <a:endParaRPr lang="en-GB" dirty="0"/>
+          </a:p>
+        </p:txBody>
+      </p:sp>
+      <p:sp>
+        <p:nvSpPr>
+          <p:cNvPr id="3" name="Datumsplatzhalter 2"/>
+          <p:cNvSpPr>
+            <a:spLocks noGrp="1"/>
+          </p:cNvSpPr>
+          <p:nvPr>
+            <p:ph type="dt" sz="half" idx="10"/>
+          </p:nvPr>
+        </p:nvSpPr>
+        <p:spPr/>
+        <p:txBody>
+          <a:bodyPr/>
+          <a:lstStyle/>
+          <a:p>
+            <a:r>
+              <a:rPr lang="fr-CH"/>
+              <a:t>23.05.2018</a:t>
+            </a:r>
+            <a:endParaRPr lang="en-GB" dirty="0"/>
+          </a:p>
+        </p:txBody>
+      </p:sp>
+      <p:sp>
+        <p:nvSpPr>
+          <p:cNvPr id="4" name="Fußzeilenplatzhalter 3"/>
+          <p:cNvSpPr>
+            <a:spLocks noGrp="1"/>
+          </p:cNvSpPr>
+          <p:nvPr>
+            <p:ph type="ftr" sz="quarter" idx="11"/>
+          </p:nvPr>
+        </p:nvSpPr>
+        <p:spPr/>
+        <p:txBody>
+          <a:bodyPr/>
+          <a:lstStyle/>
+          <a:p>
+            <a:r>
+              <a:rPr lang="en-GB"/>
+              <a:t>Group A</a:t>
+            </a:r>
+            <a:endParaRPr lang="en-GB" dirty="0"/>
+          </a:p>
+        </p:txBody>
+      </p:sp>
+      <p:sp>
+        <p:nvSpPr>
+          <p:cNvPr id="5" name="Foliennummernplatzhalter 4"/>
+          <p:cNvSpPr>
+            <a:spLocks noGrp="1"/>
+          </p:cNvSpPr>
+          <p:nvPr>
+            <p:ph type="sldNum" sz="quarter" idx="12"/>
+          </p:nvPr>
+        </p:nvSpPr>
+        <p:spPr/>
+        <p:txBody>
+          <a:bodyPr/>
+          <a:lstStyle/>
+          <a:p>
+            <a:fld id="{6C6AE60A-B69C-4790-82F7-3882EDF23186}" type="slidenum">
+              <a:rPr lang="en-GB" smtClean="0"/>
+              <a:pPr/>
+              <a:t>12</a:t>
+            </a:fld>
+            <a:endParaRPr lang="en-GB" dirty="0"/>
+          </a:p>
+        </p:txBody>
+      </p:sp>
+      <p:sp>
+        <p:nvSpPr>
+          <p:cNvPr id="10" name="Titel 9"/>
+          <p:cNvSpPr>
+            <a:spLocks noGrp="1"/>
+          </p:cNvSpPr>
+          <p:nvPr>
+            <p:ph type="title"/>
+          </p:nvPr>
+        </p:nvSpPr>
+        <p:spPr/>
+        <p:txBody>
+          <a:bodyPr/>
+          <a:lstStyle/>
+          <a:p>
+            <a:endParaRPr lang="en-GB" dirty="0"/>
+          </a:p>
+        </p:txBody>
+      </p:sp>
+    </p:spTree>
+    <p:extLst>
+      <p:ext uri="{BB962C8B-B14F-4D97-AF65-F5344CB8AC3E}">
+        <p14:creationId xmlns:p14="http://schemas.microsoft.com/office/powerpoint/2010/main" val="2857788226"/>
+      </p:ext>
+    </p:extLst>
+  </p:cSld>
+  <p:clrMapOvr>
+    <a:masterClrMapping/>
+  </p:clrMapOvr>
+  <p:transition>
+    <p:fade/>
+  </p:transition>
+</p:sld>
+</file>
+
+<file path=ppt/slides/slide13.xml><?xml version="1.0" encoding="utf-8"?>
+<p:sld xmlns:a="http://schemas.openxmlformats.org/drawingml/2006/main" xmlns:r="http://schemas.openxmlformats.org/officeDocument/2006/relationships" xmlns:p="http://schemas.openxmlformats.org/presentationml/2006/main">
+  <p:cSld>
+    <p:spTree>
+      <p:nvGrpSpPr>
+        <p:cNvPr id="1" name=""/>
+        <p:cNvGrpSpPr/>
+        <p:nvPr/>
+      </p:nvGrpSpPr>
+      <p:grpSpPr>
+        <a:xfrm>
+          <a:off x="0" y="0"/>
+          <a:ext cx="0" cy="0"/>
+          <a:chOff x="0" y="0"/>
+          <a:chExt cx="0" cy="0"/>
+        </a:xfrm>
+      </p:grpSpPr>
+      <p:sp>
+        <p:nvSpPr>
+          <p:cNvPr id="11" name="Titel 10"/>
+          <p:cNvSpPr>
+            <a:spLocks noGrp="1"/>
+          </p:cNvSpPr>
+          <p:nvPr>
+            <p:ph type="ctrTitle"/>
+          </p:nvPr>
+        </p:nvSpPr>
+        <p:spPr/>
+        <p:txBody>
+          <a:bodyPr/>
+          <a:lstStyle/>
+          <a:p>
+            <a:endParaRPr lang="en-GB" dirty="0"/>
+          </a:p>
+        </p:txBody>
+      </p:sp>
+      <p:sp>
+        <p:nvSpPr>
+          <p:cNvPr id="12" name="Untertitel 11"/>
+          <p:cNvSpPr>
+            <a:spLocks noGrp="1"/>
+          </p:cNvSpPr>
+          <p:nvPr>
+            <p:ph type="subTitle" idx="1"/>
+          </p:nvPr>
+        </p:nvSpPr>
+        <p:spPr/>
+        <p:txBody>
+          <a:bodyPr/>
+          <a:lstStyle/>
+          <a:p>
+            <a:endParaRPr lang="en-GB" dirty="0"/>
+          </a:p>
+        </p:txBody>
+      </p:sp>
+      <p:sp>
+        <p:nvSpPr>
+          <p:cNvPr id="4" name="Datumsplatzhalter 3"/>
+          <p:cNvSpPr>
+            <a:spLocks noGrp="1"/>
+          </p:cNvSpPr>
+          <p:nvPr>
+            <p:ph type="dt" sz="half" idx="10"/>
+          </p:nvPr>
+        </p:nvSpPr>
+        <p:spPr/>
+        <p:txBody>
+          <a:bodyPr/>
+          <a:lstStyle/>
+          <a:p>
+            <a:r>
+              <a:rPr lang="fr-CH"/>
+              <a:t>23.05.2018</a:t>
+            </a:r>
+            <a:endParaRPr lang="en-GB" dirty="0"/>
+          </a:p>
+        </p:txBody>
+      </p:sp>
+      <p:sp>
+        <p:nvSpPr>
+          <p:cNvPr id="5" name="Fußzeilenplatzhalter 4"/>
+          <p:cNvSpPr>
+            <a:spLocks noGrp="1"/>
+          </p:cNvSpPr>
+          <p:nvPr>
+            <p:ph type="ftr" sz="quarter" idx="11"/>
+          </p:nvPr>
+        </p:nvSpPr>
+        <p:spPr/>
+        <p:txBody>
+          <a:bodyPr/>
+          <a:lstStyle/>
+          <a:p>
+            <a:r>
+              <a:rPr lang="en-GB"/>
+              <a:t>Group A</a:t>
+            </a:r>
+            <a:endParaRPr lang="en-GB" dirty="0"/>
+          </a:p>
+        </p:txBody>
+      </p:sp>
+      <p:sp>
+        <p:nvSpPr>
+          <p:cNvPr id="6" name="Foliennummernplatzhalter 5"/>
+          <p:cNvSpPr>
+            <a:spLocks noGrp="1"/>
+          </p:cNvSpPr>
+          <p:nvPr>
+            <p:ph type="sldNum" sz="quarter" idx="12"/>
+          </p:nvPr>
+        </p:nvSpPr>
+        <p:spPr/>
+        <p:txBody>
+          <a:bodyPr/>
+          <a:lstStyle/>
+          <a:p>
+            <a:fld id="{6C6AE60A-B69C-4790-82F7-3882EDF23186}" type="slidenum">
+              <a:rPr lang="en-GB" smtClean="0"/>
+              <a:pPr/>
+              <a:t>13</a:t>
             </a:fld>
             <a:endParaRPr lang="en-GB" dirty="0"/>
           </a:p>
@@ -41933,7 +42409,7 @@
 </p:sld>
 </file>
 
-<file path=ppt/slides/slide12.xml><?xml version="1.0" encoding="utf-8"?>
+<file path=ppt/slides/slide14.xml><?xml version="1.0" encoding="utf-8"?>
 <p:sld xmlns:a="http://schemas.openxmlformats.org/drawingml/2006/main" xmlns:r="http://schemas.openxmlformats.org/officeDocument/2006/relationships" xmlns:p="http://schemas.openxmlformats.org/presentationml/2006/main">
   <p:cSld>
     <p:spTree>
@@ -42209,288 +42685,6 @@
 </p:sld>
 </file>
 
-<file path=ppt/slides/slide13.xml><?xml version="1.0" encoding="utf-8"?>
-<p:sld xmlns:a="http://schemas.openxmlformats.org/drawingml/2006/main" xmlns:r="http://schemas.openxmlformats.org/officeDocument/2006/relationships" xmlns:p="http://schemas.openxmlformats.org/presentationml/2006/main">
-  <p:cSld>
-    <p:spTree>
-      <p:nvGrpSpPr>
-        <p:cNvPr id="1" name=""/>
-        <p:cNvGrpSpPr/>
-        <p:nvPr/>
-      </p:nvGrpSpPr>
-      <p:grpSpPr>
-        <a:xfrm>
-          <a:off x="0" y="0"/>
-          <a:ext cx="0" cy="0"/>
-          <a:chOff x="0" y="0"/>
-          <a:chExt cx="0" cy="0"/>
-        </a:xfrm>
-      </p:grpSpPr>
-      <p:sp>
-        <p:nvSpPr>
-          <p:cNvPr id="12" name="Inhaltsplatzhalter 11"/>
-          <p:cNvSpPr>
-            <a:spLocks noGrp="1"/>
-          </p:cNvSpPr>
-          <p:nvPr>
-            <p:ph sz="half" idx="1"/>
-          </p:nvPr>
-        </p:nvSpPr>
-        <p:spPr/>
-        <p:txBody>
-          <a:bodyPr/>
-          <a:lstStyle/>
-          <a:p>
-            <a:endParaRPr lang="en-GB" dirty="0"/>
-          </a:p>
-        </p:txBody>
-      </p:sp>
-      <p:sp>
-        <p:nvSpPr>
-          <p:cNvPr id="13" name="Inhaltsplatzhalter 12"/>
-          <p:cNvSpPr>
-            <a:spLocks noGrp="1"/>
-          </p:cNvSpPr>
-          <p:nvPr>
-            <p:ph sz="half" idx="2"/>
-          </p:nvPr>
-        </p:nvSpPr>
-        <p:spPr/>
-        <p:txBody>
-          <a:bodyPr/>
-          <a:lstStyle/>
-          <a:p>
-            <a:endParaRPr lang="en-GB" dirty="0"/>
-          </a:p>
-        </p:txBody>
-      </p:sp>
-      <p:sp>
-        <p:nvSpPr>
-          <p:cNvPr id="4" name="Datumsplatzhalter 3"/>
-          <p:cNvSpPr>
-            <a:spLocks noGrp="1"/>
-          </p:cNvSpPr>
-          <p:nvPr>
-            <p:ph type="dt" sz="half" idx="10"/>
-          </p:nvPr>
-        </p:nvSpPr>
-        <p:spPr/>
-        <p:txBody>
-          <a:bodyPr/>
-          <a:lstStyle/>
-          <a:p>
-            <a:r>
-              <a:rPr lang="fr-CH"/>
-              <a:t>23.05.2018</a:t>
-            </a:r>
-            <a:endParaRPr lang="en-GB" dirty="0"/>
-          </a:p>
-        </p:txBody>
-      </p:sp>
-      <p:sp>
-        <p:nvSpPr>
-          <p:cNvPr id="5" name="Fußzeilenplatzhalter 4"/>
-          <p:cNvSpPr>
-            <a:spLocks noGrp="1"/>
-          </p:cNvSpPr>
-          <p:nvPr>
-            <p:ph type="ftr" sz="quarter" idx="11"/>
-          </p:nvPr>
-        </p:nvSpPr>
-        <p:spPr/>
-        <p:txBody>
-          <a:bodyPr/>
-          <a:lstStyle/>
-          <a:p>
-            <a:r>
-              <a:rPr lang="en-GB"/>
-              <a:t>Group A</a:t>
-            </a:r>
-            <a:endParaRPr lang="en-GB" dirty="0"/>
-          </a:p>
-        </p:txBody>
-      </p:sp>
-      <p:sp>
-        <p:nvSpPr>
-          <p:cNvPr id="6" name="Foliennummernplatzhalter 5"/>
-          <p:cNvSpPr>
-            <a:spLocks noGrp="1"/>
-          </p:cNvSpPr>
-          <p:nvPr>
-            <p:ph type="sldNum" sz="quarter" idx="12"/>
-          </p:nvPr>
-        </p:nvSpPr>
-        <p:spPr/>
-        <p:txBody>
-          <a:bodyPr/>
-          <a:lstStyle/>
-          <a:p>
-            <a:fld id="{6C6AE60A-B69C-4790-82F7-3882EDF23186}" type="slidenum">
-              <a:rPr lang="en-GB" smtClean="0"/>
-              <a:pPr/>
-              <a:t>13</a:t>
-            </a:fld>
-            <a:endParaRPr lang="en-GB" dirty="0"/>
-          </a:p>
-        </p:txBody>
-      </p:sp>
-      <p:sp>
-        <p:nvSpPr>
-          <p:cNvPr id="11" name="Titel 10"/>
-          <p:cNvSpPr>
-            <a:spLocks noGrp="1"/>
-          </p:cNvSpPr>
-          <p:nvPr>
-            <p:ph type="title"/>
-          </p:nvPr>
-        </p:nvSpPr>
-        <p:spPr/>
-        <p:txBody>
-          <a:bodyPr/>
-          <a:lstStyle/>
-          <a:p>
-            <a:endParaRPr lang="en-GB" dirty="0"/>
-          </a:p>
-        </p:txBody>
-      </p:sp>
-    </p:spTree>
-    <p:extLst>
-      <p:ext uri="{BB962C8B-B14F-4D97-AF65-F5344CB8AC3E}">
-        <p14:creationId xmlns:p14="http://schemas.microsoft.com/office/powerpoint/2010/main" val="572143329"/>
-      </p:ext>
-    </p:extLst>
-  </p:cSld>
-  <p:clrMapOvr>
-    <a:masterClrMapping/>
-  </p:clrMapOvr>
-  <p:transition>
-    <p:fade/>
-  </p:transition>
-</p:sld>
-</file>
-
-<file path=ppt/slides/slide14.xml><?xml version="1.0" encoding="utf-8"?>
-<p:sld xmlns:a="http://schemas.openxmlformats.org/drawingml/2006/main" xmlns:r="http://schemas.openxmlformats.org/officeDocument/2006/relationships" xmlns:p="http://schemas.openxmlformats.org/presentationml/2006/main">
-  <p:cSld>
-    <p:spTree>
-      <p:nvGrpSpPr>
-        <p:cNvPr id="1" name=""/>
-        <p:cNvGrpSpPr/>
-        <p:nvPr/>
-      </p:nvGrpSpPr>
-      <p:grpSpPr>
-        <a:xfrm>
-          <a:off x="0" y="0"/>
-          <a:ext cx="0" cy="0"/>
-          <a:chOff x="0" y="0"/>
-          <a:chExt cx="0" cy="0"/>
-        </a:xfrm>
-      </p:grpSpPr>
-      <p:sp>
-        <p:nvSpPr>
-          <p:cNvPr id="2" name="Datumsplatzhalter 1"/>
-          <p:cNvSpPr>
-            <a:spLocks noGrp="1"/>
-          </p:cNvSpPr>
-          <p:nvPr>
-            <p:ph type="dt" sz="half" idx="10"/>
-          </p:nvPr>
-        </p:nvSpPr>
-        <p:spPr/>
-        <p:txBody>
-          <a:bodyPr/>
-          <a:lstStyle/>
-          <a:p>
-            <a:r>
-              <a:rPr lang="fr-CH"/>
-              <a:t>23.05.2018</a:t>
-            </a:r>
-            <a:endParaRPr lang="en-GB" dirty="0"/>
-          </a:p>
-        </p:txBody>
-      </p:sp>
-      <p:sp>
-        <p:nvSpPr>
-          <p:cNvPr id="3" name="Fußzeilenplatzhalter 2"/>
-          <p:cNvSpPr>
-            <a:spLocks noGrp="1"/>
-          </p:cNvSpPr>
-          <p:nvPr>
-            <p:ph type="ftr" sz="quarter" idx="11"/>
-          </p:nvPr>
-        </p:nvSpPr>
-        <p:spPr/>
-        <p:txBody>
-          <a:bodyPr/>
-          <a:lstStyle/>
-          <a:p>
-            <a:r>
-              <a:rPr lang="en-GB"/>
-              <a:t>Group A</a:t>
-            </a:r>
-            <a:endParaRPr lang="en-GB" dirty="0"/>
-          </a:p>
-        </p:txBody>
-      </p:sp>
-      <p:sp>
-        <p:nvSpPr>
-          <p:cNvPr id="4" name="Foliennummernplatzhalter 3"/>
-          <p:cNvSpPr>
-            <a:spLocks noGrp="1"/>
-          </p:cNvSpPr>
-          <p:nvPr>
-            <p:ph type="sldNum" sz="quarter" idx="12"/>
-          </p:nvPr>
-        </p:nvSpPr>
-        <p:spPr/>
-        <p:txBody>
-          <a:bodyPr/>
-          <a:lstStyle/>
-          <a:p>
-            <a:fld id="{6C6AE60A-B69C-4790-82F7-3882EDF23186}" type="slidenum">
-              <a:rPr lang="en-GB" smtClean="0"/>
-              <a:pPr/>
-              <a:t>14</a:t>
-            </a:fld>
-            <a:endParaRPr lang="en-GB" dirty="0"/>
-          </a:p>
-        </p:txBody>
-      </p:sp>
-      <p:sp>
-        <p:nvSpPr>
-          <p:cNvPr id="9" name="Titel 8"/>
-          <p:cNvSpPr>
-            <a:spLocks noGrp="1"/>
-          </p:cNvSpPr>
-          <p:nvPr>
-            <p:ph type="title"/>
-          </p:nvPr>
-        </p:nvSpPr>
-        <p:spPr/>
-        <p:txBody>
-          <a:bodyPr/>
-          <a:lstStyle/>
-          <a:p>
-            <a:endParaRPr lang="en-GB" dirty="0"/>
-          </a:p>
-        </p:txBody>
-      </p:sp>
-    </p:spTree>
-    <p:extLst>
-      <p:ext uri="{BB962C8B-B14F-4D97-AF65-F5344CB8AC3E}">
-        <p14:creationId xmlns:p14="http://schemas.microsoft.com/office/powerpoint/2010/main" val="3974297676"/>
-      </p:ext>
-    </p:extLst>
-  </p:cSld>
-  <p:clrMapOvr>
-    <a:masterClrMapping/>
-  </p:clrMapOvr>
-  <p:transition>
-    <p:fade/>
-  </p:transition>
-</p:sld>
-</file>
-
 <file path=ppt/slides/slide15.xml><?xml version="1.0" encoding="utf-8"?>
 <p:sld xmlns:a="http://schemas.openxmlformats.org/drawingml/2006/main" xmlns:r="http://schemas.openxmlformats.org/officeDocument/2006/relationships" xmlns:p="http://schemas.openxmlformats.org/presentationml/2006/main">
   <p:cSld>
@@ -42510,12 +42704,12 @@
       </p:grpSpPr>
       <p:sp>
         <p:nvSpPr>
-          <p:cNvPr id="2" name="Datumsplatzhalter 1"/>
-          <p:cNvSpPr>
-            <a:spLocks noGrp="1"/>
-          </p:cNvSpPr>
-          <p:nvPr>
-            <p:ph type="dt" sz="half" idx="10"/>
+          <p:cNvPr id="12" name="Inhaltsplatzhalter 11"/>
+          <p:cNvSpPr>
+            <a:spLocks noGrp="1"/>
+          </p:cNvSpPr>
+          <p:nvPr>
+            <p:ph sz="half" idx="1"/>
           </p:nvPr>
         </p:nvSpPr>
         <p:spPr/>
@@ -42523,6 +42717,44 @@
           <a:bodyPr/>
           <a:lstStyle/>
           <a:p>
+            <a:endParaRPr lang="en-GB" dirty="0"/>
+          </a:p>
+        </p:txBody>
+      </p:sp>
+      <p:sp>
+        <p:nvSpPr>
+          <p:cNvPr id="13" name="Inhaltsplatzhalter 12"/>
+          <p:cNvSpPr>
+            <a:spLocks noGrp="1"/>
+          </p:cNvSpPr>
+          <p:nvPr>
+            <p:ph sz="half" idx="2"/>
+          </p:nvPr>
+        </p:nvSpPr>
+        <p:spPr/>
+        <p:txBody>
+          <a:bodyPr/>
+          <a:lstStyle/>
+          <a:p>
+            <a:endParaRPr lang="en-GB" dirty="0"/>
+          </a:p>
+        </p:txBody>
+      </p:sp>
+      <p:sp>
+        <p:nvSpPr>
+          <p:cNvPr id="4" name="Datumsplatzhalter 3"/>
+          <p:cNvSpPr>
+            <a:spLocks noGrp="1"/>
+          </p:cNvSpPr>
+          <p:nvPr>
+            <p:ph type="dt" sz="half" idx="10"/>
+          </p:nvPr>
+        </p:nvSpPr>
+        <p:spPr/>
+        <p:txBody>
+          <a:bodyPr/>
+          <a:lstStyle/>
+          <a:p>
             <a:r>
               <a:rPr lang="fr-CH"/>
               <a:t>23.05.2018</a:t>
@@ -42533,7 +42765,7 @@
       </p:sp>
       <p:sp>
         <p:nvSpPr>
-          <p:cNvPr id="3" name="Fußzeilenplatzhalter 2"/>
+          <p:cNvPr id="5" name="Fußzeilenplatzhalter 4"/>
           <p:cNvSpPr>
             <a:spLocks noGrp="1"/>
           </p:cNvSpPr>
@@ -42556,7 +42788,7 @@
       </p:sp>
       <p:sp>
         <p:nvSpPr>
-          <p:cNvPr id="4" name="Foliennummernplatzhalter 3"/>
+          <p:cNvPr id="6" name="Foliennummernplatzhalter 5"/>
           <p:cNvSpPr>
             <a:spLocks noGrp="1"/>
           </p:cNvSpPr>
@@ -42580,20 +42812,27 @@
       </p:sp>
       <p:sp>
         <p:nvSpPr>
-          <p:cNvPr id="9" name="Bildplatzhalter 8"/>
-          <p:cNvSpPr>
-            <a:spLocks noGrp="1"/>
-          </p:cNvSpPr>
-          <p:nvPr>
-            <p:ph type="pic" sz="quarter" idx="13"/>
+          <p:cNvPr id="11" name="Titel 10"/>
+          <p:cNvSpPr>
+            <a:spLocks noGrp="1"/>
+          </p:cNvSpPr>
+          <p:nvPr>
+            <p:ph type="title"/>
           </p:nvPr>
         </p:nvSpPr>
         <p:spPr/>
+        <p:txBody>
+          <a:bodyPr/>
+          <a:lstStyle/>
+          <a:p>
+            <a:endParaRPr lang="en-GB" dirty="0"/>
+          </a:p>
+        </p:txBody>
       </p:sp>
     </p:spTree>
     <p:extLst>
       <p:ext uri="{BB962C8B-B14F-4D97-AF65-F5344CB8AC3E}">
-        <p14:creationId xmlns:p14="http://schemas.microsoft.com/office/powerpoint/2010/main" val="1116238283"/>
+        <p14:creationId xmlns:p14="http://schemas.microsoft.com/office/powerpoint/2010/main" val="572143329"/>
       </p:ext>
     </p:extLst>
   </p:cSld>
@@ -42625,12 +42864,12 @@
       </p:grpSpPr>
       <p:sp>
         <p:nvSpPr>
-          <p:cNvPr id="7" name="Inhaltsplatzhalter 6"/>
-          <p:cNvSpPr>
-            <a:spLocks noGrp="1"/>
-          </p:cNvSpPr>
-          <p:nvPr>
-            <p:ph idx="1"/>
+          <p:cNvPr id="2" name="Datumsplatzhalter 1"/>
+          <p:cNvSpPr>
+            <a:spLocks noGrp="1"/>
+          </p:cNvSpPr>
+          <p:nvPr>
+            <p:ph type="dt" sz="half" idx="10"/>
           </p:nvPr>
         </p:nvSpPr>
         <p:spPr/>
@@ -42638,122 +42877,22 @@
           <a:bodyPr/>
           <a:lstStyle/>
           <a:p>
-            <a:pPr marL="0" indent="0">
-              <a:buNone/>
-            </a:pPr>
-            <a:r>
-              <a:rPr lang="en-GB" sz="1800" b="1" dirty="0"/>
-              <a:t>ETH Zurich</a:t>
-            </a:r>
-          </a:p>
-          <a:p>
-            <a:pPr marL="0" indent="0">
-              <a:buNone/>
-            </a:pPr>
-            <a:r>
-              <a:rPr lang="en-GB" sz="1800" dirty="0"/>
-              <a:t>Organisational unit</a:t>
-            </a:r>
-          </a:p>
-          <a:p>
-            <a:pPr marL="0" indent="0">
-              <a:buNone/>
-            </a:pPr>
-            <a:r>
-              <a:rPr lang="en-GB" sz="1800" dirty="0"/>
-              <a:t>Street address</a:t>
-            </a:r>
-          </a:p>
-          <a:p>
-            <a:pPr marL="0" indent="0">
-              <a:buNone/>
-            </a:pPr>
-            <a:r>
-              <a:rPr lang="en-GB" sz="1800" dirty="0"/>
-              <a:t>Postcode City</a:t>
-            </a:r>
-          </a:p>
-          <a:p>
-            <a:pPr marL="0" indent="0">
-              <a:buNone/>
-            </a:pPr>
-            <a:endParaRPr lang="en-GB" sz="1800" dirty="0"/>
-          </a:p>
-          <a:p>
-            <a:pPr marL="0" indent="0">
-              <a:buNone/>
-            </a:pPr>
-            <a:r>
-              <a:rPr lang="en-GB" sz="1800" dirty="0"/>
-              <a:t>www.ethz.ch/en.html</a:t>
-            </a:r>
-          </a:p>
-          <a:p>
-            <a:pPr marL="0" indent="0">
-              <a:buNone/>
-            </a:pPr>
-            <a:endParaRPr lang="en-GB" sz="1800" dirty="0"/>
-          </a:p>
-          <a:p>
-            <a:pPr marL="0" indent="0">
-              <a:buNone/>
-            </a:pPr>
-            <a:r>
-              <a:rPr lang="en-US" sz="1800" dirty="0"/>
-              <a:t>Publisher: </a:t>
-            </a:r>
-            <a:r>
-              <a:rPr lang="en-GB" sz="1800" dirty="0"/>
-              <a:t>Organisational</a:t>
-            </a:r>
-            <a:r>
-              <a:rPr lang="en-US" sz="1800" dirty="0"/>
-              <a:t> unit of ETH Zurich</a:t>
-            </a:r>
-          </a:p>
-          <a:p>
-            <a:pPr marL="0" indent="0">
-              <a:buNone/>
-            </a:pPr>
-            <a:r>
-              <a:rPr lang="en-GB" sz="1800" dirty="0"/>
-              <a:t>Design: Designer Name</a:t>
-            </a:r>
-          </a:p>
-          <a:p>
-            <a:pPr marL="0" indent="0">
-              <a:buNone/>
-            </a:pPr>
-            <a:r>
-              <a:rPr lang="en-US" sz="1800" dirty="0"/>
-              <a:t>Images: Credit (slide xx), Credit (slide xx)</a:t>
-            </a:r>
-          </a:p>
-          <a:p>
-            <a:pPr marL="0" indent="0">
-              <a:buNone/>
-            </a:pPr>
-            <a:endParaRPr lang="en-GB" sz="1800" dirty="0"/>
-          </a:p>
-          <a:p>
-            <a:pPr marL="0" indent="0">
-              <a:buNone/>
-            </a:pPr>
-            <a:r>
-              <a:rPr lang="en-GB" sz="1800" dirty="0"/>
-              <a:t>© ETH Zurich, December 2013</a:t>
-            </a:r>
-          </a:p>
-        </p:txBody>
-      </p:sp>
-      <p:sp>
-        <p:nvSpPr>
-          <p:cNvPr id="2" name="Datumsplatzhalter 1"/>
-          <p:cNvSpPr>
-            <a:spLocks noGrp="1"/>
-          </p:cNvSpPr>
-          <p:nvPr>
-            <p:ph type="dt" sz="half" idx="10"/>
+            <a:r>
+              <a:rPr lang="fr-CH"/>
+              <a:t>23.05.2018</a:t>
+            </a:r>
+            <a:endParaRPr lang="en-GB" dirty="0"/>
+          </a:p>
+        </p:txBody>
+      </p:sp>
+      <p:sp>
+        <p:nvSpPr>
+          <p:cNvPr id="3" name="Fußzeilenplatzhalter 2"/>
+          <p:cNvSpPr>
+            <a:spLocks noGrp="1"/>
+          </p:cNvSpPr>
+          <p:nvPr>
+            <p:ph type="ftr" sz="quarter" idx="11"/>
           </p:nvPr>
         </p:nvSpPr>
         <p:spPr/>
@@ -42762,21 +42901,21 @@
           <a:lstStyle/>
           <a:p>
             <a:r>
-              <a:rPr lang="fr-CH"/>
-              <a:t>23.05.2018</a:t>
-            </a:r>
-            <a:endParaRPr lang="en-GB" dirty="0"/>
-          </a:p>
-        </p:txBody>
-      </p:sp>
-      <p:sp>
-        <p:nvSpPr>
-          <p:cNvPr id="3" name="Fußzeilenplatzhalter 2"/>
-          <p:cNvSpPr>
-            <a:spLocks noGrp="1"/>
-          </p:cNvSpPr>
-          <p:nvPr>
-            <p:ph type="ftr" sz="quarter" idx="11"/>
+              <a:rPr lang="en-GB"/>
+              <a:t>Group A</a:t>
+            </a:r>
+            <a:endParaRPr lang="en-GB" dirty="0"/>
+          </a:p>
+        </p:txBody>
+      </p:sp>
+      <p:sp>
+        <p:nvSpPr>
+          <p:cNvPr id="4" name="Foliennummernplatzhalter 3"/>
+          <p:cNvSpPr>
+            <a:spLocks noGrp="1"/>
+          </p:cNvSpPr>
+          <p:nvPr>
+            <p:ph type="sldNum" sz="quarter" idx="12"/>
           </p:nvPr>
         </p:nvSpPr>
         <p:spPr/>
@@ -42784,22 +42923,23 @@
           <a:bodyPr/>
           <a:lstStyle/>
           <a:p>
-            <a:r>
-              <a:rPr lang="en-GB"/>
-              <a:t>Group A</a:t>
-            </a:r>
-            <a:endParaRPr lang="en-GB" dirty="0"/>
-          </a:p>
-        </p:txBody>
-      </p:sp>
-      <p:sp>
-        <p:nvSpPr>
-          <p:cNvPr id="4" name="Foliennummernplatzhalter 3"/>
-          <p:cNvSpPr>
-            <a:spLocks noGrp="1"/>
-          </p:cNvSpPr>
-          <p:nvPr>
-            <p:ph type="sldNum" sz="quarter" idx="12"/>
+            <a:fld id="{6C6AE60A-B69C-4790-82F7-3882EDF23186}" type="slidenum">
+              <a:rPr lang="en-GB" smtClean="0"/>
+              <a:pPr/>
+              <a:t>16</a:t>
+            </a:fld>
+            <a:endParaRPr lang="en-GB" dirty="0"/>
+          </a:p>
+        </p:txBody>
+      </p:sp>
+      <p:sp>
+        <p:nvSpPr>
+          <p:cNvPr id="9" name="Titel 8"/>
+          <p:cNvSpPr>
+            <a:spLocks noGrp="1"/>
+          </p:cNvSpPr>
+          <p:nvPr>
+            <p:ph type="title"/>
           </p:nvPr>
         </p:nvSpPr>
         <p:spPr/>
@@ -42807,40 +42947,14 @@
           <a:bodyPr/>
           <a:lstStyle/>
           <a:p>
-            <a:fld id="{6C6AE60A-B69C-4790-82F7-3882EDF23186}" type="slidenum">
-              <a:rPr lang="en-GB" smtClean="0"/>
-              <a:t>16</a:t>
-            </a:fld>
-            <a:endParaRPr lang="en-GB" dirty="0"/>
-          </a:p>
-        </p:txBody>
-      </p:sp>
-      <p:sp>
-        <p:nvSpPr>
-          <p:cNvPr id="6" name="Titel 5"/>
-          <p:cNvSpPr>
-            <a:spLocks noGrp="1"/>
-          </p:cNvSpPr>
-          <p:nvPr>
-            <p:ph type="title"/>
-          </p:nvPr>
-        </p:nvSpPr>
-        <p:spPr/>
-        <p:txBody>
-          <a:bodyPr/>
-          <a:lstStyle/>
-          <a:p>
-            <a:r>
-              <a:rPr lang="en-GB" dirty="0"/>
-              <a:t>Contact information and credits</a:t>
-            </a:r>
+            <a:endParaRPr lang="en-GB" dirty="0"/>
           </a:p>
         </p:txBody>
       </p:sp>
     </p:spTree>
     <p:extLst>
       <p:ext uri="{BB962C8B-B14F-4D97-AF65-F5344CB8AC3E}">
-        <p14:creationId xmlns:p14="http://schemas.microsoft.com/office/powerpoint/2010/main" val="949753625"/>
+        <p14:creationId xmlns:p14="http://schemas.microsoft.com/office/powerpoint/2010/main" val="3974297676"/>
       </p:ext>
     </p:extLst>
   </p:cSld>
@@ -42935,6 +43049,368 @@
               <a:rPr lang="en-GB" smtClean="0"/>
               <a:pPr/>
               <a:t>17</a:t>
+            </a:fld>
+            <a:endParaRPr lang="en-GB" dirty="0"/>
+          </a:p>
+        </p:txBody>
+      </p:sp>
+      <p:sp>
+        <p:nvSpPr>
+          <p:cNvPr id="9" name="Bildplatzhalter 8"/>
+          <p:cNvSpPr>
+            <a:spLocks noGrp="1"/>
+          </p:cNvSpPr>
+          <p:nvPr>
+            <p:ph type="pic" sz="quarter" idx="13"/>
+          </p:nvPr>
+        </p:nvSpPr>
+        <p:spPr/>
+      </p:sp>
+    </p:spTree>
+    <p:extLst>
+      <p:ext uri="{BB962C8B-B14F-4D97-AF65-F5344CB8AC3E}">
+        <p14:creationId xmlns:p14="http://schemas.microsoft.com/office/powerpoint/2010/main" val="1116238283"/>
+      </p:ext>
+    </p:extLst>
+  </p:cSld>
+  <p:clrMapOvr>
+    <a:masterClrMapping/>
+  </p:clrMapOvr>
+  <p:transition>
+    <p:fade/>
+  </p:transition>
+</p:sld>
+</file>
+
+<file path=ppt/slides/slide18.xml><?xml version="1.0" encoding="utf-8"?>
+<p:sld xmlns:a="http://schemas.openxmlformats.org/drawingml/2006/main" xmlns:r="http://schemas.openxmlformats.org/officeDocument/2006/relationships" xmlns:p="http://schemas.openxmlformats.org/presentationml/2006/main">
+  <p:cSld>
+    <p:spTree>
+      <p:nvGrpSpPr>
+        <p:cNvPr id="1" name=""/>
+        <p:cNvGrpSpPr/>
+        <p:nvPr/>
+      </p:nvGrpSpPr>
+      <p:grpSpPr>
+        <a:xfrm>
+          <a:off x="0" y="0"/>
+          <a:ext cx="0" cy="0"/>
+          <a:chOff x="0" y="0"/>
+          <a:chExt cx="0" cy="0"/>
+        </a:xfrm>
+      </p:grpSpPr>
+      <p:sp>
+        <p:nvSpPr>
+          <p:cNvPr id="7" name="Inhaltsplatzhalter 6"/>
+          <p:cNvSpPr>
+            <a:spLocks noGrp="1"/>
+          </p:cNvSpPr>
+          <p:nvPr>
+            <p:ph idx="1"/>
+          </p:nvPr>
+        </p:nvSpPr>
+        <p:spPr/>
+        <p:txBody>
+          <a:bodyPr/>
+          <a:lstStyle/>
+          <a:p>
+            <a:pPr marL="0" indent="0">
+              <a:buNone/>
+            </a:pPr>
+            <a:r>
+              <a:rPr lang="en-GB" sz="1800" b="1" dirty="0"/>
+              <a:t>ETH Zurich</a:t>
+            </a:r>
+          </a:p>
+          <a:p>
+            <a:pPr marL="0" indent="0">
+              <a:buNone/>
+            </a:pPr>
+            <a:r>
+              <a:rPr lang="en-GB" sz="1800" dirty="0"/>
+              <a:t>Organisational unit</a:t>
+            </a:r>
+          </a:p>
+          <a:p>
+            <a:pPr marL="0" indent="0">
+              <a:buNone/>
+            </a:pPr>
+            <a:r>
+              <a:rPr lang="en-GB" sz="1800" dirty="0"/>
+              <a:t>Street address</a:t>
+            </a:r>
+          </a:p>
+          <a:p>
+            <a:pPr marL="0" indent="0">
+              <a:buNone/>
+            </a:pPr>
+            <a:r>
+              <a:rPr lang="en-GB" sz="1800" dirty="0"/>
+              <a:t>Postcode City</a:t>
+            </a:r>
+          </a:p>
+          <a:p>
+            <a:pPr marL="0" indent="0">
+              <a:buNone/>
+            </a:pPr>
+            <a:endParaRPr lang="en-GB" sz="1800" dirty="0"/>
+          </a:p>
+          <a:p>
+            <a:pPr marL="0" indent="0">
+              <a:buNone/>
+            </a:pPr>
+            <a:r>
+              <a:rPr lang="en-GB" sz="1800" dirty="0"/>
+              <a:t>www.ethz.ch/en.html</a:t>
+            </a:r>
+          </a:p>
+          <a:p>
+            <a:pPr marL="0" indent="0">
+              <a:buNone/>
+            </a:pPr>
+            <a:endParaRPr lang="en-GB" sz="1800" dirty="0"/>
+          </a:p>
+          <a:p>
+            <a:pPr marL="0" indent="0">
+              <a:buNone/>
+            </a:pPr>
+            <a:r>
+              <a:rPr lang="en-US" sz="1800" dirty="0"/>
+              <a:t>Publisher: </a:t>
+            </a:r>
+            <a:r>
+              <a:rPr lang="en-GB" sz="1800" dirty="0"/>
+              <a:t>Organisational</a:t>
+            </a:r>
+            <a:r>
+              <a:rPr lang="en-US" sz="1800" dirty="0"/>
+              <a:t> unit of ETH Zurich</a:t>
+            </a:r>
+          </a:p>
+          <a:p>
+            <a:pPr marL="0" indent="0">
+              <a:buNone/>
+            </a:pPr>
+            <a:r>
+              <a:rPr lang="en-GB" sz="1800" dirty="0"/>
+              <a:t>Design: Designer Name</a:t>
+            </a:r>
+          </a:p>
+          <a:p>
+            <a:pPr marL="0" indent="0">
+              <a:buNone/>
+            </a:pPr>
+            <a:r>
+              <a:rPr lang="en-US" sz="1800" dirty="0"/>
+              <a:t>Images: Credit (slide xx), Credit (slide xx)</a:t>
+            </a:r>
+          </a:p>
+          <a:p>
+            <a:pPr marL="0" indent="0">
+              <a:buNone/>
+            </a:pPr>
+            <a:endParaRPr lang="en-GB" sz="1800" dirty="0"/>
+          </a:p>
+          <a:p>
+            <a:pPr marL="0" indent="0">
+              <a:buNone/>
+            </a:pPr>
+            <a:r>
+              <a:rPr lang="en-GB" sz="1800" dirty="0"/>
+              <a:t>© ETH Zurich, December 2013</a:t>
+            </a:r>
+          </a:p>
+        </p:txBody>
+      </p:sp>
+      <p:sp>
+        <p:nvSpPr>
+          <p:cNvPr id="2" name="Datumsplatzhalter 1"/>
+          <p:cNvSpPr>
+            <a:spLocks noGrp="1"/>
+          </p:cNvSpPr>
+          <p:nvPr>
+            <p:ph type="dt" sz="half" idx="10"/>
+          </p:nvPr>
+        </p:nvSpPr>
+        <p:spPr/>
+        <p:txBody>
+          <a:bodyPr/>
+          <a:lstStyle/>
+          <a:p>
+            <a:r>
+              <a:rPr lang="fr-CH"/>
+              <a:t>23.05.2018</a:t>
+            </a:r>
+            <a:endParaRPr lang="en-GB" dirty="0"/>
+          </a:p>
+        </p:txBody>
+      </p:sp>
+      <p:sp>
+        <p:nvSpPr>
+          <p:cNvPr id="3" name="Fußzeilenplatzhalter 2"/>
+          <p:cNvSpPr>
+            <a:spLocks noGrp="1"/>
+          </p:cNvSpPr>
+          <p:nvPr>
+            <p:ph type="ftr" sz="quarter" idx="11"/>
+          </p:nvPr>
+        </p:nvSpPr>
+        <p:spPr/>
+        <p:txBody>
+          <a:bodyPr/>
+          <a:lstStyle/>
+          <a:p>
+            <a:r>
+              <a:rPr lang="en-GB"/>
+              <a:t>Group A</a:t>
+            </a:r>
+            <a:endParaRPr lang="en-GB" dirty="0"/>
+          </a:p>
+        </p:txBody>
+      </p:sp>
+      <p:sp>
+        <p:nvSpPr>
+          <p:cNvPr id="4" name="Foliennummernplatzhalter 3"/>
+          <p:cNvSpPr>
+            <a:spLocks noGrp="1"/>
+          </p:cNvSpPr>
+          <p:nvPr>
+            <p:ph type="sldNum" sz="quarter" idx="12"/>
+          </p:nvPr>
+        </p:nvSpPr>
+        <p:spPr/>
+        <p:txBody>
+          <a:bodyPr/>
+          <a:lstStyle/>
+          <a:p>
+            <a:fld id="{6C6AE60A-B69C-4790-82F7-3882EDF23186}" type="slidenum">
+              <a:rPr lang="en-GB" smtClean="0"/>
+              <a:t>18</a:t>
+            </a:fld>
+            <a:endParaRPr lang="en-GB" dirty="0"/>
+          </a:p>
+        </p:txBody>
+      </p:sp>
+      <p:sp>
+        <p:nvSpPr>
+          <p:cNvPr id="6" name="Titel 5"/>
+          <p:cNvSpPr>
+            <a:spLocks noGrp="1"/>
+          </p:cNvSpPr>
+          <p:nvPr>
+            <p:ph type="title"/>
+          </p:nvPr>
+        </p:nvSpPr>
+        <p:spPr/>
+        <p:txBody>
+          <a:bodyPr/>
+          <a:lstStyle/>
+          <a:p>
+            <a:r>
+              <a:rPr lang="en-GB" dirty="0"/>
+              <a:t>Contact information and credits</a:t>
+            </a:r>
+          </a:p>
+        </p:txBody>
+      </p:sp>
+    </p:spTree>
+    <p:extLst>
+      <p:ext uri="{BB962C8B-B14F-4D97-AF65-F5344CB8AC3E}">
+        <p14:creationId xmlns:p14="http://schemas.microsoft.com/office/powerpoint/2010/main" val="949753625"/>
+      </p:ext>
+    </p:extLst>
+  </p:cSld>
+  <p:clrMapOvr>
+    <a:masterClrMapping/>
+  </p:clrMapOvr>
+  <p:transition>
+    <p:fade/>
+  </p:transition>
+</p:sld>
+</file>
+
+<file path=ppt/slides/slide19.xml><?xml version="1.0" encoding="utf-8"?>
+<p:sld xmlns:a="http://schemas.openxmlformats.org/drawingml/2006/main" xmlns:r="http://schemas.openxmlformats.org/officeDocument/2006/relationships" xmlns:p="http://schemas.openxmlformats.org/presentationml/2006/main">
+  <p:cSld>
+    <p:spTree>
+      <p:nvGrpSpPr>
+        <p:cNvPr id="1" name=""/>
+        <p:cNvGrpSpPr/>
+        <p:nvPr/>
+      </p:nvGrpSpPr>
+      <p:grpSpPr>
+        <a:xfrm>
+          <a:off x="0" y="0"/>
+          <a:ext cx="0" cy="0"/>
+          <a:chOff x="0" y="0"/>
+          <a:chExt cx="0" cy="0"/>
+        </a:xfrm>
+      </p:grpSpPr>
+      <p:sp>
+        <p:nvSpPr>
+          <p:cNvPr id="2" name="Datumsplatzhalter 1"/>
+          <p:cNvSpPr>
+            <a:spLocks noGrp="1"/>
+          </p:cNvSpPr>
+          <p:nvPr>
+            <p:ph type="dt" sz="half" idx="10"/>
+          </p:nvPr>
+        </p:nvSpPr>
+        <p:spPr/>
+        <p:txBody>
+          <a:bodyPr/>
+          <a:lstStyle/>
+          <a:p>
+            <a:r>
+              <a:rPr lang="fr-CH"/>
+              <a:t>23.05.2018</a:t>
+            </a:r>
+            <a:endParaRPr lang="en-GB" dirty="0"/>
+          </a:p>
+        </p:txBody>
+      </p:sp>
+      <p:sp>
+        <p:nvSpPr>
+          <p:cNvPr id="3" name="Fußzeilenplatzhalter 2"/>
+          <p:cNvSpPr>
+            <a:spLocks noGrp="1"/>
+          </p:cNvSpPr>
+          <p:nvPr>
+            <p:ph type="ftr" sz="quarter" idx="11"/>
+          </p:nvPr>
+        </p:nvSpPr>
+        <p:spPr/>
+        <p:txBody>
+          <a:bodyPr/>
+          <a:lstStyle/>
+          <a:p>
+            <a:r>
+              <a:rPr lang="en-GB"/>
+              <a:t>Group A</a:t>
+            </a:r>
+            <a:endParaRPr lang="en-GB" dirty="0"/>
+          </a:p>
+        </p:txBody>
+      </p:sp>
+      <p:sp>
+        <p:nvSpPr>
+          <p:cNvPr id="4" name="Foliennummernplatzhalter 3"/>
+          <p:cNvSpPr>
+            <a:spLocks noGrp="1"/>
+          </p:cNvSpPr>
+          <p:nvPr>
+            <p:ph type="sldNum" sz="quarter" idx="12"/>
+          </p:nvPr>
+        </p:nvSpPr>
+        <p:spPr/>
+        <p:txBody>
+          <a:bodyPr/>
+          <a:lstStyle/>
+          <a:p>
+            <a:fld id="{6C6AE60A-B69C-4790-82F7-3882EDF23186}" type="slidenum">
+              <a:rPr lang="en-GB" smtClean="0"/>
+              <a:pPr/>
+              <a:t>19</a:t>
             </a:fld>
             <a:endParaRPr lang="en-GB" dirty="0"/>
           </a:p>
@@ -43149,12 +43625,18 @@
       </p:grpSpPr>
       <p:sp>
         <p:nvSpPr>
-          <p:cNvPr id="12" name="Inhaltsplatzhalter 11"/>
-          <p:cNvSpPr>
-            <a:spLocks noGrp="1"/>
-          </p:cNvSpPr>
-          <p:nvPr>
-            <p:ph sz="half" idx="1"/>
+          <p:cNvPr id="4" name="Datumsplatzhalter 3">
+            <a:extLst>
+              <a:ext uri="{FF2B5EF4-FFF2-40B4-BE49-F238E27FC236}">
+                <a16:creationId xmlns:a16="http://schemas.microsoft.com/office/drawing/2014/main" id="{0486F77B-EBCA-4D98-96B4-D810930354B2}"/>
+              </a:ext>
+            </a:extLst>
+          </p:cNvPr>
+          <p:cNvSpPr>
+            <a:spLocks noGrp="1"/>
+          </p:cNvSpPr>
+          <p:nvPr>
+            <p:ph type="dt" sz="half" idx="10"/>
           </p:nvPr>
         </p:nvSpPr>
         <p:spPr/>
@@ -43162,75 +43644,28 @@
           <a:bodyPr/>
           <a:lstStyle/>
           <a:p>
-            <a:pPr marL="0" indent="0">
-              <a:buNone/>
-            </a:pPr>
-            <a:r>
-              <a:rPr lang="en-GB" b="1" dirty="0"/>
-              <a:t>Ideal case</a:t>
-            </a:r>
-          </a:p>
-          <a:p>
-            <a:endParaRPr lang="en-GB" dirty="0"/>
-          </a:p>
-          <a:p>
-            <a:r>
-              <a:rPr lang="en-GB" dirty="0"/>
-              <a:t>Isothermal column</a:t>
-            </a:r>
-          </a:p>
-          <a:p>
-            <a:r>
-              <a:rPr lang="en-GB" dirty="0"/>
-              <a:t>Heat of absorption neglected</a:t>
-            </a:r>
-          </a:p>
-          <a:p>
-            <a:r>
-              <a:rPr lang="en-GB" dirty="0"/>
-              <a:t>Outlet temperature same for gas and liquid</a:t>
-            </a:r>
-          </a:p>
-          <a:p>
-            <a:r>
-              <a:rPr lang="en-GB" dirty="0"/>
-              <a:t>Only HCN is absorbed</a:t>
-            </a:r>
-          </a:p>
-          <a:p>
-            <a:r>
-              <a:rPr lang="en-GB" dirty="0"/>
-              <a:t>Heat capacities not temperature dependent</a:t>
-            </a:r>
-          </a:p>
-          <a:p>
-            <a:r>
-              <a:rPr lang="en-GB" dirty="0"/>
-              <a:t>No HCN in liquid inlet stream</a:t>
-            </a:r>
-          </a:p>
-          <a:p>
-            <a:r>
-              <a:rPr lang="en-GB" dirty="0"/>
-              <a:t>Resistivity in the liquid phase neglected</a:t>
-            </a:r>
-          </a:p>
-          <a:p>
-            <a:endParaRPr lang="en-GB" dirty="0"/>
-          </a:p>
-          <a:p>
-            <a:endParaRPr lang="en-GB" dirty="0"/>
-          </a:p>
-        </p:txBody>
-      </p:sp>
-      <p:sp>
-        <p:nvSpPr>
-          <p:cNvPr id="13" name="Inhaltsplatzhalter 12"/>
-          <p:cNvSpPr>
-            <a:spLocks noGrp="1"/>
-          </p:cNvSpPr>
-          <p:nvPr>
-            <p:ph sz="half" idx="2"/>
+            <a:r>
+              <a:rPr lang="fr-CH"/>
+              <a:t>23.05.2018</a:t>
+            </a:r>
+            <a:endParaRPr lang="en-GB" dirty="0"/>
+          </a:p>
+        </p:txBody>
+      </p:sp>
+      <p:sp>
+        <p:nvSpPr>
+          <p:cNvPr id="5" name="Fußzeilenplatzhalter 4">
+            <a:extLst>
+              <a:ext uri="{FF2B5EF4-FFF2-40B4-BE49-F238E27FC236}">
+                <a16:creationId xmlns:a16="http://schemas.microsoft.com/office/drawing/2014/main" id="{AF51684B-6762-4772-9CCE-E61481E9D834}"/>
+              </a:ext>
+            </a:extLst>
+          </p:cNvPr>
+          <p:cNvSpPr>
+            <a:spLocks noGrp="1"/>
+          </p:cNvSpPr>
+          <p:nvPr>
+            <p:ph type="ftr" sz="quarter" idx="11"/>
           </p:nvPr>
         </p:nvSpPr>
         <p:spPr/>
@@ -43238,51 +43673,28 @@
           <a:bodyPr/>
           <a:lstStyle/>
           <a:p>
-            <a:pPr marL="0" indent="0">
-              <a:buNone/>
-            </a:pPr>
-            <a:r>
-              <a:rPr lang="en-GB" b="1" dirty="0"/>
-              <a:t>Non-ideal case</a:t>
-            </a:r>
-          </a:p>
-          <a:p>
-            <a:endParaRPr lang="en-GB" dirty="0"/>
-          </a:p>
-          <a:p>
-            <a:r>
-              <a:rPr lang="en-GB" dirty="0"/>
-              <a:t>Isothermal column</a:t>
-            </a:r>
-          </a:p>
-          <a:p>
-            <a:r>
-              <a:rPr lang="en-GB" dirty="0"/>
-              <a:t>Heat of absorption neglected</a:t>
-            </a:r>
-          </a:p>
-          <a:p>
-            <a:r>
-              <a:rPr lang="en-GB" dirty="0"/>
-              <a:t>Outlet temperature same for gas and liquid</a:t>
-            </a:r>
-          </a:p>
-          <a:p>
-            <a:r>
-              <a:rPr lang="en-GB" dirty="0"/>
-              <a:t>Only HCN is absorbed</a:t>
-            </a:r>
-          </a:p>
-        </p:txBody>
-      </p:sp>
-      <p:sp>
-        <p:nvSpPr>
-          <p:cNvPr id="4" name="Datumsplatzhalter 3"/>
-          <p:cNvSpPr>
-            <a:spLocks noGrp="1"/>
-          </p:cNvSpPr>
-          <p:nvPr>
-            <p:ph type="dt" sz="half" idx="10"/>
+            <a:r>
+              <a:rPr lang="en-GB"/>
+              <a:t>Group A</a:t>
+            </a:r>
+            <a:endParaRPr lang="en-GB" dirty="0"/>
+          </a:p>
+        </p:txBody>
+      </p:sp>
+      <p:sp>
+        <p:nvSpPr>
+          <p:cNvPr id="6" name="Foliennummernplatzhalter 5">
+            <a:extLst>
+              <a:ext uri="{FF2B5EF4-FFF2-40B4-BE49-F238E27FC236}">
+                <a16:creationId xmlns:a16="http://schemas.microsoft.com/office/drawing/2014/main" id="{37290704-C0B1-4941-9014-F2D7234770E4}"/>
+              </a:ext>
+            </a:extLst>
+          </p:cNvPr>
+          <p:cNvSpPr>
+            <a:spLocks noGrp="1"/>
+          </p:cNvSpPr>
+          <p:nvPr>
+            <p:ph type="sldNum" sz="quarter" idx="12"/>
           </p:nvPr>
         </p:nvSpPr>
         <p:spPr/>
@@ -43290,54 +43702,8 @@
           <a:bodyPr/>
           <a:lstStyle/>
           <a:p>
-            <a:r>
-              <a:rPr lang="fr-CH"/>
-              <a:t>23.05.2018</a:t>
-            </a:r>
-            <a:endParaRPr lang="en-GB" dirty="0"/>
-          </a:p>
-        </p:txBody>
-      </p:sp>
-      <p:sp>
-        <p:nvSpPr>
-          <p:cNvPr id="5" name="Fußzeilenplatzhalter 4"/>
-          <p:cNvSpPr>
-            <a:spLocks noGrp="1"/>
-          </p:cNvSpPr>
-          <p:nvPr>
-            <p:ph type="ftr" sz="quarter" idx="11"/>
-          </p:nvPr>
-        </p:nvSpPr>
-        <p:spPr/>
-        <p:txBody>
-          <a:bodyPr/>
-          <a:lstStyle/>
-          <a:p>
-            <a:r>
-              <a:rPr lang="en-GB" dirty="0"/>
-              <a:t>Group A</a:t>
-            </a:r>
-          </a:p>
-        </p:txBody>
-      </p:sp>
-      <p:sp>
-        <p:nvSpPr>
-          <p:cNvPr id="6" name="Foliennummernplatzhalter 5"/>
-          <p:cNvSpPr>
-            <a:spLocks noGrp="1"/>
-          </p:cNvSpPr>
-          <p:nvPr>
-            <p:ph type="sldNum" sz="quarter" idx="12"/>
-          </p:nvPr>
-        </p:nvSpPr>
-        <p:spPr/>
-        <p:txBody>
-          <a:bodyPr/>
-          <a:lstStyle/>
-          <a:p>
             <a:fld id="{6C6AE60A-B69C-4790-82F7-3882EDF23186}" type="slidenum">
               <a:rPr lang="en-GB" smtClean="0"/>
-              <a:pPr/>
               <a:t>3</a:t>
             </a:fld>
             <a:endParaRPr lang="en-GB" dirty="0"/>
@@ -43346,30 +43712,633 @@
       </p:sp>
       <p:sp>
         <p:nvSpPr>
-          <p:cNvPr id="11" name="Titel 10"/>
-          <p:cNvSpPr>
-            <a:spLocks noGrp="1"/>
-          </p:cNvSpPr>
-          <p:nvPr>
-            <p:ph type="title"/>
-          </p:nvPr>
-        </p:nvSpPr>
-        <p:spPr/>
-        <p:txBody>
-          <a:bodyPr/>
+          <p:cNvPr id="9" name="Textfeld 8">
+            <a:extLst>
+              <a:ext uri="{FF2B5EF4-FFF2-40B4-BE49-F238E27FC236}">
+                <a16:creationId xmlns:a16="http://schemas.microsoft.com/office/drawing/2014/main" id="{E01BDD48-F433-4875-954E-0DFA17C62606}"/>
+              </a:ext>
+            </a:extLst>
+          </p:cNvPr>
+          <p:cNvSpPr txBox="1"/>
+          <p:nvPr/>
+        </p:nvSpPr>
+        <p:spPr>
+          <a:xfrm>
+            <a:off x="409789" y="692620"/>
+            <a:ext cx="11449590" cy="523220"/>
+          </a:xfrm>
+          <a:prstGeom prst="rect">
+            <a:avLst/>
+          </a:prstGeom>
+          <a:noFill/>
+        </p:spPr>
+        <p:txBody>
+          <a:bodyPr wrap="square" rtlCol="0">
+            <a:spAutoFit/>
+          </a:bodyPr>
           <a:lstStyle/>
           <a:p>
             <a:r>
-              <a:rPr lang="en-GB" dirty="0"/>
-              <a:t>Made assumptions for the HCN absorber</a:t>
-            </a:r>
-          </a:p>
-        </p:txBody>
-      </p:sp>
+              <a:rPr lang="de-CH" sz="2800" b="1" dirty="0" err="1"/>
+              <a:t>Assumptions</a:t>
+            </a:r>
+            <a:r>
+              <a:rPr lang="de-CH" sz="2800" b="1" dirty="0"/>
+              <a:t> </a:t>
+            </a:r>
+            <a:r>
+              <a:rPr lang="de-CH" sz="2800" b="1" dirty="0" err="1"/>
+              <a:t>for</a:t>
+            </a:r>
+            <a:r>
+              <a:rPr lang="de-CH" sz="2800" b="1" dirty="0"/>
+              <a:t> </a:t>
+            </a:r>
+            <a:r>
+              <a:rPr lang="de-CH" sz="2800" b="1" dirty="0" err="1"/>
+              <a:t>Ammonia</a:t>
+            </a:r>
+            <a:r>
+              <a:rPr lang="de-CH" sz="2800" b="1" dirty="0"/>
+              <a:t> Absorber</a:t>
+            </a:r>
+          </a:p>
+        </p:txBody>
+      </p:sp>
+      <p:grpSp>
+        <p:nvGrpSpPr>
+          <p:cNvPr id="14" name="Gruppieren 13">
+            <a:extLst>
+              <a:ext uri="{FF2B5EF4-FFF2-40B4-BE49-F238E27FC236}">
+                <a16:creationId xmlns:a16="http://schemas.microsoft.com/office/drawing/2014/main" id="{A0A45610-7AFD-45C0-9B8F-D440C877D741}"/>
+              </a:ext>
+            </a:extLst>
+          </p:cNvPr>
+          <p:cNvGrpSpPr/>
+          <p:nvPr/>
+        </p:nvGrpSpPr>
+        <p:grpSpPr>
+          <a:xfrm>
+            <a:off x="580057" y="4041368"/>
+            <a:ext cx="11109054" cy="1791454"/>
+            <a:chOff x="419457" y="3391872"/>
+            <a:chExt cx="11109054" cy="1791454"/>
+          </a:xfrm>
+        </p:grpSpPr>
+        <p:sp>
+          <p:nvSpPr>
+            <p:cNvPr id="10" name="Textfeld 9">
+              <a:extLst>
+                <a:ext uri="{FF2B5EF4-FFF2-40B4-BE49-F238E27FC236}">
+                  <a16:creationId xmlns:a16="http://schemas.microsoft.com/office/drawing/2014/main" id="{C1E6B540-7AB5-4DEA-9935-4D8AF7940D97}"/>
+                </a:ext>
+              </a:extLst>
+            </p:cNvPr>
+            <p:cNvSpPr txBox="1"/>
+            <p:nvPr/>
+          </p:nvSpPr>
+          <p:spPr>
+            <a:xfrm>
+              <a:off x="419457" y="3429000"/>
+              <a:ext cx="5040700" cy="1754326"/>
+            </a:xfrm>
+            <a:prstGeom prst="rect">
+              <a:avLst/>
+            </a:prstGeom>
+            <a:noFill/>
+          </p:spPr>
+          <p:txBody>
+            <a:bodyPr wrap="square" rtlCol="0">
+              <a:spAutoFit/>
+            </a:bodyPr>
+            <a:lstStyle/>
+            <a:p>
+              <a:r>
+                <a:rPr lang="de-CH" b="1" dirty="0"/>
+                <a:t>Ideal </a:t>
+              </a:r>
+              <a:r>
+                <a:rPr lang="de-CH" b="1" dirty="0" err="1"/>
+                <a:t>case</a:t>
+              </a:r>
+              <a:endParaRPr lang="de-CH" b="1" dirty="0"/>
+            </a:p>
+            <a:p>
+              <a:endParaRPr lang="de-CH" dirty="0"/>
+            </a:p>
+            <a:p>
+              <a:pPr marL="285750" indent="-285750">
+                <a:buFont typeface="Wingdings" panose="05000000000000000000" pitchFamily="2" charset="2"/>
+                <a:buChar char="§"/>
+              </a:pPr>
+              <a:r>
+                <a:rPr lang="de-CH" dirty="0"/>
+                <a:t>Heat </a:t>
+              </a:r>
+              <a:r>
+                <a:rPr lang="de-CH" dirty="0" err="1"/>
+                <a:t>capacities</a:t>
+              </a:r>
+              <a:r>
+                <a:rPr lang="de-CH" dirty="0"/>
+                <a:t> </a:t>
+              </a:r>
+              <a:r>
+                <a:rPr lang="de-CH" dirty="0" err="1"/>
+                <a:t>are</a:t>
+              </a:r>
+              <a:r>
+                <a:rPr lang="de-CH" dirty="0"/>
+                <a:t> T </a:t>
+              </a:r>
+              <a:r>
+                <a:rPr lang="de-CH" dirty="0" err="1"/>
+                <a:t>independent</a:t>
+              </a:r>
+              <a:endParaRPr lang="de-CH" dirty="0"/>
+            </a:p>
+            <a:p>
+              <a:pPr marL="285750" indent="-285750">
+                <a:buFont typeface="Wingdings" panose="05000000000000000000" pitchFamily="2" charset="2"/>
+                <a:buChar char="§"/>
+              </a:pPr>
+              <a:endParaRPr lang="de-CH" dirty="0"/>
+            </a:p>
+            <a:p>
+              <a:pPr marL="285750" indent="-285750">
+                <a:buFont typeface="Wingdings" panose="05000000000000000000" pitchFamily="2" charset="2"/>
+                <a:buChar char="§"/>
+              </a:pPr>
+              <a:endParaRPr lang="de-CH" dirty="0"/>
+            </a:p>
+            <a:p>
+              <a:pPr marL="285750" indent="-285750">
+                <a:buFont typeface="Wingdings" panose="05000000000000000000" pitchFamily="2" charset="2"/>
+                <a:buChar char="§"/>
+              </a:pPr>
+              <a:endParaRPr lang="de-CH" dirty="0"/>
+            </a:p>
+          </p:txBody>
+        </p:sp>
+        <p:sp>
+          <p:nvSpPr>
+            <p:cNvPr id="11" name="Textfeld 10">
+              <a:extLst>
+                <a:ext uri="{FF2B5EF4-FFF2-40B4-BE49-F238E27FC236}">
+                  <a16:creationId xmlns:a16="http://schemas.microsoft.com/office/drawing/2014/main" id="{6855DB6C-3273-425C-AC16-D17F5347FA9A}"/>
+                </a:ext>
+              </a:extLst>
+            </p:cNvPr>
+            <p:cNvSpPr txBox="1"/>
+            <p:nvPr/>
+          </p:nvSpPr>
+          <p:spPr>
+            <a:xfrm>
+              <a:off x="6487811" y="3391872"/>
+              <a:ext cx="5040700" cy="1477328"/>
+            </a:xfrm>
+            <a:prstGeom prst="rect">
+              <a:avLst/>
+            </a:prstGeom>
+            <a:noFill/>
+          </p:spPr>
+          <p:txBody>
+            <a:bodyPr wrap="square" rtlCol="0">
+              <a:spAutoFit/>
+            </a:bodyPr>
+            <a:lstStyle/>
+            <a:p>
+              <a:r>
+                <a:rPr lang="de-CH" b="1" dirty="0"/>
+                <a:t>Non ideal </a:t>
+              </a:r>
+              <a:r>
+                <a:rPr lang="de-CH" b="1" dirty="0" err="1"/>
+                <a:t>case</a:t>
+              </a:r>
+              <a:endParaRPr lang="de-CH" b="1" dirty="0"/>
+            </a:p>
+            <a:p>
+              <a:pPr marL="285750" indent="-285750">
+                <a:buFont typeface="Wingdings" panose="05000000000000000000" pitchFamily="2" charset="2"/>
+                <a:buChar char="§"/>
+              </a:pPr>
+              <a:endParaRPr lang="de-CH" dirty="0"/>
+            </a:p>
+            <a:p>
+              <a:pPr marL="285750" indent="-285750">
+                <a:buFont typeface="Wingdings" panose="05000000000000000000" pitchFamily="2" charset="2"/>
+                <a:buChar char="§"/>
+              </a:pPr>
+              <a:r>
+                <a:rPr lang="de-CH" dirty="0"/>
+                <a:t>Heat </a:t>
+              </a:r>
+              <a:r>
+                <a:rPr lang="de-CH" dirty="0" err="1"/>
+                <a:t>capacities</a:t>
+              </a:r>
+              <a:r>
+                <a:rPr lang="de-CH" dirty="0"/>
+                <a:t> </a:t>
+              </a:r>
+              <a:r>
+                <a:rPr lang="de-CH" dirty="0" err="1"/>
+                <a:t>are</a:t>
+              </a:r>
+              <a:r>
+                <a:rPr lang="de-CH" dirty="0"/>
+                <a:t> T </a:t>
+              </a:r>
+              <a:r>
+                <a:rPr lang="de-CH" dirty="0" err="1"/>
+                <a:t>dependent</a:t>
+              </a:r>
+              <a:endParaRPr lang="de-CH" dirty="0"/>
+            </a:p>
+            <a:p>
+              <a:pPr marL="285750" indent="-285750">
+                <a:buFont typeface="Wingdings" panose="05000000000000000000" pitchFamily="2" charset="2"/>
+                <a:buChar char="§"/>
+              </a:pPr>
+              <a:endParaRPr lang="de-CH" dirty="0"/>
+            </a:p>
+            <a:p>
+              <a:pPr marL="285750" indent="-285750">
+                <a:buFont typeface="Wingdings" panose="05000000000000000000" pitchFamily="2" charset="2"/>
+                <a:buChar char="§"/>
+              </a:pPr>
+              <a:endParaRPr lang="de-CH" dirty="0"/>
+            </a:p>
+          </p:txBody>
+        </p:sp>
+      </p:grpSp>
+      <p:grpSp>
+        <p:nvGrpSpPr>
+          <p:cNvPr id="15" name="Gruppieren 14">
+            <a:extLst>
+              <a:ext uri="{FF2B5EF4-FFF2-40B4-BE49-F238E27FC236}">
+                <a16:creationId xmlns:a16="http://schemas.microsoft.com/office/drawing/2014/main" id="{0E1AE58D-949A-4868-A791-3FE8EB8CDE6B}"/>
+              </a:ext>
+            </a:extLst>
+          </p:cNvPr>
+          <p:cNvGrpSpPr/>
+          <p:nvPr/>
+        </p:nvGrpSpPr>
+        <p:grpSpPr>
+          <a:xfrm>
+            <a:off x="419457" y="1484730"/>
+            <a:ext cx="11420334" cy="1785104"/>
+            <a:chOff x="419457" y="1484730"/>
+            <a:chExt cx="11420334" cy="1785104"/>
+          </a:xfrm>
+        </p:grpSpPr>
+        <p:sp>
+          <p:nvSpPr>
+            <p:cNvPr id="12" name="Textfeld 11">
+              <a:extLst>
+                <a:ext uri="{FF2B5EF4-FFF2-40B4-BE49-F238E27FC236}">
+                  <a16:creationId xmlns:a16="http://schemas.microsoft.com/office/drawing/2014/main" id="{708F2FB0-FDD8-432D-A125-D3D19A876A94}"/>
+                </a:ext>
+              </a:extLst>
+            </p:cNvPr>
+            <p:cNvSpPr txBox="1"/>
+            <p:nvPr/>
+          </p:nvSpPr>
+          <p:spPr>
+            <a:xfrm>
+              <a:off x="419457" y="1484730"/>
+              <a:ext cx="5602152" cy="1785104"/>
+            </a:xfrm>
+            <a:prstGeom prst="rect">
+              <a:avLst/>
+            </a:prstGeom>
+            <a:noFill/>
+          </p:spPr>
+          <p:txBody>
+            <a:bodyPr wrap="square" rtlCol="0">
+              <a:spAutoFit/>
+            </a:bodyPr>
+            <a:lstStyle/>
+            <a:p>
+              <a:r>
+                <a:rPr lang="de-CH" sz="2000" b="1" dirty="0"/>
+                <a:t>General</a:t>
+              </a:r>
+            </a:p>
+            <a:p>
+              <a:endParaRPr lang="de-CH" dirty="0"/>
+            </a:p>
+            <a:p>
+              <a:pPr marL="285750" indent="-285750">
+                <a:buFont typeface="Arial" panose="020B0604020202020204" pitchFamily="34" charset="0"/>
+                <a:buChar char="•"/>
+              </a:pPr>
+              <a:r>
+                <a:rPr lang="de-CH" dirty="0" err="1"/>
+                <a:t>Isothermal</a:t>
+              </a:r>
+              <a:r>
+                <a:rPr lang="de-CH" dirty="0"/>
+                <a:t> </a:t>
+              </a:r>
+              <a:r>
+                <a:rPr lang="de-CH" dirty="0" err="1"/>
+                <a:t>column</a:t>
+              </a:r>
+              <a:r>
+                <a:rPr lang="de-CH" dirty="0"/>
+                <a:t>			</a:t>
+              </a:r>
+            </a:p>
+            <a:p>
+              <a:pPr marL="285750" indent="-285750">
+                <a:buFont typeface="Arial" panose="020B0604020202020204" pitchFamily="34" charset="0"/>
+                <a:buChar char="•"/>
+              </a:pPr>
+              <a:r>
+                <a:rPr lang="de-CH" dirty="0" err="1"/>
+                <a:t>Instantaneous</a:t>
+              </a:r>
+              <a:r>
+                <a:rPr lang="de-CH" dirty="0"/>
+                <a:t> &amp; irreversible </a:t>
+              </a:r>
+              <a:r>
+                <a:rPr lang="de-CH" dirty="0" err="1"/>
+                <a:t>reaction</a:t>
+              </a:r>
+              <a:endParaRPr lang="de-CH" dirty="0"/>
+            </a:p>
+            <a:p>
+              <a:pPr marL="285750" indent="-285750">
+                <a:buFont typeface="Arial" panose="020B0604020202020204" pitchFamily="34" charset="0"/>
+                <a:buChar char="•"/>
+              </a:pPr>
+              <a:r>
+                <a:rPr lang="de-CH" dirty="0"/>
+                <a:t>Heat </a:t>
+              </a:r>
+              <a:r>
+                <a:rPr lang="de-CH" dirty="0" err="1"/>
+                <a:t>of</a:t>
+              </a:r>
+              <a:r>
+                <a:rPr lang="de-CH" dirty="0"/>
+                <a:t> </a:t>
+              </a:r>
+              <a:r>
+                <a:rPr lang="de-CH" dirty="0" err="1"/>
+                <a:t>absorption</a:t>
+              </a:r>
+              <a:r>
+                <a:rPr lang="de-CH" dirty="0"/>
+                <a:t> </a:t>
+              </a:r>
+              <a:r>
+                <a:rPr lang="de-CH" dirty="0" err="1"/>
+                <a:t>neglected</a:t>
+              </a:r>
+              <a:endParaRPr lang="de-CH" dirty="0"/>
+            </a:p>
+            <a:p>
+              <a:pPr marL="285750" indent="-285750">
+                <a:buFont typeface="Arial" panose="020B0604020202020204" pitchFamily="34" charset="0"/>
+                <a:buChar char="•"/>
+              </a:pPr>
+              <a:r>
+                <a:rPr lang="de-CH" dirty="0"/>
+                <a:t>Outlet </a:t>
+              </a:r>
+              <a:r>
+                <a:rPr lang="de-CH" dirty="0" err="1"/>
+                <a:t>temperature</a:t>
+              </a:r>
+              <a:r>
+                <a:rPr lang="de-CH" dirty="0"/>
+                <a:t> </a:t>
+              </a:r>
+              <a:r>
+                <a:rPr lang="de-CH" dirty="0" err="1"/>
+                <a:t>for</a:t>
+              </a:r>
+              <a:r>
+                <a:rPr lang="de-CH" dirty="0"/>
+                <a:t> liquid and gas </a:t>
+              </a:r>
+              <a:r>
+                <a:rPr lang="de-CH" dirty="0" err="1"/>
+                <a:t>alike</a:t>
+              </a:r>
+              <a:endParaRPr lang="de-CH" dirty="0"/>
+            </a:p>
+          </p:txBody>
+        </p:sp>
+        <p:sp>
+          <p:nvSpPr>
+            <p:cNvPr id="13" name="Textfeld 12">
+              <a:extLst>
+                <a:ext uri="{FF2B5EF4-FFF2-40B4-BE49-F238E27FC236}">
+                  <a16:creationId xmlns:a16="http://schemas.microsoft.com/office/drawing/2014/main" id="{14841331-643E-47E9-8B53-48457524948C}"/>
+                </a:ext>
+              </a:extLst>
+            </p:cNvPr>
+            <p:cNvSpPr txBox="1"/>
+            <p:nvPr/>
+          </p:nvSpPr>
+          <p:spPr>
+            <a:xfrm>
+              <a:off x="6237639" y="1525641"/>
+              <a:ext cx="5602152" cy="1477328"/>
+            </a:xfrm>
+            <a:prstGeom prst="rect">
+              <a:avLst/>
+            </a:prstGeom>
+            <a:noFill/>
+          </p:spPr>
+          <p:txBody>
+            <a:bodyPr wrap="square" rtlCol="0">
+              <a:spAutoFit/>
+            </a:bodyPr>
+            <a:lstStyle/>
+            <a:p>
+              <a:endParaRPr lang="de-CH" dirty="0"/>
+            </a:p>
+            <a:p>
+              <a:endParaRPr lang="de-CH" dirty="0"/>
+            </a:p>
+            <a:p>
+              <a:pPr marL="285750" indent="-285750">
+                <a:buFont typeface="Arial" panose="020B0604020202020204" pitchFamily="34" charset="0"/>
+                <a:buChar char="•"/>
+              </a:pPr>
+              <a:r>
+                <a:rPr lang="de-CH" dirty="0" err="1"/>
+                <a:t>No</a:t>
+              </a:r>
+              <a:r>
+                <a:rPr lang="de-CH" dirty="0"/>
+                <a:t> HCN </a:t>
+              </a:r>
+              <a:r>
+                <a:rPr lang="de-CH" dirty="0" err="1"/>
+                <a:t>absorption</a:t>
+              </a:r>
+              <a:r>
+                <a:rPr lang="de-CH" dirty="0"/>
+                <a:t> in </a:t>
+              </a:r>
+              <a:r>
+                <a:rPr lang="de-CH" dirty="0" err="1"/>
+                <a:t>water</a:t>
+              </a:r>
+              <a:endParaRPr lang="de-CH" dirty="0"/>
+            </a:p>
+            <a:p>
+              <a:pPr marL="285750" indent="-285750">
+                <a:buFont typeface="Arial" panose="020B0604020202020204" pitchFamily="34" charset="0"/>
+                <a:buChar char="•"/>
+              </a:pPr>
+              <a:r>
+                <a:rPr lang="de-CH" dirty="0" err="1"/>
+                <a:t>No</a:t>
+              </a:r>
+              <a:r>
+                <a:rPr lang="de-CH" dirty="0"/>
+                <a:t> </a:t>
+              </a:r>
+              <a:r>
+                <a:rPr lang="de-CH" dirty="0" err="1"/>
+                <a:t>pressure</a:t>
+              </a:r>
+              <a:r>
+                <a:rPr lang="de-CH" dirty="0"/>
+                <a:t> </a:t>
+              </a:r>
+              <a:r>
+                <a:rPr lang="de-CH" dirty="0" err="1"/>
+                <a:t>drop</a:t>
+              </a:r>
+              <a:endParaRPr lang="de-CH" dirty="0"/>
+            </a:p>
+            <a:p>
+              <a:pPr marL="285750" indent="-285750">
+                <a:buFont typeface="Arial" panose="020B0604020202020204" pitchFamily="34" charset="0"/>
+                <a:buChar char="•"/>
+              </a:pPr>
+              <a:r>
+                <a:rPr lang="de-CH" dirty="0"/>
+                <a:t>20 % </a:t>
+              </a:r>
+              <a:r>
+                <a:rPr lang="de-CH" dirty="0" err="1"/>
+                <a:t>excess</a:t>
+              </a:r>
+              <a:r>
+                <a:rPr lang="de-CH" dirty="0"/>
+                <a:t> </a:t>
+              </a:r>
+              <a:r>
+                <a:rPr lang="de-CH" dirty="0" err="1"/>
+                <a:t>of</a:t>
+              </a:r>
+              <a:r>
+                <a:rPr lang="de-CH" dirty="0"/>
+                <a:t> </a:t>
+              </a:r>
+              <a:r>
+                <a:rPr lang="de-CH" dirty="0" err="1"/>
+                <a:t>sulfuric</a:t>
+              </a:r>
+              <a:r>
+                <a:rPr lang="de-CH" dirty="0"/>
+                <a:t> </a:t>
+              </a:r>
+              <a:r>
+                <a:rPr lang="de-CH" dirty="0" err="1"/>
+                <a:t>acid</a:t>
+              </a:r>
+              <a:endParaRPr lang="de-CH" dirty="0"/>
+            </a:p>
+          </p:txBody>
+        </p:sp>
+      </p:grpSp>
+      <p:pic>
+        <p:nvPicPr>
+          <p:cNvPr id="3" name="Grafik 2">
+            <a:extLst>
+              <a:ext uri="{FF2B5EF4-FFF2-40B4-BE49-F238E27FC236}">
+                <a16:creationId xmlns:a16="http://schemas.microsoft.com/office/drawing/2014/main" id="{626E4691-0EC4-4A23-94AF-3E6B499A3E35}"/>
+              </a:ext>
+            </a:extLst>
+          </p:cNvPr>
+          <p:cNvPicPr>
+            <a:picLocks noChangeAspect="1"/>
+          </p:cNvPicPr>
+          <p:nvPr/>
+        </p:nvPicPr>
+        <p:blipFill>
+          <a:blip r:embed="rId2">
+            <a:extLst>
+              <a:ext uri="{28A0092B-C50C-407E-A947-70E740481C1C}">
+                <a14:useLocalDpi xmlns:a14="http://schemas.microsoft.com/office/drawing/2010/main" val="0"/>
+              </a:ext>
+            </a:extLst>
+          </a:blip>
+          <a:stretch>
+            <a:fillRect/>
+          </a:stretch>
+        </p:blipFill>
+        <p:spPr>
+          <a:xfrm>
+            <a:off x="5085479" y="5331669"/>
+            <a:ext cx="6773900" cy="833711"/>
+          </a:xfrm>
+          <a:prstGeom prst="rect">
+            <a:avLst/>
+          </a:prstGeom>
+        </p:spPr>
+      </p:pic>
+      <p:pic>
+        <p:nvPicPr>
+          <p:cNvPr id="8" name="Grafik 7">
+            <a:extLst>
+              <a:ext uri="{FF2B5EF4-FFF2-40B4-BE49-F238E27FC236}">
+                <a16:creationId xmlns:a16="http://schemas.microsoft.com/office/drawing/2014/main" id="{F62DB472-57DE-44CF-AB8A-65ACA633BD6B}"/>
+              </a:ext>
+            </a:extLst>
+          </p:cNvPr>
+          <p:cNvPicPr>
+            <a:picLocks noChangeAspect="1"/>
+          </p:cNvPicPr>
+          <p:nvPr/>
+        </p:nvPicPr>
+        <p:blipFill>
+          <a:blip r:embed="rId3">
+            <a:extLst>
+              <a:ext uri="{28A0092B-C50C-407E-A947-70E740481C1C}">
+                <a14:useLocalDpi xmlns:a14="http://schemas.microsoft.com/office/drawing/2010/main" val="0"/>
+              </a:ext>
+            </a:extLst>
+          </a:blip>
+          <a:stretch>
+            <a:fillRect/>
+          </a:stretch>
+        </p:blipFill>
+        <p:spPr>
+          <a:xfrm>
+            <a:off x="507019" y="5460698"/>
+            <a:ext cx="3940513" cy="595330"/>
+          </a:xfrm>
+          <a:prstGeom prst="rect">
+            <a:avLst/>
+          </a:prstGeom>
+        </p:spPr>
+      </p:pic>
     </p:spTree>
     <p:extLst>
       <p:ext uri="{BB962C8B-B14F-4D97-AF65-F5344CB8AC3E}">
-        <p14:creationId xmlns:p14="http://schemas.microsoft.com/office/powerpoint/2010/main" val="239499201"/>
+        <p14:creationId xmlns:p14="http://schemas.microsoft.com/office/powerpoint/2010/main" val="2890124435"/>
       </p:ext>
     </p:extLst>
   </p:cSld>
@@ -43399,47 +44368,41 @@
           <a:chExt cx="0" cy="0"/>
         </a:xfrm>
       </p:grpSpPr>
-      <p:pic>
-        <p:nvPicPr>
-          <p:cNvPr id="9" name="Inhaltsplatzhalter 8">
+      <p:sp>
+        <p:nvSpPr>
+          <p:cNvPr id="4" name="Datumsplatzhalter 3">
             <a:extLst>
               <a:ext uri="{FF2B5EF4-FFF2-40B4-BE49-F238E27FC236}">
-                <a16:creationId xmlns:a16="http://schemas.microsoft.com/office/drawing/2014/main" id="{2D2110E3-83BC-4D4A-81C6-243EDC7E1901}"/>
+                <a16:creationId xmlns:a16="http://schemas.microsoft.com/office/drawing/2014/main" id="{2FDE3256-08BD-49EA-BADD-47E5137E8247}"/>
               </a:ext>
             </a:extLst>
           </p:cNvPr>
-          <p:cNvPicPr>
-            <a:picLocks noGrp="1" noChangeAspect="1"/>
-          </p:cNvPicPr>
-          <p:nvPr>
-            <p:ph sz="half" idx="1"/>
-          </p:nvPr>
-        </p:nvPicPr>
-        <p:blipFill>
-          <a:blip r:embed="rId2">
-            <a:extLst>
-              <a:ext uri="{28A0092B-C50C-407E-A947-70E740481C1C}">
-                <a14:useLocalDpi xmlns:a14="http://schemas.microsoft.com/office/drawing/2010/main" val="0"/>
-              </a:ext>
-            </a:extLst>
-          </a:blip>
-          <a:stretch>
-            <a:fillRect/>
-          </a:stretch>
-        </p:blipFill>
-        <p:spPr>
-          <a:xfrm>
-            <a:off x="323850" y="2039342"/>
-            <a:ext cx="5576888" cy="4182666"/>
-          </a:xfrm>
-        </p:spPr>
-      </p:pic>
-      <p:sp>
-        <p:nvSpPr>
-          <p:cNvPr id="7" name="Inhaltsplatzhalter 6">
+          <p:cNvSpPr>
+            <a:spLocks noGrp="1"/>
+          </p:cNvSpPr>
+          <p:nvPr>
+            <p:ph type="dt" sz="half" idx="10"/>
+          </p:nvPr>
+        </p:nvSpPr>
+        <p:spPr/>
+        <p:txBody>
+          <a:bodyPr/>
+          <a:lstStyle/>
+          <a:p>
+            <a:r>
+              <a:rPr lang="fr-CH"/>
+              <a:t>23.05.2018</a:t>
+            </a:r>
+            <a:endParaRPr lang="en-GB" dirty="0"/>
+          </a:p>
+        </p:txBody>
+      </p:sp>
+      <p:sp>
+        <p:nvSpPr>
+          <p:cNvPr id="5" name="Fußzeilenplatzhalter 4">
             <a:extLst>
               <a:ext uri="{FF2B5EF4-FFF2-40B4-BE49-F238E27FC236}">
-                <a16:creationId xmlns:a16="http://schemas.microsoft.com/office/drawing/2014/main" id="{6D488CB4-429D-D64C-AE82-45FE5567DC4A}"/>
+                <a16:creationId xmlns:a16="http://schemas.microsoft.com/office/drawing/2014/main" id="{85919C73-4F1B-4A65-BC56-A2BD4020C9A3}"/>
               </a:ext>
             </a:extLst>
           </p:cNvPr>
@@ -43447,188 +44410,28 @@
             <a:spLocks noGrp="1"/>
           </p:cNvSpPr>
           <p:nvPr>
-            <p:ph sz="half" idx="2"/>
-          </p:nvPr>
-        </p:nvSpPr>
-        <p:spPr>
-          <a:xfrm>
-            <a:off x="6294595" y="2996940"/>
-            <a:ext cx="5567205" cy="4213225"/>
-          </a:xfrm>
-        </p:spPr>
+            <p:ph type="ftr" sz="quarter" idx="11"/>
+          </p:nvPr>
+        </p:nvSpPr>
+        <p:spPr/>
         <p:txBody>
           <a:bodyPr/>
           <a:lstStyle/>
           <a:p>
             <a:r>
-              <a:rPr lang="de-DE" dirty="0"/>
-              <a:t>Height </a:t>
-            </a:r>
-            <a:r>
-              <a:rPr lang="de-DE" dirty="0" err="1"/>
-              <a:t>of</a:t>
-            </a:r>
-            <a:r>
-              <a:rPr lang="de-DE" dirty="0"/>
-              <a:t> </a:t>
-            </a:r>
-            <a:r>
-              <a:rPr lang="de-DE" dirty="0" err="1"/>
-              <a:t>the</a:t>
-            </a:r>
-            <a:r>
-              <a:rPr lang="de-DE" dirty="0"/>
-              <a:t> </a:t>
-            </a:r>
-            <a:r>
-              <a:rPr lang="de-DE" dirty="0" err="1"/>
-              <a:t>column</a:t>
-            </a:r>
-            <a:r>
-              <a:rPr lang="de-DE" dirty="0"/>
-              <a:t> </a:t>
-            </a:r>
-            <a:r>
-              <a:rPr lang="de-DE" dirty="0" err="1"/>
-              <a:t>increases</a:t>
-            </a:r>
-            <a:r>
-              <a:rPr lang="de-DE" dirty="0"/>
-              <a:t> </a:t>
-            </a:r>
-            <a:r>
-              <a:rPr lang="de-DE" dirty="0" err="1"/>
-              <a:t>with</a:t>
-            </a:r>
-            <a:r>
-              <a:rPr lang="de-DE" dirty="0"/>
-              <a:t> </a:t>
-            </a:r>
-            <a:r>
-              <a:rPr lang="de-DE" dirty="0" err="1"/>
-              <a:t>decreasing</a:t>
-            </a:r>
-            <a:r>
-              <a:rPr lang="de-DE" dirty="0"/>
-              <a:t> </a:t>
-            </a:r>
-            <a:r>
-              <a:rPr lang="de-DE" dirty="0" err="1"/>
-              <a:t>inlet</a:t>
-            </a:r>
-            <a:r>
-              <a:rPr lang="de-DE" dirty="0"/>
-              <a:t> liquid </a:t>
-            </a:r>
-            <a:r>
-              <a:rPr lang="de-DE" dirty="0" err="1"/>
-              <a:t>flow</a:t>
-            </a:r>
-            <a:endParaRPr lang="de-DE" dirty="0"/>
-          </a:p>
-          <a:p>
-            <a:r>
-              <a:rPr lang="de-DE" dirty="0" err="1"/>
-              <a:t>Better</a:t>
-            </a:r>
-            <a:r>
-              <a:rPr lang="de-DE" dirty="0"/>
-              <a:t> </a:t>
-            </a:r>
-            <a:r>
-              <a:rPr lang="de-DE" dirty="0" err="1"/>
-              <a:t>absorption</a:t>
-            </a:r>
-            <a:endParaRPr lang="de-DE" dirty="0"/>
-          </a:p>
-          <a:p>
-            <a:r>
-              <a:rPr lang="de-DE" dirty="0"/>
-              <a:t>CAPEX </a:t>
-            </a:r>
-            <a:r>
-              <a:rPr lang="de-DE" dirty="0" err="1"/>
-              <a:t>decreases</a:t>
-            </a:r>
-            <a:endParaRPr lang="de-DE" dirty="0"/>
-          </a:p>
-          <a:p>
-            <a:r>
-              <a:rPr lang="de-DE" dirty="0"/>
-              <a:t>OPEX </a:t>
-            </a:r>
-            <a:r>
-              <a:rPr lang="de-DE" dirty="0" err="1"/>
-              <a:t>increases</a:t>
-            </a:r>
-            <a:endParaRPr lang="de-DE" dirty="0"/>
-          </a:p>
-        </p:txBody>
-      </p:sp>
-      <p:sp>
-        <p:nvSpPr>
-          <p:cNvPr id="2" name="Datumsplatzhalter 1">
+              <a:rPr lang="en-GB"/>
+              <a:t>Group A</a:t>
+            </a:r>
+            <a:endParaRPr lang="en-GB" dirty="0"/>
+          </a:p>
+        </p:txBody>
+      </p:sp>
+      <p:sp>
+        <p:nvSpPr>
+          <p:cNvPr id="6" name="Foliennummernplatzhalter 5">
             <a:extLst>
               <a:ext uri="{FF2B5EF4-FFF2-40B4-BE49-F238E27FC236}">
-                <a16:creationId xmlns:a16="http://schemas.microsoft.com/office/drawing/2014/main" id="{35ABBF7B-96D1-6E4F-8290-F0AC49418229}"/>
-              </a:ext>
-            </a:extLst>
-          </p:cNvPr>
-          <p:cNvSpPr>
-            <a:spLocks noGrp="1"/>
-          </p:cNvSpPr>
-          <p:nvPr>
-            <p:ph type="dt" sz="half" idx="10"/>
-          </p:nvPr>
-        </p:nvSpPr>
-        <p:spPr/>
-        <p:txBody>
-          <a:bodyPr/>
-          <a:lstStyle/>
-          <a:p>
-            <a:r>
-              <a:rPr lang="fr-CH"/>
-              <a:t>23.05.2018</a:t>
-            </a:r>
-            <a:endParaRPr lang="en-GB" dirty="0"/>
-          </a:p>
-        </p:txBody>
-      </p:sp>
-      <p:sp>
-        <p:nvSpPr>
-          <p:cNvPr id="3" name="Fußzeilenplatzhalter 2">
-            <a:extLst>
-              <a:ext uri="{FF2B5EF4-FFF2-40B4-BE49-F238E27FC236}">
-                <a16:creationId xmlns:a16="http://schemas.microsoft.com/office/drawing/2014/main" id="{4127C30E-F535-FA47-9C07-E1BCED3EFC52}"/>
-              </a:ext>
-            </a:extLst>
-          </p:cNvPr>
-          <p:cNvSpPr>
-            <a:spLocks noGrp="1"/>
-          </p:cNvSpPr>
-          <p:nvPr>
-            <p:ph type="ftr" sz="quarter" idx="11"/>
-          </p:nvPr>
-        </p:nvSpPr>
-        <p:spPr/>
-        <p:txBody>
-          <a:bodyPr/>
-          <a:lstStyle/>
-          <a:p>
-            <a:r>
-              <a:rPr lang="en-GB"/>
-              <a:t>Group A</a:t>
-            </a:r>
-            <a:endParaRPr lang="en-GB" dirty="0"/>
-          </a:p>
-        </p:txBody>
-      </p:sp>
-      <p:sp>
-        <p:nvSpPr>
-          <p:cNvPr id="4" name="Foliennummernplatzhalter 3">
-            <a:extLst>
-              <a:ext uri="{FF2B5EF4-FFF2-40B4-BE49-F238E27FC236}">
-                <a16:creationId xmlns:a16="http://schemas.microsoft.com/office/drawing/2014/main" id="{C88BF33C-BAF6-464F-B278-84B3B0CB6B82}"/>
+                <a16:creationId xmlns:a16="http://schemas.microsoft.com/office/drawing/2014/main" id="{3AC6906F-C695-42D0-8B48-6E39679D048F}"/>
               </a:ext>
             </a:extLst>
           </p:cNvPr>
@@ -43652,58 +44455,158 @@
           </a:p>
         </p:txBody>
       </p:sp>
-      <p:sp>
-        <p:nvSpPr>
-          <p:cNvPr id="5" name="Titel 4">
+      <p:grpSp>
+        <p:nvGrpSpPr>
+          <p:cNvPr id="14" name="Gruppieren 13">
             <a:extLst>
               <a:ext uri="{FF2B5EF4-FFF2-40B4-BE49-F238E27FC236}">
-                <a16:creationId xmlns:a16="http://schemas.microsoft.com/office/drawing/2014/main" id="{2AD82122-56E2-FD4B-B6AC-2B56FB45F00B}"/>
+                <a16:creationId xmlns:a16="http://schemas.microsoft.com/office/drawing/2014/main" id="{1C5DACA3-5790-4ACA-A8B0-83A51B447AE1}"/>
               </a:ext>
             </a:extLst>
           </p:cNvPr>
-          <p:cNvSpPr>
-            <a:spLocks noGrp="1"/>
-          </p:cNvSpPr>
-          <p:nvPr>
-            <p:ph type="title"/>
-          </p:nvPr>
-        </p:nvSpPr>
-        <p:spPr/>
-        <p:txBody>
-          <a:bodyPr/>
+          <p:cNvGrpSpPr/>
+          <p:nvPr/>
+        </p:nvGrpSpPr>
+        <p:grpSpPr>
+          <a:xfrm>
+            <a:off x="614650" y="1628750"/>
+            <a:ext cx="11253993" cy="4265477"/>
+            <a:chOff x="528416" y="1496752"/>
+            <a:chExt cx="10718657" cy="3864495"/>
+          </a:xfrm>
+        </p:grpSpPr>
+        <p:pic>
+          <p:nvPicPr>
+            <p:cNvPr id="10" name="Grafik 9">
+              <a:extLst>
+                <a:ext uri="{FF2B5EF4-FFF2-40B4-BE49-F238E27FC236}">
+                  <a16:creationId xmlns:a16="http://schemas.microsoft.com/office/drawing/2014/main" id="{01B0C16B-8264-44E9-81FE-9E65721B1ABE}"/>
+                </a:ext>
+              </a:extLst>
+            </p:cNvPr>
+            <p:cNvPicPr>
+              <a:picLocks noChangeAspect="1"/>
+            </p:cNvPicPr>
+            <p:nvPr/>
+          </p:nvPicPr>
+          <p:blipFill>
+            <a:blip r:embed="rId2">
+              <a:extLst>
+                <a:ext uri="{28A0092B-C50C-407E-A947-70E740481C1C}">
+                  <a14:useLocalDpi xmlns:a14="http://schemas.microsoft.com/office/drawing/2010/main" val="0"/>
+                </a:ext>
+              </a:extLst>
+            </a:blip>
+            <a:stretch>
+              <a:fillRect/>
+            </a:stretch>
+          </p:blipFill>
+          <p:spPr>
+            <a:xfrm>
+              <a:off x="528416" y="1496752"/>
+              <a:ext cx="5152660" cy="3864495"/>
+            </a:xfrm>
+            <a:prstGeom prst="rect">
+              <a:avLst/>
+            </a:prstGeom>
+          </p:spPr>
+        </p:pic>
+        <p:pic>
+          <p:nvPicPr>
+            <p:cNvPr id="12" name="Grafik 11">
+              <a:extLst>
+                <a:ext uri="{FF2B5EF4-FFF2-40B4-BE49-F238E27FC236}">
+                  <a16:creationId xmlns:a16="http://schemas.microsoft.com/office/drawing/2014/main" id="{72BEA4AF-5046-47EE-81D4-6FD0A4B2471E}"/>
+                </a:ext>
+              </a:extLst>
+            </p:cNvPr>
+            <p:cNvPicPr>
+              <a:picLocks noChangeAspect="1"/>
+            </p:cNvPicPr>
+            <p:nvPr/>
+          </p:nvPicPr>
+          <p:blipFill>
+            <a:blip r:embed="rId3">
+              <a:extLst>
+                <a:ext uri="{28A0092B-C50C-407E-A947-70E740481C1C}">
+                  <a14:useLocalDpi xmlns:a14="http://schemas.microsoft.com/office/drawing/2010/main" val="0"/>
+                </a:ext>
+              </a:extLst>
+            </a:blip>
+            <a:stretch>
+              <a:fillRect/>
+            </a:stretch>
+          </p:blipFill>
+          <p:spPr>
+            <a:xfrm>
+              <a:off x="6094413" y="1496752"/>
+              <a:ext cx="5152660" cy="3864495"/>
+            </a:xfrm>
+            <a:prstGeom prst="rect">
+              <a:avLst/>
+            </a:prstGeom>
+          </p:spPr>
+        </p:pic>
+      </p:grpSp>
+      <p:sp>
+        <p:nvSpPr>
+          <p:cNvPr id="13" name="Textfeld 12">
+            <a:extLst>
+              <a:ext uri="{FF2B5EF4-FFF2-40B4-BE49-F238E27FC236}">
+                <a16:creationId xmlns:a16="http://schemas.microsoft.com/office/drawing/2014/main" id="{46CEF1EC-6307-4482-BF82-CBE6E1A51417}"/>
+              </a:ext>
+            </a:extLst>
+          </p:cNvPr>
+          <p:cNvSpPr txBox="1"/>
+          <p:nvPr/>
+        </p:nvSpPr>
+        <p:spPr>
+          <a:xfrm>
+            <a:off x="472893" y="834751"/>
+            <a:ext cx="11152011" cy="492443"/>
+          </a:xfrm>
+          <a:prstGeom prst="rect">
+            <a:avLst/>
+          </a:prstGeom>
+          <a:noFill/>
+        </p:spPr>
+        <p:txBody>
+          <a:bodyPr wrap="square" rtlCol="0">
+            <a:spAutoFit/>
+          </a:bodyPr>
           <a:lstStyle/>
           <a:p>
             <a:r>
-              <a:rPr lang="de-DE" dirty="0" err="1"/>
+              <a:rPr lang="de-CH" sz="2600" b="1" dirty="0" err="1"/>
               <a:t>Sensitivity</a:t>
             </a:r>
             <a:r>
-              <a:rPr lang="de-DE" dirty="0"/>
+              <a:rPr lang="de-CH" sz="2600" b="1" dirty="0"/>
+              <a:t> Analysis </a:t>
+            </a:r>
+            <a:r>
+              <a:rPr lang="de-CH" sz="2600" b="1" dirty="0" err="1"/>
+              <a:t>of</a:t>
+            </a:r>
+            <a:r>
+              <a:rPr lang="de-CH" sz="2600" b="1" dirty="0"/>
               <a:t> </a:t>
             </a:r>
             <a:r>
-              <a:rPr lang="de-DE" dirty="0" err="1"/>
-              <a:t>analysis</a:t>
-            </a:r>
-            <a:r>
-              <a:rPr lang="de-DE" dirty="0"/>
+              <a:rPr lang="de-CH" sz="2600" b="1" dirty="0" err="1"/>
+              <a:t>the</a:t>
+            </a:r>
+            <a:r>
+              <a:rPr lang="de-CH" sz="2600" b="1" dirty="0"/>
               <a:t> </a:t>
             </a:r>
             <a:r>
-              <a:rPr lang="de-DE" dirty="0" err="1"/>
-              <a:t>of</a:t>
-            </a:r>
-            <a:r>
-              <a:rPr lang="de-DE" dirty="0"/>
-              <a:t> </a:t>
-            </a:r>
-            <a:r>
-              <a:rPr lang="de-DE" dirty="0" err="1"/>
-              <a:t>the</a:t>
-            </a:r>
-            <a:r>
-              <a:rPr lang="de-DE" dirty="0"/>
-              <a:t> HCN Absorber</a:t>
+              <a:rPr lang="de-CH" sz="2600" b="1" dirty="0" err="1"/>
+              <a:t>Ammonia</a:t>
+            </a:r>
+            <a:r>
+              <a:rPr lang="de-CH" sz="2600" b="1" dirty="0"/>
+              <a:t> Absorber</a:t>
             </a:r>
           </a:p>
         </p:txBody>
@@ -43711,7 +44614,7 @@
     </p:spTree>
     <p:extLst>
       <p:ext uri="{BB962C8B-B14F-4D97-AF65-F5344CB8AC3E}">
-        <p14:creationId xmlns:p14="http://schemas.microsoft.com/office/powerpoint/2010/main" val="857607359"/>
+        <p14:creationId xmlns:p14="http://schemas.microsoft.com/office/powerpoint/2010/main" val="3761759683"/>
       </p:ext>
     </p:extLst>
   </p:cSld>
@@ -43743,20 +44646,15 @@
       </p:grpSpPr>
       <p:sp>
         <p:nvSpPr>
-          <p:cNvPr id="11" name="Inhaltsplatzhalter 10"/>
-          <p:cNvSpPr>
-            <a:spLocks noGrp="1"/>
-          </p:cNvSpPr>
-          <p:nvPr>
-            <p:ph idx="1"/>
-          </p:nvPr>
-        </p:nvSpPr>
-        <p:spPr>
-          <a:xfrm>
-            <a:off x="323850" y="1268700"/>
-            <a:ext cx="11537950" cy="4965410"/>
-          </a:xfrm>
-        </p:spPr>
+          <p:cNvPr id="12" name="Inhaltsplatzhalter 11"/>
+          <p:cNvSpPr>
+            <a:spLocks noGrp="1"/>
+          </p:cNvSpPr>
+          <p:nvPr>
+            <p:ph sz="half" idx="1"/>
+          </p:nvPr>
+        </p:nvSpPr>
+        <p:spPr/>
         <p:txBody>
           <a:bodyPr/>
           <a:lstStyle/>
@@ -43764,92 +44662,119 @@
             <a:pPr marL="0" indent="0">
               <a:buNone/>
             </a:pPr>
-            <a:endParaRPr lang="en-GB" dirty="0"/>
-          </a:p>
+            <a:r>
+              <a:rPr lang="en-GB" b="1" dirty="0"/>
+              <a:t>Ideal case</a:t>
+            </a:r>
+          </a:p>
+          <a:p>
+            <a:endParaRPr lang="en-GB" dirty="0"/>
+          </a:p>
+          <a:p>
+            <a:r>
+              <a:rPr lang="en-GB" dirty="0"/>
+              <a:t>Isothermal column</a:t>
+            </a:r>
+          </a:p>
+          <a:p>
+            <a:r>
+              <a:rPr lang="en-GB" dirty="0"/>
+              <a:t>Heat of absorption neglected</a:t>
+            </a:r>
+          </a:p>
+          <a:p>
+            <a:r>
+              <a:rPr lang="en-GB" dirty="0"/>
+              <a:t>Outlet temperature same for gas and liquid</a:t>
+            </a:r>
+          </a:p>
+          <a:p>
+            <a:r>
+              <a:rPr lang="en-GB" dirty="0"/>
+              <a:t>Only HCN is absorbed</a:t>
+            </a:r>
+          </a:p>
+          <a:p>
+            <a:r>
+              <a:rPr lang="en-GB" dirty="0"/>
+              <a:t>Heat capacities not temperature dependent</a:t>
+            </a:r>
+          </a:p>
+          <a:p>
+            <a:r>
+              <a:rPr lang="en-GB" dirty="0"/>
+              <a:t>No HCN in liquid inlet stream</a:t>
+            </a:r>
+          </a:p>
+          <a:p>
+            <a:r>
+              <a:rPr lang="en-GB" dirty="0"/>
+              <a:t>Resistivity in the liquid phase neglected</a:t>
+            </a:r>
+          </a:p>
+          <a:p>
+            <a:endParaRPr lang="en-GB" dirty="0"/>
+          </a:p>
+          <a:p>
+            <a:endParaRPr lang="en-GB" dirty="0"/>
+          </a:p>
+        </p:txBody>
+      </p:sp>
+      <p:sp>
+        <p:nvSpPr>
+          <p:cNvPr id="13" name="Inhaltsplatzhalter 12"/>
+          <p:cNvSpPr>
+            <a:spLocks noGrp="1"/>
+          </p:cNvSpPr>
+          <p:nvPr>
+            <p:ph sz="half" idx="2"/>
+          </p:nvPr>
+        </p:nvSpPr>
+        <p:spPr/>
+        <p:txBody>
+          <a:bodyPr/>
+          <a:lstStyle/>
           <a:p>
             <a:pPr marL="0" indent="0">
               <a:buNone/>
             </a:pPr>
             <a:r>
+              <a:rPr lang="en-GB" b="1" dirty="0"/>
+              <a:t>Non-ideal case</a:t>
+            </a:r>
+          </a:p>
+          <a:p>
+            <a:endParaRPr lang="en-GB" dirty="0"/>
+          </a:p>
+          <a:p>
+            <a:r>
               <a:rPr lang="en-GB" dirty="0"/>
-              <a:t>Reactor:</a:t>
+              <a:t>Isothermal column</a:t>
             </a:r>
           </a:p>
           <a:p>
             <a:r>
               <a:rPr lang="en-GB" dirty="0"/>
-              <a:t>Ideal vs. real (case 1/case 3)</a:t>
-            </a:r>
-          </a:p>
-          <a:p>
-            <a:pPr lvl="1"/>
+              <a:t>Heat of absorption neglected</a:t>
+            </a:r>
+          </a:p>
+          <a:p>
             <a:r>
               <a:rPr lang="en-GB" dirty="0"/>
-              <a:t>Length: 12 m / 28 m</a:t>
-            </a:r>
-          </a:p>
-          <a:p>
-            <a:pPr lvl="1"/>
+              <a:t>Outlet temperature same for gas and liquid</a:t>
+            </a:r>
+          </a:p>
+          <a:p>
             <a:r>
               <a:rPr lang="en-GB" dirty="0"/>
-              <a:t>Number of tubes: 1’342 / 17’149</a:t>
-            </a:r>
-          </a:p>
-          <a:p>
-            <a:pPr marL="361950" lvl="1" indent="0">
-              <a:buNone/>
-            </a:pPr>
-            <a:endParaRPr lang="en-GB" dirty="0"/>
-          </a:p>
-          <a:p>
-            <a:r>
-              <a:rPr lang="en-GB" dirty="0"/>
-              <a:t>Co- vs. counter-current (case 3/case 4)</a:t>
-            </a:r>
-          </a:p>
-          <a:p>
-            <a:pPr lvl="1">
-              <a:buFont typeface="Wingdings" charset="2"/>
-              <a:buChar char="§"/>
-            </a:pPr>
-            <a:r>
-              <a:rPr lang="en-GB" dirty="0"/>
-              <a:t>Number of tubes: 17’149 / 40’642</a:t>
-            </a:r>
-          </a:p>
-          <a:p>
-            <a:pPr lvl="1">
-              <a:buFont typeface="Wingdings" charset="2"/>
-              <a:buChar char="§"/>
-            </a:pPr>
-            <a:r>
-              <a:rPr lang="en-GB" dirty="0"/>
-              <a:t>Heating medium flow: 0.10 / 0.05</a:t>
-            </a:r>
-          </a:p>
-          <a:p>
-            <a:pPr lvl="1">
-              <a:buFont typeface="Wingdings" charset="2"/>
-              <a:buChar char="§"/>
-            </a:pPr>
-            <a:r>
-              <a:rPr lang="en-GB" dirty="0"/>
-              <a:t>Conversion CH</a:t>
-            </a:r>
-            <a:r>
-              <a:rPr lang="en-GB" baseline="-25000" dirty="0"/>
-              <a:t>4</a:t>
-            </a:r>
-            <a:r>
-              <a:rPr lang="en-GB" dirty="0"/>
-              <a:t>: 0.82 / 0.59</a:t>
-            </a:r>
-          </a:p>
-        </p:txBody>
-      </p:sp>
-      <p:sp>
-        <p:nvSpPr>
-          <p:cNvPr id="3" name="Datumsplatzhalter 2"/>
+              <a:t>Only HCN is absorbed</a:t>
+            </a:r>
+          </a:p>
+        </p:txBody>
+      </p:sp>
+      <p:sp>
+        <p:nvSpPr>
+          <p:cNvPr id="4" name="Datumsplatzhalter 3"/>
           <p:cNvSpPr>
             <a:spLocks noGrp="1"/>
           </p:cNvSpPr>
@@ -43872,7 +44797,7 @@
       </p:sp>
       <p:sp>
         <p:nvSpPr>
-          <p:cNvPr id="4" name="Fußzeilenplatzhalter 3"/>
+          <p:cNvPr id="5" name="Fußzeilenplatzhalter 4"/>
           <p:cNvSpPr>
             <a:spLocks noGrp="1"/>
           </p:cNvSpPr>
@@ -43886,16 +44811,15 @@
           <a:lstStyle/>
           <a:p>
             <a:r>
-              <a:rPr lang="en-GB"/>
+              <a:rPr lang="en-GB" dirty="0"/>
               <a:t>Group A</a:t>
             </a:r>
-            <a:endParaRPr lang="en-GB" dirty="0"/>
-          </a:p>
-        </p:txBody>
-      </p:sp>
-      <p:sp>
-        <p:nvSpPr>
-          <p:cNvPr id="5" name="Foliennummernplatzhalter 4"/>
+          </a:p>
+        </p:txBody>
+      </p:sp>
+      <p:sp>
+        <p:nvSpPr>
+          <p:cNvPr id="6" name="Foliennummernplatzhalter 5"/>
           <p:cNvSpPr>
             <a:spLocks noGrp="1"/>
           </p:cNvSpPr>
@@ -43919,7 +44843,7 @@
       </p:sp>
       <p:sp>
         <p:nvSpPr>
-          <p:cNvPr id="10" name="Titel 9"/>
+          <p:cNvPr id="11" name="Titel 10"/>
           <p:cNvSpPr>
             <a:spLocks noGrp="1"/>
           </p:cNvSpPr>
@@ -43927,19 +44851,14 @@
             <p:ph type="title"/>
           </p:nvPr>
         </p:nvSpPr>
-        <p:spPr>
-          <a:xfrm>
-            <a:off x="323850" y="620714"/>
-            <a:ext cx="11537950" cy="503966"/>
-          </a:xfrm>
-        </p:spPr>
+        <p:spPr/>
         <p:txBody>
           <a:bodyPr/>
           <a:lstStyle/>
           <a:p>
             <a:r>
               <a:rPr lang="en-GB" dirty="0"/>
-              <a:t>Results</a:t>
+              <a:t>Made assumptions for the HCN absorber</a:t>
             </a:r>
           </a:p>
         </p:txBody>
@@ -43947,7 +44866,7 @@
     </p:spTree>
     <p:extLst>
       <p:ext uri="{BB962C8B-B14F-4D97-AF65-F5344CB8AC3E}">
-        <p14:creationId xmlns:p14="http://schemas.microsoft.com/office/powerpoint/2010/main" val="524812646"/>
+        <p14:creationId xmlns:p14="http://schemas.microsoft.com/office/powerpoint/2010/main" val="239499201"/>
       </p:ext>
     </p:extLst>
   </p:cSld>
@@ -43977,113 +44896,181 @@
           <a:chExt cx="0" cy="0"/>
         </a:xfrm>
       </p:grpSpPr>
-      <p:sp>
-        <p:nvSpPr>
-          <p:cNvPr id="11" name="Inhaltsplatzhalter 10"/>
-          <p:cNvSpPr>
-            <a:spLocks noGrp="1"/>
-          </p:cNvSpPr>
-          <p:nvPr>
-            <p:ph idx="1"/>
-          </p:nvPr>
-        </p:nvSpPr>
+      <p:pic>
+        <p:nvPicPr>
+          <p:cNvPr id="9" name="Inhaltsplatzhalter 8">
+            <a:extLst>
+              <a:ext uri="{FF2B5EF4-FFF2-40B4-BE49-F238E27FC236}">
+                <a16:creationId xmlns:a16="http://schemas.microsoft.com/office/drawing/2014/main" id="{2D2110E3-83BC-4D4A-81C6-243EDC7E1901}"/>
+              </a:ext>
+            </a:extLst>
+          </p:cNvPr>
+          <p:cNvPicPr>
+            <a:picLocks noGrp="1" noChangeAspect="1"/>
+          </p:cNvPicPr>
+          <p:nvPr>
+            <p:ph sz="half" idx="1"/>
+          </p:nvPr>
+        </p:nvPicPr>
+        <p:blipFill>
+          <a:blip r:embed="rId2">
+            <a:extLst>
+              <a:ext uri="{28A0092B-C50C-407E-A947-70E740481C1C}">
+                <a14:useLocalDpi xmlns:a14="http://schemas.microsoft.com/office/drawing/2010/main" val="0"/>
+              </a:ext>
+            </a:extLst>
+          </a:blip>
+          <a:stretch>
+            <a:fillRect/>
+          </a:stretch>
+        </p:blipFill>
         <p:spPr>
           <a:xfrm>
-            <a:off x="323850" y="1268700"/>
-            <a:ext cx="11537950" cy="4965410"/>
+            <a:off x="323850" y="2039342"/>
+            <a:ext cx="5576888" cy="4182666"/>
           </a:xfrm>
         </p:spPr>
+      </p:pic>
+      <p:sp>
+        <p:nvSpPr>
+          <p:cNvPr id="7" name="Inhaltsplatzhalter 6">
+            <a:extLst>
+              <a:ext uri="{FF2B5EF4-FFF2-40B4-BE49-F238E27FC236}">
+                <a16:creationId xmlns:a16="http://schemas.microsoft.com/office/drawing/2014/main" id="{6D488CB4-429D-D64C-AE82-45FE5567DC4A}"/>
+              </a:ext>
+            </a:extLst>
+          </p:cNvPr>
+          <p:cNvSpPr>
+            <a:spLocks noGrp="1"/>
+          </p:cNvSpPr>
+          <p:nvPr>
+            <p:ph sz="half" idx="2"/>
+          </p:nvPr>
+        </p:nvSpPr>
+        <p:spPr>
+          <a:xfrm>
+            <a:off x="6294595" y="2996940"/>
+            <a:ext cx="5567205" cy="4213225"/>
+          </a:xfrm>
+        </p:spPr>
         <p:txBody>
           <a:bodyPr/>
           <a:lstStyle/>
           <a:p>
-            <a:pPr marL="0" indent="0">
-              <a:buNone/>
-            </a:pPr>
-            <a:endParaRPr lang="en-GB" dirty="0"/>
-          </a:p>
-          <a:p>
-            <a:pPr marL="0" indent="0">
-              <a:buNone/>
-            </a:pPr>
-            <a:r>
-              <a:rPr lang="en-GB" dirty="0"/>
-              <a:t>NH</a:t>
-            </a:r>
-            <a:r>
-              <a:rPr lang="en-GB" baseline="-25000" dirty="0"/>
-              <a:t>3</a:t>
-            </a:r>
-            <a:r>
-              <a:rPr lang="en-GB" dirty="0"/>
-              <a:t> absorber:</a:t>
-            </a:r>
-          </a:p>
-          <a:p>
-            <a:r>
-              <a:rPr lang="en-GB" dirty="0"/>
-              <a:t>Ideal vs. real (case 1/case 3)</a:t>
-            </a:r>
-          </a:p>
-          <a:p>
-            <a:pPr lvl="1"/>
-            <a:r>
-              <a:rPr lang="en-GB" dirty="0"/>
-              <a:t>Column height: 2.44 m / 4.39 m</a:t>
-            </a:r>
-          </a:p>
-          <a:p>
-            <a:pPr lvl="1"/>
-            <a:r>
-              <a:rPr lang="en-GB" dirty="0"/>
-              <a:t>Diameter: 0.79 m / 0.79 m</a:t>
-            </a:r>
-          </a:p>
-          <a:p>
-            <a:pPr lvl="1"/>
-            <a:r>
-              <a:rPr lang="en-GB" dirty="0"/>
-              <a:t>Flow rate ratio 0.80 / 1.64</a:t>
-            </a:r>
-          </a:p>
-          <a:p>
-            <a:pPr lvl="1"/>
-            <a:r>
-              <a:rPr lang="en-GB" dirty="0"/>
-              <a:t>Temperature in the column</a:t>
-            </a:r>
-          </a:p>
-          <a:p>
-            <a:pPr lvl="1"/>
-            <a:r>
-              <a:rPr lang="en-GB" dirty="0"/>
-              <a:t>Volumetric fraction H</a:t>
-            </a:r>
-            <a:r>
-              <a:rPr lang="en-GB" baseline="-25000" dirty="0"/>
-              <a:t>2</a:t>
-            </a:r>
-            <a:r>
-              <a:rPr lang="en-GB" dirty="0"/>
-              <a:t>SO</a:t>
-            </a:r>
-            <a:r>
-              <a:rPr lang="en-GB" baseline="-25000" dirty="0"/>
-              <a:t>4 </a:t>
-            </a:r>
-            <a:r>
-              <a:rPr lang="en-GB" dirty="0"/>
-              <a:t>: 0.37 / 2.01</a:t>
-            </a:r>
-          </a:p>
-          <a:p>
-            <a:endParaRPr lang="en-GB" dirty="0"/>
-          </a:p>
-        </p:txBody>
-      </p:sp>
-      <p:sp>
-        <p:nvSpPr>
-          <p:cNvPr id="3" name="Datumsplatzhalter 2"/>
+            <a:r>
+              <a:rPr lang="de-DE" dirty="0"/>
+              <a:t>Height </a:t>
+            </a:r>
+            <a:r>
+              <a:rPr lang="de-DE" dirty="0" err="1"/>
+              <a:t>of</a:t>
+            </a:r>
+            <a:r>
+              <a:rPr lang="de-DE" dirty="0"/>
+              <a:t> </a:t>
+            </a:r>
+            <a:r>
+              <a:rPr lang="de-DE" dirty="0" err="1"/>
+              <a:t>the</a:t>
+            </a:r>
+            <a:r>
+              <a:rPr lang="de-DE" dirty="0"/>
+              <a:t> </a:t>
+            </a:r>
+            <a:r>
+              <a:rPr lang="de-DE" dirty="0" err="1"/>
+              <a:t>column</a:t>
+            </a:r>
+            <a:r>
+              <a:rPr lang="de-DE" dirty="0"/>
+              <a:t> </a:t>
+            </a:r>
+            <a:r>
+              <a:rPr lang="de-DE" dirty="0" err="1"/>
+              <a:t>increases</a:t>
+            </a:r>
+            <a:r>
+              <a:rPr lang="de-DE" dirty="0"/>
+              <a:t> </a:t>
+            </a:r>
+            <a:r>
+              <a:rPr lang="de-DE" dirty="0" err="1"/>
+              <a:t>with</a:t>
+            </a:r>
+            <a:r>
+              <a:rPr lang="de-DE" dirty="0"/>
+              <a:t> </a:t>
+            </a:r>
+            <a:r>
+              <a:rPr lang="de-DE" dirty="0" err="1"/>
+              <a:t>decreasing</a:t>
+            </a:r>
+            <a:r>
+              <a:rPr lang="de-DE" dirty="0"/>
+              <a:t> </a:t>
+            </a:r>
+            <a:r>
+              <a:rPr lang="de-DE" dirty="0" err="1"/>
+              <a:t>inlet</a:t>
+            </a:r>
+            <a:r>
+              <a:rPr lang="de-DE" dirty="0"/>
+              <a:t> liquid </a:t>
+            </a:r>
+            <a:r>
+              <a:rPr lang="de-DE" dirty="0" err="1"/>
+              <a:t>flow</a:t>
+            </a:r>
+            <a:endParaRPr lang="de-DE" dirty="0"/>
+          </a:p>
+          <a:p>
+            <a:r>
+              <a:rPr lang="de-DE" dirty="0" err="1"/>
+              <a:t>Better</a:t>
+            </a:r>
+            <a:r>
+              <a:rPr lang="de-DE" dirty="0"/>
+              <a:t> </a:t>
+            </a:r>
+            <a:r>
+              <a:rPr lang="de-DE" dirty="0" err="1"/>
+              <a:t>absorption</a:t>
+            </a:r>
+            <a:endParaRPr lang="de-DE" dirty="0"/>
+          </a:p>
+          <a:p>
+            <a:r>
+              <a:rPr lang="de-DE" dirty="0"/>
+              <a:t>CAPEX </a:t>
+            </a:r>
+            <a:r>
+              <a:rPr lang="de-DE" dirty="0" err="1"/>
+              <a:t>decreases</a:t>
+            </a:r>
+            <a:endParaRPr lang="de-DE" dirty="0"/>
+          </a:p>
+          <a:p>
+            <a:r>
+              <a:rPr lang="de-DE" dirty="0"/>
+              <a:t>OPEX </a:t>
+            </a:r>
+            <a:r>
+              <a:rPr lang="de-DE" dirty="0" err="1"/>
+              <a:t>increases</a:t>
+            </a:r>
+            <a:endParaRPr lang="de-DE" dirty="0"/>
+          </a:p>
+        </p:txBody>
+      </p:sp>
+      <p:sp>
+        <p:nvSpPr>
+          <p:cNvPr id="2" name="Datumsplatzhalter 1">
+            <a:extLst>
+              <a:ext uri="{FF2B5EF4-FFF2-40B4-BE49-F238E27FC236}">
+                <a16:creationId xmlns:a16="http://schemas.microsoft.com/office/drawing/2014/main" id="{35ABBF7B-96D1-6E4F-8290-F0AC49418229}"/>
+              </a:ext>
+            </a:extLst>
+          </p:cNvPr>
           <p:cNvSpPr>
             <a:spLocks noGrp="1"/>
           </p:cNvSpPr>
@@ -44106,7 +45093,13 @@
       </p:sp>
       <p:sp>
         <p:nvSpPr>
-          <p:cNvPr id="4" name="Fußzeilenplatzhalter 3"/>
+          <p:cNvPr id="3" name="Fußzeilenplatzhalter 2">
+            <a:extLst>
+              <a:ext uri="{FF2B5EF4-FFF2-40B4-BE49-F238E27FC236}">
+                <a16:creationId xmlns:a16="http://schemas.microsoft.com/office/drawing/2014/main" id="{4127C30E-F535-FA47-9C07-E1BCED3EFC52}"/>
+              </a:ext>
+            </a:extLst>
+          </p:cNvPr>
           <p:cNvSpPr>
             <a:spLocks noGrp="1"/>
           </p:cNvSpPr>
@@ -44129,7 +45122,13 @@
       </p:sp>
       <p:sp>
         <p:nvSpPr>
-          <p:cNvPr id="5" name="Foliennummernplatzhalter 4"/>
+          <p:cNvPr id="4" name="Foliennummernplatzhalter 3">
+            <a:extLst>
+              <a:ext uri="{FF2B5EF4-FFF2-40B4-BE49-F238E27FC236}">
+                <a16:creationId xmlns:a16="http://schemas.microsoft.com/office/drawing/2014/main" id="{C88BF33C-BAF6-464F-B278-84B3B0CB6B82}"/>
+              </a:ext>
+            </a:extLst>
+          </p:cNvPr>
           <p:cNvSpPr>
             <a:spLocks noGrp="1"/>
           </p:cNvSpPr>
@@ -44144,7 +45143,6 @@
           <a:p>
             <a:fld id="{6C6AE60A-B69C-4790-82F7-3882EDF23186}" type="slidenum">
               <a:rPr lang="en-GB" smtClean="0"/>
-              <a:pPr/>
               <a:t>6</a:t>
             </a:fld>
             <a:endParaRPr lang="en-GB" dirty="0"/>
@@ -44153,7 +45151,13 @@
       </p:sp>
       <p:sp>
         <p:nvSpPr>
-          <p:cNvPr id="10" name="Titel 9"/>
+          <p:cNvPr id="5" name="Titel 4">
+            <a:extLst>
+              <a:ext uri="{FF2B5EF4-FFF2-40B4-BE49-F238E27FC236}">
+                <a16:creationId xmlns:a16="http://schemas.microsoft.com/office/drawing/2014/main" id="{2AD82122-56E2-FD4B-B6AC-2B56FB45F00B}"/>
+              </a:ext>
+            </a:extLst>
+          </p:cNvPr>
           <p:cNvSpPr>
             <a:spLocks noGrp="1"/>
           </p:cNvSpPr>
@@ -44161,19 +45165,42 @@
             <p:ph type="title"/>
           </p:nvPr>
         </p:nvSpPr>
-        <p:spPr>
-          <a:xfrm>
-            <a:off x="323850" y="620714"/>
-            <a:ext cx="11537950" cy="503966"/>
-          </a:xfrm>
-        </p:spPr>
+        <p:spPr/>
         <p:txBody>
           <a:bodyPr/>
           <a:lstStyle/>
           <a:p>
             <a:r>
-              <a:rPr lang="en-GB" dirty="0"/>
-              <a:t>Results</a:t>
+              <a:rPr lang="de-DE" dirty="0" err="1"/>
+              <a:t>Sensitivity</a:t>
+            </a:r>
+            <a:r>
+              <a:rPr lang="de-DE" dirty="0"/>
+              <a:t> </a:t>
+            </a:r>
+            <a:r>
+              <a:rPr lang="de-DE" dirty="0" err="1"/>
+              <a:t>analysis</a:t>
+            </a:r>
+            <a:r>
+              <a:rPr lang="de-DE" dirty="0"/>
+              <a:t> </a:t>
+            </a:r>
+            <a:r>
+              <a:rPr lang="de-DE" dirty="0" err="1"/>
+              <a:t>of</a:t>
+            </a:r>
+            <a:r>
+              <a:rPr lang="de-DE" dirty="0"/>
+              <a:t> </a:t>
+            </a:r>
+            <a:r>
+              <a:rPr lang="de-DE" dirty="0" err="1"/>
+              <a:t>the</a:t>
+            </a:r>
+            <a:r>
+              <a:rPr lang="de-DE" dirty="0"/>
+              <a:t> HCN Absorber</a:t>
             </a:r>
           </a:p>
         </p:txBody>
@@ -44181,7 +45208,7 @@
     </p:spTree>
     <p:extLst>
       <p:ext uri="{BB962C8B-B14F-4D97-AF65-F5344CB8AC3E}">
-        <p14:creationId xmlns:p14="http://schemas.microsoft.com/office/powerpoint/2010/main" val="2336202494"/>
+        <p14:creationId xmlns:p14="http://schemas.microsoft.com/office/powerpoint/2010/main" val="857607359"/>
       </p:ext>
     </p:extLst>
   </p:cSld>
@@ -44242,7 +45269,7 @@
             </a:pPr>
             <a:r>
               <a:rPr lang="en-GB" dirty="0"/>
-              <a:t>HCN absorber:</a:t>
+              <a:t>Reactor:</a:t>
             </a:r>
           </a:p>
           <a:p>
@@ -44255,32 +45282,65 @@
             <a:pPr lvl="1"/>
             <a:r>
               <a:rPr lang="en-GB" dirty="0"/>
-              <a:t>Column height: 9.73 m / 10.31 m</a:t>
+              <a:t>Length: 12 m / 28 m</a:t>
             </a:r>
           </a:p>
           <a:p>
             <a:pPr lvl="1"/>
             <a:r>
               <a:rPr lang="en-GB" dirty="0"/>
-              <a:t>Diameter: 1.11 m / 1.10 m</a:t>
-            </a:r>
-          </a:p>
-          <a:p>
-            <a:pPr lvl="1"/>
+              <a:t>Number of tubes: 1’342 / 17’149</a:t>
+            </a:r>
+          </a:p>
+          <a:p>
+            <a:pPr marL="361950" lvl="1" indent="0">
+              <a:buNone/>
+            </a:pPr>
+            <a:endParaRPr lang="en-GB" dirty="0"/>
+          </a:p>
+          <a:p>
             <a:r>
               <a:rPr lang="en-GB" dirty="0"/>
-              <a:t>Outlet temperature: 294.72 K / 293.57 K</a:t>
-            </a:r>
-          </a:p>
-          <a:p>
-            <a:pPr lvl="1"/>
+              <a:t>Co- vs. counter-current (case 3/case 4)</a:t>
+            </a:r>
+          </a:p>
+          <a:p>
+            <a:pPr lvl="1">
+              <a:buFont typeface="Wingdings" charset="2"/>
+              <a:buChar char="§"/>
+            </a:pPr>
             <a:r>
               <a:rPr lang="en-GB" dirty="0"/>
-              <a:t>Water</a:t>
-            </a:r>
-          </a:p>
-          <a:p>
-            <a:endParaRPr lang="en-GB" dirty="0"/>
+              <a:t>Number of tubes: 17’149 / 40’642</a:t>
+            </a:r>
+          </a:p>
+          <a:p>
+            <a:pPr lvl="1">
+              <a:buFont typeface="Wingdings" charset="2"/>
+              <a:buChar char="§"/>
+            </a:pPr>
+            <a:r>
+              <a:rPr lang="en-GB" dirty="0"/>
+              <a:t>Heating medium flow: 0.10 / 0.05</a:t>
+            </a:r>
+          </a:p>
+          <a:p>
+            <a:pPr lvl="1">
+              <a:buFont typeface="Wingdings" charset="2"/>
+              <a:buChar char="§"/>
+            </a:pPr>
+            <a:r>
+              <a:rPr lang="en-GB" dirty="0"/>
+              <a:t>Conversion CH</a:t>
+            </a:r>
+            <a:r>
+              <a:rPr lang="en-GB" baseline="-25000" dirty="0"/>
+              <a:t>4</a:t>
+            </a:r>
+            <a:r>
+              <a:rPr lang="en-GB" dirty="0"/>
+              <a:t>: 0.82 / 0.59</a:t>
+            </a:r>
           </a:p>
         </p:txBody>
       </p:sp>
@@ -44384,7 +45444,7 @@
     </p:spTree>
     <p:extLst>
       <p:ext uri="{BB962C8B-B14F-4D97-AF65-F5344CB8AC3E}">
-        <p14:creationId xmlns:p14="http://schemas.microsoft.com/office/powerpoint/2010/main" val="3246964687"/>
+        <p14:creationId xmlns:p14="http://schemas.microsoft.com/office/powerpoint/2010/main" val="524812646"/>
       </p:ext>
     </p:extLst>
   </p:cSld>
@@ -44445,7 +45505,15 @@
             </a:pPr>
             <a:r>
               <a:rPr lang="en-GB" dirty="0"/>
-              <a:t>HCN distillation:</a:t>
+              <a:t>NH</a:t>
+            </a:r>
+            <a:r>
+              <a:rPr lang="en-GB" baseline="-25000" dirty="0"/>
+              <a:t>3</a:t>
+            </a:r>
+            <a:r>
+              <a:rPr lang="en-GB" dirty="0"/>
+              <a:t> absorber:</a:t>
             </a:r>
           </a:p>
           <a:p>
@@ -44458,34 +45526,55 @@
             <a:pPr lvl="1"/>
             <a:r>
               <a:rPr lang="en-GB" dirty="0"/>
-              <a:t>Column height: 9.36 m / 10.08 m</a:t>
+              <a:t>Column height: 2.44 m / 4.39 m</a:t>
             </a:r>
           </a:p>
           <a:p>
             <a:pPr lvl="1"/>
             <a:r>
               <a:rPr lang="en-GB" dirty="0"/>
-              <a:t>Diameter: 1.73 m / 1.92 m</a:t>
+              <a:t>Diameter: 0.79 m / 0.79 m</a:t>
             </a:r>
           </a:p>
           <a:p>
             <a:pPr lvl="1"/>
             <a:r>
               <a:rPr lang="en-GB" dirty="0"/>
-              <a:t>Heat exchanger area: 0.057 m</a:t>
-            </a:r>
-            <a:r>
-              <a:rPr lang="en-GB" baseline="30000" dirty="0"/>
+              <a:t>Flow rate ratio 0.80 / 1.64</a:t>
+            </a:r>
+          </a:p>
+          <a:p>
+            <a:pPr lvl="1"/>
+            <a:r>
+              <a:rPr lang="en-GB" dirty="0"/>
+              <a:t>Temperature in the column</a:t>
+            </a:r>
+          </a:p>
+          <a:p>
+            <a:pPr lvl="1"/>
+            <a:r>
+              <a:rPr lang="en-GB" dirty="0"/>
+              <a:t>Volumetric fraction H</a:t>
+            </a:r>
+            <a:r>
+              <a:rPr lang="en-GB" baseline="-25000" dirty="0"/>
               <a:t>2</a:t>
             </a:r>
             <a:r>
               <a:rPr lang="en-GB" dirty="0"/>
-              <a:t> / 0.056 m</a:t>
-            </a:r>
-            <a:r>
-              <a:rPr lang="en-GB" baseline="30000" dirty="0"/>
-              <a:t>2</a:t>
-            </a:r>
+              <a:t>SO</a:t>
+            </a:r>
+            <a:r>
+              <a:rPr lang="en-GB" baseline="-25000" dirty="0"/>
+              <a:t>4 </a:t>
+            </a:r>
+            <a:r>
+              <a:rPr lang="en-GB" dirty="0"/>
+              <a:t>: 0.37 / 2.01</a:t>
+            </a:r>
+          </a:p>
+          <a:p>
+            <a:endParaRPr lang="en-GB" dirty="0"/>
           </a:p>
         </p:txBody>
       </p:sp>
@@ -44589,7 +45678,7 @@
     </p:spTree>
     <p:extLst>
       <p:ext uri="{BB962C8B-B14F-4D97-AF65-F5344CB8AC3E}">
-        <p14:creationId xmlns:p14="http://schemas.microsoft.com/office/powerpoint/2010/main" val="1461997070"/>
+        <p14:creationId xmlns:p14="http://schemas.microsoft.com/office/powerpoint/2010/main" val="2336202494"/>
       </p:ext>
     </p:extLst>
   </p:cSld>
@@ -44650,7 +45739,7 @@
             </a:pPr>
             <a:r>
               <a:rPr lang="en-GB" dirty="0"/>
-              <a:t>Costs</a:t>
+              <a:t>HCN absorber:</a:t>
             </a:r>
           </a:p>
           <a:p>
@@ -44663,8 +45752,32 @@
             <a:pPr lvl="1"/>
             <a:r>
               <a:rPr lang="en-GB" dirty="0"/>
-              <a:t>Break-even price: 0.62 $/kg / 0.76 $/kg</a:t>
-            </a:r>
+              <a:t>Column height: 9.73 m / 10.31 m</a:t>
+            </a:r>
+          </a:p>
+          <a:p>
+            <a:pPr lvl="1"/>
+            <a:r>
+              <a:rPr lang="en-GB" dirty="0"/>
+              <a:t>Diameter: 1.11 m / 1.10 m</a:t>
+            </a:r>
+          </a:p>
+          <a:p>
+            <a:pPr lvl="1"/>
+            <a:r>
+              <a:rPr lang="en-GB" dirty="0"/>
+              <a:t>Outlet temperature: 294.72 K / 293.57 K</a:t>
+            </a:r>
+          </a:p>
+          <a:p>
+            <a:pPr lvl="1"/>
+            <a:r>
+              <a:rPr lang="en-GB" dirty="0"/>
+              <a:t>Water</a:t>
+            </a:r>
+          </a:p>
+          <a:p>
+            <a:endParaRPr lang="en-GB" dirty="0"/>
           </a:p>
         </p:txBody>
       </p:sp>
@@ -44765,100 +45878,10 @@
           </a:p>
         </p:txBody>
       </p:sp>
-      <p:pic>
-        <p:nvPicPr>
-          <p:cNvPr id="6" name="Image 5" descr="costplot1.png"/>
-          <p:cNvPicPr>
-            <a:picLocks noChangeAspect="1"/>
-          </p:cNvPicPr>
-          <p:nvPr/>
-        </p:nvPicPr>
-        <p:blipFill>
-          <a:blip r:embed="rId2" cstate="print">
-            <a:extLst>
-              <a:ext uri="{28A0092B-C50C-407E-A947-70E740481C1C}">
-                <a14:useLocalDpi xmlns:a14="http://schemas.microsoft.com/office/drawing/2010/main" val="0"/>
-              </a:ext>
-            </a:extLst>
-          </a:blip>
-          <a:stretch>
-            <a:fillRect/>
-          </a:stretch>
-        </p:blipFill>
-        <p:spPr>
-          <a:xfrm>
-            <a:off x="692869" y="2996940"/>
-            <a:ext cx="2938082" cy="2802065"/>
-          </a:xfrm>
-          <a:prstGeom prst="rect">
-            <a:avLst/>
-          </a:prstGeom>
-        </p:spPr>
-      </p:pic>
-      <p:pic>
-        <p:nvPicPr>
-          <p:cNvPr id="7" name="Image 6" descr="costplot2.png"/>
-          <p:cNvPicPr>
-            <a:picLocks noChangeAspect="1"/>
-          </p:cNvPicPr>
-          <p:nvPr/>
-        </p:nvPicPr>
-        <p:blipFill>
-          <a:blip r:embed="rId3" cstate="print">
-            <a:extLst>
-              <a:ext uri="{28A0092B-C50C-407E-A947-70E740481C1C}">
-                <a14:useLocalDpi xmlns:a14="http://schemas.microsoft.com/office/drawing/2010/main" val="0"/>
-              </a:ext>
-            </a:extLst>
-          </a:blip>
-          <a:stretch>
-            <a:fillRect/>
-          </a:stretch>
-        </p:blipFill>
-        <p:spPr>
-          <a:xfrm>
-            <a:off x="4221359" y="3001000"/>
-            <a:ext cx="2937510" cy="2803208"/>
-          </a:xfrm>
-          <a:prstGeom prst="rect">
-            <a:avLst/>
-          </a:prstGeom>
-        </p:spPr>
-      </p:pic>
-      <p:pic>
-        <p:nvPicPr>
-          <p:cNvPr id="8" name="Image 7" descr="costplot3.png"/>
-          <p:cNvPicPr>
-            <a:picLocks noChangeAspect="1"/>
-          </p:cNvPicPr>
-          <p:nvPr/>
-        </p:nvPicPr>
-        <p:blipFill>
-          <a:blip r:embed="rId4" cstate="print">
-            <a:extLst>
-              <a:ext uri="{28A0092B-C50C-407E-A947-70E740481C1C}">
-                <a14:useLocalDpi xmlns:a14="http://schemas.microsoft.com/office/drawing/2010/main" val="0"/>
-              </a:ext>
-            </a:extLst>
-          </a:blip>
-          <a:stretch>
-            <a:fillRect/>
-          </a:stretch>
-        </p:blipFill>
-        <p:spPr>
-          <a:xfrm>
-            <a:off x="7712110" y="3010144"/>
-            <a:ext cx="3204401" cy="2794064"/>
-          </a:xfrm>
-          <a:prstGeom prst="rect">
-            <a:avLst/>
-          </a:prstGeom>
-        </p:spPr>
-      </p:pic>
     </p:spTree>
     <p:extLst>
       <p:ext uri="{BB962C8B-B14F-4D97-AF65-F5344CB8AC3E}">
-        <p14:creationId xmlns:p14="http://schemas.microsoft.com/office/powerpoint/2010/main" val="3886166668"/>
+        <p14:creationId xmlns:p14="http://schemas.microsoft.com/office/powerpoint/2010/main" val="3246964687"/>
       </p:ext>
     </p:extLst>
   </p:cSld>

</xml_diff>

<commit_message>
Corrections + reactor profile added
</commit_message>
<xml_diff>
--- a/Case_Study_presentation.pptx
+++ b/Case_Study_presentation.pptx
@@ -13,10 +13,10 @@
     <p:sldMasterId id="2147483849" r:id="rId9"/>
   </p:sldMasterIdLst>
   <p:notesMasterIdLst>
-    <p:notesMasterId r:id="rId31"/>
+    <p:notesMasterId r:id="rId32"/>
   </p:notesMasterIdLst>
   <p:handoutMasterIdLst>
-    <p:handoutMasterId r:id="rId32"/>
+    <p:handoutMasterId r:id="rId33"/>
   </p:handoutMasterIdLst>
   <p:sldIdLst>
     <p:sldId id="268" r:id="rId10"/>
@@ -27,19 +27,20 @@
     <p:sldId id="284" r:id="rId15"/>
     <p:sldId id="281" r:id="rId16"/>
     <p:sldId id="282" r:id="rId17"/>
-    <p:sldId id="276" r:id="rId18"/>
-    <p:sldId id="277" r:id="rId19"/>
-    <p:sldId id="278" r:id="rId20"/>
-    <p:sldId id="279" r:id="rId21"/>
-    <p:sldId id="280" r:id="rId22"/>
-    <p:sldId id="272" r:id="rId23"/>
-    <p:sldId id="270" r:id="rId24"/>
-    <p:sldId id="271" r:id="rId25"/>
-    <p:sldId id="273" r:id="rId26"/>
-    <p:sldId id="274" r:id="rId27"/>
-    <p:sldId id="275" r:id="rId28"/>
-    <p:sldId id="266" r:id="rId29"/>
-    <p:sldId id="267" r:id="rId30"/>
+    <p:sldId id="287" r:id="rId18"/>
+    <p:sldId id="288" r:id="rId19"/>
+    <p:sldId id="277" r:id="rId20"/>
+    <p:sldId id="278" r:id="rId21"/>
+    <p:sldId id="279" r:id="rId22"/>
+    <p:sldId id="280" r:id="rId23"/>
+    <p:sldId id="272" r:id="rId24"/>
+    <p:sldId id="270" r:id="rId25"/>
+    <p:sldId id="271" r:id="rId26"/>
+    <p:sldId id="273" r:id="rId27"/>
+    <p:sldId id="274" r:id="rId28"/>
+    <p:sldId id="275" r:id="rId29"/>
+    <p:sldId id="266" r:id="rId30"/>
+    <p:sldId id="267" r:id="rId31"/>
   </p:sldIdLst>
   <p:sldSz cx="12187238" cy="6858000"/>
   <p:notesSz cx="7099300" cy="10234613"/>
@@ -140,7 +141,7 @@
   </p:defaultTextStyle>
   <p:extLst>
     <p:ext uri="{EFAFB233-063F-42B5-8137-9DF3F51BA10A}">
-      <p15:sldGuideLst xmlns:p15="http://schemas.microsoft.com/office/powerpoint/2012/main">
+      <p15:sldGuideLst xmlns:p15="http://schemas.microsoft.com/office/powerpoint/2012/main" xmlns="">
         <p15:guide id="1" orient="horz" pos="391">
           <p15:clr>
             <a:srgbClr val="A4A3A4"/>
@@ -298,7 +299,7 @@
               <a:rPr lang="de-DE" smtClean="0">
                 <a:latin typeface="Arial" panose="020B0604020202020204" pitchFamily="34" charset="0"/>
               </a:rPr>
-              <a:t>22.05.18</a:t>
+              <a:t>22/05/18</a:t>
             </a:fld>
             <a:endParaRPr lang="de-DE" dirty="0">
               <a:latin typeface="Arial" panose="020B0604020202020204" pitchFamily="34" charset="0"/>
@@ -477,7 +478,7 @@
             <a:fld id="{BCDB334D-D17F-49C4-91DD-37BB7E818209}" type="datetimeFigureOut">
               <a:rPr lang="de-CH" smtClean="0"/>
               <a:pPr/>
-              <a:t>22.05.18</a:t>
+              <a:t>22/05/18</a:t>
             </a:fld>
             <a:endParaRPr lang="de-CH" dirty="0"/>
           </a:p>
@@ -816,7 +817,7 @@
           <a:p>
             <a:fld id="{A51C0C35-A9A2-4EFD-9BAF-1E52E29E03D1}" type="slidenum">
               <a:rPr lang="de-CH" smtClean="0"/>
-              <a:t>15</a:t>
+              <a:t>16</a:t>
             </a:fld>
             <a:endParaRPr lang="de-CH"/>
           </a:p>
@@ -1125,7 +1126,7 @@
   <p:clrMapOvr>
     <a:masterClrMapping/>
   </p:clrMapOvr>
-  <p:transition>
+  <p:transition xmlns:p14="http://schemas.microsoft.com/office/powerpoint/2010/main">
     <p:fade/>
   </p:transition>
 </p:sldLayout>
@@ -1417,7 +1418,7 @@
   <p:clrMapOvr>
     <a:masterClrMapping/>
   </p:clrMapOvr>
-  <p:transition>
+  <p:transition xmlns:p14="http://schemas.microsoft.com/office/powerpoint/2010/main">
     <p:fade/>
   </p:transition>
 </p:sldLayout>
@@ -1720,7 +1721,7 @@
   <p:clrMapOvr>
     <a:masterClrMapping/>
   </p:clrMapOvr>
-  <p:transition>
+  <p:transition xmlns:p14="http://schemas.microsoft.com/office/powerpoint/2010/main">
     <p:fade/>
   </p:transition>
 </p:sldLayout>
@@ -2019,12 +2020,12 @@
   <p:clrMapOvr>
     <a:masterClrMapping/>
   </p:clrMapOvr>
-  <p:transition>
+  <p:transition xmlns:p14="http://schemas.microsoft.com/office/powerpoint/2010/main">
     <p:fade/>
   </p:transition>
   <p:extLst mod="1">
     <p:ext uri="{DCECCB84-F9BA-43D5-87BE-67443E8EF086}">
-      <p15:sldGuideLst xmlns:p15="http://schemas.microsoft.com/office/powerpoint/2012/main"/>
+      <p15:sldGuideLst xmlns:p15="http://schemas.microsoft.com/office/powerpoint/2012/main" xmlns=""/>
     </p:ext>
   </p:extLst>
 </p:sldLayout>
@@ -3051,7 +3052,7 @@
   <p:clrMapOvr>
     <a:masterClrMapping/>
   </p:clrMapOvr>
-  <p:transition>
+  <p:transition xmlns:p14="http://schemas.microsoft.com/office/powerpoint/2010/main">
     <p:fade/>
   </p:transition>
 </p:sldLayout>
@@ -3292,7 +3293,7 @@
   <p:clrMapOvr>
     <a:masterClrMapping/>
   </p:clrMapOvr>
-  <p:transition>
+  <p:transition xmlns:p14="http://schemas.microsoft.com/office/powerpoint/2010/main">
     <p:fade/>
   </p:transition>
 </p:sldLayout>
@@ -3702,7 +3703,7 @@
   <p:clrMapOvr>
     <a:masterClrMapping/>
   </p:clrMapOvr>
-  <p:transition>
+  <p:transition xmlns:p14="http://schemas.microsoft.com/office/powerpoint/2010/main">
     <p:fade/>
   </p:transition>
 </p:sldLayout>
@@ -3835,7 +3836,7 @@
   <p:clrMapOvr>
     <a:masterClrMapping/>
   </p:clrMapOvr>
-  <p:transition>
+  <p:transition xmlns:p14="http://schemas.microsoft.com/office/powerpoint/2010/main">
     <p:fade/>
   </p:transition>
 </p:sldLayout>
@@ -3970,7 +3971,7 @@
   <p:clrMapOvr>
     <a:masterClrMapping/>
   </p:clrMapOvr>
-  <p:transition>
+  <p:transition xmlns:p14="http://schemas.microsoft.com/office/powerpoint/2010/main">
     <p:fade/>
   </p:transition>
 </p:sldLayout>
@@ -4148,7 +4149,7 @@
   <p:clrMapOvr>
     <a:masterClrMapping/>
   </p:clrMapOvr>
-  <p:transition>
+  <p:transition xmlns:p14="http://schemas.microsoft.com/office/powerpoint/2010/main">
     <p:fade/>
   </p:transition>
 </p:sldLayout>
@@ -4440,7 +4441,7 @@
   <p:clrMapOvr>
     <a:masterClrMapping/>
   </p:clrMapOvr>
-  <p:transition>
+  <p:transition xmlns:p14="http://schemas.microsoft.com/office/powerpoint/2010/main">
     <p:fade/>
   </p:transition>
 </p:sldLayout>
@@ -4743,7 +4744,7 @@
   <p:clrMapOvr>
     <a:masterClrMapping/>
   </p:clrMapOvr>
-  <p:transition>
+  <p:transition xmlns:p14="http://schemas.microsoft.com/office/powerpoint/2010/main">
     <p:fade/>
   </p:transition>
 </p:sldLayout>
@@ -5046,7 +5047,7 @@
   <p:clrMapOvr>
     <a:masterClrMapping/>
   </p:clrMapOvr>
-  <p:transition>
+  <p:transition xmlns:p14="http://schemas.microsoft.com/office/powerpoint/2010/main">
     <p:fade/>
   </p:transition>
 </p:sldLayout>
@@ -5345,12 +5346,12 @@
   <p:clrMapOvr>
     <a:masterClrMapping/>
   </p:clrMapOvr>
-  <p:transition>
+  <p:transition xmlns:p14="http://schemas.microsoft.com/office/powerpoint/2010/main">
     <p:fade/>
   </p:transition>
   <p:extLst mod="1">
     <p:ext uri="{DCECCB84-F9BA-43D5-87BE-67443E8EF086}">
-      <p15:sldGuideLst xmlns:p15="http://schemas.microsoft.com/office/powerpoint/2012/main"/>
+      <p15:sldGuideLst xmlns:p15="http://schemas.microsoft.com/office/powerpoint/2012/main" xmlns=""/>
     </p:ext>
   </p:extLst>
 </p:sldLayout>
@@ -6377,7 +6378,7 @@
   <p:clrMapOvr>
     <a:masterClrMapping/>
   </p:clrMapOvr>
-  <p:transition>
+  <p:transition xmlns:p14="http://schemas.microsoft.com/office/powerpoint/2010/main">
     <p:fade/>
   </p:transition>
 </p:sldLayout>
@@ -6618,7 +6619,7 @@
   <p:clrMapOvr>
     <a:masterClrMapping/>
   </p:clrMapOvr>
-  <p:transition>
+  <p:transition xmlns:p14="http://schemas.microsoft.com/office/powerpoint/2010/main">
     <p:fade/>
   </p:transition>
 </p:sldLayout>
@@ -7028,7 +7029,7 @@
   <p:clrMapOvr>
     <a:masterClrMapping/>
   </p:clrMapOvr>
-  <p:transition>
+  <p:transition xmlns:p14="http://schemas.microsoft.com/office/powerpoint/2010/main">
     <p:fade/>
   </p:transition>
 </p:sldLayout>
@@ -7161,7 +7162,7 @@
   <p:clrMapOvr>
     <a:masterClrMapping/>
   </p:clrMapOvr>
-  <p:transition>
+  <p:transition xmlns:p14="http://schemas.microsoft.com/office/powerpoint/2010/main">
     <p:fade/>
   </p:transition>
 </p:sldLayout>
@@ -7296,7 +7297,7 @@
   <p:clrMapOvr>
     <a:masterClrMapping/>
   </p:clrMapOvr>
-  <p:transition>
+  <p:transition xmlns:p14="http://schemas.microsoft.com/office/powerpoint/2010/main">
     <p:fade/>
   </p:transition>
 </p:sldLayout>
@@ -7474,7 +7475,7 @@
   <p:clrMapOvr>
     <a:masterClrMapping/>
   </p:clrMapOvr>
-  <p:transition>
+  <p:transition xmlns:p14="http://schemas.microsoft.com/office/powerpoint/2010/main">
     <p:fade/>
   </p:transition>
 </p:sldLayout>
@@ -7766,7 +7767,7 @@
   <p:clrMapOvr>
     <a:masterClrMapping/>
   </p:clrMapOvr>
-  <p:transition>
+  <p:transition xmlns:p14="http://schemas.microsoft.com/office/powerpoint/2010/main">
     <p:fade/>
   </p:transition>
 </p:sldLayout>
@@ -8069,7 +8070,7 @@
   <p:clrMapOvr>
     <a:masterClrMapping/>
   </p:clrMapOvr>
-  <p:transition>
+  <p:transition xmlns:p14="http://schemas.microsoft.com/office/powerpoint/2010/main">
     <p:fade/>
   </p:transition>
 </p:sldLayout>
@@ -8368,12 +8369,12 @@
   <p:clrMapOvr>
     <a:masterClrMapping/>
   </p:clrMapOvr>
-  <p:transition>
+  <p:transition xmlns:p14="http://schemas.microsoft.com/office/powerpoint/2010/main">
     <p:fade/>
   </p:transition>
   <p:extLst mod="1">
     <p:ext uri="{DCECCB84-F9BA-43D5-87BE-67443E8EF086}">
-      <p15:sldGuideLst xmlns:p15="http://schemas.microsoft.com/office/powerpoint/2012/main"/>
+      <p15:sldGuideLst xmlns:p15="http://schemas.microsoft.com/office/powerpoint/2012/main" xmlns=""/>
     </p:ext>
   </p:extLst>
 </p:sldLayout>
@@ -8672,12 +8673,12 @@
   <p:clrMapOvr>
     <a:masterClrMapping/>
   </p:clrMapOvr>
-  <p:transition>
+  <p:transition xmlns:p14="http://schemas.microsoft.com/office/powerpoint/2010/main">
     <p:fade/>
   </p:transition>
   <p:extLst mod="1">
     <p:ext uri="{DCECCB84-F9BA-43D5-87BE-67443E8EF086}">
-      <p15:sldGuideLst xmlns:p15="http://schemas.microsoft.com/office/powerpoint/2012/main"/>
+      <p15:sldGuideLst xmlns:p15="http://schemas.microsoft.com/office/powerpoint/2012/main" xmlns=""/>
     </p:ext>
   </p:extLst>
 </p:sldLayout>
@@ -9704,7 +9705,7 @@
   <p:clrMapOvr>
     <a:masterClrMapping/>
   </p:clrMapOvr>
-  <p:transition>
+  <p:transition xmlns:p14="http://schemas.microsoft.com/office/powerpoint/2010/main">
     <p:fade/>
   </p:transition>
 </p:sldLayout>
@@ -9945,7 +9946,7 @@
   <p:clrMapOvr>
     <a:masterClrMapping/>
   </p:clrMapOvr>
-  <p:transition>
+  <p:transition xmlns:p14="http://schemas.microsoft.com/office/powerpoint/2010/main">
     <p:fade/>
   </p:transition>
 </p:sldLayout>
@@ -10355,7 +10356,7 @@
   <p:clrMapOvr>
     <a:masterClrMapping/>
   </p:clrMapOvr>
-  <p:transition>
+  <p:transition xmlns:p14="http://schemas.microsoft.com/office/powerpoint/2010/main">
     <p:fade/>
   </p:transition>
 </p:sldLayout>
@@ -10488,7 +10489,7 @@
   <p:clrMapOvr>
     <a:masterClrMapping/>
   </p:clrMapOvr>
-  <p:transition>
+  <p:transition xmlns:p14="http://schemas.microsoft.com/office/powerpoint/2010/main">
     <p:fade/>
   </p:transition>
 </p:sldLayout>
@@ -10623,7 +10624,7 @@
   <p:clrMapOvr>
     <a:masterClrMapping/>
   </p:clrMapOvr>
-  <p:transition>
+  <p:transition xmlns:p14="http://schemas.microsoft.com/office/powerpoint/2010/main">
     <p:fade/>
   </p:transition>
 </p:sldLayout>
@@ -10801,7 +10802,7 @@
   <p:clrMapOvr>
     <a:masterClrMapping/>
   </p:clrMapOvr>
-  <p:transition>
+  <p:transition xmlns:p14="http://schemas.microsoft.com/office/powerpoint/2010/main">
     <p:fade/>
   </p:transition>
 </p:sldLayout>
@@ -11093,7 +11094,7 @@
   <p:clrMapOvr>
     <a:masterClrMapping/>
   </p:clrMapOvr>
-  <p:transition>
+  <p:transition xmlns:p14="http://schemas.microsoft.com/office/powerpoint/2010/main">
     <p:fade/>
   </p:transition>
 </p:sldLayout>
@@ -11396,7 +11397,7 @@
   <p:clrMapOvr>
     <a:masterClrMapping/>
   </p:clrMapOvr>
-  <p:transition>
+  <p:transition xmlns:p14="http://schemas.microsoft.com/office/powerpoint/2010/main">
     <p:fade/>
   </p:transition>
 </p:sldLayout>
@@ -11695,12 +11696,12 @@
   <p:clrMapOvr>
     <a:masterClrMapping/>
   </p:clrMapOvr>
-  <p:transition>
+  <p:transition xmlns:p14="http://schemas.microsoft.com/office/powerpoint/2010/main">
     <p:fade/>
   </p:transition>
   <p:extLst mod="1">
     <p:ext uri="{DCECCB84-F9BA-43D5-87BE-67443E8EF086}">
-      <p15:sldGuideLst xmlns:p15="http://schemas.microsoft.com/office/powerpoint/2012/main"/>
+      <p15:sldGuideLst xmlns:p15="http://schemas.microsoft.com/office/powerpoint/2012/main" xmlns=""/>
     </p:ext>
   </p:extLst>
 </p:sldLayout>
@@ -12727,7 +12728,7 @@
   <p:clrMapOvr>
     <a:masterClrMapping/>
   </p:clrMapOvr>
-  <p:transition>
+  <p:transition xmlns:p14="http://schemas.microsoft.com/office/powerpoint/2010/main">
     <p:fade/>
   </p:transition>
 </p:sldLayout>
@@ -13754,7 +13755,7 @@
   <p:clrMapOvr>
     <a:masterClrMapping/>
   </p:clrMapOvr>
-  <p:transition>
+  <p:transition xmlns:p14="http://schemas.microsoft.com/office/powerpoint/2010/main">
     <p:fade/>
   </p:transition>
 </p:sldLayout>
@@ -13995,7 +13996,7 @@
   <p:clrMapOvr>
     <a:masterClrMapping/>
   </p:clrMapOvr>
-  <p:transition>
+  <p:transition xmlns:p14="http://schemas.microsoft.com/office/powerpoint/2010/main">
     <p:fade/>
   </p:transition>
 </p:sldLayout>
@@ -14405,7 +14406,7 @@
   <p:clrMapOvr>
     <a:masterClrMapping/>
   </p:clrMapOvr>
-  <p:transition>
+  <p:transition xmlns:p14="http://schemas.microsoft.com/office/powerpoint/2010/main">
     <p:fade/>
   </p:transition>
 </p:sldLayout>
@@ -14538,7 +14539,7 @@
   <p:clrMapOvr>
     <a:masterClrMapping/>
   </p:clrMapOvr>
-  <p:transition>
+  <p:transition xmlns:p14="http://schemas.microsoft.com/office/powerpoint/2010/main">
     <p:fade/>
   </p:transition>
 </p:sldLayout>
@@ -14673,7 +14674,7 @@
   <p:clrMapOvr>
     <a:masterClrMapping/>
   </p:clrMapOvr>
-  <p:transition>
+  <p:transition xmlns:p14="http://schemas.microsoft.com/office/powerpoint/2010/main">
     <p:fade/>
   </p:transition>
 </p:sldLayout>
@@ -14851,7 +14852,7 @@
   <p:clrMapOvr>
     <a:masterClrMapping/>
   </p:clrMapOvr>
-  <p:transition>
+  <p:transition xmlns:p14="http://schemas.microsoft.com/office/powerpoint/2010/main">
     <p:fade/>
   </p:transition>
 </p:sldLayout>
@@ -15143,7 +15144,7 @@
   <p:clrMapOvr>
     <a:masterClrMapping/>
   </p:clrMapOvr>
-  <p:transition>
+  <p:transition xmlns:p14="http://schemas.microsoft.com/office/powerpoint/2010/main">
     <p:fade/>
   </p:transition>
 </p:sldLayout>
@@ -15446,7 +15447,7 @@
   <p:clrMapOvr>
     <a:masterClrMapping/>
   </p:clrMapOvr>
-  <p:transition>
+  <p:transition xmlns:p14="http://schemas.microsoft.com/office/powerpoint/2010/main">
     <p:fade/>
   </p:transition>
 </p:sldLayout>
@@ -15745,12 +15746,12 @@
   <p:clrMapOvr>
     <a:masterClrMapping/>
   </p:clrMapOvr>
-  <p:transition>
+  <p:transition xmlns:p14="http://schemas.microsoft.com/office/powerpoint/2010/main">
     <p:fade/>
   </p:transition>
   <p:extLst mod="1">
     <p:ext uri="{DCECCB84-F9BA-43D5-87BE-67443E8EF086}">
-      <p15:sldGuideLst xmlns:p15="http://schemas.microsoft.com/office/powerpoint/2012/main"/>
+      <p15:sldGuideLst xmlns:p15="http://schemas.microsoft.com/office/powerpoint/2012/main" xmlns=""/>
     </p:ext>
   </p:extLst>
 </p:sldLayout>
@@ -16777,7 +16778,7 @@
   <p:clrMapOvr>
     <a:masterClrMapping/>
   </p:clrMapOvr>
-  <p:transition>
+  <p:transition xmlns:p14="http://schemas.microsoft.com/office/powerpoint/2010/main">
     <p:fade/>
   </p:transition>
 </p:sldLayout>
@@ -17013,7 +17014,7 @@
   <p:clrMapOvr>
     <a:masterClrMapping/>
   </p:clrMapOvr>
-  <p:transition>
+  <p:transition xmlns:p14="http://schemas.microsoft.com/office/powerpoint/2010/main">
     <p:fade/>
   </p:transition>
 </p:sldLayout>
@@ -17254,7 +17255,7 @@
   <p:clrMapOvr>
     <a:masterClrMapping/>
   </p:clrMapOvr>
-  <p:transition>
+  <p:transition xmlns:p14="http://schemas.microsoft.com/office/powerpoint/2010/main">
     <p:fade/>
   </p:transition>
 </p:sldLayout>
@@ -17664,7 +17665,7 @@
   <p:clrMapOvr>
     <a:masterClrMapping/>
   </p:clrMapOvr>
-  <p:transition>
+  <p:transition xmlns:p14="http://schemas.microsoft.com/office/powerpoint/2010/main">
     <p:fade/>
   </p:transition>
 </p:sldLayout>
@@ -17797,7 +17798,7 @@
   <p:clrMapOvr>
     <a:masterClrMapping/>
   </p:clrMapOvr>
-  <p:transition>
+  <p:transition xmlns:p14="http://schemas.microsoft.com/office/powerpoint/2010/main">
     <p:fade/>
   </p:transition>
 </p:sldLayout>
@@ -17932,7 +17933,7 @@
   <p:clrMapOvr>
     <a:masterClrMapping/>
   </p:clrMapOvr>
-  <p:transition>
+  <p:transition xmlns:p14="http://schemas.microsoft.com/office/powerpoint/2010/main">
     <p:fade/>
   </p:transition>
 </p:sldLayout>
@@ -18110,7 +18111,7 @@
   <p:clrMapOvr>
     <a:masterClrMapping/>
   </p:clrMapOvr>
-  <p:transition>
+  <p:transition xmlns:p14="http://schemas.microsoft.com/office/powerpoint/2010/main">
     <p:fade/>
   </p:transition>
 </p:sldLayout>
@@ -18402,7 +18403,7 @@
   <p:clrMapOvr>
     <a:masterClrMapping/>
   </p:clrMapOvr>
-  <p:transition>
+  <p:transition xmlns:p14="http://schemas.microsoft.com/office/powerpoint/2010/main">
     <p:fade/>
   </p:transition>
 </p:sldLayout>
@@ -18705,7 +18706,7 @@
   <p:clrMapOvr>
     <a:masterClrMapping/>
   </p:clrMapOvr>
-  <p:transition>
+  <p:transition xmlns:p14="http://schemas.microsoft.com/office/powerpoint/2010/main">
     <p:fade/>
   </p:transition>
 </p:sldLayout>
@@ -19004,12 +19005,12 @@
   <p:clrMapOvr>
     <a:masterClrMapping/>
   </p:clrMapOvr>
-  <p:transition>
+  <p:transition xmlns:p14="http://schemas.microsoft.com/office/powerpoint/2010/main">
     <p:fade/>
   </p:transition>
   <p:extLst mod="1">
     <p:ext uri="{DCECCB84-F9BA-43D5-87BE-67443E8EF086}">
-      <p15:sldGuideLst xmlns:p15="http://schemas.microsoft.com/office/powerpoint/2012/main"/>
+      <p15:sldGuideLst xmlns:p15="http://schemas.microsoft.com/office/powerpoint/2012/main" xmlns=""/>
     </p:ext>
   </p:extLst>
 </p:sldLayout>
@@ -20036,7 +20037,7 @@
   <p:clrMapOvr>
     <a:masterClrMapping/>
   </p:clrMapOvr>
-  <p:transition>
+  <p:transition xmlns:p14="http://schemas.microsoft.com/office/powerpoint/2010/main">
     <p:fade/>
   </p:transition>
 </p:sldLayout>
@@ -20277,7 +20278,7 @@
   <p:clrMapOvr>
     <a:masterClrMapping/>
   </p:clrMapOvr>
-  <p:transition>
+  <p:transition xmlns:p14="http://schemas.microsoft.com/office/powerpoint/2010/main">
     <p:fade/>
   </p:transition>
 </p:sldLayout>
@@ -20682,7 +20683,7 @@
   <p:clrMapOvr>
     <a:masterClrMapping/>
   </p:clrMapOvr>
-  <p:transition>
+  <p:transition xmlns:p14="http://schemas.microsoft.com/office/powerpoint/2010/main">
     <p:fade/>
   </p:transition>
 </p:sldLayout>
@@ -21092,7 +21093,7 @@
   <p:clrMapOvr>
     <a:masterClrMapping/>
   </p:clrMapOvr>
-  <p:transition>
+  <p:transition xmlns:p14="http://schemas.microsoft.com/office/powerpoint/2010/main">
     <p:fade/>
   </p:transition>
 </p:sldLayout>
@@ -21225,7 +21226,7 @@
   <p:clrMapOvr>
     <a:masterClrMapping/>
   </p:clrMapOvr>
-  <p:transition>
+  <p:transition xmlns:p14="http://schemas.microsoft.com/office/powerpoint/2010/main">
     <p:fade/>
   </p:transition>
 </p:sldLayout>
@@ -21360,7 +21361,7 @@
   <p:clrMapOvr>
     <a:masterClrMapping/>
   </p:clrMapOvr>
-  <p:transition>
+  <p:transition xmlns:p14="http://schemas.microsoft.com/office/powerpoint/2010/main">
     <p:fade/>
   </p:transition>
 </p:sldLayout>
@@ -21538,7 +21539,7 @@
   <p:clrMapOvr>
     <a:masterClrMapping/>
   </p:clrMapOvr>
-  <p:transition>
+  <p:transition xmlns:p14="http://schemas.microsoft.com/office/powerpoint/2010/main">
     <p:fade/>
   </p:transition>
 </p:sldLayout>
@@ -21830,7 +21831,7 @@
   <p:clrMapOvr>
     <a:masterClrMapping/>
   </p:clrMapOvr>
-  <p:transition>
+  <p:transition xmlns:p14="http://schemas.microsoft.com/office/powerpoint/2010/main">
     <p:fade/>
   </p:transition>
 </p:sldLayout>
@@ -22133,7 +22134,7 @@
   <p:clrMapOvr>
     <a:masterClrMapping/>
   </p:clrMapOvr>
-  <p:transition>
+  <p:transition xmlns:p14="http://schemas.microsoft.com/office/powerpoint/2010/main">
     <p:fade/>
   </p:transition>
 </p:sldLayout>
@@ -22432,12 +22433,12 @@
   <p:clrMapOvr>
     <a:masterClrMapping/>
   </p:clrMapOvr>
-  <p:transition>
+  <p:transition xmlns:p14="http://schemas.microsoft.com/office/powerpoint/2010/main">
     <p:fade/>
   </p:transition>
   <p:extLst mod="1">
     <p:ext uri="{DCECCB84-F9BA-43D5-87BE-67443E8EF086}">
-      <p15:sldGuideLst xmlns:p15="http://schemas.microsoft.com/office/powerpoint/2012/main"/>
+      <p15:sldGuideLst xmlns:p15="http://schemas.microsoft.com/office/powerpoint/2012/main" xmlns=""/>
     </p:ext>
   </p:extLst>
 </p:sldLayout>
@@ -23464,7 +23465,7 @@
   <p:clrMapOvr>
     <a:masterClrMapping/>
   </p:clrMapOvr>
-  <p:transition>
+  <p:transition xmlns:p14="http://schemas.microsoft.com/office/powerpoint/2010/main">
     <p:fade/>
   </p:transition>
 </p:sldLayout>
@@ -23705,7 +23706,7 @@
   <p:clrMapOvr>
     <a:masterClrMapping/>
   </p:clrMapOvr>
-  <p:transition>
+  <p:transition xmlns:p14="http://schemas.microsoft.com/office/powerpoint/2010/main">
     <p:fade/>
   </p:transition>
 </p:sldLayout>
@@ -24115,7 +24116,7 @@
   <p:clrMapOvr>
     <a:masterClrMapping/>
   </p:clrMapOvr>
-  <p:transition>
+  <p:transition xmlns:p14="http://schemas.microsoft.com/office/powerpoint/2010/main">
     <p:fade/>
   </p:transition>
 </p:sldLayout>
@@ -24243,7 +24244,7 @@
   <p:clrMapOvr>
     <a:masterClrMapping/>
   </p:clrMapOvr>
-  <p:transition>
+  <p:transition xmlns:p14="http://schemas.microsoft.com/office/powerpoint/2010/main">
     <p:fade/>
   </p:transition>
 </p:sldLayout>
@@ -24376,7 +24377,7 @@
   <p:clrMapOvr>
     <a:masterClrMapping/>
   </p:clrMapOvr>
-  <p:transition>
+  <p:transition xmlns:p14="http://schemas.microsoft.com/office/powerpoint/2010/main">
     <p:fade/>
   </p:transition>
 </p:sldLayout>
@@ -24511,7 +24512,7 @@
   <p:clrMapOvr>
     <a:masterClrMapping/>
   </p:clrMapOvr>
-  <p:transition>
+  <p:transition xmlns:p14="http://schemas.microsoft.com/office/powerpoint/2010/main">
     <p:fade/>
   </p:transition>
 </p:sldLayout>
@@ -24689,7 +24690,7 @@
   <p:clrMapOvr>
     <a:masterClrMapping/>
   </p:clrMapOvr>
-  <p:transition>
+  <p:transition xmlns:p14="http://schemas.microsoft.com/office/powerpoint/2010/main">
     <p:fade/>
   </p:transition>
 </p:sldLayout>
@@ -24981,7 +24982,7 @@
   <p:clrMapOvr>
     <a:masterClrMapping/>
   </p:clrMapOvr>
-  <p:transition>
+  <p:transition xmlns:p14="http://schemas.microsoft.com/office/powerpoint/2010/main">
     <p:fade/>
   </p:transition>
 </p:sldLayout>
@@ -25284,7 +25285,7 @@
   <p:clrMapOvr>
     <a:masterClrMapping/>
   </p:clrMapOvr>
-  <p:transition>
+  <p:transition xmlns:p14="http://schemas.microsoft.com/office/powerpoint/2010/main">
     <p:fade/>
   </p:transition>
 </p:sldLayout>
@@ -25583,12 +25584,12 @@
   <p:clrMapOvr>
     <a:masterClrMapping/>
   </p:clrMapOvr>
-  <p:transition>
+  <p:transition xmlns:p14="http://schemas.microsoft.com/office/powerpoint/2010/main">
     <p:fade/>
   </p:transition>
   <p:extLst mod="1">
     <p:ext uri="{DCECCB84-F9BA-43D5-87BE-67443E8EF086}">
-      <p15:sldGuideLst xmlns:p15="http://schemas.microsoft.com/office/powerpoint/2012/main"/>
+      <p15:sldGuideLst xmlns:p15="http://schemas.microsoft.com/office/powerpoint/2012/main" xmlns=""/>
     </p:ext>
   </p:extLst>
 </p:sldLayout>
@@ -26615,7 +26616,7 @@
   <p:clrMapOvr>
     <a:masterClrMapping/>
   </p:clrMapOvr>
-  <p:transition>
+  <p:transition xmlns:p14="http://schemas.microsoft.com/office/powerpoint/2010/main">
     <p:fade/>
   </p:transition>
 </p:sldLayout>
@@ -26856,7 +26857,7 @@
   <p:clrMapOvr>
     <a:masterClrMapping/>
   </p:clrMapOvr>
-  <p:transition>
+  <p:transition xmlns:p14="http://schemas.microsoft.com/office/powerpoint/2010/main">
     <p:fade/>
   </p:transition>
 </p:sldLayout>
@@ -27266,7 +27267,7 @@
   <p:clrMapOvr>
     <a:masterClrMapping/>
   </p:clrMapOvr>
-  <p:transition>
+  <p:transition xmlns:p14="http://schemas.microsoft.com/office/powerpoint/2010/main">
     <p:fade/>
   </p:transition>
 </p:sldLayout>
@@ -27399,7 +27400,7 @@
   <p:clrMapOvr>
     <a:masterClrMapping/>
   </p:clrMapOvr>
-  <p:transition>
+  <p:transition xmlns:p14="http://schemas.microsoft.com/office/powerpoint/2010/main">
     <p:fade/>
   </p:transition>
 </p:sldLayout>
@@ -27534,7 +27535,7 @@
   <p:clrMapOvr>
     <a:masterClrMapping/>
   </p:clrMapOvr>
-  <p:transition>
+  <p:transition xmlns:p14="http://schemas.microsoft.com/office/powerpoint/2010/main">
     <p:fade/>
   </p:transition>
 </p:sldLayout>
@@ -27669,7 +27670,7 @@
   <p:clrMapOvr>
     <a:masterClrMapping/>
   </p:clrMapOvr>
-  <p:transition>
+  <p:transition xmlns:p14="http://schemas.microsoft.com/office/powerpoint/2010/main">
     <p:fade/>
   </p:transition>
 </p:sldLayout>
@@ -27847,7 +27848,7 @@
   <p:clrMapOvr>
     <a:masterClrMapping/>
   </p:clrMapOvr>
-  <p:transition>
+  <p:transition xmlns:p14="http://schemas.microsoft.com/office/powerpoint/2010/main">
     <p:fade/>
   </p:transition>
 </p:sldLayout>
@@ -28025,7 +28026,7 @@
   <p:clrMapOvr>
     <a:masterClrMapping/>
   </p:clrMapOvr>
-  <p:transition>
+  <p:transition xmlns:p14="http://schemas.microsoft.com/office/powerpoint/2010/main">
     <p:fade/>
   </p:transition>
 </p:sldLayout>
@@ -29117,7 +29118,7 @@
           <p:cNvPr id="10" name="Picture 9">
             <a:extLst>
               <a:ext uri="{FF2B5EF4-FFF2-40B4-BE49-F238E27FC236}">
-                <a16:creationId xmlns:a16="http://schemas.microsoft.com/office/drawing/2014/main" id="{81E3FA72-4E08-6742-9902-2B25A29D3BB2}"/>
+                <a16:creationId xmlns:a16="http://schemas.microsoft.com/office/drawing/2014/main" xmlns="" id="{81E3FA72-4E08-6742-9902-2B25A29D3BB2}"/>
               </a:ext>
             </a:extLst>
           </p:cNvPr>
@@ -29162,7 +29163,7 @@
     <p:sldLayoutId id="2147483665" r:id="rId8"/>
     <p:sldLayoutId id="2147483668" r:id="rId9"/>
   </p:sldLayoutIdLst>
-  <p:transition>
+  <p:transition xmlns:p14="http://schemas.microsoft.com/office/powerpoint/2010/main">
     <p:fade/>
   </p:transition>
   <p:hf hdr="0"/>
@@ -29451,7 +29452,7 @@
   </p:txStyles>
   <p:extLst mod="1">
     <p:ext uri="{27BBF7A9-308A-43DC-89C8-2F10F3537804}">
-      <p15:sldGuideLst xmlns:p15="http://schemas.microsoft.com/office/powerpoint/2012/main">
+      <p15:sldGuideLst xmlns:p15="http://schemas.microsoft.com/office/powerpoint/2012/main" xmlns="">
         <p15:guide id="1" pos="92" userDrawn="1">
           <p15:clr>
             <a:srgbClr val="F26B43"/>
@@ -30590,6 +30591,10 @@
               <a:rPr lang="en-GB" sz="800" b="1" dirty="0"/>
               <a:t>Placeholder for organisational unit name / logo</a:t>
             </a:r>
+            <a:r>
+              <a:rPr lang="en-GB" sz="800" baseline="0" dirty="0"/>
+              <a:t/>
+            </a:r>
             <a:br>
               <a:rPr lang="en-GB" sz="800" baseline="0" dirty="0"/>
             </a:br>
@@ -30649,7 +30654,7 @@
     <p:sldLayoutId id="2147483773" r:id="rId8"/>
     <p:sldLayoutId id="2147483776" r:id="rId9"/>
   </p:sldLayoutIdLst>
-  <p:transition>
+  <p:transition xmlns:p14="http://schemas.microsoft.com/office/powerpoint/2010/main">
     <p:fade/>
   </p:transition>
   <p:hf hdr="0"/>
@@ -30938,7 +30943,7 @@
   </p:txStyles>
   <p:extLst mod="1">
     <p:ext uri="{27BBF7A9-308A-43DC-89C8-2F10F3537804}">
-      <p15:sldGuideLst xmlns:p15="http://schemas.microsoft.com/office/powerpoint/2012/main">
+      <p15:sldGuideLst xmlns:p15="http://schemas.microsoft.com/office/powerpoint/2012/main" xmlns="">
         <p15:guide id="1" pos="92" userDrawn="1">
           <p15:clr>
             <a:srgbClr val="F26B43"/>
@@ -32077,6 +32082,10 @@
               <a:rPr lang="en-GB" sz="800" b="1" dirty="0"/>
               <a:t>Placeholder for organisational unit name / logo</a:t>
             </a:r>
+            <a:r>
+              <a:rPr lang="en-GB" sz="800" baseline="0" dirty="0"/>
+              <a:t/>
+            </a:r>
             <a:br>
               <a:rPr lang="en-GB" sz="800" baseline="0" dirty="0"/>
             </a:br>
@@ -32136,7 +32145,7 @@
     <p:sldLayoutId id="2147483785" r:id="rId8"/>
     <p:sldLayoutId id="2147483788" r:id="rId9"/>
   </p:sldLayoutIdLst>
-  <p:transition>
+  <p:transition xmlns:p14="http://schemas.microsoft.com/office/powerpoint/2010/main">
     <p:fade/>
   </p:transition>
   <p:hf hdr="0"/>
@@ -32425,7 +32434,7 @@
   </p:txStyles>
   <p:extLst mod="1">
     <p:ext uri="{27BBF7A9-308A-43DC-89C8-2F10F3537804}">
-      <p15:sldGuideLst xmlns:p15="http://schemas.microsoft.com/office/powerpoint/2012/main">
+      <p15:sldGuideLst xmlns:p15="http://schemas.microsoft.com/office/powerpoint/2012/main" xmlns="">
         <p15:guide id="1" pos="92" userDrawn="1">
           <p15:clr>
             <a:srgbClr val="F26B43"/>
@@ -33564,6 +33573,10 @@
               <a:rPr lang="en-GB" sz="800" b="1" dirty="0"/>
               <a:t>Placeholder for organisational unit name / logo</a:t>
             </a:r>
+            <a:r>
+              <a:rPr lang="en-GB" sz="800" baseline="0" dirty="0"/>
+              <a:t/>
+            </a:r>
             <a:br>
               <a:rPr lang="en-GB" sz="800" baseline="0" dirty="0"/>
             </a:br>
@@ -33623,7 +33636,7 @@
     <p:sldLayoutId id="2147483797" r:id="rId8"/>
     <p:sldLayoutId id="2147483800" r:id="rId9"/>
   </p:sldLayoutIdLst>
-  <p:transition>
+  <p:transition xmlns:p14="http://schemas.microsoft.com/office/powerpoint/2010/main">
     <p:fade/>
   </p:transition>
   <p:hf hdr="0"/>
@@ -33912,7 +33925,7 @@
   </p:txStyles>
   <p:extLst mod="1">
     <p:ext uri="{27BBF7A9-308A-43DC-89C8-2F10F3537804}">
-      <p15:sldGuideLst xmlns:p15="http://schemas.microsoft.com/office/powerpoint/2012/main">
+      <p15:sldGuideLst xmlns:p15="http://schemas.microsoft.com/office/powerpoint/2012/main" xmlns="">
         <p15:guide id="1" pos="92" userDrawn="1">
           <p15:clr>
             <a:srgbClr val="F26B43"/>
@@ -35051,6 +35064,10 @@
               <a:rPr lang="en-GB" sz="800" b="1" dirty="0"/>
               <a:t>Placeholder for organisational unit name / logo</a:t>
             </a:r>
+            <a:r>
+              <a:rPr lang="en-GB" sz="800" baseline="0" dirty="0"/>
+              <a:t/>
+            </a:r>
             <a:br>
               <a:rPr lang="en-GB" sz="800" baseline="0" dirty="0"/>
             </a:br>
@@ -35110,7 +35127,7 @@
     <p:sldLayoutId id="2147483809" r:id="rId8"/>
     <p:sldLayoutId id="2147483812" r:id="rId9"/>
   </p:sldLayoutIdLst>
-  <p:transition>
+  <p:transition xmlns:p14="http://schemas.microsoft.com/office/powerpoint/2010/main">
     <p:fade/>
   </p:transition>
   <p:hf hdr="0"/>
@@ -35399,7 +35416,7 @@
   </p:txStyles>
   <p:extLst mod="1">
     <p:ext uri="{27BBF7A9-308A-43DC-89C8-2F10F3537804}">
-      <p15:sldGuideLst xmlns:p15="http://schemas.microsoft.com/office/powerpoint/2012/main">
+      <p15:sldGuideLst xmlns:p15="http://schemas.microsoft.com/office/powerpoint/2012/main" xmlns="">
         <p15:guide id="1" pos="92" userDrawn="1">
           <p15:clr>
             <a:srgbClr val="F26B43"/>
@@ -36538,6 +36555,10 @@
               <a:rPr lang="en-GB" sz="800" b="1" dirty="0"/>
               <a:t>Placeholder for organisational unit name / logo</a:t>
             </a:r>
+            <a:r>
+              <a:rPr lang="en-GB" sz="800" baseline="0" dirty="0"/>
+              <a:t/>
+            </a:r>
             <a:br>
               <a:rPr lang="en-GB" sz="800" baseline="0" dirty="0"/>
             </a:br>
@@ -36597,7 +36618,7 @@
     <p:sldLayoutId id="2147483821" r:id="rId8"/>
     <p:sldLayoutId id="2147483824" r:id="rId9"/>
   </p:sldLayoutIdLst>
-  <p:transition>
+  <p:transition xmlns:p14="http://schemas.microsoft.com/office/powerpoint/2010/main">
     <p:fade/>
   </p:transition>
   <p:hf hdr="0"/>
@@ -36886,7 +36907,7 @@
   </p:txStyles>
   <p:extLst mod="1">
     <p:ext uri="{27BBF7A9-308A-43DC-89C8-2F10F3537804}">
-      <p15:sldGuideLst xmlns:p15="http://schemas.microsoft.com/office/powerpoint/2012/main">
+      <p15:sldGuideLst xmlns:p15="http://schemas.microsoft.com/office/powerpoint/2012/main" xmlns="">
         <p15:guide id="1" pos="92" userDrawn="1">
           <p15:clr>
             <a:srgbClr val="F26B43"/>
@@ -38025,6 +38046,10 @@
               <a:rPr lang="en-GB" sz="800" b="1" dirty="0"/>
               <a:t>Placeholder for organisational unit name / logo</a:t>
             </a:r>
+            <a:r>
+              <a:rPr lang="en-GB" sz="800" baseline="0" dirty="0"/>
+              <a:t/>
+            </a:r>
             <a:br>
               <a:rPr lang="en-GB" sz="800" baseline="0" dirty="0"/>
             </a:br>
@@ -38084,7 +38109,7 @@
     <p:sldLayoutId id="2147483833" r:id="rId8"/>
     <p:sldLayoutId id="2147483836" r:id="rId9"/>
   </p:sldLayoutIdLst>
-  <p:transition>
+  <p:transition xmlns:p14="http://schemas.microsoft.com/office/powerpoint/2010/main">
     <p:fade/>
   </p:transition>
   <p:hf hdr="0"/>
@@ -38373,7 +38398,7 @@
   </p:txStyles>
   <p:extLst mod="1">
     <p:ext uri="{27BBF7A9-308A-43DC-89C8-2F10F3537804}">
-      <p15:sldGuideLst xmlns:p15="http://schemas.microsoft.com/office/powerpoint/2012/main">
+      <p15:sldGuideLst xmlns:p15="http://schemas.microsoft.com/office/powerpoint/2012/main" xmlns="">
         <p15:guide id="1" pos="92" userDrawn="1">
           <p15:clr>
             <a:srgbClr val="F26B43"/>
@@ -39512,6 +39537,10 @@
               <a:rPr lang="en-GB" sz="800" b="1" dirty="0"/>
               <a:t>Placeholder for organisational unit name / logo</a:t>
             </a:r>
+            <a:r>
+              <a:rPr lang="en-GB" sz="800" baseline="0" dirty="0"/>
+              <a:t/>
+            </a:r>
             <a:br>
               <a:rPr lang="en-GB" sz="800" baseline="0" dirty="0"/>
             </a:br>
@@ -39571,7 +39600,7 @@
     <p:sldLayoutId id="2147483845" r:id="rId8"/>
     <p:sldLayoutId id="2147483848" r:id="rId9"/>
   </p:sldLayoutIdLst>
-  <p:transition>
+  <p:transition xmlns:p14="http://schemas.microsoft.com/office/powerpoint/2010/main">
     <p:fade/>
   </p:transition>
   <p:hf hdr="0"/>
@@ -39860,7 +39889,7 @@
   </p:txStyles>
   <p:extLst mod="1">
     <p:ext uri="{27BBF7A9-308A-43DC-89C8-2F10F3537804}">
-      <p15:sldGuideLst xmlns:p15="http://schemas.microsoft.com/office/powerpoint/2012/main">
+      <p15:sldGuideLst xmlns:p15="http://schemas.microsoft.com/office/powerpoint/2012/main" xmlns="">
         <p15:guide id="1" pos="92" userDrawn="1">
           <p15:clr>
             <a:srgbClr val="F26B43"/>
@@ -40999,6 +41028,10 @@
               <a:rPr lang="en-GB" sz="800" b="1" dirty="0"/>
               <a:t>Placeholder for organisational unit name / logo</a:t>
             </a:r>
+            <a:r>
+              <a:rPr lang="en-GB" sz="800" baseline="0" dirty="0"/>
+              <a:t/>
+            </a:r>
             <a:br>
               <a:rPr lang="en-GB" sz="800" baseline="0" dirty="0"/>
             </a:br>
@@ -41058,7 +41091,7 @@
     <p:sldLayoutId id="2147483857" r:id="rId8"/>
     <p:sldLayoutId id="2147483860" r:id="rId9"/>
   </p:sldLayoutIdLst>
-  <p:transition>
+  <p:transition xmlns:p14="http://schemas.microsoft.com/office/powerpoint/2010/main">
     <p:fade/>
   </p:transition>
   <p:hf hdr="0"/>
@@ -41347,7 +41380,7 @@
   </p:txStyles>
   <p:extLst mod="1">
     <p:ext uri="{27BBF7A9-308A-43DC-89C8-2F10F3537804}">
-      <p15:sldGuideLst xmlns:p15="http://schemas.microsoft.com/office/powerpoint/2012/main">
+      <p15:sldGuideLst xmlns:p15="http://schemas.microsoft.com/office/powerpoint/2012/main" xmlns="">
         <p15:guide id="1" pos="92" userDrawn="1">
           <p15:clr>
             <a:srgbClr val="F26B43"/>
@@ -41637,7 +41670,7 @@
   <p:clrMapOvr>
     <a:masterClrMapping/>
   </p:clrMapOvr>
-  <p:transition>
+  <p:transition xmlns:p14="http://schemas.microsoft.com/office/powerpoint/2010/main">
     <p:fade/>
   </p:transition>
 </p:sld>
@@ -41662,110 +41695,6 @@
       </p:grpSpPr>
       <p:sp>
         <p:nvSpPr>
-          <p:cNvPr id="11" name="Inhaltsplatzhalter 10"/>
-          <p:cNvSpPr>
-            <a:spLocks noGrp="1"/>
-          </p:cNvSpPr>
-          <p:nvPr>
-            <p:ph idx="1"/>
-          </p:nvPr>
-        </p:nvSpPr>
-        <p:spPr>
-          <a:xfrm>
-            <a:off x="323850" y="1268700"/>
-            <a:ext cx="11537950" cy="4965410"/>
-          </a:xfrm>
-        </p:spPr>
-        <p:txBody>
-          <a:bodyPr/>
-          <a:lstStyle/>
-          <a:p>
-            <a:pPr marL="0" indent="0">
-              <a:buNone/>
-            </a:pPr>
-            <a:endParaRPr lang="en-GB" dirty="0"/>
-          </a:p>
-          <a:p>
-            <a:pPr marL="0" indent="0">
-              <a:buNone/>
-            </a:pPr>
-            <a:r>
-              <a:rPr lang="en-GB" dirty="0"/>
-              <a:t>NH</a:t>
-            </a:r>
-            <a:r>
-              <a:rPr lang="en-GB" baseline="-25000" dirty="0"/>
-              <a:t>3</a:t>
-            </a:r>
-            <a:r>
-              <a:rPr lang="en-GB" dirty="0"/>
-              <a:t> absorber:</a:t>
-            </a:r>
-          </a:p>
-          <a:p>
-            <a:r>
-              <a:rPr lang="en-GB" dirty="0"/>
-              <a:t>Ideal vs. real (case 1/case 3)</a:t>
-            </a:r>
-          </a:p>
-          <a:p>
-            <a:pPr lvl="1"/>
-            <a:r>
-              <a:rPr lang="en-GB" dirty="0"/>
-              <a:t>Column height: 2.44 m / 4.39 m</a:t>
-            </a:r>
-          </a:p>
-          <a:p>
-            <a:pPr lvl="1"/>
-            <a:r>
-              <a:rPr lang="en-GB" dirty="0"/>
-              <a:t>Diameter: 0.79 m / 0.79 m</a:t>
-            </a:r>
-          </a:p>
-          <a:p>
-            <a:pPr lvl="1"/>
-            <a:r>
-              <a:rPr lang="en-GB" dirty="0"/>
-              <a:t>Flow rate ratio 0.80 / 1.64</a:t>
-            </a:r>
-          </a:p>
-          <a:p>
-            <a:pPr lvl="1"/>
-            <a:r>
-              <a:rPr lang="en-GB" dirty="0"/>
-              <a:t>Temperature in the column</a:t>
-            </a:r>
-          </a:p>
-          <a:p>
-            <a:pPr lvl="1"/>
-            <a:r>
-              <a:rPr lang="en-GB" dirty="0"/>
-              <a:t>Volumetric fraction H</a:t>
-            </a:r>
-            <a:r>
-              <a:rPr lang="en-GB" baseline="-25000" dirty="0"/>
-              <a:t>2</a:t>
-            </a:r>
-            <a:r>
-              <a:rPr lang="en-GB" dirty="0"/>
-              <a:t>SO</a:t>
-            </a:r>
-            <a:r>
-              <a:rPr lang="en-GB" baseline="-25000" dirty="0"/>
-              <a:t>4 </a:t>
-            </a:r>
-            <a:r>
-              <a:rPr lang="en-GB" dirty="0"/>
-              <a:t>: 0.37 / 2.01</a:t>
-            </a:r>
-          </a:p>
-          <a:p>
-            <a:endParaRPr lang="en-GB" dirty="0"/>
-          </a:p>
-        </p:txBody>
-      </p:sp>
-      <p:sp>
-        <p:nvSpPr>
           <p:cNvPr id="3" name="Datumsplatzhalter 2"/>
           <p:cNvSpPr>
             <a:spLocks noGrp="1"/>
@@ -41844,36 +41773,69 @@
             <p:ph type="title"/>
           </p:nvPr>
         </p:nvSpPr>
+        <p:spPr/>
+        <p:txBody>
+          <a:bodyPr/>
+          <a:lstStyle/>
+          <a:p>
+            <a:r>
+              <a:rPr lang="en-GB" dirty="0" smtClean="0"/>
+              <a:t>Reactor profile case 3</a:t>
+            </a:r>
+            <a:endParaRPr lang="en-GB" dirty="0"/>
+          </a:p>
+        </p:txBody>
+      </p:sp>
+      <p:pic>
+        <p:nvPicPr>
+          <p:cNvPr id="7" name="Espace réservé du contenu 6" descr="ReactorProfileCase3_pres.pdf"/>
+          <p:cNvPicPr>
+            <a:picLocks noGrp="1" noChangeAspect="1"/>
+          </p:cNvPicPr>
+          <p:nvPr>
+            <p:ph idx="1"/>
+          </p:nvPr>
+        </p:nvPicPr>
+        <p:blipFill>
+          <a:blip r:embed="rId2">
+            <a:extLst>
+              <a:ext uri="{28A0092B-C50C-407E-A947-70E740481C1C}">
+                <a14:useLocalDpi xmlns:a14="http://schemas.microsoft.com/office/drawing/2010/main" val="0"/>
+              </a:ext>
+            </a:extLst>
+          </a:blip>
+          <a:srcRect l="-146643" r="-146643"/>
+          <a:stretch>
+            <a:fillRect/>
+          </a:stretch>
+        </p:blipFill>
         <p:spPr>
           <a:xfrm>
-            <a:off x="323850" y="620714"/>
-            <a:ext cx="11537950" cy="503966"/>
+            <a:off x="-1035371" y="734130"/>
+            <a:ext cx="14989524" cy="5469480"/>
           </a:xfrm>
         </p:spPr>
-        <p:txBody>
-          <a:bodyPr/>
-          <a:lstStyle/>
-          <a:p>
-            <a:r>
-              <a:rPr lang="en-GB" dirty="0"/>
-              <a:t>Results</a:t>
-            </a:r>
-          </a:p>
-        </p:txBody>
-      </p:sp>
+      </p:pic>
     </p:spTree>
     <p:extLst>
       <p:ext uri="{BB962C8B-B14F-4D97-AF65-F5344CB8AC3E}">
-        <p14:creationId xmlns:p14="http://schemas.microsoft.com/office/powerpoint/2010/main" val="2336202494"/>
+        <p14:creationId xmlns:p14="http://schemas.microsoft.com/office/powerpoint/2010/main" val="2500826925"/>
       </p:ext>
     </p:extLst>
   </p:cSld>
   <p:clrMapOvr>
     <a:masterClrMapping/>
   </p:clrMapOvr>
-  <p:transition>
+  <p:transition xmlns:p14="http://schemas.microsoft.com/office/powerpoint/2010/main">
     <p:fade/>
   </p:transition>
+  <p:timing>
+    <p:tnLst>
+      <p:par>
+        <p:cTn xmlns:p14="http://schemas.microsoft.com/office/powerpoint/2010/main" id="1" dur="indefinite" restart="never" nodeType="tmRoot"/>
+      </p:par>
+    </p:tnLst>
+  </p:timing>
 </p:sld>
 </file>
 
@@ -41925,7 +41887,15 @@
             </a:pPr>
             <a:r>
               <a:rPr lang="en-GB" dirty="0"/>
-              <a:t>HCN absorber:</a:t>
+              <a:t>NH</a:t>
+            </a:r>
+            <a:r>
+              <a:rPr lang="en-GB" baseline="-25000" dirty="0"/>
+              <a:t>3</a:t>
+            </a:r>
+            <a:r>
+              <a:rPr lang="en-GB" dirty="0"/>
+              <a:t> absorber:</a:t>
             </a:r>
           </a:p>
           <a:p>
@@ -41938,28 +41908,51 @@
             <a:pPr lvl="1"/>
             <a:r>
               <a:rPr lang="en-GB" dirty="0"/>
-              <a:t>Column height: 9.73 m / 10.31 m</a:t>
+              <a:t>Column height: 2.44 m / 4.39 m</a:t>
             </a:r>
           </a:p>
           <a:p>
             <a:pPr lvl="1"/>
             <a:r>
               <a:rPr lang="en-GB" dirty="0"/>
-              <a:t>Diameter: 1.11 m / 1.10 m</a:t>
+              <a:t>Diameter: 0.79 m / 0.79 m</a:t>
             </a:r>
           </a:p>
           <a:p>
             <a:pPr lvl="1"/>
             <a:r>
               <a:rPr lang="en-GB" dirty="0"/>
-              <a:t>Outlet temperature: 294.72 K / 293.57 K</a:t>
+              <a:t>Flow rate ratio 0.80 / 1.64</a:t>
             </a:r>
           </a:p>
           <a:p>
             <a:pPr lvl="1"/>
             <a:r>
               <a:rPr lang="en-GB" dirty="0"/>
-              <a:t>Water</a:t>
+              <a:t>Temperature in the column</a:t>
+            </a:r>
+          </a:p>
+          <a:p>
+            <a:pPr lvl="1"/>
+            <a:r>
+              <a:rPr lang="en-GB" dirty="0"/>
+              <a:t>Volumetric fraction H</a:t>
+            </a:r>
+            <a:r>
+              <a:rPr lang="en-GB" baseline="-25000" dirty="0"/>
+              <a:t>2</a:t>
+            </a:r>
+            <a:r>
+              <a:rPr lang="en-GB" dirty="0"/>
+              <a:t>SO</a:t>
+            </a:r>
+            <a:r>
+              <a:rPr lang="en-GB" baseline="-25000" dirty="0"/>
+              <a:t>4 </a:t>
+            </a:r>
+            <a:r>
+              <a:rPr lang="en-GB" dirty="0"/>
+              <a:t>: 0.37 / 2.01</a:t>
             </a:r>
           </a:p>
           <a:p>
@@ -42067,14 +42060,14 @@
     </p:spTree>
     <p:extLst>
       <p:ext uri="{BB962C8B-B14F-4D97-AF65-F5344CB8AC3E}">
-        <p14:creationId xmlns:p14="http://schemas.microsoft.com/office/powerpoint/2010/main" val="3246964687"/>
+        <p14:creationId xmlns:p14="http://schemas.microsoft.com/office/powerpoint/2010/main" val="2336202494"/>
       </p:ext>
     </p:extLst>
   </p:cSld>
   <p:clrMapOvr>
     <a:masterClrMapping/>
   </p:clrMapOvr>
-  <p:transition>
+  <p:transition xmlns:p14="http://schemas.microsoft.com/office/powerpoint/2010/main">
     <p:fade/>
   </p:transition>
 </p:sld>
@@ -42128,7 +42121,7 @@
             </a:pPr>
             <a:r>
               <a:rPr lang="en-GB" dirty="0"/>
-              <a:t>HCN distillation:</a:t>
+              <a:t>HCN absorber:</a:t>
             </a:r>
           </a:p>
           <a:p>
@@ -42141,34 +42134,32 @@
             <a:pPr lvl="1"/>
             <a:r>
               <a:rPr lang="en-GB" dirty="0"/>
-              <a:t>Column height: 9.36 m / 10.08 m</a:t>
+              <a:t>Column height: 9.73 m / 10.31 m</a:t>
             </a:r>
           </a:p>
           <a:p>
             <a:pPr lvl="1"/>
             <a:r>
               <a:rPr lang="en-GB" dirty="0"/>
-              <a:t>Diameter: 1.73 m / 1.92 m</a:t>
+              <a:t>Diameter: 1.11 m / 1.10 m</a:t>
             </a:r>
           </a:p>
           <a:p>
             <a:pPr lvl="1"/>
             <a:r>
               <a:rPr lang="en-GB" dirty="0"/>
-              <a:t>Heat exchanger area: 0.057 m</a:t>
-            </a:r>
-            <a:r>
-              <a:rPr lang="en-GB" baseline="30000" dirty="0"/>
-              <a:t>2</a:t>
-            </a:r>
+              <a:t>Outlet temperature: 294.72 K / 293.57 K</a:t>
+            </a:r>
+          </a:p>
+          <a:p>
+            <a:pPr lvl="1"/>
             <a:r>
               <a:rPr lang="en-GB" dirty="0"/>
-              <a:t> / 0.056 m</a:t>
-            </a:r>
-            <a:r>
-              <a:rPr lang="en-GB" baseline="30000" dirty="0"/>
-              <a:t>2</a:t>
-            </a:r>
+              <a:t>Water</a:t>
+            </a:r>
+          </a:p>
+          <a:p>
+            <a:endParaRPr lang="en-GB" dirty="0"/>
           </a:p>
         </p:txBody>
       </p:sp>
@@ -42272,14 +42263,14 @@
     </p:spTree>
     <p:extLst>
       <p:ext uri="{BB962C8B-B14F-4D97-AF65-F5344CB8AC3E}">
-        <p14:creationId xmlns:p14="http://schemas.microsoft.com/office/powerpoint/2010/main" val="1461997070"/>
+        <p14:creationId xmlns:p14="http://schemas.microsoft.com/office/powerpoint/2010/main" val="3246964687"/>
       </p:ext>
     </p:extLst>
   </p:cSld>
   <p:clrMapOvr>
     <a:masterClrMapping/>
   </p:clrMapOvr>
-  <p:transition>
+  <p:transition xmlns:p14="http://schemas.microsoft.com/office/powerpoint/2010/main">
     <p:fade/>
   </p:transition>
 </p:sld>
@@ -42333,7 +42324,7 @@
             </a:pPr>
             <a:r>
               <a:rPr lang="en-GB" dirty="0"/>
-              <a:t>Costs</a:t>
+              <a:t>HCN distillation:</a:t>
             </a:r>
           </a:p>
           <a:p>
@@ -42346,7 +42337,33 @@
             <a:pPr lvl="1"/>
             <a:r>
               <a:rPr lang="en-GB" dirty="0"/>
-              <a:t>Break-even price: 0.62 $/kg / 0.76 $/kg</a:t>
+              <a:t>Column height: 9.36 m / 10.08 m</a:t>
+            </a:r>
+          </a:p>
+          <a:p>
+            <a:pPr lvl="1"/>
+            <a:r>
+              <a:rPr lang="en-GB" dirty="0"/>
+              <a:t>Diameter: 1.73 m / 1.92 m</a:t>
+            </a:r>
+          </a:p>
+          <a:p>
+            <a:pPr lvl="1"/>
+            <a:r>
+              <a:rPr lang="en-GB" dirty="0"/>
+              <a:t>Heat exchanger area: 0.057 m</a:t>
+            </a:r>
+            <a:r>
+              <a:rPr lang="en-GB" baseline="30000" dirty="0"/>
+              <a:t>2</a:t>
+            </a:r>
+            <a:r>
+              <a:rPr lang="en-GB" dirty="0"/>
+              <a:t> / 0.056 m</a:t>
+            </a:r>
+            <a:r>
+              <a:rPr lang="en-GB" baseline="30000" dirty="0"/>
+              <a:t>2</a:t>
             </a:r>
           </a:p>
         </p:txBody>
@@ -42416,6 +42433,185 @@
               <a:rPr lang="en-GB" smtClean="0"/>
               <a:pPr/>
               <a:t>13</a:t>
+            </a:fld>
+            <a:endParaRPr lang="en-GB" dirty="0"/>
+          </a:p>
+        </p:txBody>
+      </p:sp>
+      <p:sp>
+        <p:nvSpPr>
+          <p:cNvPr id="10" name="Titel 9"/>
+          <p:cNvSpPr>
+            <a:spLocks noGrp="1"/>
+          </p:cNvSpPr>
+          <p:nvPr>
+            <p:ph type="title"/>
+          </p:nvPr>
+        </p:nvSpPr>
+        <p:spPr>
+          <a:xfrm>
+            <a:off x="323850" y="620714"/>
+            <a:ext cx="11537950" cy="503966"/>
+          </a:xfrm>
+        </p:spPr>
+        <p:txBody>
+          <a:bodyPr/>
+          <a:lstStyle/>
+          <a:p>
+            <a:r>
+              <a:rPr lang="en-GB" dirty="0"/>
+              <a:t>Results</a:t>
+            </a:r>
+          </a:p>
+        </p:txBody>
+      </p:sp>
+    </p:spTree>
+    <p:extLst>
+      <p:ext uri="{BB962C8B-B14F-4D97-AF65-F5344CB8AC3E}">
+        <p14:creationId xmlns:p14="http://schemas.microsoft.com/office/powerpoint/2010/main" val="1461997070"/>
+      </p:ext>
+    </p:extLst>
+  </p:cSld>
+  <p:clrMapOvr>
+    <a:masterClrMapping/>
+  </p:clrMapOvr>
+  <p:transition xmlns:p14="http://schemas.microsoft.com/office/powerpoint/2010/main">
+    <p:fade/>
+  </p:transition>
+</p:sld>
+</file>
+
+<file path=ppt/slides/slide14.xml><?xml version="1.0" encoding="utf-8"?>
+<p:sld xmlns:a="http://schemas.openxmlformats.org/drawingml/2006/main" xmlns:r="http://schemas.openxmlformats.org/officeDocument/2006/relationships" xmlns:p="http://schemas.openxmlformats.org/presentationml/2006/main">
+  <p:cSld>
+    <p:spTree>
+      <p:nvGrpSpPr>
+        <p:cNvPr id="1" name=""/>
+        <p:cNvGrpSpPr/>
+        <p:nvPr/>
+      </p:nvGrpSpPr>
+      <p:grpSpPr>
+        <a:xfrm>
+          <a:off x="0" y="0"/>
+          <a:ext cx="0" cy="0"/>
+          <a:chOff x="0" y="0"/>
+          <a:chExt cx="0" cy="0"/>
+        </a:xfrm>
+      </p:grpSpPr>
+      <p:sp>
+        <p:nvSpPr>
+          <p:cNvPr id="11" name="Inhaltsplatzhalter 10"/>
+          <p:cNvSpPr>
+            <a:spLocks noGrp="1"/>
+          </p:cNvSpPr>
+          <p:nvPr>
+            <p:ph idx="1"/>
+          </p:nvPr>
+        </p:nvSpPr>
+        <p:spPr>
+          <a:xfrm>
+            <a:off x="323850" y="1268700"/>
+            <a:ext cx="11537950" cy="4965410"/>
+          </a:xfrm>
+        </p:spPr>
+        <p:txBody>
+          <a:bodyPr/>
+          <a:lstStyle/>
+          <a:p>
+            <a:pPr marL="0" indent="0">
+              <a:buNone/>
+            </a:pPr>
+            <a:endParaRPr lang="en-GB" dirty="0"/>
+          </a:p>
+          <a:p>
+            <a:pPr marL="0" indent="0">
+              <a:buNone/>
+            </a:pPr>
+            <a:r>
+              <a:rPr lang="en-GB" dirty="0"/>
+              <a:t>Costs</a:t>
+            </a:r>
+          </a:p>
+          <a:p>
+            <a:r>
+              <a:rPr lang="en-GB" dirty="0"/>
+              <a:t>Ideal vs. real (case 1/case 3)</a:t>
+            </a:r>
+          </a:p>
+          <a:p>
+            <a:pPr lvl="1"/>
+            <a:r>
+              <a:rPr lang="en-GB" dirty="0"/>
+              <a:t>Break-even price: 0.62 $/kg / 0.76 $/kg</a:t>
+            </a:r>
+          </a:p>
+        </p:txBody>
+      </p:sp>
+      <p:sp>
+        <p:nvSpPr>
+          <p:cNvPr id="3" name="Datumsplatzhalter 2"/>
+          <p:cNvSpPr>
+            <a:spLocks noGrp="1"/>
+          </p:cNvSpPr>
+          <p:nvPr>
+            <p:ph type="dt" sz="half" idx="10"/>
+          </p:nvPr>
+        </p:nvSpPr>
+        <p:spPr/>
+        <p:txBody>
+          <a:bodyPr/>
+          <a:lstStyle/>
+          <a:p>
+            <a:r>
+              <a:rPr lang="fr-CH"/>
+              <a:t>23.05.2018</a:t>
+            </a:r>
+            <a:endParaRPr lang="en-GB" dirty="0"/>
+          </a:p>
+        </p:txBody>
+      </p:sp>
+      <p:sp>
+        <p:nvSpPr>
+          <p:cNvPr id="4" name="Fußzeilenplatzhalter 3"/>
+          <p:cNvSpPr>
+            <a:spLocks noGrp="1"/>
+          </p:cNvSpPr>
+          <p:nvPr>
+            <p:ph type="ftr" sz="quarter" idx="11"/>
+          </p:nvPr>
+        </p:nvSpPr>
+        <p:spPr/>
+        <p:txBody>
+          <a:bodyPr/>
+          <a:lstStyle/>
+          <a:p>
+            <a:r>
+              <a:rPr lang="en-GB"/>
+              <a:t>Group A</a:t>
+            </a:r>
+            <a:endParaRPr lang="en-GB" dirty="0"/>
+          </a:p>
+        </p:txBody>
+      </p:sp>
+      <p:sp>
+        <p:nvSpPr>
+          <p:cNvPr id="5" name="Foliennummernplatzhalter 4"/>
+          <p:cNvSpPr>
+            <a:spLocks noGrp="1"/>
+          </p:cNvSpPr>
+          <p:nvPr>
+            <p:ph type="sldNum" sz="quarter" idx="12"/>
+          </p:nvPr>
+        </p:nvSpPr>
+        <p:spPr/>
+        <p:txBody>
+          <a:bodyPr/>
+          <a:lstStyle/>
+          <a:p>
+            <a:fld id="{6C6AE60A-B69C-4790-82F7-3882EDF23186}" type="slidenum">
+              <a:rPr lang="en-GB" smtClean="0"/>
+              <a:pPr/>
+              <a:t>14</a:t>
             </a:fld>
             <a:endParaRPr lang="en-GB" dirty="0"/>
           </a:p>
@@ -42548,148 +42744,7 @@
   <p:clrMapOvr>
     <a:masterClrMapping/>
   </p:clrMapOvr>
-  <p:transition>
-    <p:fade/>
-  </p:transition>
-</p:sld>
-</file>
-
-<file path=ppt/slides/slide14.xml><?xml version="1.0" encoding="utf-8"?>
-<p:sld xmlns:a="http://schemas.openxmlformats.org/drawingml/2006/main" xmlns:r="http://schemas.openxmlformats.org/officeDocument/2006/relationships" xmlns:p="http://schemas.openxmlformats.org/presentationml/2006/main">
-  <p:cSld>
-    <p:spTree>
-      <p:nvGrpSpPr>
-        <p:cNvPr id="1" name=""/>
-        <p:cNvGrpSpPr/>
-        <p:nvPr/>
-      </p:nvGrpSpPr>
-      <p:grpSpPr>
-        <a:xfrm>
-          <a:off x="0" y="0"/>
-          <a:ext cx="0" cy="0"/>
-          <a:chOff x="0" y="0"/>
-          <a:chExt cx="0" cy="0"/>
-        </a:xfrm>
-      </p:grpSpPr>
-      <p:sp>
-        <p:nvSpPr>
-          <p:cNvPr id="11" name="Inhaltsplatzhalter 10"/>
-          <p:cNvSpPr>
-            <a:spLocks noGrp="1"/>
-          </p:cNvSpPr>
-          <p:nvPr>
-            <p:ph idx="1"/>
-          </p:nvPr>
-        </p:nvSpPr>
-        <p:spPr/>
-        <p:txBody>
-          <a:bodyPr/>
-          <a:lstStyle/>
-          <a:p>
-            <a:endParaRPr lang="en-GB" dirty="0"/>
-          </a:p>
-        </p:txBody>
-      </p:sp>
-      <p:sp>
-        <p:nvSpPr>
-          <p:cNvPr id="3" name="Datumsplatzhalter 2"/>
-          <p:cNvSpPr>
-            <a:spLocks noGrp="1"/>
-          </p:cNvSpPr>
-          <p:nvPr>
-            <p:ph type="dt" sz="half" idx="10"/>
-          </p:nvPr>
-        </p:nvSpPr>
-        <p:spPr/>
-        <p:txBody>
-          <a:bodyPr/>
-          <a:lstStyle/>
-          <a:p>
-            <a:r>
-              <a:rPr lang="fr-CH"/>
-              <a:t>23.05.2018</a:t>
-            </a:r>
-            <a:endParaRPr lang="en-GB" dirty="0"/>
-          </a:p>
-        </p:txBody>
-      </p:sp>
-      <p:sp>
-        <p:nvSpPr>
-          <p:cNvPr id="4" name="Fußzeilenplatzhalter 3"/>
-          <p:cNvSpPr>
-            <a:spLocks noGrp="1"/>
-          </p:cNvSpPr>
-          <p:nvPr>
-            <p:ph type="ftr" sz="quarter" idx="11"/>
-          </p:nvPr>
-        </p:nvSpPr>
-        <p:spPr/>
-        <p:txBody>
-          <a:bodyPr/>
-          <a:lstStyle/>
-          <a:p>
-            <a:r>
-              <a:rPr lang="en-GB"/>
-              <a:t>Group A</a:t>
-            </a:r>
-            <a:endParaRPr lang="en-GB" dirty="0"/>
-          </a:p>
-        </p:txBody>
-      </p:sp>
-      <p:sp>
-        <p:nvSpPr>
-          <p:cNvPr id="5" name="Foliennummernplatzhalter 4"/>
-          <p:cNvSpPr>
-            <a:spLocks noGrp="1"/>
-          </p:cNvSpPr>
-          <p:nvPr>
-            <p:ph type="sldNum" sz="quarter" idx="12"/>
-          </p:nvPr>
-        </p:nvSpPr>
-        <p:spPr/>
-        <p:txBody>
-          <a:bodyPr/>
-          <a:lstStyle/>
-          <a:p>
-            <a:fld id="{6C6AE60A-B69C-4790-82F7-3882EDF23186}" type="slidenum">
-              <a:rPr lang="en-GB" smtClean="0"/>
-              <a:pPr/>
-              <a:t>14</a:t>
-            </a:fld>
-            <a:endParaRPr lang="en-GB" dirty="0"/>
-          </a:p>
-        </p:txBody>
-      </p:sp>
-      <p:sp>
-        <p:nvSpPr>
-          <p:cNvPr id="10" name="Titel 9"/>
-          <p:cNvSpPr>
-            <a:spLocks noGrp="1"/>
-          </p:cNvSpPr>
-          <p:nvPr>
-            <p:ph type="title"/>
-          </p:nvPr>
-        </p:nvSpPr>
-        <p:spPr/>
-        <p:txBody>
-          <a:bodyPr/>
-          <a:lstStyle/>
-          <a:p>
-            <a:endParaRPr lang="en-GB" dirty="0"/>
-          </a:p>
-        </p:txBody>
-      </p:sp>
-    </p:spTree>
-    <p:extLst>
-      <p:ext uri="{BB962C8B-B14F-4D97-AF65-F5344CB8AC3E}">
-        <p14:creationId xmlns:p14="http://schemas.microsoft.com/office/powerpoint/2010/main" val="2857788226"/>
-      </p:ext>
-    </p:extLst>
-  </p:cSld>
-  <p:clrMapOvr>
-    <a:masterClrMapping/>
-  </p:clrMapOvr>
-  <p:transition>
+  <p:transition xmlns:p14="http://schemas.microsoft.com/office/powerpoint/2010/main">
     <p:fade/>
   </p:transition>
 </p:sld>
@@ -42714,12 +42769,12 @@
       </p:grpSpPr>
       <p:sp>
         <p:nvSpPr>
-          <p:cNvPr id="11" name="Titel 10"/>
-          <p:cNvSpPr>
-            <a:spLocks noGrp="1"/>
-          </p:cNvSpPr>
-          <p:nvPr>
-            <p:ph type="ctrTitle"/>
+          <p:cNvPr id="11" name="Inhaltsplatzhalter 10"/>
+          <p:cNvSpPr>
+            <a:spLocks noGrp="1"/>
+          </p:cNvSpPr>
+          <p:nvPr>
+            <p:ph idx="1"/>
           </p:nvPr>
         </p:nvSpPr>
         <p:spPr/>
@@ -42733,12 +42788,12 @@
       </p:sp>
       <p:sp>
         <p:nvSpPr>
-          <p:cNvPr id="12" name="Untertitel 11"/>
-          <p:cNvSpPr>
-            <a:spLocks noGrp="1"/>
-          </p:cNvSpPr>
-          <p:nvPr>
-            <p:ph type="subTitle" idx="1"/>
+          <p:cNvPr id="3" name="Datumsplatzhalter 2"/>
+          <p:cNvSpPr>
+            <a:spLocks noGrp="1"/>
+          </p:cNvSpPr>
+          <p:nvPr>
+            <p:ph type="dt" sz="half" idx="10"/>
           </p:nvPr>
         </p:nvSpPr>
         <p:spPr/>
@@ -42746,18 +42801,22 @@
           <a:bodyPr/>
           <a:lstStyle/>
           <a:p>
-            <a:endParaRPr lang="en-GB" dirty="0"/>
-          </a:p>
-        </p:txBody>
-      </p:sp>
-      <p:sp>
-        <p:nvSpPr>
-          <p:cNvPr id="4" name="Datumsplatzhalter 3"/>
-          <p:cNvSpPr>
-            <a:spLocks noGrp="1"/>
-          </p:cNvSpPr>
-          <p:nvPr>
-            <p:ph type="dt" sz="half" idx="10"/>
+            <a:r>
+              <a:rPr lang="fr-CH"/>
+              <a:t>23.05.2018</a:t>
+            </a:r>
+            <a:endParaRPr lang="en-GB" dirty="0"/>
+          </a:p>
+        </p:txBody>
+      </p:sp>
+      <p:sp>
+        <p:nvSpPr>
+          <p:cNvPr id="4" name="Fußzeilenplatzhalter 3"/>
+          <p:cNvSpPr>
+            <a:spLocks noGrp="1"/>
+          </p:cNvSpPr>
+          <p:nvPr>
+            <p:ph type="ftr" sz="quarter" idx="11"/>
           </p:nvPr>
         </p:nvSpPr>
         <p:spPr/>
@@ -42766,29 +42825,6 @@
           <a:lstStyle/>
           <a:p>
             <a:r>
-              <a:rPr lang="fr-CH"/>
-              <a:t>23.05.2018</a:t>
-            </a:r>
-            <a:endParaRPr lang="en-GB" dirty="0"/>
-          </a:p>
-        </p:txBody>
-      </p:sp>
-      <p:sp>
-        <p:nvSpPr>
-          <p:cNvPr id="5" name="Fußzeilenplatzhalter 4"/>
-          <p:cNvSpPr>
-            <a:spLocks noGrp="1"/>
-          </p:cNvSpPr>
-          <p:nvPr>
-            <p:ph type="ftr" sz="quarter" idx="11"/>
-          </p:nvPr>
-        </p:nvSpPr>
-        <p:spPr/>
-        <p:txBody>
-          <a:bodyPr/>
-          <a:lstStyle/>
-          <a:p>
-            <a:r>
               <a:rPr lang="en-GB"/>
               <a:t>Group A</a:t>
             </a:r>
@@ -42798,7 +42834,7 @@
       </p:sp>
       <p:sp>
         <p:nvSpPr>
-          <p:cNvPr id="6" name="Foliennummernplatzhalter 5"/>
+          <p:cNvPr id="5" name="Foliennummernplatzhalter 4"/>
           <p:cNvSpPr>
             <a:spLocks noGrp="1"/>
           </p:cNvSpPr>
@@ -42815,6 +42851,166 @@
               <a:rPr lang="en-GB" smtClean="0"/>
               <a:pPr/>
               <a:t>15</a:t>
+            </a:fld>
+            <a:endParaRPr lang="en-GB" dirty="0"/>
+          </a:p>
+        </p:txBody>
+      </p:sp>
+      <p:sp>
+        <p:nvSpPr>
+          <p:cNvPr id="10" name="Titel 9"/>
+          <p:cNvSpPr>
+            <a:spLocks noGrp="1"/>
+          </p:cNvSpPr>
+          <p:nvPr>
+            <p:ph type="title"/>
+          </p:nvPr>
+        </p:nvSpPr>
+        <p:spPr/>
+        <p:txBody>
+          <a:bodyPr/>
+          <a:lstStyle/>
+          <a:p>
+            <a:endParaRPr lang="en-GB" dirty="0"/>
+          </a:p>
+        </p:txBody>
+      </p:sp>
+    </p:spTree>
+    <p:extLst>
+      <p:ext uri="{BB962C8B-B14F-4D97-AF65-F5344CB8AC3E}">
+        <p14:creationId xmlns:p14="http://schemas.microsoft.com/office/powerpoint/2010/main" val="2857788226"/>
+      </p:ext>
+    </p:extLst>
+  </p:cSld>
+  <p:clrMapOvr>
+    <a:masterClrMapping/>
+  </p:clrMapOvr>
+  <p:transition xmlns:p14="http://schemas.microsoft.com/office/powerpoint/2010/main">
+    <p:fade/>
+  </p:transition>
+</p:sld>
+</file>
+
+<file path=ppt/slides/slide16.xml><?xml version="1.0" encoding="utf-8"?>
+<p:sld xmlns:a="http://schemas.openxmlformats.org/drawingml/2006/main" xmlns:r="http://schemas.openxmlformats.org/officeDocument/2006/relationships" xmlns:p="http://schemas.openxmlformats.org/presentationml/2006/main">
+  <p:cSld>
+    <p:spTree>
+      <p:nvGrpSpPr>
+        <p:cNvPr id="1" name=""/>
+        <p:cNvGrpSpPr/>
+        <p:nvPr/>
+      </p:nvGrpSpPr>
+      <p:grpSpPr>
+        <a:xfrm>
+          <a:off x="0" y="0"/>
+          <a:ext cx="0" cy="0"/>
+          <a:chOff x="0" y="0"/>
+          <a:chExt cx="0" cy="0"/>
+        </a:xfrm>
+      </p:grpSpPr>
+      <p:sp>
+        <p:nvSpPr>
+          <p:cNvPr id="11" name="Titel 10"/>
+          <p:cNvSpPr>
+            <a:spLocks noGrp="1"/>
+          </p:cNvSpPr>
+          <p:nvPr>
+            <p:ph type="ctrTitle"/>
+          </p:nvPr>
+        </p:nvSpPr>
+        <p:spPr/>
+        <p:txBody>
+          <a:bodyPr/>
+          <a:lstStyle/>
+          <a:p>
+            <a:endParaRPr lang="en-GB" dirty="0"/>
+          </a:p>
+        </p:txBody>
+      </p:sp>
+      <p:sp>
+        <p:nvSpPr>
+          <p:cNvPr id="12" name="Untertitel 11"/>
+          <p:cNvSpPr>
+            <a:spLocks noGrp="1"/>
+          </p:cNvSpPr>
+          <p:nvPr>
+            <p:ph type="subTitle" idx="1"/>
+          </p:nvPr>
+        </p:nvSpPr>
+        <p:spPr/>
+        <p:txBody>
+          <a:bodyPr/>
+          <a:lstStyle/>
+          <a:p>
+            <a:endParaRPr lang="en-GB" dirty="0"/>
+          </a:p>
+        </p:txBody>
+      </p:sp>
+      <p:sp>
+        <p:nvSpPr>
+          <p:cNvPr id="4" name="Datumsplatzhalter 3"/>
+          <p:cNvSpPr>
+            <a:spLocks noGrp="1"/>
+          </p:cNvSpPr>
+          <p:nvPr>
+            <p:ph type="dt" sz="half" idx="10"/>
+          </p:nvPr>
+        </p:nvSpPr>
+        <p:spPr/>
+        <p:txBody>
+          <a:bodyPr/>
+          <a:lstStyle/>
+          <a:p>
+            <a:r>
+              <a:rPr lang="fr-CH"/>
+              <a:t>23.05.2018</a:t>
+            </a:r>
+            <a:endParaRPr lang="en-GB" dirty="0"/>
+          </a:p>
+        </p:txBody>
+      </p:sp>
+      <p:sp>
+        <p:nvSpPr>
+          <p:cNvPr id="5" name="Fußzeilenplatzhalter 4"/>
+          <p:cNvSpPr>
+            <a:spLocks noGrp="1"/>
+          </p:cNvSpPr>
+          <p:nvPr>
+            <p:ph type="ftr" sz="quarter" idx="11"/>
+          </p:nvPr>
+        </p:nvSpPr>
+        <p:spPr/>
+        <p:txBody>
+          <a:bodyPr/>
+          <a:lstStyle/>
+          <a:p>
+            <a:r>
+              <a:rPr lang="en-GB"/>
+              <a:t>Group A</a:t>
+            </a:r>
+            <a:endParaRPr lang="en-GB" dirty="0"/>
+          </a:p>
+        </p:txBody>
+      </p:sp>
+      <p:sp>
+        <p:nvSpPr>
+          <p:cNvPr id="6" name="Foliennummernplatzhalter 5"/>
+          <p:cNvSpPr>
+            <a:spLocks noGrp="1"/>
+          </p:cNvSpPr>
+          <p:nvPr>
+            <p:ph type="sldNum" sz="quarter" idx="12"/>
+          </p:nvPr>
+        </p:nvSpPr>
+        <p:spPr/>
+        <p:txBody>
+          <a:bodyPr/>
+          <a:lstStyle/>
+          <a:p>
+            <a:fld id="{6C6AE60A-B69C-4790-82F7-3882EDF23186}" type="slidenum">
+              <a:rPr lang="en-GB" smtClean="0"/>
+              <a:pPr/>
+              <a:t>16</a:t>
             </a:fld>
             <a:endParaRPr lang="en-GB" dirty="0"/>
           </a:p>
@@ -42842,13 +43038,13 @@
   <p:clrMapOvr>
     <a:masterClrMapping/>
   </p:clrMapOvr>
-  <p:transition>
+  <p:transition xmlns:p14="http://schemas.microsoft.com/office/powerpoint/2010/main">
     <p:fade/>
   </p:transition>
 </p:sld>
 </file>
 
-<file path=ppt/slides/slide16.xml><?xml version="1.0" encoding="utf-8"?>
+<file path=ppt/slides/slide17.xml><?xml version="1.0" encoding="utf-8"?>
 <p:sld xmlns:a="http://schemas.openxmlformats.org/drawingml/2006/main" xmlns:r="http://schemas.openxmlformats.org/officeDocument/2006/relationships" xmlns:p="http://schemas.openxmlformats.org/presentationml/2006/main">
   <p:cSld>
     <p:spTree>
@@ -43118,167 +43314,7 @@
   <p:clrMapOvr>
     <a:masterClrMapping/>
   </p:clrMapOvr>
-  <p:transition>
-    <p:fade/>
-  </p:transition>
-</p:sld>
-</file>
-
-<file path=ppt/slides/slide17.xml><?xml version="1.0" encoding="utf-8"?>
-<p:sld xmlns:a="http://schemas.openxmlformats.org/drawingml/2006/main" xmlns:r="http://schemas.openxmlformats.org/officeDocument/2006/relationships" xmlns:p="http://schemas.openxmlformats.org/presentationml/2006/main">
-  <p:cSld>
-    <p:spTree>
-      <p:nvGrpSpPr>
-        <p:cNvPr id="1" name=""/>
-        <p:cNvGrpSpPr/>
-        <p:nvPr/>
-      </p:nvGrpSpPr>
-      <p:grpSpPr>
-        <a:xfrm>
-          <a:off x="0" y="0"/>
-          <a:ext cx="0" cy="0"/>
-          <a:chOff x="0" y="0"/>
-          <a:chExt cx="0" cy="0"/>
-        </a:xfrm>
-      </p:grpSpPr>
-      <p:sp>
-        <p:nvSpPr>
-          <p:cNvPr id="12" name="Inhaltsplatzhalter 11"/>
-          <p:cNvSpPr>
-            <a:spLocks noGrp="1"/>
-          </p:cNvSpPr>
-          <p:nvPr>
-            <p:ph sz="half" idx="1"/>
-          </p:nvPr>
-        </p:nvSpPr>
-        <p:spPr/>
-        <p:txBody>
-          <a:bodyPr/>
-          <a:lstStyle/>
-          <a:p>
-            <a:endParaRPr lang="en-GB" dirty="0"/>
-          </a:p>
-        </p:txBody>
-      </p:sp>
-      <p:sp>
-        <p:nvSpPr>
-          <p:cNvPr id="13" name="Inhaltsplatzhalter 12"/>
-          <p:cNvSpPr>
-            <a:spLocks noGrp="1"/>
-          </p:cNvSpPr>
-          <p:nvPr>
-            <p:ph sz="half" idx="2"/>
-          </p:nvPr>
-        </p:nvSpPr>
-        <p:spPr/>
-        <p:txBody>
-          <a:bodyPr/>
-          <a:lstStyle/>
-          <a:p>
-            <a:endParaRPr lang="en-GB" dirty="0"/>
-          </a:p>
-        </p:txBody>
-      </p:sp>
-      <p:sp>
-        <p:nvSpPr>
-          <p:cNvPr id="4" name="Datumsplatzhalter 3"/>
-          <p:cNvSpPr>
-            <a:spLocks noGrp="1"/>
-          </p:cNvSpPr>
-          <p:nvPr>
-            <p:ph type="dt" sz="half" idx="10"/>
-          </p:nvPr>
-        </p:nvSpPr>
-        <p:spPr/>
-        <p:txBody>
-          <a:bodyPr/>
-          <a:lstStyle/>
-          <a:p>
-            <a:r>
-              <a:rPr lang="fr-CH"/>
-              <a:t>23.05.2018</a:t>
-            </a:r>
-            <a:endParaRPr lang="en-GB" dirty="0"/>
-          </a:p>
-        </p:txBody>
-      </p:sp>
-      <p:sp>
-        <p:nvSpPr>
-          <p:cNvPr id="5" name="Fußzeilenplatzhalter 4"/>
-          <p:cNvSpPr>
-            <a:spLocks noGrp="1"/>
-          </p:cNvSpPr>
-          <p:nvPr>
-            <p:ph type="ftr" sz="quarter" idx="11"/>
-          </p:nvPr>
-        </p:nvSpPr>
-        <p:spPr/>
-        <p:txBody>
-          <a:bodyPr/>
-          <a:lstStyle/>
-          <a:p>
-            <a:r>
-              <a:rPr lang="en-GB"/>
-              <a:t>Group A</a:t>
-            </a:r>
-            <a:endParaRPr lang="en-GB" dirty="0"/>
-          </a:p>
-        </p:txBody>
-      </p:sp>
-      <p:sp>
-        <p:nvSpPr>
-          <p:cNvPr id="6" name="Foliennummernplatzhalter 5"/>
-          <p:cNvSpPr>
-            <a:spLocks noGrp="1"/>
-          </p:cNvSpPr>
-          <p:nvPr>
-            <p:ph type="sldNum" sz="quarter" idx="12"/>
-          </p:nvPr>
-        </p:nvSpPr>
-        <p:spPr/>
-        <p:txBody>
-          <a:bodyPr/>
-          <a:lstStyle/>
-          <a:p>
-            <a:fld id="{6C6AE60A-B69C-4790-82F7-3882EDF23186}" type="slidenum">
-              <a:rPr lang="en-GB" smtClean="0"/>
-              <a:pPr/>
-              <a:t>17</a:t>
-            </a:fld>
-            <a:endParaRPr lang="en-GB" dirty="0"/>
-          </a:p>
-        </p:txBody>
-      </p:sp>
-      <p:sp>
-        <p:nvSpPr>
-          <p:cNvPr id="11" name="Titel 10"/>
-          <p:cNvSpPr>
-            <a:spLocks noGrp="1"/>
-          </p:cNvSpPr>
-          <p:nvPr>
-            <p:ph type="title"/>
-          </p:nvPr>
-        </p:nvSpPr>
-        <p:spPr/>
-        <p:txBody>
-          <a:bodyPr/>
-          <a:lstStyle/>
-          <a:p>
-            <a:endParaRPr lang="en-GB" dirty="0"/>
-          </a:p>
-        </p:txBody>
-      </p:sp>
-    </p:spTree>
-    <p:extLst>
-      <p:ext uri="{BB962C8B-B14F-4D97-AF65-F5344CB8AC3E}">
-        <p14:creationId xmlns:p14="http://schemas.microsoft.com/office/powerpoint/2010/main" val="572143329"/>
-      </p:ext>
-    </p:extLst>
-  </p:cSld>
-  <p:clrMapOvr>
-    <a:masterClrMapping/>
-  </p:clrMapOvr>
-  <p:transition>
+  <p:transition xmlns:p14="http://schemas.microsoft.com/office/powerpoint/2010/main">
     <p:fade/>
   </p:transition>
 </p:sld>
@@ -43303,12 +43339,12 @@
       </p:grpSpPr>
       <p:sp>
         <p:nvSpPr>
-          <p:cNvPr id="2" name="Datumsplatzhalter 1"/>
-          <p:cNvSpPr>
-            <a:spLocks noGrp="1"/>
-          </p:cNvSpPr>
-          <p:nvPr>
-            <p:ph type="dt" sz="half" idx="10"/>
+          <p:cNvPr id="12" name="Inhaltsplatzhalter 11"/>
+          <p:cNvSpPr>
+            <a:spLocks noGrp="1"/>
+          </p:cNvSpPr>
+          <p:nvPr>
+            <p:ph sz="half" idx="1"/>
           </p:nvPr>
         </p:nvSpPr>
         <p:spPr/>
@@ -43316,6 +43352,44 @@
           <a:bodyPr/>
           <a:lstStyle/>
           <a:p>
+            <a:endParaRPr lang="en-GB" dirty="0"/>
+          </a:p>
+        </p:txBody>
+      </p:sp>
+      <p:sp>
+        <p:nvSpPr>
+          <p:cNvPr id="13" name="Inhaltsplatzhalter 12"/>
+          <p:cNvSpPr>
+            <a:spLocks noGrp="1"/>
+          </p:cNvSpPr>
+          <p:nvPr>
+            <p:ph sz="half" idx="2"/>
+          </p:nvPr>
+        </p:nvSpPr>
+        <p:spPr/>
+        <p:txBody>
+          <a:bodyPr/>
+          <a:lstStyle/>
+          <a:p>
+            <a:endParaRPr lang="en-GB" dirty="0"/>
+          </a:p>
+        </p:txBody>
+      </p:sp>
+      <p:sp>
+        <p:nvSpPr>
+          <p:cNvPr id="4" name="Datumsplatzhalter 3"/>
+          <p:cNvSpPr>
+            <a:spLocks noGrp="1"/>
+          </p:cNvSpPr>
+          <p:nvPr>
+            <p:ph type="dt" sz="half" idx="10"/>
+          </p:nvPr>
+        </p:nvSpPr>
+        <p:spPr/>
+        <p:txBody>
+          <a:bodyPr/>
+          <a:lstStyle/>
+          <a:p>
             <a:r>
               <a:rPr lang="fr-CH"/>
               <a:t>23.05.2018</a:t>
@@ -43326,7 +43400,7 @@
       </p:sp>
       <p:sp>
         <p:nvSpPr>
-          <p:cNvPr id="3" name="Fußzeilenplatzhalter 2"/>
+          <p:cNvPr id="5" name="Fußzeilenplatzhalter 4"/>
           <p:cNvSpPr>
             <a:spLocks noGrp="1"/>
           </p:cNvSpPr>
@@ -43349,7 +43423,7 @@
       </p:sp>
       <p:sp>
         <p:nvSpPr>
-          <p:cNvPr id="4" name="Foliennummernplatzhalter 3"/>
+          <p:cNvPr id="6" name="Foliennummernplatzhalter 5"/>
           <p:cNvSpPr>
             <a:spLocks noGrp="1"/>
           </p:cNvSpPr>
@@ -43373,7 +43447,7 @@
       </p:sp>
       <p:sp>
         <p:nvSpPr>
-          <p:cNvPr id="9" name="Titel 8"/>
+          <p:cNvPr id="11" name="Titel 10"/>
           <p:cNvSpPr>
             <a:spLocks noGrp="1"/>
           </p:cNvSpPr>
@@ -43393,14 +43467,14 @@
     </p:spTree>
     <p:extLst>
       <p:ext uri="{BB962C8B-B14F-4D97-AF65-F5344CB8AC3E}">
-        <p14:creationId xmlns:p14="http://schemas.microsoft.com/office/powerpoint/2010/main" val="3974297676"/>
+        <p14:creationId xmlns:p14="http://schemas.microsoft.com/office/powerpoint/2010/main" val="572143329"/>
       </p:ext>
     </p:extLst>
   </p:cSld>
   <p:clrMapOvr>
     <a:masterClrMapping/>
   </p:clrMapOvr>
-  <p:transition>
+  <p:transition xmlns:p14="http://schemas.microsoft.com/office/powerpoint/2010/main">
     <p:fade/>
   </p:transition>
 </p:sld>
@@ -43495,27 +43569,34 @@
       </p:sp>
       <p:sp>
         <p:nvSpPr>
-          <p:cNvPr id="9" name="Bildplatzhalter 8"/>
-          <p:cNvSpPr>
-            <a:spLocks noGrp="1"/>
-          </p:cNvSpPr>
-          <p:nvPr>
-            <p:ph type="pic" sz="quarter" idx="13"/>
+          <p:cNvPr id="9" name="Titel 8"/>
+          <p:cNvSpPr>
+            <a:spLocks noGrp="1"/>
+          </p:cNvSpPr>
+          <p:nvPr>
+            <p:ph type="title"/>
           </p:nvPr>
         </p:nvSpPr>
         <p:spPr/>
+        <p:txBody>
+          <a:bodyPr/>
+          <a:lstStyle/>
+          <a:p>
+            <a:endParaRPr lang="en-GB" dirty="0"/>
+          </a:p>
+        </p:txBody>
       </p:sp>
     </p:spTree>
     <p:extLst>
       <p:ext uri="{BB962C8B-B14F-4D97-AF65-F5344CB8AC3E}">
-        <p14:creationId xmlns:p14="http://schemas.microsoft.com/office/powerpoint/2010/main" val="1116238283"/>
+        <p14:creationId xmlns:p14="http://schemas.microsoft.com/office/powerpoint/2010/main" val="3974297676"/>
       </p:ext>
     </p:extLst>
   </p:cSld>
   <p:clrMapOvr>
     <a:masterClrMapping/>
   </p:clrMapOvr>
-  <p:transition>
+  <p:transition xmlns:p14="http://schemas.microsoft.com/office/powerpoint/2010/main">
     <p:fade/>
   </p:transition>
 </p:sld>
@@ -43689,7 +43770,7 @@
   <p:clrMapOvr>
     <a:masterClrMapping/>
   </p:clrMapOvr>
-  <p:transition>
+  <p:transition xmlns:p14="http://schemas.microsoft.com/office/powerpoint/2010/main">
     <p:fade/>
   </p:transition>
 </p:sld>
@@ -43714,12 +43795,12 @@
       </p:grpSpPr>
       <p:sp>
         <p:nvSpPr>
-          <p:cNvPr id="7" name="Inhaltsplatzhalter 6"/>
-          <p:cNvSpPr>
-            <a:spLocks noGrp="1"/>
-          </p:cNvSpPr>
-          <p:nvPr>
-            <p:ph idx="1"/>
+          <p:cNvPr id="2" name="Datumsplatzhalter 1"/>
+          <p:cNvSpPr>
+            <a:spLocks noGrp="1"/>
+          </p:cNvSpPr>
+          <p:nvPr>
+            <p:ph type="dt" sz="half" idx="10"/>
           </p:nvPr>
         </p:nvSpPr>
         <p:spPr/>
@@ -43727,122 +43808,22 @@
           <a:bodyPr/>
           <a:lstStyle/>
           <a:p>
-            <a:pPr marL="0" indent="0">
-              <a:buNone/>
-            </a:pPr>
-            <a:r>
-              <a:rPr lang="en-GB" sz="1800" b="1" dirty="0"/>
-              <a:t>ETH Zurich</a:t>
-            </a:r>
-          </a:p>
-          <a:p>
-            <a:pPr marL="0" indent="0">
-              <a:buNone/>
-            </a:pPr>
-            <a:r>
-              <a:rPr lang="en-GB" sz="1800" dirty="0"/>
-              <a:t>Organisational unit</a:t>
-            </a:r>
-          </a:p>
-          <a:p>
-            <a:pPr marL="0" indent="0">
-              <a:buNone/>
-            </a:pPr>
-            <a:r>
-              <a:rPr lang="en-GB" sz="1800" dirty="0"/>
-              <a:t>Street address</a:t>
-            </a:r>
-          </a:p>
-          <a:p>
-            <a:pPr marL="0" indent="0">
-              <a:buNone/>
-            </a:pPr>
-            <a:r>
-              <a:rPr lang="en-GB" sz="1800" dirty="0"/>
-              <a:t>Postcode City</a:t>
-            </a:r>
-          </a:p>
-          <a:p>
-            <a:pPr marL="0" indent="0">
-              <a:buNone/>
-            </a:pPr>
-            <a:endParaRPr lang="en-GB" sz="1800" dirty="0"/>
-          </a:p>
-          <a:p>
-            <a:pPr marL="0" indent="0">
-              <a:buNone/>
-            </a:pPr>
-            <a:r>
-              <a:rPr lang="en-GB" sz="1800" dirty="0"/>
-              <a:t>www.ethz.ch/en.html</a:t>
-            </a:r>
-          </a:p>
-          <a:p>
-            <a:pPr marL="0" indent="0">
-              <a:buNone/>
-            </a:pPr>
-            <a:endParaRPr lang="en-GB" sz="1800" dirty="0"/>
-          </a:p>
-          <a:p>
-            <a:pPr marL="0" indent="0">
-              <a:buNone/>
-            </a:pPr>
-            <a:r>
-              <a:rPr lang="en-US" sz="1800" dirty="0"/>
-              <a:t>Publisher: </a:t>
-            </a:r>
-            <a:r>
-              <a:rPr lang="en-GB" sz="1800" dirty="0"/>
-              <a:t>Organisational</a:t>
-            </a:r>
-            <a:r>
-              <a:rPr lang="en-US" sz="1800" dirty="0"/>
-              <a:t> unit of ETH Zurich</a:t>
-            </a:r>
-          </a:p>
-          <a:p>
-            <a:pPr marL="0" indent="0">
-              <a:buNone/>
-            </a:pPr>
-            <a:r>
-              <a:rPr lang="en-GB" sz="1800" dirty="0"/>
-              <a:t>Design: Designer Name</a:t>
-            </a:r>
-          </a:p>
-          <a:p>
-            <a:pPr marL="0" indent="0">
-              <a:buNone/>
-            </a:pPr>
-            <a:r>
-              <a:rPr lang="en-US" sz="1800" dirty="0"/>
-              <a:t>Images: Credit (slide xx), Credit (slide xx)</a:t>
-            </a:r>
-          </a:p>
-          <a:p>
-            <a:pPr marL="0" indent="0">
-              <a:buNone/>
-            </a:pPr>
-            <a:endParaRPr lang="en-GB" sz="1800" dirty="0"/>
-          </a:p>
-          <a:p>
-            <a:pPr marL="0" indent="0">
-              <a:buNone/>
-            </a:pPr>
-            <a:r>
-              <a:rPr lang="en-GB" sz="1800" dirty="0"/>
-              <a:t>© ETH Zurich, December 2013</a:t>
-            </a:r>
-          </a:p>
-        </p:txBody>
-      </p:sp>
-      <p:sp>
-        <p:nvSpPr>
-          <p:cNvPr id="2" name="Datumsplatzhalter 1"/>
-          <p:cNvSpPr>
-            <a:spLocks noGrp="1"/>
-          </p:cNvSpPr>
-          <p:nvPr>
-            <p:ph type="dt" sz="half" idx="10"/>
+            <a:r>
+              <a:rPr lang="fr-CH"/>
+              <a:t>23.05.2018</a:t>
+            </a:r>
+            <a:endParaRPr lang="en-GB" dirty="0"/>
+          </a:p>
+        </p:txBody>
+      </p:sp>
+      <p:sp>
+        <p:nvSpPr>
+          <p:cNvPr id="3" name="Fußzeilenplatzhalter 2"/>
+          <p:cNvSpPr>
+            <a:spLocks noGrp="1"/>
+          </p:cNvSpPr>
+          <p:nvPr>
+            <p:ph type="ftr" sz="quarter" idx="11"/>
           </p:nvPr>
         </p:nvSpPr>
         <p:spPr/>
@@ -43851,21 +43832,21 @@
           <a:lstStyle/>
           <a:p>
             <a:r>
-              <a:rPr lang="fr-CH"/>
-              <a:t>23.05.2018</a:t>
-            </a:r>
-            <a:endParaRPr lang="en-GB" dirty="0"/>
-          </a:p>
-        </p:txBody>
-      </p:sp>
-      <p:sp>
-        <p:nvSpPr>
-          <p:cNvPr id="3" name="Fußzeilenplatzhalter 2"/>
-          <p:cNvSpPr>
-            <a:spLocks noGrp="1"/>
-          </p:cNvSpPr>
-          <p:nvPr>
-            <p:ph type="ftr" sz="quarter" idx="11"/>
+              <a:rPr lang="en-GB"/>
+              <a:t>Group A</a:t>
+            </a:r>
+            <a:endParaRPr lang="en-GB" dirty="0"/>
+          </a:p>
+        </p:txBody>
+      </p:sp>
+      <p:sp>
+        <p:nvSpPr>
+          <p:cNvPr id="4" name="Foliennummernplatzhalter 3"/>
+          <p:cNvSpPr>
+            <a:spLocks noGrp="1"/>
+          </p:cNvSpPr>
+          <p:nvPr>
+            <p:ph type="sldNum" sz="quarter" idx="12"/>
           </p:nvPr>
         </p:nvSpPr>
         <p:spPr/>
@@ -43873,31 +43854,9 @@
           <a:bodyPr/>
           <a:lstStyle/>
           <a:p>
-            <a:r>
-              <a:rPr lang="en-GB"/>
-              <a:t>Group A</a:t>
-            </a:r>
-            <a:endParaRPr lang="en-GB" dirty="0"/>
-          </a:p>
-        </p:txBody>
-      </p:sp>
-      <p:sp>
-        <p:nvSpPr>
-          <p:cNvPr id="4" name="Foliennummernplatzhalter 3"/>
-          <p:cNvSpPr>
-            <a:spLocks noGrp="1"/>
-          </p:cNvSpPr>
-          <p:nvPr>
-            <p:ph type="sldNum" sz="quarter" idx="12"/>
-          </p:nvPr>
-        </p:nvSpPr>
-        <p:spPr/>
-        <p:txBody>
-          <a:bodyPr/>
-          <a:lstStyle/>
-          <a:p>
             <a:fld id="{6C6AE60A-B69C-4790-82F7-3882EDF23186}" type="slidenum">
               <a:rPr lang="en-GB" smtClean="0"/>
+              <a:pPr/>
               <a:t>20</a:t>
             </a:fld>
             <a:endParaRPr lang="en-GB" dirty="0"/>
@@ -43906,37 +43865,27 @@
       </p:sp>
       <p:sp>
         <p:nvSpPr>
-          <p:cNvPr id="6" name="Titel 5"/>
-          <p:cNvSpPr>
-            <a:spLocks noGrp="1"/>
-          </p:cNvSpPr>
-          <p:nvPr>
-            <p:ph type="title"/>
+          <p:cNvPr id="9" name="Bildplatzhalter 8"/>
+          <p:cNvSpPr>
+            <a:spLocks noGrp="1"/>
+          </p:cNvSpPr>
+          <p:nvPr>
+            <p:ph type="pic" sz="quarter" idx="13"/>
           </p:nvPr>
         </p:nvSpPr>
         <p:spPr/>
-        <p:txBody>
-          <a:bodyPr/>
-          <a:lstStyle/>
-          <a:p>
-            <a:r>
-              <a:rPr lang="en-GB" dirty="0"/>
-              <a:t>Contact information and credits</a:t>
-            </a:r>
-          </a:p>
-        </p:txBody>
       </p:sp>
     </p:spTree>
     <p:extLst>
       <p:ext uri="{BB962C8B-B14F-4D97-AF65-F5344CB8AC3E}">
-        <p14:creationId xmlns:p14="http://schemas.microsoft.com/office/powerpoint/2010/main" val="949753625"/>
+        <p14:creationId xmlns:p14="http://schemas.microsoft.com/office/powerpoint/2010/main" val="1116238283"/>
       </p:ext>
     </p:extLst>
   </p:cSld>
   <p:clrMapOvr>
     <a:masterClrMapping/>
   </p:clrMapOvr>
-  <p:transition>
+  <p:transition xmlns:p14="http://schemas.microsoft.com/office/powerpoint/2010/main">
     <p:fade/>
   </p:transition>
 </p:sld>
@@ -43961,6 +43910,253 @@
       </p:grpSpPr>
       <p:sp>
         <p:nvSpPr>
+          <p:cNvPr id="7" name="Inhaltsplatzhalter 6"/>
+          <p:cNvSpPr>
+            <a:spLocks noGrp="1"/>
+          </p:cNvSpPr>
+          <p:nvPr>
+            <p:ph idx="1"/>
+          </p:nvPr>
+        </p:nvSpPr>
+        <p:spPr/>
+        <p:txBody>
+          <a:bodyPr/>
+          <a:lstStyle/>
+          <a:p>
+            <a:pPr marL="0" indent="0">
+              <a:buNone/>
+            </a:pPr>
+            <a:r>
+              <a:rPr lang="en-GB" sz="1800" b="1" dirty="0"/>
+              <a:t>ETH Zurich</a:t>
+            </a:r>
+          </a:p>
+          <a:p>
+            <a:pPr marL="0" indent="0">
+              <a:buNone/>
+            </a:pPr>
+            <a:r>
+              <a:rPr lang="en-GB" sz="1800" dirty="0"/>
+              <a:t>Organisational unit</a:t>
+            </a:r>
+          </a:p>
+          <a:p>
+            <a:pPr marL="0" indent="0">
+              <a:buNone/>
+            </a:pPr>
+            <a:r>
+              <a:rPr lang="en-GB" sz="1800" dirty="0"/>
+              <a:t>Street address</a:t>
+            </a:r>
+          </a:p>
+          <a:p>
+            <a:pPr marL="0" indent="0">
+              <a:buNone/>
+            </a:pPr>
+            <a:r>
+              <a:rPr lang="en-GB" sz="1800" dirty="0"/>
+              <a:t>Postcode City</a:t>
+            </a:r>
+          </a:p>
+          <a:p>
+            <a:pPr marL="0" indent="0">
+              <a:buNone/>
+            </a:pPr>
+            <a:endParaRPr lang="en-GB" sz="1800" dirty="0"/>
+          </a:p>
+          <a:p>
+            <a:pPr marL="0" indent="0">
+              <a:buNone/>
+            </a:pPr>
+            <a:r>
+              <a:rPr lang="en-GB" sz="1800" dirty="0"/>
+              <a:t>www.ethz.ch/en.html</a:t>
+            </a:r>
+          </a:p>
+          <a:p>
+            <a:pPr marL="0" indent="0">
+              <a:buNone/>
+            </a:pPr>
+            <a:endParaRPr lang="en-GB" sz="1800" dirty="0"/>
+          </a:p>
+          <a:p>
+            <a:pPr marL="0" indent="0">
+              <a:buNone/>
+            </a:pPr>
+            <a:r>
+              <a:rPr lang="en-US" sz="1800" dirty="0"/>
+              <a:t>Publisher: </a:t>
+            </a:r>
+            <a:r>
+              <a:rPr lang="en-GB" sz="1800" dirty="0"/>
+              <a:t>Organisational</a:t>
+            </a:r>
+            <a:r>
+              <a:rPr lang="en-US" sz="1800" dirty="0"/>
+              <a:t> unit of ETH Zurich</a:t>
+            </a:r>
+          </a:p>
+          <a:p>
+            <a:pPr marL="0" indent="0">
+              <a:buNone/>
+            </a:pPr>
+            <a:r>
+              <a:rPr lang="en-GB" sz="1800" dirty="0"/>
+              <a:t>Design: Designer Name</a:t>
+            </a:r>
+          </a:p>
+          <a:p>
+            <a:pPr marL="0" indent="0">
+              <a:buNone/>
+            </a:pPr>
+            <a:r>
+              <a:rPr lang="en-US" sz="1800" dirty="0"/>
+              <a:t>Images: Credit (slide xx), Credit (slide xx)</a:t>
+            </a:r>
+          </a:p>
+          <a:p>
+            <a:pPr marL="0" indent="0">
+              <a:buNone/>
+            </a:pPr>
+            <a:endParaRPr lang="en-GB" sz="1800" dirty="0"/>
+          </a:p>
+          <a:p>
+            <a:pPr marL="0" indent="0">
+              <a:buNone/>
+            </a:pPr>
+            <a:r>
+              <a:rPr lang="en-GB" sz="1800" dirty="0"/>
+              <a:t>© ETH Zurich, December 2013</a:t>
+            </a:r>
+          </a:p>
+        </p:txBody>
+      </p:sp>
+      <p:sp>
+        <p:nvSpPr>
+          <p:cNvPr id="2" name="Datumsplatzhalter 1"/>
+          <p:cNvSpPr>
+            <a:spLocks noGrp="1"/>
+          </p:cNvSpPr>
+          <p:nvPr>
+            <p:ph type="dt" sz="half" idx="10"/>
+          </p:nvPr>
+        </p:nvSpPr>
+        <p:spPr/>
+        <p:txBody>
+          <a:bodyPr/>
+          <a:lstStyle/>
+          <a:p>
+            <a:r>
+              <a:rPr lang="fr-CH"/>
+              <a:t>23.05.2018</a:t>
+            </a:r>
+            <a:endParaRPr lang="en-GB" dirty="0"/>
+          </a:p>
+        </p:txBody>
+      </p:sp>
+      <p:sp>
+        <p:nvSpPr>
+          <p:cNvPr id="3" name="Fußzeilenplatzhalter 2"/>
+          <p:cNvSpPr>
+            <a:spLocks noGrp="1"/>
+          </p:cNvSpPr>
+          <p:nvPr>
+            <p:ph type="ftr" sz="quarter" idx="11"/>
+          </p:nvPr>
+        </p:nvSpPr>
+        <p:spPr/>
+        <p:txBody>
+          <a:bodyPr/>
+          <a:lstStyle/>
+          <a:p>
+            <a:r>
+              <a:rPr lang="en-GB"/>
+              <a:t>Group A</a:t>
+            </a:r>
+            <a:endParaRPr lang="en-GB" dirty="0"/>
+          </a:p>
+        </p:txBody>
+      </p:sp>
+      <p:sp>
+        <p:nvSpPr>
+          <p:cNvPr id="4" name="Foliennummernplatzhalter 3"/>
+          <p:cNvSpPr>
+            <a:spLocks noGrp="1"/>
+          </p:cNvSpPr>
+          <p:nvPr>
+            <p:ph type="sldNum" sz="quarter" idx="12"/>
+          </p:nvPr>
+        </p:nvSpPr>
+        <p:spPr/>
+        <p:txBody>
+          <a:bodyPr/>
+          <a:lstStyle/>
+          <a:p>
+            <a:fld id="{6C6AE60A-B69C-4790-82F7-3882EDF23186}" type="slidenum">
+              <a:rPr lang="en-GB" smtClean="0"/>
+              <a:t>21</a:t>
+            </a:fld>
+            <a:endParaRPr lang="en-GB" dirty="0"/>
+          </a:p>
+        </p:txBody>
+      </p:sp>
+      <p:sp>
+        <p:nvSpPr>
+          <p:cNvPr id="6" name="Titel 5"/>
+          <p:cNvSpPr>
+            <a:spLocks noGrp="1"/>
+          </p:cNvSpPr>
+          <p:nvPr>
+            <p:ph type="title"/>
+          </p:nvPr>
+        </p:nvSpPr>
+        <p:spPr/>
+        <p:txBody>
+          <a:bodyPr/>
+          <a:lstStyle/>
+          <a:p>
+            <a:r>
+              <a:rPr lang="en-GB" dirty="0"/>
+              <a:t>Contact information and credits</a:t>
+            </a:r>
+          </a:p>
+        </p:txBody>
+      </p:sp>
+    </p:spTree>
+    <p:extLst>
+      <p:ext uri="{BB962C8B-B14F-4D97-AF65-F5344CB8AC3E}">
+        <p14:creationId xmlns:p14="http://schemas.microsoft.com/office/powerpoint/2010/main" val="949753625"/>
+      </p:ext>
+    </p:extLst>
+  </p:cSld>
+  <p:clrMapOvr>
+    <a:masterClrMapping/>
+  </p:clrMapOvr>
+  <p:transition xmlns:p14="http://schemas.microsoft.com/office/powerpoint/2010/main">
+    <p:fade/>
+  </p:transition>
+</p:sld>
+</file>
+
+<file path=ppt/slides/slide22.xml><?xml version="1.0" encoding="utf-8"?>
+<p:sld xmlns:a="http://schemas.openxmlformats.org/drawingml/2006/main" xmlns:r="http://schemas.openxmlformats.org/officeDocument/2006/relationships" xmlns:p="http://schemas.openxmlformats.org/presentationml/2006/main">
+  <p:cSld>
+    <p:spTree>
+      <p:nvGrpSpPr>
+        <p:cNvPr id="1" name=""/>
+        <p:cNvGrpSpPr/>
+        <p:nvPr/>
+      </p:nvGrpSpPr>
+      <p:grpSpPr>
+        <a:xfrm>
+          <a:off x="0" y="0"/>
+          <a:ext cx="0" cy="0"/>
+          <a:chOff x="0" y="0"/>
+          <a:chExt cx="0" cy="0"/>
+        </a:xfrm>
+      </p:grpSpPr>
+      <p:sp>
+        <p:nvSpPr>
           <p:cNvPr id="2" name="Datumsplatzhalter 1"/>
           <p:cNvSpPr>
             <a:spLocks noGrp="1"/>
@@ -44023,7 +44219,7 @@
             <a:fld id="{6C6AE60A-B69C-4790-82F7-3882EDF23186}" type="slidenum">
               <a:rPr lang="en-GB" smtClean="0"/>
               <a:pPr/>
-              <a:t>21</a:t>
+              <a:t>22</a:t>
             </a:fld>
             <a:endParaRPr lang="en-GB" dirty="0"/>
           </a:p>
@@ -44039,7 +44235,7 @@
   <p:clrMapOvr>
     <a:masterClrMapping/>
   </p:clrMapOvr>
-  <p:transition>
+  <p:transition xmlns:p14="http://schemas.microsoft.com/office/powerpoint/2010/main">
     <p:fade/>
   </p:transition>
 </p:sld>
@@ -44250,7 +44446,7 @@
           <p:cNvPr id="7" name="Table 6">
             <a:extLst>
               <a:ext uri="{FF2B5EF4-FFF2-40B4-BE49-F238E27FC236}">
-                <a16:creationId xmlns:a16="http://schemas.microsoft.com/office/drawing/2014/main" id="{A22A54C5-F25A-D14C-A319-AEA786331DB5}"/>
+                <a16:creationId xmlns:a16="http://schemas.microsoft.com/office/drawing/2014/main" xmlns="" id="{A22A54C5-F25A-D14C-A319-AEA786331DB5}"/>
               </a:ext>
             </a:extLst>
           </p:cNvPr>
@@ -44279,35 +44475,35 @@
                 <a:gridCol w="2276992">
                   <a:extLst>
                     <a:ext uri="{9D8B030D-6E8A-4147-A177-3AD203B41FA5}">
-                      <a16:colId xmlns:a16="http://schemas.microsoft.com/office/drawing/2014/main" val="2023592035"/>
+                      <a16:colId xmlns:a16="http://schemas.microsoft.com/office/drawing/2014/main" xmlns="" val="2023592035"/>
                     </a:ext>
                   </a:extLst>
                 </a:gridCol>
                 <a:gridCol w="2276992">
                   <a:extLst>
                     <a:ext uri="{9D8B030D-6E8A-4147-A177-3AD203B41FA5}">
-                      <a16:colId xmlns:a16="http://schemas.microsoft.com/office/drawing/2014/main" val="1069251106"/>
+                      <a16:colId xmlns:a16="http://schemas.microsoft.com/office/drawing/2014/main" xmlns="" val="1069251106"/>
                     </a:ext>
                   </a:extLst>
                 </a:gridCol>
                 <a:gridCol w="2276992">
                   <a:extLst>
                     <a:ext uri="{9D8B030D-6E8A-4147-A177-3AD203B41FA5}">
-                      <a16:colId xmlns:a16="http://schemas.microsoft.com/office/drawing/2014/main" val="176633595"/>
+                      <a16:colId xmlns:a16="http://schemas.microsoft.com/office/drawing/2014/main" xmlns="" val="176633595"/>
                     </a:ext>
                   </a:extLst>
                 </a:gridCol>
                 <a:gridCol w="2276992">
                   <a:extLst>
                     <a:ext uri="{9D8B030D-6E8A-4147-A177-3AD203B41FA5}">
-                      <a16:colId xmlns:a16="http://schemas.microsoft.com/office/drawing/2014/main" val="1572743861"/>
+                      <a16:colId xmlns:a16="http://schemas.microsoft.com/office/drawing/2014/main" xmlns="" val="1572743861"/>
                     </a:ext>
                   </a:extLst>
                 </a:gridCol>
                 <a:gridCol w="2276992">
                   <a:extLst>
                     <a:ext uri="{9D8B030D-6E8A-4147-A177-3AD203B41FA5}">
-                      <a16:colId xmlns:a16="http://schemas.microsoft.com/office/drawing/2014/main" val="4057482938"/>
+                      <a16:colId xmlns:a16="http://schemas.microsoft.com/office/drawing/2014/main" xmlns="" val="4057482938"/>
                     </a:ext>
                   </a:extLst>
                 </a:gridCol>
@@ -44377,7 +44573,7 @@
                 </a:tc>
                 <a:extLst>
                   <a:ext uri="{0D108BD9-81ED-4DB2-BD59-A6C34878D82A}">
-                    <a16:rowId xmlns:a16="http://schemas.microsoft.com/office/drawing/2014/main" val="4080293505"/>
+                    <a16:rowId xmlns:a16="http://schemas.microsoft.com/office/drawing/2014/main" xmlns="" val="4080293505"/>
                   </a:ext>
                 </a:extLst>
               </a:tr>
@@ -44453,7 +44649,7 @@
                 </a:tc>
                 <a:extLst>
                   <a:ext uri="{0D108BD9-81ED-4DB2-BD59-A6C34878D82A}">
-                    <a16:rowId xmlns:a16="http://schemas.microsoft.com/office/drawing/2014/main" val="3036351838"/>
+                    <a16:rowId xmlns:a16="http://schemas.microsoft.com/office/drawing/2014/main" xmlns="" val="3036351838"/>
                   </a:ext>
                 </a:extLst>
               </a:tr>
@@ -44561,7 +44757,7 @@
                 </a:tc>
                 <a:extLst>
                   <a:ext uri="{0D108BD9-81ED-4DB2-BD59-A6C34878D82A}">
-                    <a16:rowId xmlns:a16="http://schemas.microsoft.com/office/drawing/2014/main" val="3221214023"/>
+                    <a16:rowId xmlns:a16="http://schemas.microsoft.com/office/drawing/2014/main" xmlns="" val="3221214023"/>
                   </a:ext>
                 </a:extLst>
               </a:tr>
@@ -44653,7 +44849,7 @@
                 </a:tc>
                 <a:extLst>
                   <a:ext uri="{0D108BD9-81ED-4DB2-BD59-A6C34878D82A}">
-                    <a16:rowId xmlns:a16="http://schemas.microsoft.com/office/drawing/2014/main" val="400042954"/>
+                    <a16:rowId xmlns:a16="http://schemas.microsoft.com/office/drawing/2014/main" xmlns="" val="400042954"/>
                   </a:ext>
                 </a:extLst>
               </a:tr>
@@ -44729,7 +44925,7 @@
                 </a:tc>
                 <a:extLst>
                   <a:ext uri="{0D108BD9-81ED-4DB2-BD59-A6C34878D82A}">
-                    <a16:rowId xmlns:a16="http://schemas.microsoft.com/office/drawing/2014/main" val="3211406312"/>
+                    <a16:rowId xmlns:a16="http://schemas.microsoft.com/office/drawing/2014/main" xmlns="" val="3211406312"/>
                   </a:ext>
                 </a:extLst>
               </a:tr>
@@ -44805,7 +45001,7 @@
                 </a:tc>
                 <a:extLst>
                   <a:ext uri="{0D108BD9-81ED-4DB2-BD59-A6C34878D82A}">
-                    <a16:rowId xmlns:a16="http://schemas.microsoft.com/office/drawing/2014/main" val="53141143"/>
+                    <a16:rowId xmlns:a16="http://schemas.microsoft.com/office/drawing/2014/main" xmlns="" val="53141143"/>
                   </a:ext>
                 </a:extLst>
               </a:tr>
@@ -44823,7 +45019,7 @@
   <p:clrMapOvr>
     <a:masterClrMapping/>
   </p:clrMapOvr>
-  <p:transition>
+  <p:transition xmlns:p14="http://schemas.microsoft.com/office/powerpoint/2010/main">
     <p:fade/>
   </p:transition>
 </p:sld>
@@ -44943,7 +45139,7 @@
           <p:cNvPr id="9" name="Picture 8">
             <a:extLst>
               <a:ext uri="{FF2B5EF4-FFF2-40B4-BE49-F238E27FC236}">
-                <a16:creationId xmlns:a16="http://schemas.microsoft.com/office/drawing/2014/main" id="{069BA076-049B-C048-9A70-DBFD82ADCD55}"/>
+                <a16:creationId xmlns:a16="http://schemas.microsoft.com/office/drawing/2014/main" xmlns="" id="{069BA076-049B-C048-9A70-DBFD82ADCD55}"/>
               </a:ext>
             </a:extLst>
           </p:cNvPr>
@@ -44984,7 +45180,7 @@
   <p:clrMapOvr>
     <a:masterClrMapping/>
   </p:clrMapOvr>
-  <p:transition>
+  <p:transition xmlns:p14="http://schemas.microsoft.com/office/powerpoint/2010/main">
     <p:fade/>
   </p:transition>
 </p:sld>
@@ -45012,7 +45208,7 @@
           <p:cNvPr id="4" name="Datumsplatzhalter 3">
             <a:extLst>
               <a:ext uri="{FF2B5EF4-FFF2-40B4-BE49-F238E27FC236}">
-                <a16:creationId xmlns:a16="http://schemas.microsoft.com/office/drawing/2014/main" id="{0486F77B-EBCA-4D98-96B4-D810930354B2}"/>
+                <a16:creationId xmlns:a16="http://schemas.microsoft.com/office/drawing/2014/main" xmlns="" id="{0486F77B-EBCA-4D98-96B4-D810930354B2}"/>
               </a:ext>
             </a:extLst>
           </p:cNvPr>
@@ -45041,7 +45237,7 @@
           <p:cNvPr id="5" name="Fußzeilenplatzhalter 4">
             <a:extLst>
               <a:ext uri="{FF2B5EF4-FFF2-40B4-BE49-F238E27FC236}">
-                <a16:creationId xmlns:a16="http://schemas.microsoft.com/office/drawing/2014/main" id="{AF51684B-6762-4772-9CCE-E61481E9D834}"/>
+                <a16:creationId xmlns:a16="http://schemas.microsoft.com/office/drawing/2014/main" xmlns="" id="{AF51684B-6762-4772-9CCE-E61481E9D834}"/>
               </a:ext>
             </a:extLst>
           </p:cNvPr>
@@ -45070,7 +45266,7 @@
           <p:cNvPr id="6" name="Foliennummernplatzhalter 5">
             <a:extLst>
               <a:ext uri="{FF2B5EF4-FFF2-40B4-BE49-F238E27FC236}">
-                <a16:creationId xmlns:a16="http://schemas.microsoft.com/office/drawing/2014/main" id="{37290704-C0B1-4941-9014-F2D7234770E4}"/>
+                <a16:creationId xmlns:a16="http://schemas.microsoft.com/office/drawing/2014/main" xmlns="" id="{37290704-C0B1-4941-9014-F2D7234770E4}"/>
               </a:ext>
             </a:extLst>
           </p:cNvPr>
@@ -45099,7 +45295,7 @@
           <p:cNvPr id="9" name="Textfeld 8">
             <a:extLst>
               <a:ext uri="{FF2B5EF4-FFF2-40B4-BE49-F238E27FC236}">
-                <a16:creationId xmlns:a16="http://schemas.microsoft.com/office/drawing/2014/main" id="{E01BDD48-F433-4875-954E-0DFA17C62606}"/>
+                <a16:creationId xmlns:a16="http://schemas.microsoft.com/office/drawing/2014/main" xmlns="" id="{E01BDD48-F433-4875-954E-0DFA17C62606}"/>
               </a:ext>
             </a:extLst>
           </p:cNvPr>
@@ -45154,7 +45350,7 @@
           <p:cNvPr id="14" name="Gruppieren 13">
             <a:extLst>
               <a:ext uri="{FF2B5EF4-FFF2-40B4-BE49-F238E27FC236}">
-                <a16:creationId xmlns:a16="http://schemas.microsoft.com/office/drawing/2014/main" id="{A0A45610-7AFD-45C0-9B8F-D440C877D741}"/>
+                <a16:creationId xmlns:a16="http://schemas.microsoft.com/office/drawing/2014/main" xmlns="" id="{A0A45610-7AFD-45C0-9B8F-D440C877D741}"/>
               </a:ext>
             </a:extLst>
           </p:cNvPr>
@@ -45174,7 +45370,7 @@
             <p:cNvPr id="10" name="Textfeld 9">
               <a:extLst>
                 <a:ext uri="{FF2B5EF4-FFF2-40B4-BE49-F238E27FC236}">
-                  <a16:creationId xmlns:a16="http://schemas.microsoft.com/office/drawing/2014/main" id="{C1E6B540-7AB5-4DEA-9935-4D8AF7940D97}"/>
+                  <a16:creationId xmlns:a16="http://schemas.microsoft.com/office/drawing/2014/main" xmlns="" id="{C1E6B540-7AB5-4DEA-9935-4D8AF7940D97}"/>
                 </a:ext>
               </a:extLst>
             </p:cNvPr>
@@ -45269,7 +45465,7 @@
             <p:cNvPr id="11" name="Textfeld 10">
               <a:extLst>
                 <a:ext uri="{FF2B5EF4-FFF2-40B4-BE49-F238E27FC236}">
-                  <a16:creationId xmlns:a16="http://schemas.microsoft.com/office/drawing/2014/main" id="{6855DB6C-3273-425C-AC16-D17F5347FA9A}"/>
+                  <a16:creationId xmlns:a16="http://schemas.microsoft.com/office/drawing/2014/main" xmlns="" id="{6855DB6C-3273-425C-AC16-D17F5347FA9A}"/>
                 </a:ext>
               </a:extLst>
             </p:cNvPr>
@@ -45362,7 +45558,7 @@
           <p:cNvPr id="15" name="Gruppieren 14">
             <a:extLst>
               <a:ext uri="{FF2B5EF4-FFF2-40B4-BE49-F238E27FC236}">
-                <a16:creationId xmlns:a16="http://schemas.microsoft.com/office/drawing/2014/main" id="{0E1AE58D-949A-4868-A791-3FE8EB8CDE6B}"/>
+                <a16:creationId xmlns:a16="http://schemas.microsoft.com/office/drawing/2014/main" xmlns="" id="{0E1AE58D-949A-4868-A791-3FE8EB8CDE6B}"/>
               </a:ext>
             </a:extLst>
           </p:cNvPr>
@@ -45382,7 +45578,7 @@
             <p:cNvPr id="12" name="Textfeld 11">
               <a:extLst>
                 <a:ext uri="{FF2B5EF4-FFF2-40B4-BE49-F238E27FC236}">
-                  <a16:creationId xmlns:a16="http://schemas.microsoft.com/office/drawing/2014/main" id="{708F2FB0-FDD8-432D-A125-D3D19A876A94}"/>
+                  <a16:creationId xmlns:a16="http://schemas.microsoft.com/office/drawing/2014/main" xmlns="" id="{708F2FB0-FDD8-432D-A125-D3D19A876A94}"/>
                 </a:ext>
               </a:extLst>
             </p:cNvPr>
@@ -45523,7 +45719,7 @@
             <p:cNvPr id="13" name="Textfeld 12">
               <a:extLst>
                 <a:ext uri="{FF2B5EF4-FFF2-40B4-BE49-F238E27FC236}">
-                  <a16:creationId xmlns:a16="http://schemas.microsoft.com/office/drawing/2014/main" id="{14841331-643E-47E9-8B53-48457524948C}"/>
+                  <a16:creationId xmlns:a16="http://schemas.microsoft.com/office/drawing/2014/main" xmlns="" id="{14841331-643E-47E9-8B53-48457524948C}"/>
                 </a:ext>
               </a:extLst>
             </p:cNvPr>
@@ -45652,7 +45848,7 @@
           <p:cNvPr id="3" name="Grafik 2">
             <a:extLst>
               <a:ext uri="{FF2B5EF4-FFF2-40B4-BE49-F238E27FC236}">
-                <a16:creationId xmlns:a16="http://schemas.microsoft.com/office/drawing/2014/main" id="{626E4691-0EC4-4A23-94AF-3E6B499A3E35}"/>
+                <a16:creationId xmlns:a16="http://schemas.microsoft.com/office/drawing/2014/main" xmlns="" id="{626E4691-0EC4-4A23-94AF-3E6B499A3E35}"/>
               </a:ext>
             </a:extLst>
           </p:cNvPr>
@@ -45688,7 +45884,7 @@
           <p:cNvPr id="8" name="Grafik 7">
             <a:extLst>
               <a:ext uri="{FF2B5EF4-FFF2-40B4-BE49-F238E27FC236}">
-                <a16:creationId xmlns:a16="http://schemas.microsoft.com/office/drawing/2014/main" id="{F62DB472-57DE-44CF-AB8A-65ACA633BD6B}"/>
+                <a16:creationId xmlns:a16="http://schemas.microsoft.com/office/drawing/2014/main" xmlns="" id="{F62DB472-57DE-44CF-AB8A-65ACA633BD6B}"/>
               </a:ext>
             </a:extLst>
           </p:cNvPr>
@@ -45729,7 +45925,7 @@
   <p:clrMapOvr>
     <a:masterClrMapping/>
   </p:clrMapOvr>
-  <p:transition>
+  <p:transition xmlns:p14="http://schemas.microsoft.com/office/powerpoint/2010/main">
     <p:fade/>
   </p:transition>
 </p:sld>
@@ -45757,7 +45953,7 @@
           <p:cNvPr id="4" name="Datumsplatzhalter 3">
             <a:extLst>
               <a:ext uri="{FF2B5EF4-FFF2-40B4-BE49-F238E27FC236}">
-                <a16:creationId xmlns:a16="http://schemas.microsoft.com/office/drawing/2014/main" id="{2FDE3256-08BD-49EA-BADD-47E5137E8247}"/>
+                <a16:creationId xmlns:a16="http://schemas.microsoft.com/office/drawing/2014/main" xmlns="" id="{2FDE3256-08BD-49EA-BADD-47E5137E8247}"/>
               </a:ext>
             </a:extLst>
           </p:cNvPr>
@@ -45786,7 +45982,7 @@
           <p:cNvPr id="5" name="Fußzeilenplatzhalter 4">
             <a:extLst>
               <a:ext uri="{FF2B5EF4-FFF2-40B4-BE49-F238E27FC236}">
-                <a16:creationId xmlns:a16="http://schemas.microsoft.com/office/drawing/2014/main" id="{85919C73-4F1B-4A65-BC56-A2BD4020C9A3}"/>
+                <a16:creationId xmlns:a16="http://schemas.microsoft.com/office/drawing/2014/main" xmlns="" id="{85919C73-4F1B-4A65-BC56-A2BD4020C9A3}"/>
               </a:ext>
             </a:extLst>
           </p:cNvPr>
@@ -45815,7 +46011,7 @@
           <p:cNvPr id="6" name="Foliennummernplatzhalter 5">
             <a:extLst>
               <a:ext uri="{FF2B5EF4-FFF2-40B4-BE49-F238E27FC236}">
-                <a16:creationId xmlns:a16="http://schemas.microsoft.com/office/drawing/2014/main" id="{3AC6906F-C695-42D0-8B48-6E39679D048F}"/>
+                <a16:creationId xmlns:a16="http://schemas.microsoft.com/office/drawing/2014/main" xmlns="" id="{3AC6906F-C695-42D0-8B48-6E39679D048F}"/>
               </a:ext>
             </a:extLst>
           </p:cNvPr>
@@ -45844,7 +46040,7 @@
           <p:cNvPr id="14" name="Gruppieren 13">
             <a:extLst>
               <a:ext uri="{FF2B5EF4-FFF2-40B4-BE49-F238E27FC236}">
-                <a16:creationId xmlns:a16="http://schemas.microsoft.com/office/drawing/2014/main" id="{1C5DACA3-5790-4ACA-A8B0-83A51B447AE1}"/>
+                <a16:creationId xmlns:a16="http://schemas.microsoft.com/office/drawing/2014/main" xmlns="" id="{1C5DACA3-5790-4ACA-A8B0-83A51B447AE1}"/>
               </a:ext>
             </a:extLst>
           </p:cNvPr>
@@ -45864,7 +46060,7 @@
             <p:cNvPr id="10" name="Grafik 9">
               <a:extLst>
                 <a:ext uri="{FF2B5EF4-FFF2-40B4-BE49-F238E27FC236}">
-                  <a16:creationId xmlns:a16="http://schemas.microsoft.com/office/drawing/2014/main" id="{01B0C16B-8264-44E9-81FE-9E65721B1ABE}"/>
+                  <a16:creationId xmlns:a16="http://schemas.microsoft.com/office/drawing/2014/main" xmlns="" id="{01B0C16B-8264-44E9-81FE-9E65721B1ABE}"/>
                 </a:ext>
               </a:extLst>
             </p:cNvPr>
@@ -45900,7 +46096,7 @@
             <p:cNvPr id="12" name="Grafik 11">
               <a:extLst>
                 <a:ext uri="{FF2B5EF4-FFF2-40B4-BE49-F238E27FC236}">
-                  <a16:creationId xmlns:a16="http://schemas.microsoft.com/office/drawing/2014/main" id="{72BEA4AF-5046-47EE-81D4-6FD0A4B2471E}"/>
+                  <a16:creationId xmlns:a16="http://schemas.microsoft.com/office/drawing/2014/main" xmlns="" id="{72BEA4AF-5046-47EE-81D4-6FD0A4B2471E}"/>
                 </a:ext>
               </a:extLst>
             </p:cNvPr>
@@ -45937,7 +46133,7 @@
           <p:cNvPr id="13" name="Textfeld 12">
             <a:extLst>
               <a:ext uri="{FF2B5EF4-FFF2-40B4-BE49-F238E27FC236}">
-                <a16:creationId xmlns:a16="http://schemas.microsoft.com/office/drawing/2014/main" id="{46CEF1EC-6307-4482-BF82-CBE6E1A51417}"/>
+                <a16:creationId xmlns:a16="http://schemas.microsoft.com/office/drawing/2014/main" xmlns="" id="{46CEF1EC-6307-4482-BF82-CBE6E1A51417}"/>
               </a:ext>
             </a:extLst>
           </p:cNvPr>
@@ -46005,7 +46201,7 @@
   <p:clrMapOvr>
     <a:masterClrMapping/>
   </p:clrMapOvr>
-  <p:transition>
+  <p:transition xmlns:p14="http://schemas.microsoft.com/office/powerpoint/2010/main">
     <p:fade/>
   </p:transition>
 </p:sld>
@@ -46257,7 +46453,7 @@
   <p:clrMapOvr>
     <a:masterClrMapping/>
   </p:clrMapOvr>
-  <p:transition>
+  <p:transition xmlns:p14="http://schemas.microsoft.com/office/powerpoint/2010/main">
     <p:fade/>
   </p:transition>
 </p:sld>
@@ -46285,7 +46481,7 @@
           <p:cNvPr id="9" name="Inhaltsplatzhalter 8">
             <a:extLst>
               <a:ext uri="{FF2B5EF4-FFF2-40B4-BE49-F238E27FC236}">
-                <a16:creationId xmlns:a16="http://schemas.microsoft.com/office/drawing/2014/main" id="{2D2110E3-83BC-4D4A-81C6-243EDC7E1901}"/>
+                <a16:creationId xmlns:a16="http://schemas.microsoft.com/office/drawing/2014/main" xmlns="" id="{2D2110E3-83BC-4D4A-81C6-243EDC7E1901}"/>
               </a:ext>
             </a:extLst>
           </p:cNvPr>
@@ -46320,7 +46516,7 @@
           <p:cNvPr id="7" name="Inhaltsplatzhalter 6">
             <a:extLst>
               <a:ext uri="{FF2B5EF4-FFF2-40B4-BE49-F238E27FC236}">
-                <a16:creationId xmlns:a16="http://schemas.microsoft.com/office/drawing/2014/main" id="{6D488CB4-429D-D64C-AE82-45FE5567DC4A}"/>
+                <a16:creationId xmlns:a16="http://schemas.microsoft.com/office/drawing/2014/main" xmlns="" id="{6D488CB4-429D-D64C-AE82-45FE5567DC4A}"/>
               </a:ext>
             </a:extLst>
           </p:cNvPr>
@@ -46451,7 +46647,7 @@
           <p:cNvPr id="2" name="Datumsplatzhalter 1">
             <a:extLst>
               <a:ext uri="{FF2B5EF4-FFF2-40B4-BE49-F238E27FC236}">
-                <a16:creationId xmlns:a16="http://schemas.microsoft.com/office/drawing/2014/main" id="{35ABBF7B-96D1-6E4F-8290-F0AC49418229}"/>
+                <a16:creationId xmlns:a16="http://schemas.microsoft.com/office/drawing/2014/main" xmlns="" id="{35ABBF7B-96D1-6E4F-8290-F0AC49418229}"/>
               </a:ext>
             </a:extLst>
           </p:cNvPr>
@@ -46480,7 +46676,7 @@
           <p:cNvPr id="3" name="Fußzeilenplatzhalter 2">
             <a:extLst>
               <a:ext uri="{FF2B5EF4-FFF2-40B4-BE49-F238E27FC236}">
-                <a16:creationId xmlns:a16="http://schemas.microsoft.com/office/drawing/2014/main" id="{4127C30E-F535-FA47-9C07-E1BCED3EFC52}"/>
+                <a16:creationId xmlns:a16="http://schemas.microsoft.com/office/drawing/2014/main" xmlns="" id="{4127C30E-F535-FA47-9C07-E1BCED3EFC52}"/>
               </a:ext>
             </a:extLst>
           </p:cNvPr>
@@ -46509,7 +46705,7 @@
           <p:cNvPr id="4" name="Foliennummernplatzhalter 3">
             <a:extLst>
               <a:ext uri="{FF2B5EF4-FFF2-40B4-BE49-F238E27FC236}">
-                <a16:creationId xmlns:a16="http://schemas.microsoft.com/office/drawing/2014/main" id="{C88BF33C-BAF6-464F-B278-84B3B0CB6B82}"/>
+                <a16:creationId xmlns:a16="http://schemas.microsoft.com/office/drawing/2014/main" xmlns="" id="{C88BF33C-BAF6-464F-B278-84B3B0CB6B82}"/>
               </a:ext>
             </a:extLst>
           </p:cNvPr>
@@ -46538,7 +46734,7 @@
           <p:cNvPr id="5" name="Titel 4">
             <a:extLst>
               <a:ext uri="{FF2B5EF4-FFF2-40B4-BE49-F238E27FC236}">
-                <a16:creationId xmlns:a16="http://schemas.microsoft.com/office/drawing/2014/main" id="{2AD82122-56E2-FD4B-B6AC-2B56FB45F00B}"/>
+                <a16:creationId xmlns:a16="http://schemas.microsoft.com/office/drawing/2014/main" xmlns="" id="{2AD82122-56E2-FD4B-B6AC-2B56FB45F00B}"/>
               </a:ext>
             </a:extLst>
           </p:cNvPr>
@@ -46599,7 +46795,7 @@
   <p:clrMapOvr>
     <a:masterClrMapping/>
   </p:clrMapOvr>
-  <p:transition>
+  <p:transition xmlns:p14="http://schemas.microsoft.com/office/powerpoint/2010/main">
     <p:fade/>
   </p:transition>
 </p:sld>
@@ -46645,48 +46841,65 @@
             <a:pPr marL="0" indent="0">
               <a:buNone/>
             </a:pPr>
-            <a:endParaRPr lang="en-GB" dirty="0"/>
+            <a:endParaRPr lang="en-GB" dirty="0" smtClean="0"/>
           </a:p>
           <a:p>
             <a:pPr marL="0" indent="0">
               <a:buNone/>
             </a:pPr>
             <a:r>
+              <a:rPr lang="en-GB" dirty="0" smtClean="0"/>
+              <a:t>Reactor:</a:t>
+            </a:r>
+          </a:p>
+          <a:p>
+            <a:r>
+              <a:rPr lang="en-GB" dirty="0" smtClean="0"/>
+              <a:t>Ideal vs. real (case 1/case 3)</a:t>
+            </a:r>
+          </a:p>
+          <a:p>
+            <a:pPr lvl="1"/>
+            <a:r>
+              <a:rPr lang="en-GB" dirty="0" smtClean="0"/>
+              <a:t>Length: 12 m / 28 m</a:t>
+            </a:r>
+          </a:p>
+          <a:p>
+            <a:pPr lvl="1"/>
+            <a:r>
               <a:rPr lang="en-GB" dirty="0"/>
-              <a:t>Reactor:</a:t>
-            </a:r>
-          </a:p>
-          <a:p>
-            <a:r>
-              <a:rPr lang="en-GB" dirty="0"/>
-              <a:t>Ideal vs. real (case 1/case 3)</a:t>
-            </a:r>
-          </a:p>
-          <a:p>
-            <a:pPr lvl="1"/>
-            <a:r>
-              <a:rPr lang="en-GB" dirty="0"/>
-              <a:t>Length: 12 m / 28 m</a:t>
-            </a:r>
-          </a:p>
-          <a:p>
-            <a:pPr lvl="1"/>
-            <a:r>
-              <a:rPr lang="en-GB" dirty="0"/>
-              <a:t>Number of tubes: 1’342 / 17’149</a:t>
+              <a:t>Number of </a:t>
+            </a:r>
+            <a:r>
+              <a:rPr lang="en-GB" dirty="0" smtClean="0"/>
+              <a:t>tubes: 1’342 / 17’149</a:t>
             </a:r>
           </a:p>
           <a:p>
             <a:pPr marL="361950" lvl="1" indent="0">
               <a:buNone/>
             </a:pPr>
-            <a:endParaRPr lang="en-GB" dirty="0"/>
-          </a:p>
-          <a:p>
+            <a:endParaRPr lang="en-GB" dirty="0" smtClean="0"/>
+          </a:p>
+          <a:p>
+            <a:r>
+              <a:rPr lang="en-GB" dirty="0" smtClean="0"/>
+              <a:t>Cross- </a:t>
+            </a:r>
             <a:r>
               <a:rPr lang="en-GB" dirty="0"/>
-              <a:t>Co- vs. counter-current (case 3/case 4)</a:t>
-            </a:r>
+              <a:t>vs. </a:t>
+            </a:r>
+            <a:r>
+              <a:rPr lang="en-GB" dirty="0" smtClean="0"/>
+              <a:t>co-</a:t>
+            </a:r>
+            <a:r>
+              <a:rPr lang="en-GB" dirty="0" smtClean="0"/>
+              <a:t>current (case 3/case 4)</a:t>
+            </a:r>
+            <a:endParaRPr lang="en-GB" dirty="0"/>
           </a:p>
           <a:p>
             <a:pPr lvl="1">
@@ -46694,9 +46907,10 @@
               <a:buChar char="§"/>
             </a:pPr>
             <a:r>
-              <a:rPr lang="en-GB" dirty="0"/>
+              <a:rPr lang="en-GB" dirty="0" smtClean="0"/>
               <a:t>Number of tubes: 17’149 / 40’642</a:t>
             </a:r>
+            <a:endParaRPr lang="en-GB" dirty="0"/>
           </a:p>
           <a:p>
             <a:pPr lvl="1">
@@ -46705,7 +46919,11 @@
             </a:pPr>
             <a:r>
               <a:rPr lang="en-GB" dirty="0"/>
-              <a:t>Heating medium flow: 0.10 / 0.05</a:t>
+              <a:t>Heating medium </a:t>
+            </a:r>
+            <a:r>
+              <a:rPr lang="en-GB" dirty="0" smtClean="0"/>
+              <a:t>flow: 0.10 / 0.05</a:t>
             </a:r>
           </a:p>
           <a:p>
@@ -46714,17 +46932,18 @@
               <a:buChar char="§"/>
             </a:pPr>
             <a:r>
-              <a:rPr lang="en-GB" dirty="0"/>
+              <a:rPr lang="en-GB" dirty="0" smtClean="0"/>
               <a:t>Conversion CH</a:t>
             </a:r>
             <a:r>
-              <a:rPr lang="en-GB" baseline="-25000" dirty="0"/>
+              <a:rPr lang="en-GB" baseline="-25000" dirty="0" smtClean="0"/>
               <a:t>4</a:t>
             </a:r>
             <a:r>
-              <a:rPr lang="en-GB" dirty="0"/>
+              <a:rPr lang="en-GB" dirty="0" smtClean="0"/>
               <a:t>: 0.82 / 0.59</a:t>
             </a:r>
+            <a:endParaRPr lang="en-GB" dirty="0"/>
           </a:p>
         </p:txBody>
       </p:sp>
@@ -46744,7 +46963,7 @@
           <a:lstStyle/>
           <a:p>
             <a:r>
-              <a:rPr lang="fr-CH"/>
+              <a:rPr lang="fr-CH" smtClean="0"/>
               <a:t>23.05.2018</a:t>
             </a:r>
             <a:endParaRPr lang="en-GB" dirty="0"/>
@@ -46767,7 +46986,7 @@
           <a:lstStyle/>
           <a:p>
             <a:r>
-              <a:rPr lang="en-GB"/>
+              <a:rPr lang="en-GB" smtClean="0"/>
               <a:t>Group A</a:t>
             </a:r>
             <a:endParaRPr lang="en-GB" dirty="0"/>
@@ -46819,25 +47038,33 @@
           <a:lstStyle/>
           <a:p>
             <a:r>
-              <a:rPr lang="en-GB" dirty="0"/>
+              <a:rPr lang="en-GB" dirty="0" smtClean="0"/>
               <a:t>Results</a:t>
             </a:r>
+            <a:endParaRPr lang="en-GB" dirty="0"/>
           </a:p>
         </p:txBody>
       </p:sp>
     </p:spTree>
     <p:extLst>
       <p:ext uri="{BB962C8B-B14F-4D97-AF65-F5344CB8AC3E}">
-        <p14:creationId xmlns:p14="http://schemas.microsoft.com/office/powerpoint/2010/main" val="524812646"/>
+        <p14:creationId xmlns:p14="http://schemas.microsoft.com/office/powerpoint/2010/main" val="3101651310"/>
       </p:ext>
     </p:extLst>
   </p:cSld>
   <p:clrMapOvr>
     <a:masterClrMapping/>
   </p:clrMapOvr>
-  <p:transition>
+  <p:transition xmlns:p14="http://schemas.microsoft.com/office/powerpoint/2010/main">
     <p:fade/>
   </p:transition>
+  <p:timing>
+    <p:tnLst>
+      <p:par>
+        <p:cTn xmlns:p14="http://schemas.microsoft.com/office/powerpoint/2010/main" id="1" dur="indefinite" restart="never" nodeType="tmRoot"/>
+      </p:par>
+    </p:tnLst>
+  </p:timing>
 </p:sld>
 </file>
 
@@ -47251,7 +47478,7 @@
   </a:custClrLst>
   <a:extLst>
     <a:ext uri="{05A4C25C-085E-4340-85A3-A5531E510DB2}">
-      <thm15:themeFamily xmlns:thm15="http://schemas.microsoft.com/office/thememl/2012/main" name="eth_praesentation_16zu9_ETH1_d" id="{F9B539DF-8A69-4439-8089-24A40A980317}" vid="{5D9C827C-5BA7-402A-8ABB-C7F0BA4B4DEC}"/>
+      <thm15:themeFamily xmlns:thm15="http://schemas.microsoft.com/office/thememl/2012/main" xmlns="" name="eth_praesentation_16zu9_ETH1_d" id="{F9B539DF-8A69-4439-8089-24A40A980317}" vid="{5D9C827C-5BA7-402A-8ABB-C7F0BA4B4DEC}"/>
     </a:ext>
   </a:extLst>
 </a:theme>
@@ -48272,7 +48499,7 @@
   </a:custClrLst>
   <a:extLst>
     <a:ext uri="{05A4C25C-085E-4340-85A3-A5531E510DB2}">
-      <thm15:themeFamily xmlns:thm15="http://schemas.microsoft.com/office/thememl/2012/main" name="eth_praesentation_16zu9_ETH1_d" id="{F9B539DF-8A69-4439-8089-24A40A980317}" vid="{5D9C827C-5BA7-402A-8ABB-C7F0BA4B4DEC}"/>
+      <thm15:themeFamily xmlns:thm15="http://schemas.microsoft.com/office/thememl/2012/main" xmlns="" name="eth_praesentation_16zu9_ETH1_d" id="{F9B539DF-8A69-4439-8089-24A40A980317}" vid="{5D9C827C-5BA7-402A-8ABB-C7F0BA4B4DEC}"/>
     </a:ext>
   </a:extLst>
 </a:theme>
@@ -48688,7 +48915,7 @@
   </a:custClrLst>
   <a:extLst>
     <a:ext uri="{05A4C25C-085E-4340-85A3-A5531E510DB2}">
-      <thm15:themeFamily xmlns:thm15="http://schemas.microsoft.com/office/thememl/2012/main" name="eth_praesentation_16zu9_ETH1_d" id="{F9B539DF-8A69-4439-8089-24A40A980317}" vid="{5D9C827C-5BA7-402A-8ABB-C7F0BA4B4DEC}"/>
+      <thm15:themeFamily xmlns:thm15="http://schemas.microsoft.com/office/thememl/2012/main" xmlns="" name="eth_praesentation_16zu9_ETH1_d" id="{F9B539DF-8A69-4439-8089-24A40A980317}" vid="{5D9C827C-5BA7-402A-8ABB-C7F0BA4B4DEC}"/>
     </a:ext>
   </a:extLst>
 </a:theme>
@@ -49104,7 +49331,7 @@
   </a:custClrLst>
   <a:extLst>
     <a:ext uri="{05A4C25C-085E-4340-85A3-A5531E510DB2}">
-      <thm15:themeFamily xmlns:thm15="http://schemas.microsoft.com/office/thememl/2012/main" name="eth_praesentation_16zu9_ETH1_d" id="{F9B539DF-8A69-4439-8089-24A40A980317}" vid="{5D9C827C-5BA7-402A-8ABB-C7F0BA4B4DEC}"/>
+      <thm15:themeFamily xmlns:thm15="http://schemas.microsoft.com/office/thememl/2012/main" xmlns="" name="eth_praesentation_16zu9_ETH1_d" id="{F9B539DF-8A69-4439-8089-24A40A980317}" vid="{5D9C827C-5BA7-402A-8ABB-C7F0BA4B4DEC}"/>
     </a:ext>
   </a:extLst>
 </a:theme>
@@ -49520,7 +49747,7 @@
   </a:custClrLst>
   <a:extLst>
     <a:ext uri="{05A4C25C-085E-4340-85A3-A5531E510DB2}">
-      <thm15:themeFamily xmlns:thm15="http://schemas.microsoft.com/office/thememl/2012/main" name="eth_praesentation_16zu9_ETH1_d" id="{F9B539DF-8A69-4439-8089-24A40A980317}" vid="{5D9C827C-5BA7-402A-8ABB-C7F0BA4B4DEC}"/>
+      <thm15:themeFamily xmlns:thm15="http://schemas.microsoft.com/office/thememl/2012/main" xmlns="" name="eth_praesentation_16zu9_ETH1_d" id="{F9B539DF-8A69-4439-8089-24A40A980317}" vid="{5D9C827C-5BA7-402A-8ABB-C7F0BA4B4DEC}"/>
     </a:ext>
   </a:extLst>
 </a:theme>
@@ -49936,7 +50163,7 @@
   </a:custClrLst>
   <a:extLst>
     <a:ext uri="{05A4C25C-085E-4340-85A3-A5531E510DB2}">
-      <thm15:themeFamily xmlns:thm15="http://schemas.microsoft.com/office/thememl/2012/main" name="eth_praesentation_16zu9_ETH1_d" id="{F9B539DF-8A69-4439-8089-24A40A980317}" vid="{5D9C827C-5BA7-402A-8ABB-C7F0BA4B4DEC}"/>
+      <thm15:themeFamily xmlns:thm15="http://schemas.microsoft.com/office/thememl/2012/main" xmlns="" name="eth_praesentation_16zu9_ETH1_d" id="{F9B539DF-8A69-4439-8089-24A40A980317}" vid="{5D9C827C-5BA7-402A-8ABB-C7F0BA4B4DEC}"/>
     </a:ext>
   </a:extLst>
 </a:theme>
@@ -50352,7 +50579,7 @@
   </a:custClrLst>
   <a:extLst>
     <a:ext uri="{05A4C25C-085E-4340-85A3-A5531E510DB2}">
-      <thm15:themeFamily xmlns:thm15="http://schemas.microsoft.com/office/thememl/2012/main" name="eth_praesentation_16zu9_ETH1_d" id="{F9B539DF-8A69-4439-8089-24A40A980317}" vid="{5D9C827C-5BA7-402A-8ABB-C7F0BA4B4DEC}"/>
+      <thm15:themeFamily xmlns:thm15="http://schemas.microsoft.com/office/thememl/2012/main" xmlns="" name="eth_praesentation_16zu9_ETH1_d" id="{F9B539DF-8A69-4439-8089-24A40A980317}" vid="{5D9C827C-5BA7-402A-8ABB-C7F0BA4B4DEC}"/>
     </a:ext>
   </a:extLst>
 </a:theme>
@@ -50768,7 +50995,7 @@
   </a:custClrLst>
   <a:extLst>
     <a:ext uri="{05A4C25C-085E-4340-85A3-A5531E510DB2}">
-      <thm15:themeFamily xmlns:thm15="http://schemas.microsoft.com/office/thememl/2012/main" name="eth_praesentation_16zu9_ETH1_d" id="{F9B539DF-8A69-4439-8089-24A40A980317}" vid="{5D9C827C-5BA7-402A-8ABB-C7F0BA4B4DEC}"/>
+      <thm15:themeFamily xmlns:thm15="http://schemas.microsoft.com/office/thememl/2012/main" xmlns="" name="eth_praesentation_16zu9_ETH1_d" id="{F9B539DF-8A69-4439-8089-24A40A980317}" vid="{5D9C827C-5BA7-402A-8ABB-C7F0BA4B4DEC}"/>
     </a:ext>
   </a:extLst>
 </a:theme>
@@ -51184,7 +51411,7 @@
   </a:custClrLst>
   <a:extLst>
     <a:ext uri="{05A4C25C-085E-4340-85A3-A5531E510DB2}">
-      <thm15:themeFamily xmlns:thm15="http://schemas.microsoft.com/office/thememl/2012/main" name="eth_praesentation_16zu9_ETH1_d" id="{F9B539DF-8A69-4439-8089-24A40A980317}" vid="{5D9C827C-5BA7-402A-8ABB-C7F0BA4B4DEC}"/>
+      <thm15:themeFamily xmlns:thm15="http://schemas.microsoft.com/office/thememl/2012/main" xmlns="" name="eth_praesentation_16zu9_ETH1_d" id="{F9B539DF-8A69-4439-8089-24A40A980317}" vid="{5D9C827C-5BA7-402A-8ABB-C7F0BA4B4DEC}"/>
     </a:ext>
   </a:extLst>
 </a:theme>

</xml_diff>